<commit_message>
updated js and ppt
</commit_message>
<xml_diff>
--- a/Project 3 Oliver King and Ufuoma Atakere-ufilolo.pptx
+++ b/Project 3 Oliver King and Ufuoma Atakere-ufilolo.pptx
@@ -5,10 +5,10 @@
     <p:sldMasterId id="2147483676" r:id="rId4"/>
   </p:sldMasterIdLst>
   <p:notesMasterIdLst>
-    <p:notesMasterId r:id="rId16"/>
+    <p:notesMasterId r:id="rId15"/>
   </p:notesMasterIdLst>
   <p:handoutMasterIdLst>
-    <p:handoutMasterId r:id="rId17"/>
+    <p:handoutMasterId r:id="rId16"/>
   </p:handoutMasterIdLst>
   <p:sldIdLst>
     <p:sldId id="282" r:id="rId5"/>
@@ -19,9 +19,8 @@
     <p:sldId id="289" r:id="rId10"/>
     <p:sldId id="294" r:id="rId11"/>
     <p:sldId id="290" r:id="rId12"/>
-    <p:sldId id="283" r:id="rId13"/>
-    <p:sldId id="291" r:id="rId14"/>
-    <p:sldId id="295" r:id="rId15"/>
+    <p:sldId id="291" r:id="rId13"/>
+    <p:sldId id="295" r:id="rId14"/>
   </p:sldIdLst>
   <p:sldSz cx="12192000" cy="6858000"/>
   <p:notesSz cx="6858000" cy="9144000"/>
@@ -994,7 +993,7 @@
         <a:p>
           <a:r>
             <a:rPr lang="en-CA" dirty="0"/>
-            <a:t>dataset used:</a:t>
+            <a:t>Dataset used:</a:t>
           </a:r>
           <a:endParaRPr lang="en-US" dirty="0"/>
         </a:p>
@@ -1031,7 +1030,7 @@
         <a:p>
           <a:r>
             <a:rPr lang="en-CA" dirty="0"/>
-            <a:t>criteria for country’s inclusion</a:t>
+            <a:t>Criteria for country’s inclusion</a:t>
           </a:r>
           <a:endParaRPr lang="en-US" dirty="0"/>
         </a:p>
@@ -1067,10 +1066,10 @@
         <a:lstStyle/>
         <a:p>
           <a:r>
-            <a:rPr lang="en-CA"/>
-            <a:t>population &gt; 500,000</a:t>
+            <a:rPr lang="en-CA" dirty="0"/>
+            <a:t>Population &gt; 500,000</a:t>
           </a:r>
-          <a:endParaRPr lang="en-US"/>
+          <a:endParaRPr lang="en-US" dirty="0"/>
         </a:p>
       </dgm:t>
     </dgm:pt>
@@ -1105,7 +1104,7 @@
         <a:p>
           <a:r>
             <a:rPr lang="en-CA" dirty="0"/>
-            <a:t>country have 30years (1990-2019) worth of data.</a:t>
+            <a:t>30years of data available (1990-2019)</a:t>
           </a:r>
           <a:endParaRPr lang="en-US" dirty="0"/>
         </a:p>
@@ -1179,7 +1178,7 @@
         <a:p>
           <a:r>
             <a:rPr lang="en-US" dirty="0"/>
-            <a:t>Programming languages used.</a:t>
+            <a:t>Programming languages used:</a:t>
           </a:r>
         </a:p>
       </dgm:t>
@@ -1387,6 +1386,35 @@
         </a:p>
       </dgm:t>
     </dgm:pt>
+    <dgm:pt modelId="{FFBC6907-06C5-114B-8099-7413D3E0DC4C}">
+      <dgm:prSet/>
+      <dgm:spPr/>
+      <dgm:t>
+        <a:bodyPr/>
+        <a:lstStyle/>
+        <a:p>
+          <a:r>
+            <a:rPr lang="en-US" dirty="0"/>
+            <a:t>149 countries included</a:t>
+          </a:r>
+        </a:p>
+      </dgm:t>
+    </dgm:pt>
+    <dgm:pt modelId="{6F32E1C6-6D38-0244-B386-85B21ECC3DC1}" type="parTrans" cxnId="{02A0B6D1-D35B-A94D-8289-81FCA4F6ABF1}">
+      <dgm:prSet/>
+      <dgm:spPr/>
+      <dgm:t>
+        <a:bodyPr/>
+        <a:lstStyle/>
+        <a:p>
+          <a:endParaRPr lang="en-GB"/>
+        </a:p>
+      </dgm:t>
+    </dgm:pt>
+    <dgm:pt modelId="{CE981E0C-4CE9-EC48-BFE5-81658B58E72A}" type="sibTrans" cxnId="{02A0B6D1-D35B-A94D-8289-81FCA4F6ABF1}">
+      <dgm:prSet/>
+      <dgm:spPr/>
+    </dgm:pt>
     <dgm:pt modelId="{38B6E48D-E636-43AC-BDD9-1A0236B5E68F}" type="pres">
       <dgm:prSet presAssocID="{E4043D2D-5320-4B7D-B7CA-3F43E90899F4}" presName="diagram" presStyleCnt="0">
         <dgm:presLayoutVars>
@@ -1456,11 +1484,11 @@
       <dgm:spPr/>
     </dgm:pt>
     <dgm:pt modelId="{0EE44893-4820-4C4C-BC31-79BE390EB42E}" type="pres">
-      <dgm:prSet presAssocID="{5553595A-7192-4D98-8F25-F7C49033699E}" presName="conn2-1" presStyleLbl="parChTrans1D3" presStyleIdx="0" presStyleCnt="7"/>
+      <dgm:prSet presAssocID="{5553595A-7192-4D98-8F25-F7C49033699E}" presName="conn2-1" presStyleLbl="parChTrans1D3" presStyleIdx="0" presStyleCnt="8"/>
       <dgm:spPr/>
     </dgm:pt>
     <dgm:pt modelId="{444DE541-4994-4C3C-BFA3-CFF82E6D8AD8}" type="pres">
-      <dgm:prSet presAssocID="{5553595A-7192-4D98-8F25-F7C49033699E}" presName="connTx" presStyleLbl="parChTrans1D3" presStyleIdx="0" presStyleCnt="7"/>
+      <dgm:prSet presAssocID="{5553595A-7192-4D98-8F25-F7C49033699E}" presName="connTx" presStyleLbl="parChTrans1D3" presStyleIdx="0" presStyleCnt="8"/>
       <dgm:spPr/>
     </dgm:pt>
     <dgm:pt modelId="{38CCE5A2-3B63-474C-B359-7F8407266437}" type="pres">
@@ -1468,7 +1496,7 @@
       <dgm:spPr/>
     </dgm:pt>
     <dgm:pt modelId="{D19BCD9B-3EF8-4982-AC3C-362244FF4B82}" type="pres">
-      <dgm:prSet presAssocID="{DC11DD24-324F-4A67-88B6-5DD5F5A5BFB3}" presName="LevelTwoTextNode" presStyleLbl="node3" presStyleIdx="0" presStyleCnt="7">
+      <dgm:prSet presAssocID="{DC11DD24-324F-4A67-88B6-5DD5F5A5BFB3}" presName="LevelTwoTextNode" presStyleLbl="node3" presStyleIdx="0" presStyleCnt="8" custLinFactNeighborX="-50531" custLinFactNeighborY="36738">
         <dgm:presLayoutVars>
           <dgm:chPref val="3"/>
         </dgm:presLayoutVars>
@@ -1504,11 +1532,11 @@
       <dgm:spPr/>
     </dgm:pt>
     <dgm:pt modelId="{A77B5DDE-E3C2-4D93-9700-552D6EFEDEE9}" type="pres">
-      <dgm:prSet presAssocID="{BCEDF365-9EC9-4DFD-8658-CCE4D348EEFE}" presName="conn2-1" presStyleLbl="parChTrans1D3" presStyleIdx="1" presStyleCnt="7"/>
+      <dgm:prSet presAssocID="{BCEDF365-9EC9-4DFD-8658-CCE4D348EEFE}" presName="conn2-1" presStyleLbl="parChTrans1D3" presStyleIdx="1" presStyleCnt="8"/>
       <dgm:spPr/>
     </dgm:pt>
     <dgm:pt modelId="{2E59D23E-E692-4934-BF2B-B704EBF2426D}" type="pres">
-      <dgm:prSet presAssocID="{BCEDF365-9EC9-4DFD-8658-CCE4D348EEFE}" presName="connTx" presStyleLbl="parChTrans1D3" presStyleIdx="1" presStyleCnt="7"/>
+      <dgm:prSet presAssocID="{BCEDF365-9EC9-4DFD-8658-CCE4D348EEFE}" presName="connTx" presStyleLbl="parChTrans1D3" presStyleIdx="1" presStyleCnt="8"/>
       <dgm:spPr/>
     </dgm:pt>
     <dgm:pt modelId="{8D73FCC9-E6D5-4B43-BF8A-672DEBCEBCB4}" type="pres">
@@ -1516,7 +1544,7 @@
       <dgm:spPr/>
     </dgm:pt>
     <dgm:pt modelId="{8A621903-5A73-4759-9303-8591285A1D0A}" type="pres">
-      <dgm:prSet presAssocID="{5D4E1112-DA3F-45B5-B1BD-EB34EB61EC2F}" presName="LevelTwoTextNode" presStyleLbl="node3" presStyleIdx="1" presStyleCnt="7" custLinFactX="8830" custLinFactNeighborX="100000" custLinFactNeighborY="-16525">
+      <dgm:prSet presAssocID="{5D4E1112-DA3F-45B5-B1BD-EB34EB61EC2F}" presName="LevelTwoTextNode" presStyleLbl="node3" presStyleIdx="1" presStyleCnt="8" custLinFactX="8830" custLinFactNeighborX="100000" custLinFactNeighborY="-16525">
         <dgm:presLayoutVars>
           <dgm:chPref val="3"/>
         </dgm:presLayoutVars>
@@ -1528,11 +1556,11 @@
       <dgm:spPr/>
     </dgm:pt>
     <dgm:pt modelId="{3D6E54CA-CC80-4E03-8E22-75411B1D0999}" type="pres">
-      <dgm:prSet presAssocID="{64E3ED19-44C4-4893-8A88-783BB1D389B5}" presName="conn2-1" presStyleLbl="parChTrans1D3" presStyleIdx="2" presStyleCnt="7"/>
+      <dgm:prSet presAssocID="{64E3ED19-44C4-4893-8A88-783BB1D389B5}" presName="conn2-1" presStyleLbl="parChTrans1D3" presStyleIdx="2" presStyleCnt="8"/>
       <dgm:spPr/>
     </dgm:pt>
     <dgm:pt modelId="{7A252C85-73E3-4873-A134-F78366BFD5F9}" type="pres">
-      <dgm:prSet presAssocID="{64E3ED19-44C4-4893-8A88-783BB1D389B5}" presName="connTx" presStyleLbl="parChTrans1D3" presStyleIdx="2" presStyleCnt="7"/>
+      <dgm:prSet presAssocID="{64E3ED19-44C4-4893-8A88-783BB1D389B5}" presName="connTx" presStyleLbl="parChTrans1D3" presStyleIdx="2" presStyleCnt="8"/>
       <dgm:spPr/>
     </dgm:pt>
     <dgm:pt modelId="{D168169E-4ED8-4FAF-9257-D3BED0F1629C}" type="pres">
@@ -1540,7 +1568,7 @@
       <dgm:spPr/>
     </dgm:pt>
     <dgm:pt modelId="{D823D98E-D95E-4255-9B33-C37FC3F27239}" type="pres">
-      <dgm:prSet presAssocID="{4024505D-E84E-4F96-A70D-E9EE7B812CC7}" presName="LevelTwoTextNode" presStyleLbl="node3" presStyleIdx="2" presStyleCnt="7" custLinFactX="13323" custLinFactNeighborX="100000" custLinFactNeighborY="3259">
+      <dgm:prSet presAssocID="{4024505D-E84E-4F96-A70D-E9EE7B812CC7}" presName="LevelTwoTextNode" presStyleLbl="node3" presStyleIdx="2" presStyleCnt="8" custLinFactX="13323" custLinFactNeighborX="100000" custLinFactNeighborY="3259">
         <dgm:presLayoutVars>
           <dgm:chPref val="3"/>
         </dgm:presLayoutVars>
@@ -1552,11 +1580,11 @@
       <dgm:spPr/>
     </dgm:pt>
     <dgm:pt modelId="{97C5E344-2D91-45F1-BF13-231C9A593A0F}" type="pres">
-      <dgm:prSet presAssocID="{1D4BCD05-21E0-4D5C-9EB1-D5C4C2D2FB71}" presName="conn2-1" presStyleLbl="parChTrans1D3" presStyleIdx="3" presStyleCnt="7"/>
+      <dgm:prSet presAssocID="{1D4BCD05-21E0-4D5C-9EB1-D5C4C2D2FB71}" presName="conn2-1" presStyleLbl="parChTrans1D3" presStyleIdx="3" presStyleCnt="8"/>
       <dgm:spPr/>
     </dgm:pt>
     <dgm:pt modelId="{D982AA12-901B-42F0-A6E4-F9B5FE3545DC}" type="pres">
-      <dgm:prSet presAssocID="{1D4BCD05-21E0-4D5C-9EB1-D5C4C2D2FB71}" presName="connTx" presStyleLbl="parChTrans1D3" presStyleIdx="3" presStyleCnt="7"/>
+      <dgm:prSet presAssocID="{1D4BCD05-21E0-4D5C-9EB1-D5C4C2D2FB71}" presName="connTx" presStyleLbl="parChTrans1D3" presStyleIdx="3" presStyleCnt="8"/>
       <dgm:spPr/>
     </dgm:pt>
     <dgm:pt modelId="{34869E3E-4548-4274-B40F-8BD4D92DB171}" type="pres">
@@ -1564,7 +1592,7 @@
       <dgm:spPr/>
     </dgm:pt>
     <dgm:pt modelId="{CAF69FF8-E0F5-420D-A3C3-15E168D8F304}" type="pres">
-      <dgm:prSet presAssocID="{CD658796-9F20-43A2-965B-95440C6A916C}" presName="LevelTwoTextNode" presStyleLbl="node3" presStyleIdx="3" presStyleCnt="7" custLinFactX="17816" custLinFactNeighborX="100000" custLinFactNeighborY="14058">
+      <dgm:prSet presAssocID="{CD658796-9F20-43A2-965B-95440C6A916C}" presName="LevelTwoTextNode" presStyleLbl="node3" presStyleIdx="3" presStyleCnt="8" custLinFactX="17816" custLinFactNeighborX="100000" custLinFactNeighborY="14058">
         <dgm:presLayoutVars>
           <dgm:chPref val="3"/>
         </dgm:presLayoutVars>
@@ -1576,11 +1604,11 @@
       <dgm:spPr/>
     </dgm:pt>
     <dgm:pt modelId="{79D478B1-7A98-462F-88D4-27E370A531B7}" type="pres">
-      <dgm:prSet presAssocID="{921CB138-45A7-41D5-9C4B-46A9336A4C69}" presName="conn2-1" presStyleLbl="parChTrans1D3" presStyleIdx="4" presStyleCnt="7"/>
+      <dgm:prSet presAssocID="{921CB138-45A7-41D5-9C4B-46A9336A4C69}" presName="conn2-1" presStyleLbl="parChTrans1D3" presStyleIdx="4" presStyleCnt="8"/>
       <dgm:spPr/>
     </dgm:pt>
     <dgm:pt modelId="{F3AE2DAF-BDA4-415F-978E-0185B53EBD19}" type="pres">
-      <dgm:prSet presAssocID="{921CB138-45A7-41D5-9C4B-46A9336A4C69}" presName="connTx" presStyleLbl="parChTrans1D3" presStyleIdx="4" presStyleCnt="7"/>
+      <dgm:prSet presAssocID="{921CB138-45A7-41D5-9C4B-46A9336A4C69}" presName="connTx" presStyleLbl="parChTrans1D3" presStyleIdx="4" presStyleCnt="8"/>
       <dgm:spPr/>
     </dgm:pt>
     <dgm:pt modelId="{61D5AAA9-2BDA-45D3-A40A-B05CB2EB392C}" type="pres">
@@ -1588,7 +1616,7 @@
       <dgm:spPr/>
     </dgm:pt>
     <dgm:pt modelId="{DF55D2D9-91AE-44C6-99A7-DBFC229C222F}" type="pres">
-      <dgm:prSet presAssocID="{3F2EC55E-D9F3-4B37-8934-9063E14BED95}" presName="LevelTwoTextNode" presStyleLbl="node3" presStyleIdx="4" presStyleCnt="7" custLinFactX="22308" custLinFactNeighborX="100000" custLinFactNeighborY="15871">
+      <dgm:prSet presAssocID="{3F2EC55E-D9F3-4B37-8934-9063E14BED95}" presName="LevelTwoTextNode" presStyleLbl="node3" presStyleIdx="4" presStyleCnt="8" custLinFactX="22308" custLinFactNeighborX="100000" custLinFactNeighborY="15871">
         <dgm:presLayoutVars>
           <dgm:chPref val="3"/>
         </dgm:presLayoutVars>
@@ -1624,11 +1652,11 @@
       <dgm:spPr/>
     </dgm:pt>
     <dgm:pt modelId="{AAC93F81-D18D-4468-BFBD-E8E4D9E2CA3F}" type="pres">
-      <dgm:prSet presAssocID="{FD569D1E-9D7E-4609-B8D2-80AF84D260F6}" presName="conn2-1" presStyleLbl="parChTrans1D3" presStyleIdx="5" presStyleCnt="7"/>
+      <dgm:prSet presAssocID="{FD569D1E-9D7E-4609-B8D2-80AF84D260F6}" presName="conn2-1" presStyleLbl="parChTrans1D3" presStyleIdx="5" presStyleCnt="8"/>
       <dgm:spPr/>
     </dgm:pt>
     <dgm:pt modelId="{7A6698F5-1338-4712-B45B-F2A1695C5787}" type="pres">
-      <dgm:prSet presAssocID="{FD569D1E-9D7E-4609-B8D2-80AF84D260F6}" presName="connTx" presStyleLbl="parChTrans1D3" presStyleIdx="5" presStyleCnt="7"/>
+      <dgm:prSet presAssocID="{FD569D1E-9D7E-4609-B8D2-80AF84D260F6}" presName="connTx" presStyleLbl="parChTrans1D3" presStyleIdx="5" presStyleCnt="8"/>
       <dgm:spPr/>
     </dgm:pt>
     <dgm:pt modelId="{720CF5BA-AFCC-4E42-B31D-3AD4770D033C}" type="pres">
@@ -1636,7 +1664,7 @@
       <dgm:spPr/>
     </dgm:pt>
     <dgm:pt modelId="{37DD8E4E-AAF9-49CC-AEA8-1D5BA9599EE6}" type="pres">
-      <dgm:prSet presAssocID="{E3BCF8B7-CEC1-4E23-BD0C-E2EC2DBECB43}" presName="LevelTwoTextNode" presStyleLbl="node3" presStyleIdx="5" presStyleCnt="7" custLinFactNeighborX="5495" custLinFactNeighborY="-18258">
+      <dgm:prSet presAssocID="{E3BCF8B7-CEC1-4E23-BD0C-E2EC2DBECB43}" presName="LevelTwoTextNode" presStyleLbl="node3" presStyleIdx="5" presStyleCnt="8" custLinFactNeighborX="-18820" custLinFactNeighborY="-70224">
         <dgm:presLayoutVars>
           <dgm:chPref val="3"/>
         </dgm:presLayoutVars>
@@ -1648,11 +1676,11 @@
       <dgm:spPr/>
     </dgm:pt>
     <dgm:pt modelId="{AC25F52D-65B8-496D-8005-64891226B4F8}" type="pres">
-      <dgm:prSet presAssocID="{08DA3AC4-4BF8-4170-BA39-755691FF9D41}" presName="conn2-1" presStyleLbl="parChTrans1D3" presStyleIdx="6" presStyleCnt="7"/>
+      <dgm:prSet presAssocID="{08DA3AC4-4BF8-4170-BA39-755691FF9D41}" presName="conn2-1" presStyleLbl="parChTrans1D3" presStyleIdx="6" presStyleCnt="8"/>
       <dgm:spPr/>
     </dgm:pt>
     <dgm:pt modelId="{557E3390-05D9-47EB-AF08-F2091B901EB0}" type="pres">
-      <dgm:prSet presAssocID="{08DA3AC4-4BF8-4170-BA39-755691FF9D41}" presName="connTx" presStyleLbl="parChTrans1D3" presStyleIdx="6" presStyleCnt="7"/>
+      <dgm:prSet presAssocID="{08DA3AC4-4BF8-4170-BA39-755691FF9D41}" presName="connTx" presStyleLbl="parChTrans1D3" presStyleIdx="6" presStyleCnt="8"/>
       <dgm:spPr/>
     </dgm:pt>
     <dgm:pt modelId="{9FBEB2DD-7149-4FCE-AA30-DBF16470CF91}" type="pres">
@@ -1660,7 +1688,7 @@
       <dgm:spPr/>
     </dgm:pt>
     <dgm:pt modelId="{E3BA8EC6-7F82-4DD3-9F43-044BFBA16891}" type="pres">
-      <dgm:prSet presAssocID="{5EBCBBB5-061D-4165-BBCD-A2D4E1F5C478}" presName="LevelTwoTextNode" presStyleLbl="node3" presStyleIdx="6" presStyleCnt="7">
+      <dgm:prSet presAssocID="{5EBCBBB5-061D-4165-BBCD-A2D4E1F5C478}" presName="LevelTwoTextNode" presStyleLbl="node3" presStyleIdx="6" presStyleCnt="8" custScaleX="167933" custLinFactNeighborX="-7851" custLinFactNeighborY="-62632">
         <dgm:presLayoutVars>
           <dgm:chPref val="3"/>
         </dgm:presLayoutVars>
@@ -1669,6 +1697,30 @@
     </dgm:pt>
     <dgm:pt modelId="{0B0BB8D0-D7C3-4CCC-977A-2B1B46AE5A83}" type="pres">
       <dgm:prSet presAssocID="{5EBCBBB5-061D-4165-BBCD-A2D4E1F5C478}" presName="level3hierChild" presStyleCnt="0"/>
+      <dgm:spPr/>
+    </dgm:pt>
+    <dgm:pt modelId="{AD5CFD4B-2A9E-2446-9673-4A7EE50C8D01}" type="pres">
+      <dgm:prSet presAssocID="{6F32E1C6-6D38-0244-B386-85B21ECC3DC1}" presName="conn2-1" presStyleLbl="parChTrans1D3" presStyleIdx="7" presStyleCnt="8"/>
+      <dgm:spPr/>
+    </dgm:pt>
+    <dgm:pt modelId="{F163A4A4-D92B-2D49-ACAF-A2EB93DC94E1}" type="pres">
+      <dgm:prSet presAssocID="{6F32E1C6-6D38-0244-B386-85B21ECC3DC1}" presName="connTx" presStyleLbl="parChTrans1D3" presStyleIdx="7" presStyleCnt="8"/>
+      <dgm:spPr/>
+    </dgm:pt>
+    <dgm:pt modelId="{3AD0BF73-CAE8-AB41-BED1-565C894777FC}" type="pres">
+      <dgm:prSet presAssocID="{FFBC6907-06C5-114B-8099-7413D3E0DC4C}" presName="root2" presStyleCnt="0"/>
+      <dgm:spPr/>
+    </dgm:pt>
+    <dgm:pt modelId="{C07E6253-54D6-804F-9862-32B577429B81}" type="pres">
+      <dgm:prSet presAssocID="{FFBC6907-06C5-114B-8099-7413D3E0DC4C}" presName="LevelTwoTextNode" presStyleLbl="node3" presStyleIdx="7" presStyleCnt="8" custScaleX="158446" custScaleY="83391" custLinFactNeighborX="-401" custLinFactNeighborY="-57905">
+        <dgm:presLayoutVars>
+          <dgm:chPref val="3"/>
+        </dgm:presLayoutVars>
+      </dgm:prSet>
+      <dgm:spPr/>
+    </dgm:pt>
+    <dgm:pt modelId="{A6A75D90-9D9D-3E45-86DC-FC9CBCB33ADC}" type="pres">
+      <dgm:prSet presAssocID="{FFBC6907-06C5-114B-8099-7413D3E0DC4C}" presName="level3hierChild" presStyleCnt="0"/>
       <dgm:spPr/>
     </dgm:pt>
     <dgm:pt modelId="{FD119F9E-325C-41AB-8BDC-67AC0AFBA3C0}" type="pres">
@@ -1703,20 +1755,21 @@
     <dgm:cxn modelId="{9D462B33-2121-4359-A11D-5126E378922F}" srcId="{E4043D2D-5320-4B7D-B7CA-3F43E90899F4}" destId="{579CA616-881E-43D5-8B9A-9187DB74A11B}" srcOrd="1" destOrd="0" parTransId="{6425992A-E855-40B3-9E12-EA15C90DEF48}" sibTransId="{AD0A0084-E97E-4705-8291-2C63B9F20081}"/>
     <dgm:cxn modelId="{D218EC3C-C77F-432B-8B94-C5F31952EE1E}" type="presOf" srcId="{FD569D1E-9D7E-4609-B8D2-80AF84D260F6}" destId="{AAC93F81-D18D-4468-BFBD-E8E4D9E2CA3F}" srcOrd="0" destOrd="0" presId="urn:microsoft.com/office/officeart/2005/8/layout/hierarchy2"/>
     <dgm:cxn modelId="{A848C33F-A708-4244-8030-D72B84983676}" type="presOf" srcId="{97E2F834-291F-4C5C-9045-8D295801748E}" destId="{23BDEE41-CAC9-4155-B53A-E94F8758ADE9}" srcOrd="0" destOrd="0" presId="urn:microsoft.com/office/officeart/2005/8/layout/hierarchy2"/>
+    <dgm:cxn modelId="{3D55F041-112D-4EA9-BD05-77B4ABAE3FA7}" type="presOf" srcId="{921CB138-45A7-41D5-9C4B-46A9336A4C69}" destId="{79D478B1-7A98-462F-88D4-27E370A531B7}" srcOrd="0" destOrd="0" presId="urn:microsoft.com/office/officeart/2005/8/layout/hierarchy2"/>
+    <dgm:cxn modelId="{6BFE1145-CB3E-4240-A0FD-A1E6C11C753A}" srcId="{D79E583B-7818-40BB-B99F-F27E07A7B3B5}" destId="{5D4E1112-DA3F-45B5-B1BD-EB34EB61EC2F}" srcOrd="0" destOrd="0" parTransId="{BCEDF365-9EC9-4DFD-8658-CCE4D348EEFE}" sibTransId="{75E68CB5-3209-4F18-9392-5A8845EF792B}"/>
+    <dgm:cxn modelId="{9F03894D-E270-4AE9-8C09-AD97A9E9AC2E}" srcId="{4398B25D-1C12-4472-83EA-C0C3A80F8063}" destId="{DC11DD24-324F-4A67-88B6-5DD5F5A5BFB3}" srcOrd="0" destOrd="0" parTransId="{5553595A-7192-4D98-8F25-F7C49033699E}" sibTransId="{FC89D4C8-C960-46EC-A021-CAE63FBDB7E0}"/>
     <dgm:cxn modelId="{339B375C-ED5A-4679-BD50-E488527C77B6}" type="presOf" srcId="{C006BECE-FFA8-4BED-9D86-71BC3439130B}" destId="{3795D5B8-3F06-47D4-8AC1-0FFA2A9A77AC}" srcOrd="0" destOrd="0" presId="urn:microsoft.com/office/officeart/2005/8/layout/hierarchy2"/>
     <dgm:cxn modelId="{A2672160-38D7-473D-B13A-7C5EBC1BB526}" type="presOf" srcId="{DC11DD24-324F-4A67-88B6-5DD5F5A5BFB3}" destId="{D19BCD9B-3EF8-4982-AC3C-362244FF4B82}" srcOrd="0" destOrd="0" presId="urn:microsoft.com/office/officeart/2005/8/layout/hierarchy2"/>
     <dgm:cxn modelId="{05974B61-1689-4576-8F56-94FD6C64AE4C}" type="presOf" srcId="{921CB138-45A7-41D5-9C4B-46A9336A4C69}" destId="{F3AE2DAF-BDA4-415F-978E-0185B53EBD19}" srcOrd="1" destOrd="0" presId="urn:microsoft.com/office/officeart/2005/8/layout/hierarchy2"/>
-    <dgm:cxn modelId="{3D55F041-112D-4EA9-BD05-77B4ABAE3FA7}" type="presOf" srcId="{921CB138-45A7-41D5-9C4B-46A9336A4C69}" destId="{79D478B1-7A98-462F-88D4-27E370A531B7}" srcOrd="0" destOrd="0" presId="urn:microsoft.com/office/officeart/2005/8/layout/hierarchy2"/>
     <dgm:cxn modelId="{5AEBA864-DAEF-46AF-AEEC-C55A5D1F0A86}" type="presOf" srcId="{64E3ED19-44C4-4893-8A88-783BB1D389B5}" destId="{7A252C85-73E3-4873-A134-F78366BFD5F9}" srcOrd="1" destOrd="0" presId="urn:microsoft.com/office/officeart/2005/8/layout/hierarchy2"/>
-    <dgm:cxn modelId="{6BFE1145-CB3E-4240-A0FD-A1E6C11C753A}" srcId="{D79E583B-7818-40BB-B99F-F27E07A7B3B5}" destId="{5D4E1112-DA3F-45B5-B1BD-EB34EB61EC2F}" srcOrd="0" destOrd="0" parTransId="{BCEDF365-9EC9-4DFD-8658-CCE4D348EEFE}" sibTransId="{75E68CB5-3209-4F18-9392-5A8845EF792B}"/>
     <dgm:cxn modelId="{F276B067-F872-4DA5-B65A-FF9D9F3319B5}" srcId="{579CA616-881E-43D5-8B9A-9187DB74A11B}" destId="{D79E583B-7818-40BB-B99F-F27E07A7B3B5}" srcOrd="1" destOrd="0" parTransId="{6480750C-AA62-4803-8857-BA914E570E24}" sibTransId="{04777137-3260-49A0-8F7A-0B47B0FCF9A4}"/>
     <dgm:cxn modelId="{7A8E1A6A-9BF3-4EFD-ADD4-2A975180C600}" srcId="{579CA616-881E-43D5-8B9A-9187DB74A11B}" destId="{4398B25D-1C12-4472-83EA-C0C3A80F8063}" srcOrd="0" destOrd="0" parTransId="{C006BECE-FFA8-4BED-9D86-71BC3439130B}" sibTransId="{6AE2B271-064C-4A7E-82D6-21D09C49C5F7}"/>
-    <dgm:cxn modelId="{9F03894D-E270-4AE9-8C09-AD97A9E9AC2E}" srcId="{4398B25D-1C12-4472-83EA-C0C3A80F8063}" destId="{DC11DD24-324F-4A67-88B6-5DD5F5A5BFB3}" srcOrd="0" destOrd="0" parTransId="{5553595A-7192-4D98-8F25-F7C49033699E}" sibTransId="{FC89D4C8-C960-46EC-A021-CAE63FBDB7E0}"/>
     <dgm:cxn modelId="{4313C06D-6B8F-44D8-BF02-C10EA80A3151}" type="presOf" srcId="{FD569D1E-9D7E-4609-B8D2-80AF84D260F6}" destId="{7A6698F5-1338-4712-B45B-F2A1695C5787}" srcOrd="1" destOrd="0" presId="urn:microsoft.com/office/officeart/2005/8/layout/hierarchy2"/>
     <dgm:cxn modelId="{486C757E-2622-42B1-99E8-5E23F6FBA5FA}" type="presOf" srcId="{E3BCF8B7-CEC1-4E23-BD0C-E2EC2DBECB43}" destId="{37DD8E4E-AAF9-49CC-AEA8-1D5BA9599EE6}" srcOrd="0" destOrd="0" presId="urn:microsoft.com/office/officeart/2005/8/layout/hierarchy2"/>
     <dgm:cxn modelId="{B03DFC80-BA29-41CE-A475-C962FDA2607E}" srcId="{D79E583B-7818-40BB-B99F-F27E07A7B3B5}" destId="{4024505D-E84E-4F96-A70D-E9EE7B812CC7}" srcOrd="1" destOrd="0" parTransId="{64E3ED19-44C4-4893-8A88-783BB1D389B5}" sibTransId="{D6098CC2-1657-4C82-8001-C048F8A03FF5}"/>
     <dgm:cxn modelId="{33AF7783-0647-4D51-8957-F6C8D5AF53D9}" type="presOf" srcId="{5553595A-7192-4D98-8F25-F7C49033699E}" destId="{0EE44893-4820-4C4C-BC31-79BE390EB42E}" srcOrd="0" destOrd="0" presId="urn:microsoft.com/office/officeart/2005/8/layout/hierarchy2"/>
     <dgm:cxn modelId="{4CF17C86-6E9F-4629-AA65-02F9E0414675}" type="presOf" srcId="{08DA3AC4-4BF8-4170-BA39-755691FF9D41}" destId="{557E3390-05D9-47EB-AF08-F2091B901EB0}" srcOrd="1" destOrd="0" presId="urn:microsoft.com/office/officeart/2005/8/layout/hierarchy2"/>
+    <dgm:cxn modelId="{1A7E7B90-45B8-394A-8207-5D6B98F010F5}" type="presOf" srcId="{6F32E1C6-6D38-0244-B386-85B21ECC3DC1}" destId="{AD5CFD4B-2A9E-2446-9673-4A7EE50C8D01}" srcOrd="0" destOrd="0" presId="urn:microsoft.com/office/officeart/2005/8/layout/hierarchy2"/>
     <dgm:cxn modelId="{EEEA8497-629A-4A4C-87BB-E0E6F6A4C478}" type="presOf" srcId="{E4043D2D-5320-4B7D-B7CA-3F43E90899F4}" destId="{38B6E48D-E636-43AC-BDD9-1A0236B5E68F}" srcOrd="0" destOrd="0" presId="urn:microsoft.com/office/officeart/2005/8/layout/hierarchy2"/>
     <dgm:cxn modelId="{2F12C898-A882-4DBD-92ED-3C9A3E9AF53D}" srcId="{D79E583B-7818-40BB-B99F-F27E07A7B3B5}" destId="{3F2EC55E-D9F3-4B37-8934-9063E14BED95}" srcOrd="3" destOrd="0" parTransId="{921CB138-45A7-41D5-9C4B-46A9336A4C69}" sibTransId="{297CD21B-7ED9-4911-8F61-23BE90B36D7B}"/>
     <dgm:cxn modelId="{7FC0269D-4978-407E-9911-7200AC23852C}" type="presOf" srcId="{1D4BCD05-21E0-4D5C-9EB1-D5C4C2D2FB71}" destId="{97C5E344-2D91-45F1-BF13-231C9A593A0F}" srcOrd="0" destOrd="0" presId="urn:microsoft.com/office/officeart/2005/8/layout/hierarchy2"/>
@@ -1730,12 +1783,15 @@
     <dgm:cxn modelId="{92E65EC8-2491-4412-8E39-C38087AD1125}" type="presOf" srcId="{CD658796-9F20-43A2-965B-95440C6A916C}" destId="{CAF69FF8-E0F5-420D-A3C3-15E168D8F304}" srcOrd="0" destOrd="0" presId="urn:microsoft.com/office/officeart/2005/8/layout/hierarchy2"/>
     <dgm:cxn modelId="{8D3F0FCB-752A-4F09-8B4D-906FE7F0B32D}" srcId="{D79E583B-7818-40BB-B99F-F27E07A7B3B5}" destId="{CD658796-9F20-43A2-965B-95440C6A916C}" srcOrd="2" destOrd="0" parTransId="{1D4BCD05-21E0-4D5C-9EB1-D5C4C2D2FB71}" sibTransId="{69F2293F-92F5-4912-B911-C5C70DD3BC00}"/>
     <dgm:cxn modelId="{4BF5B4CE-A501-4B16-A231-5E9B3DAF0DCA}" type="presOf" srcId="{08DA3AC4-4BF8-4170-BA39-755691FF9D41}" destId="{AC25F52D-65B8-496D-8005-64891226B4F8}" srcOrd="0" destOrd="0" presId="urn:microsoft.com/office/officeart/2005/8/layout/hierarchy2"/>
+    <dgm:cxn modelId="{E68213D0-946B-C440-AA65-349B1C04863D}" type="presOf" srcId="{FFBC6907-06C5-114B-8099-7413D3E0DC4C}" destId="{C07E6253-54D6-804F-9862-32B577429B81}" srcOrd="0" destOrd="0" presId="urn:microsoft.com/office/officeart/2005/8/layout/hierarchy2"/>
     <dgm:cxn modelId="{666D68D1-A028-4B22-9B90-ACC06BD39B6B}" type="presOf" srcId="{C006BECE-FFA8-4BED-9D86-71BC3439130B}" destId="{2F6B7D70-3320-4E3D-9E4F-84D1BB7A93AA}" srcOrd="1" destOrd="0" presId="urn:microsoft.com/office/officeart/2005/8/layout/hierarchy2"/>
+    <dgm:cxn modelId="{02A0B6D1-D35B-A94D-8289-81FCA4F6ABF1}" srcId="{97E2F834-291F-4C5C-9045-8D295801748E}" destId="{FFBC6907-06C5-114B-8099-7413D3E0DC4C}" srcOrd="2" destOrd="0" parTransId="{6F32E1C6-6D38-0244-B386-85B21ECC3DC1}" sibTransId="{CE981E0C-4CE9-EC48-BFE5-81658B58E72A}"/>
     <dgm:cxn modelId="{A41DC2D9-A814-4DE5-BC9D-130E4A717D25}" srcId="{97E2F834-291F-4C5C-9045-8D295801748E}" destId="{E3BCF8B7-CEC1-4E23-BD0C-E2EC2DBECB43}" srcOrd="0" destOrd="0" parTransId="{FD569D1E-9D7E-4609-B8D2-80AF84D260F6}" sibTransId="{9A48CBEB-8175-40F9-8455-C76F9E6C613E}"/>
     <dgm:cxn modelId="{90FEC7D9-0014-49FD-BD0B-2ACD02ABB46F}" type="presOf" srcId="{1D4BCD05-21E0-4D5C-9EB1-D5C4C2D2FB71}" destId="{D982AA12-901B-42F0-A6E4-F9B5FE3545DC}" srcOrd="1" destOrd="0" presId="urn:microsoft.com/office/officeart/2005/8/layout/hierarchy2"/>
     <dgm:cxn modelId="{06B6BCDD-FCCE-417A-A20E-636A65115537}" type="presOf" srcId="{64E3ED19-44C4-4893-8A88-783BB1D389B5}" destId="{3D6E54CA-CC80-4E03-8E22-75411B1D0999}" srcOrd="0" destOrd="0" presId="urn:microsoft.com/office/officeart/2005/8/layout/hierarchy2"/>
     <dgm:cxn modelId="{8B6C3AE8-5DC2-4CCE-8F38-7A5DCB04D6C5}" srcId="{97E2F834-291F-4C5C-9045-8D295801748E}" destId="{5EBCBBB5-061D-4165-BBCD-A2D4E1F5C478}" srcOrd="1" destOrd="0" parTransId="{08DA3AC4-4BF8-4170-BA39-755691FF9D41}" sibTransId="{1BD8BEC9-5EB9-4238-B28F-E48C1ECF066A}"/>
     <dgm:cxn modelId="{E0CEB5F4-3880-485F-935A-BF465E2A3203}" type="presOf" srcId="{5553595A-7192-4D98-8F25-F7C49033699E}" destId="{444DE541-4994-4C3C-BFA3-CFF82E6D8AD8}" srcOrd="1" destOrd="0" presId="urn:microsoft.com/office/officeart/2005/8/layout/hierarchy2"/>
+    <dgm:cxn modelId="{CD4DA8FA-5D71-3E47-AFD1-AFF82385CC2C}" type="presOf" srcId="{6F32E1C6-6D38-0244-B386-85B21ECC3DC1}" destId="{F163A4A4-D92B-2D49-ACAF-A2EB93DC94E1}" srcOrd="1" destOrd="0" presId="urn:microsoft.com/office/officeart/2005/8/layout/hierarchy2"/>
     <dgm:cxn modelId="{4A5B6C97-065D-4317-997D-58726D9A8CAC}" type="presParOf" srcId="{38B6E48D-E636-43AC-BDD9-1A0236B5E68F}" destId="{5B67714D-8EC2-4C30-9D3C-EE3901530D80}" srcOrd="0" destOrd="0" presId="urn:microsoft.com/office/officeart/2005/8/layout/hierarchy2"/>
     <dgm:cxn modelId="{79A77CB6-0EF6-418F-AB93-C8AABA2F5239}" type="presParOf" srcId="{5B67714D-8EC2-4C30-9D3C-EE3901530D80}" destId="{BA4FF6A0-DF63-4FAD-A6CC-C06257F343F0}" srcOrd="0" destOrd="0" presId="urn:microsoft.com/office/officeart/2005/8/layout/hierarchy2"/>
     <dgm:cxn modelId="{88BA3F56-791A-45F7-A248-1059259B3438}" type="presParOf" srcId="{5B67714D-8EC2-4C30-9D3C-EE3901530D80}" destId="{A5750978-64D8-47E8-8090-F9AC3B8C8F3F}" srcOrd="1" destOrd="0" presId="urn:microsoft.com/office/officeart/2005/8/layout/hierarchy2"/>
@@ -1792,6 +1848,11 @@
     <dgm:cxn modelId="{0BD887BD-2C1F-436C-BDBB-E246132731E6}" type="presParOf" srcId="{35A5C04A-4CC8-403E-B434-096194AE23C7}" destId="{9FBEB2DD-7149-4FCE-AA30-DBF16470CF91}" srcOrd="3" destOrd="0" presId="urn:microsoft.com/office/officeart/2005/8/layout/hierarchy2"/>
     <dgm:cxn modelId="{F59BB9B1-0611-452B-8BAD-507FD0EFBC4F}" type="presParOf" srcId="{9FBEB2DD-7149-4FCE-AA30-DBF16470CF91}" destId="{E3BA8EC6-7F82-4DD3-9F43-044BFBA16891}" srcOrd="0" destOrd="0" presId="urn:microsoft.com/office/officeart/2005/8/layout/hierarchy2"/>
     <dgm:cxn modelId="{FFBCD9C7-47A8-434B-97A6-3D0D9F3AB984}" type="presParOf" srcId="{9FBEB2DD-7149-4FCE-AA30-DBF16470CF91}" destId="{0B0BB8D0-D7C3-4CCC-977A-2B1B46AE5A83}" srcOrd="1" destOrd="0" presId="urn:microsoft.com/office/officeart/2005/8/layout/hierarchy2"/>
+    <dgm:cxn modelId="{4199D5DA-739D-D04F-8BFE-E72B19F057B0}" type="presParOf" srcId="{35A5C04A-4CC8-403E-B434-096194AE23C7}" destId="{AD5CFD4B-2A9E-2446-9673-4A7EE50C8D01}" srcOrd="4" destOrd="0" presId="urn:microsoft.com/office/officeart/2005/8/layout/hierarchy2"/>
+    <dgm:cxn modelId="{C537AA8A-34FB-324A-9694-A2C1B2EDC136}" type="presParOf" srcId="{AD5CFD4B-2A9E-2446-9673-4A7EE50C8D01}" destId="{F163A4A4-D92B-2D49-ACAF-A2EB93DC94E1}" srcOrd="0" destOrd="0" presId="urn:microsoft.com/office/officeart/2005/8/layout/hierarchy2"/>
+    <dgm:cxn modelId="{74D143C9-9AD8-6C40-983F-D3D74198B058}" type="presParOf" srcId="{35A5C04A-4CC8-403E-B434-096194AE23C7}" destId="{3AD0BF73-CAE8-AB41-BED1-565C894777FC}" srcOrd="5" destOrd="0" presId="urn:microsoft.com/office/officeart/2005/8/layout/hierarchy2"/>
+    <dgm:cxn modelId="{98BE4EE1-510F-0142-8727-8821A5D25062}" type="presParOf" srcId="{3AD0BF73-CAE8-AB41-BED1-565C894777FC}" destId="{C07E6253-54D6-804F-9862-32B577429B81}" srcOrd="0" destOrd="0" presId="urn:microsoft.com/office/officeart/2005/8/layout/hierarchy2"/>
+    <dgm:cxn modelId="{F0C1F1CE-8B87-0448-888F-D84CD7BD4223}" type="presParOf" srcId="{3AD0BF73-CAE8-AB41-BED1-565C894777FC}" destId="{A6A75D90-9D9D-3E45-86DC-FC9CBCB33ADC}" srcOrd="1" destOrd="0" presId="urn:microsoft.com/office/officeart/2005/8/layout/hierarchy2"/>
     <dgm:cxn modelId="{E2AC9B80-4519-4072-ABDE-0D57FFD3AAF8}" type="presParOf" srcId="{38B6E48D-E636-43AC-BDD9-1A0236B5E68F}" destId="{FD119F9E-325C-41AB-8BDC-67AC0AFBA3C0}" srcOrd="2" destOrd="0" presId="urn:microsoft.com/office/officeart/2005/8/layout/hierarchy2"/>
     <dgm:cxn modelId="{E0E99FD2-B470-4EC4-AA69-2911B7CB6889}" type="presParOf" srcId="{FD119F9E-325C-41AB-8BDC-67AC0AFBA3C0}" destId="{8165F82D-C410-4BC9-B18B-0BBCD1F68B12}" srcOrd="0" destOrd="0" presId="urn:microsoft.com/office/officeart/2005/8/layout/hierarchy2"/>
     <dgm:cxn modelId="{F7D3B6E5-C46C-443A-829E-C34D24E50D9D}" type="presParOf" srcId="{FD119F9E-325C-41AB-8BDC-67AC0AFBA3C0}" destId="{62D8B1E4-9D30-41FF-9379-3646DF0F5AD0}" srcOrd="1" destOrd="0" presId="urn:microsoft.com/office/officeart/2005/8/layout/hierarchy2"/>
@@ -1821,8 +1882,8 @@
       </dsp:nvSpPr>
       <dsp:spPr>
         <a:xfrm>
-          <a:off x="377266" y="1752604"/>
-          <a:ext cx="1696042" cy="848021"/>
+          <a:off x="561410" y="1743046"/>
+          <a:ext cx="1509412" cy="754706"/>
         </a:xfrm>
         <a:prstGeom prst="roundRect">
           <a:avLst>
@@ -1866,12 +1927,12 @@
         </a:fontRef>
       </dsp:style>
       <dsp:txBody>
-        <a:bodyPr spcFirstLastPara="0" vert="horz" wrap="square" lIns="9525" tIns="9525" rIns="9525" bIns="9525" numCol="1" spcCol="1270" anchor="ctr" anchorCtr="0">
+        <a:bodyPr spcFirstLastPara="0" vert="horz" wrap="square" lIns="10160" tIns="10160" rIns="10160" bIns="10160" numCol="1" spcCol="1270" anchor="ctr" anchorCtr="0">
           <a:noAutofit/>
         </a:bodyPr>
         <a:lstStyle/>
         <a:p>
-          <a:pPr marL="0" lvl="0" indent="0" algn="ctr" defTabSz="666750">
+          <a:pPr marL="0" lvl="0" indent="0" algn="ctr" defTabSz="711200">
             <a:lnSpc>
               <a:spcPct val="90000"/>
             </a:lnSpc>
@@ -1884,15 +1945,15 @@
             <a:buNone/>
           </a:pPr>
           <a:r>
-            <a:rPr lang="en-CA" sz="1500" kern="1200" dirty="0"/>
+            <a:rPr lang="en-CA" sz="1600" kern="1200" dirty="0"/>
             <a:t>Project objectives</a:t>
           </a:r>
-          <a:endParaRPr lang="en-US" sz="1500" kern="1200" dirty="0"/>
+          <a:endParaRPr lang="en-US" sz="1600" kern="1200" dirty="0"/>
         </a:p>
       </dsp:txBody>
       <dsp:txXfrm>
-        <a:off x="402104" y="1777442"/>
-        <a:ext cx="1646366" cy="798345"/>
+        <a:off x="583515" y="1765151"/>
+        <a:ext cx="1465202" cy="710496"/>
       </dsp:txXfrm>
     </dsp:sp>
     <dsp:sp modelId="{8AEAA207-5D99-40DC-B605-4692E94A8F97}">
@@ -1902,8 +1963,8 @@
       </dsp:nvSpPr>
       <dsp:spPr>
         <a:xfrm>
-          <a:off x="475093" y="3276600"/>
-          <a:ext cx="1696042" cy="848021"/>
+          <a:off x="648473" y="3099343"/>
+          <a:ext cx="1509412" cy="754706"/>
         </a:xfrm>
         <a:prstGeom prst="roundRect">
           <a:avLst>
@@ -1947,12 +2008,12 @@
         </a:fontRef>
       </dsp:style>
       <dsp:txBody>
-        <a:bodyPr spcFirstLastPara="0" vert="horz" wrap="square" lIns="9525" tIns="9525" rIns="9525" bIns="9525" numCol="1" spcCol="1270" anchor="ctr" anchorCtr="0">
+        <a:bodyPr spcFirstLastPara="0" vert="horz" wrap="square" lIns="10160" tIns="10160" rIns="10160" bIns="10160" numCol="1" spcCol="1270" anchor="ctr" anchorCtr="0">
           <a:noAutofit/>
         </a:bodyPr>
         <a:lstStyle/>
         <a:p>
-          <a:pPr marL="0" lvl="0" indent="0" algn="ctr" defTabSz="666750">
+          <a:pPr marL="0" lvl="0" indent="0" algn="ctr" defTabSz="711200">
             <a:lnSpc>
               <a:spcPct val="90000"/>
             </a:lnSpc>
@@ -1965,15 +2026,15 @@
             <a:buNone/>
           </a:pPr>
           <a:r>
-            <a:rPr lang="en-CA" sz="1500" kern="1200"/>
+            <a:rPr lang="en-CA" sz="1600" kern="1200"/>
             <a:t>Database applications</a:t>
           </a:r>
-          <a:endParaRPr lang="en-US" sz="1500" kern="1200"/>
+          <a:endParaRPr lang="en-US" sz="1600" kern="1200"/>
         </a:p>
       </dsp:txBody>
       <dsp:txXfrm>
-        <a:off x="499931" y="3301438"/>
-        <a:ext cx="1646366" cy="798345"/>
+        <a:off x="670578" y="3121448"/>
+        <a:ext cx="1465202" cy="710496"/>
       </dsp:txXfrm>
     </dsp:sp>
     <dsp:sp modelId="{3795D5B8-3F06-47D4-8AC1-0FFA2A9A77AC}">
@@ -1982,9 +2043,9 @@
         <dsp:cNvSpPr/>
       </dsp:nvSpPr>
       <dsp:spPr>
-        <a:xfrm rot="17414040">
-          <a:off x="1268024" y="2393829"/>
-          <a:ext cx="2761197" cy="22763"/>
+        <a:xfrm rot="17330182">
+          <a:off x="1266667" y="2220891"/>
+          <a:ext cx="2632326" cy="20258"/>
         </a:xfrm>
         <a:custGeom>
           <a:avLst/>
@@ -1995,10 +2056,10 @@
           <a:pathLst>
             <a:path>
               <a:moveTo>
-                <a:pt x="0" y="11381"/>
+                <a:pt x="0" y="10129"/>
               </a:moveTo>
               <a:lnTo>
-                <a:pt x="2761197" y="11381"/>
+                <a:pt x="2632326" y="10129"/>
               </a:lnTo>
             </a:path>
           </a:pathLst>
@@ -2053,8 +2114,8 @@
         </a:p>
       </dsp:txBody>
       <dsp:txXfrm>
-        <a:off x="2579593" y="2336181"/>
-        <a:ext cx="138059" cy="138059"/>
+        <a:off x="2517023" y="2165213"/>
+        <a:ext cx="131616" cy="131616"/>
       </dsp:txXfrm>
     </dsp:sp>
     <dsp:sp modelId="{1AF35A9D-CD58-4D96-AB5E-9A85A745F769}">
@@ -2064,8 +2125,8 @@
       </dsp:nvSpPr>
       <dsp:spPr>
         <a:xfrm>
-          <a:off x="3126110" y="685801"/>
-          <a:ext cx="2036676" cy="848021"/>
+          <a:off x="3007776" y="607992"/>
+          <a:ext cx="1812563" cy="754706"/>
         </a:xfrm>
         <a:prstGeom prst="roundRect">
           <a:avLst>
@@ -2109,12 +2170,12 @@
         </a:fontRef>
       </dsp:style>
       <dsp:txBody>
-        <a:bodyPr spcFirstLastPara="0" vert="horz" wrap="square" lIns="9525" tIns="9525" rIns="9525" bIns="9525" numCol="1" spcCol="1270" anchor="ctr" anchorCtr="0">
+        <a:bodyPr spcFirstLastPara="0" vert="horz" wrap="square" lIns="10160" tIns="10160" rIns="10160" bIns="10160" numCol="1" spcCol="1270" anchor="ctr" anchorCtr="0">
           <a:noAutofit/>
         </a:bodyPr>
         <a:lstStyle/>
         <a:p>
-          <a:pPr marL="0" lvl="0" indent="0" algn="ctr" defTabSz="666750">
+          <a:pPr marL="0" lvl="0" indent="0" algn="ctr" defTabSz="711200">
             <a:lnSpc>
               <a:spcPct val="90000"/>
             </a:lnSpc>
@@ -2127,15 +2188,15 @@
             <a:buNone/>
           </a:pPr>
           <a:r>
-            <a:rPr lang="en-CA" sz="1500" kern="1200" dirty="0"/>
-            <a:t>dataset used:</a:t>
+            <a:rPr lang="en-CA" sz="1600" kern="1200" dirty="0"/>
+            <a:t>Dataset used:</a:t>
           </a:r>
-          <a:endParaRPr lang="en-US" sz="1500" kern="1200" dirty="0"/>
+          <a:endParaRPr lang="en-US" sz="1600" kern="1200" dirty="0"/>
         </a:p>
       </dsp:txBody>
       <dsp:txXfrm>
-        <a:off x="3150948" y="710639"/>
-        <a:ext cx="1987000" cy="798345"/>
+        <a:off x="3029881" y="630097"/>
+        <a:ext cx="1768353" cy="710496"/>
       </dsp:txXfrm>
     </dsp:sp>
     <dsp:sp modelId="{0EE44893-4820-4C4C-BC31-79BE390EB42E}">
@@ -2144,9 +2205,9 @@
         <dsp:cNvSpPr/>
       </dsp:nvSpPr>
       <dsp:spPr>
-        <a:xfrm rot="20394537">
-          <a:off x="5102318" y="757084"/>
-          <a:ext cx="1987380" cy="22763"/>
+        <a:xfrm rot="20388744">
+          <a:off x="4790939" y="810063"/>
+          <a:ext cx="957141" cy="20258"/>
         </a:xfrm>
         <a:custGeom>
           <a:avLst/>
@@ -2157,10 +2218,10 @@
           <a:pathLst>
             <a:path>
               <a:moveTo>
-                <a:pt x="0" y="11381"/>
+                <a:pt x="0" y="10129"/>
               </a:moveTo>
               <a:lnTo>
-                <a:pt x="1987380" y="11381"/>
+                <a:pt x="957141" y="10129"/>
               </a:lnTo>
             </a:path>
           </a:pathLst>
@@ -2199,7 +2260,7 @@
         </a:bodyPr>
         <a:lstStyle/>
         <a:p>
-          <a:pPr marL="0" lvl="0" indent="0" algn="ctr" defTabSz="311150">
+          <a:pPr marL="0" lvl="0" indent="0" algn="ctr" defTabSz="222250">
             <a:lnSpc>
               <a:spcPct val="90000"/>
             </a:lnSpc>
@@ -2211,12 +2272,12 @@
             </a:spcAft>
             <a:buNone/>
           </a:pPr>
-          <a:endParaRPr lang="en-AU" sz="700" kern="1200"/>
+          <a:endParaRPr lang="en-AU" sz="500" kern="1200"/>
         </a:p>
       </dsp:txBody>
       <dsp:txXfrm>
-        <a:off x="6046324" y="718782"/>
-        <a:ext cx="99369" cy="99369"/>
+        <a:off x="5245581" y="796264"/>
+        <a:ext cx="47857" cy="47857"/>
       </dsp:txXfrm>
     </dsp:sp>
     <dsp:sp modelId="{D19BCD9B-3EF8-4982-AC3C-362244FF4B82}">
@@ -2226,8 +2287,8 @@
       </dsp:nvSpPr>
       <dsp:spPr>
         <a:xfrm>
-          <a:off x="7029230" y="3110"/>
-          <a:ext cx="1696042" cy="848021"/>
+          <a:off x="5718681" y="277687"/>
+          <a:ext cx="1509412" cy="754706"/>
         </a:xfrm>
         <a:prstGeom prst="roundRect">
           <a:avLst>
@@ -2271,12 +2332,12 @@
         </a:fontRef>
       </dsp:style>
       <dsp:txBody>
-        <a:bodyPr spcFirstLastPara="0" vert="horz" wrap="square" lIns="9525" tIns="9525" rIns="9525" bIns="9525" numCol="1" spcCol="1270" anchor="ctr" anchorCtr="0">
+        <a:bodyPr spcFirstLastPara="0" vert="horz" wrap="square" lIns="10160" tIns="10160" rIns="10160" bIns="10160" numCol="1" spcCol="1270" anchor="ctr" anchorCtr="0">
           <a:noAutofit/>
         </a:bodyPr>
         <a:lstStyle/>
         <a:p>
-          <a:pPr marL="0" lvl="0" indent="0" algn="ctr" defTabSz="666750">
+          <a:pPr marL="0" lvl="0" indent="0" algn="ctr" defTabSz="711200">
             <a:lnSpc>
               <a:spcPct val="90000"/>
             </a:lnSpc>
@@ -2289,15 +2350,15 @@
             <a:buNone/>
           </a:pPr>
           <a:r>
-            <a:rPr lang="en-CA" sz="1500" kern="1200" dirty="0"/>
+            <a:rPr lang="en-CA" sz="1600" kern="1200" dirty="0"/>
             <a:t> World bank Data</a:t>
           </a:r>
-          <a:endParaRPr lang="en-US" sz="1500" kern="1200" dirty="0"/>
+          <a:endParaRPr lang="en-US" sz="1600" kern="1200" dirty="0"/>
         </a:p>
       </dsp:txBody>
       <dsp:txXfrm>
-        <a:off x="7054068" y="27948"/>
-        <a:ext cx="1646366" cy="798345"/>
+        <a:off x="5740786" y="299792"/>
+        <a:ext cx="1465202" cy="710496"/>
       </dsp:txXfrm>
     </dsp:sp>
     <dsp:sp modelId="{58FA7E4E-33F5-416C-A9F0-FB7F2D2E4E78}">
@@ -2306,9 +2367,9 @@
         <dsp:cNvSpPr/>
       </dsp:nvSpPr>
       <dsp:spPr>
-        <a:xfrm rot="20134621">
-          <a:off x="2079373" y="3265218"/>
-          <a:ext cx="2050988" cy="22763"/>
+        <a:xfrm rot="19829921">
+          <a:off x="2034094" y="2996394"/>
+          <a:ext cx="1909553" cy="20258"/>
         </a:xfrm>
         <a:custGeom>
           <a:avLst/>
@@ -2319,10 +2380,10 @@
           <a:pathLst>
             <a:path>
               <a:moveTo>
-                <a:pt x="0" y="11381"/>
+                <a:pt x="0" y="10129"/>
               </a:moveTo>
               <a:lnTo>
-                <a:pt x="2050988" y="11381"/>
+                <a:pt x="1909553" y="10129"/>
               </a:lnTo>
             </a:path>
           </a:pathLst>
@@ -2361,7 +2422,7 @@
         </a:bodyPr>
         <a:lstStyle/>
         <a:p>
-          <a:pPr marL="0" lvl="0" indent="0" algn="ctr" defTabSz="311150">
+          <a:pPr marL="0" lvl="0" indent="0" algn="ctr" defTabSz="266700">
             <a:lnSpc>
               <a:spcPct val="90000"/>
             </a:lnSpc>
@@ -2373,12 +2434,12 @@
             </a:spcAft>
             <a:buNone/>
           </a:pPr>
-          <a:endParaRPr lang="en-AU" sz="700" kern="1200"/>
+          <a:endParaRPr lang="en-AU" sz="600" kern="1200"/>
         </a:p>
       </dsp:txBody>
       <dsp:txXfrm>
-        <a:off x="3053592" y="3225325"/>
-        <a:ext cx="102549" cy="102549"/>
+        <a:off x="2941132" y="2958784"/>
+        <a:ext cx="95477" cy="95477"/>
       </dsp:txXfrm>
     </dsp:sp>
     <dsp:sp modelId="{06D93B86-2926-450D-B2B6-2384098AD081}">
@@ -2388,8 +2449,8 @@
       </dsp:nvSpPr>
       <dsp:spPr>
         <a:xfrm>
-          <a:off x="4038598" y="2428578"/>
-          <a:ext cx="1696042" cy="848021"/>
+          <a:off x="3819855" y="2158996"/>
+          <a:ext cx="1509412" cy="754706"/>
         </a:xfrm>
         <a:prstGeom prst="roundRect">
           <a:avLst>
@@ -2433,12 +2494,12 @@
         </a:fontRef>
       </dsp:style>
       <dsp:txBody>
-        <a:bodyPr spcFirstLastPara="0" vert="horz" wrap="square" lIns="9525" tIns="9525" rIns="9525" bIns="9525" numCol="1" spcCol="1270" anchor="ctr" anchorCtr="0">
+        <a:bodyPr spcFirstLastPara="0" vert="horz" wrap="square" lIns="10160" tIns="10160" rIns="10160" bIns="10160" numCol="1" spcCol="1270" anchor="ctr" anchorCtr="0">
           <a:noAutofit/>
         </a:bodyPr>
         <a:lstStyle/>
         <a:p>
-          <a:pPr marL="0" lvl="0" indent="0" algn="ctr" defTabSz="666750">
+          <a:pPr marL="0" lvl="0" indent="0" algn="ctr" defTabSz="711200">
             <a:lnSpc>
               <a:spcPct val="90000"/>
             </a:lnSpc>
@@ -2451,14 +2512,14 @@
             <a:buNone/>
           </a:pPr>
           <a:r>
-            <a:rPr lang="en-US" sz="1500" kern="1200" dirty="0"/>
-            <a:t>Programming languages used.</a:t>
+            <a:rPr lang="en-US" sz="1600" kern="1200" dirty="0"/>
+            <a:t>Programming languages used:</a:t>
           </a:r>
         </a:p>
       </dsp:txBody>
       <dsp:txXfrm>
-        <a:off x="4063436" y="2453416"/>
-        <a:ext cx="1646366" cy="798345"/>
+        <a:off x="3841960" y="2181101"/>
+        <a:ext cx="1465202" cy="710496"/>
       </dsp:txXfrm>
     </dsp:sp>
     <dsp:sp modelId="{A77B5DDE-E3C2-4D93-9700-552D6EFEDEE9}">
@@ -2468,8 +2529,8 @@
       </dsp:nvSpPr>
       <dsp:spPr>
         <a:xfrm rot="19824098">
-          <a:off x="5524555" y="2046018"/>
-          <a:ext cx="3219931" cy="22763"/>
+          <a:off x="5142299" y="1818532"/>
+          <a:ext cx="2865614" cy="20258"/>
         </a:xfrm>
         <a:custGeom>
           <a:avLst/>
@@ -2480,171 +2541,10 @@
           <a:pathLst>
             <a:path>
               <a:moveTo>
-                <a:pt x="0" y="11381"/>
+                <a:pt x="0" y="10129"/>
               </a:moveTo>
               <a:lnTo>
-                <a:pt x="3219931" y="11381"/>
-              </a:lnTo>
-            </a:path>
-          </a:pathLst>
-        </a:custGeom>
-        <a:noFill/>
-        <a:ln w="12700" cap="flat" cmpd="sng" algn="ctr">
-          <a:solidFill>
-            <a:schemeClr val="accent5">
-              <a:shade val="80000"/>
-              <a:hueOff val="0"/>
-              <a:satOff val="0"/>
-              <a:lumOff val="0"/>
-              <a:alphaOff val="0"/>
-            </a:schemeClr>
-          </a:solidFill>
-          <a:prstDash val="solid"/>
-          <a:miter lim="800000"/>
-        </a:ln>
-        <a:effectLst/>
-      </dsp:spPr>
-      <dsp:style>
-        <a:lnRef idx="2">
-          <a:scrgbClr r="0" g="0" b="0"/>
-        </a:lnRef>
-        <a:fillRef idx="0">
-          <a:scrgbClr r="0" g="0" b="0"/>
-        </a:fillRef>
-        <a:effectRef idx="0">
-          <a:scrgbClr r="0" g="0" b="0"/>
-        </a:effectRef>
-        <a:fontRef idx="minor"/>
-      </dsp:style>
-      <dsp:txBody>
-        <a:bodyPr spcFirstLastPara="0" vert="horz" wrap="square" lIns="12700" tIns="0" rIns="12700" bIns="0" numCol="1" spcCol="1270" anchor="ctr" anchorCtr="0">
-          <a:noAutofit/>
-        </a:bodyPr>
-        <a:lstStyle/>
-        <a:p>
-          <a:pPr marL="0" lvl="0" indent="0" algn="ctr" defTabSz="488950">
-            <a:lnSpc>
-              <a:spcPct val="90000"/>
-            </a:lnSpc>
-            <a:spcBef>
-              <a:spcPct val="0"/>
-            </a:spcBef>
-            <a:spcAft>
-              <a:spcPct val="35000"/>
-            </a:spcAft>
-            <a:buNone/>
-          </a:pPr>
-          <a:endParaRPr lang="en-AU" sz="1100" kern="1200"/>
-        </a:p>
-      </dsp:txBody>
-      <dsp:txXfrm>
-        <a:off x="7054022" y="1976901"/>
-        <a:ext cx="160996" cy="160996"/>
-      </dsp:txXfrm>
-    </dsp:sp>
-    <dsp:sp modelId="{8A621903-5A73-4759-9303-8591285A1D0A}">
-      <dsp:nvSpPr>
-        <dsp:cNvPr id="0" name=""/>
-        <dsp:cNvSpPr/>
-      </dsp:nvSpPr>
-      <dsp:spPr>
-        <a:xfrm>
-          <a:off x="8534400" y="838199"/>
-          <a:ext cx="1696042" cy="848021"/>
-        </a:xfrm>
-        <a:prstGeom prst="roundRect">
-          <a:avLst>
-            <a:gd name="adj" fmla="val 10000"/>
-          </a:avLst>
-        </a:prstGeom>
-        <a:solidFill>
-          <a:schemeClr val="accent5">
-            <a:hueOff val="0"/>
-            <a:satOff val="0"/>
-            <a:lumOff val="0"/>
-            <a:alphaOff val="0"/>
-          </a:schemeClr>
-        </a:solidFill>
-        <a:ln w="19050" cap="flat" cmpd="sng" algn="ctr">
-          <a:solidFill>
-            <a:schemeClr val="lt1">
-              <a:hueOff val="0"/>
-              <a:satOff val="0"/>
-              <a:lumOff val="0"/>
-              <a:alphaOff val="0"/>
-            </a:schemeClr>
-          </a:solidFill>
-          <a:prstDash val="solid"/>
-          <a:miter lim="800000"/>
-        </a:ln>
-        <a:effectLst/>
-      </dsp:spPr>
-      <dsp:style>
-        <a:lnRef idx="3">
-          <a:scrgbClr r="0" g="0" b="0"/>
-        </a:lnRef>
-        <a:fillRef idx="1">
-          <a:scrgbClr r="0" g="0" b="0"/>
-        </a:fillRef>
-        <a:effectRef idx="1">
-          <a:scrgbClr r="0" g="0" b="0"/>
-        </a:effectRef>
-        <a:fontRef idx="minor">
-          <a:schemeClr val="lt1"/>
-        </a:fontRef>
-      </dsp:style>
-      <dsp:txBody>
-        <a:bodyPr spcFirstLastPara="0" vert="horz" wrap="square" lIns="9525" tIns="9525" rIns="9525" bIns="9525" numCol="1" spcCol="1270" anchor="ctr" anchorCtr="0">
-          <a:noAutofit/>
-        </a:bodyPr>
-        <a:lstStyle/>
-        <a:p>
-          <a:pPr marL="0" lvl="0" indent="0" algn="ctr" defTabSz="666750">
-            <a:lnSpc>
-              <a:spcPct val="90000"/>
-            </a:lnSpc>
-            <a:spcBef>
-              <a:spcPct val="0"/>
-            </a:spcBef>
-            <a:spcAft>
-              <a:spcPct val="35000"/>
-            </a:spcAft>
-            <a:buNone/>
-          </a:pPr>
-          <a:r>
-            <a:rPr lang="en-US" sz="1500" kern="1200" dirty="0"/>
-            <a:t>Python</a:t>
-          </a:r>
-        </a:p>
-      </dsp:txBody>
-      <dsp:txXfrm>
-        <a:off x="8559238" y="863037"/>
-        <a:ext cx="1646366" cy="798345"/>
-      </dsp:txXfrm>
-    </dsp:sp>
-    <dsp:sp modelId="{3D6E54CA-CC80-4E03-8E22-75411B1D0999}">
-      <dsp:nvSpPr>
-        <dsp:cNvPr id="0" name=""/>
-        <dsp:cNvSpPr/>
-      </dsp:nvSpPr>
-      <dsp:spPr>
-        <a:xfrm rot="21069479">
-          <a:off x="5717346" y="2617516"/>
-          <a:ext cx="2910551" cy="22763"/>
-        </a:xfrm>
-        <a:custGeom>
-          <a:avLst/>
-          <a:gdLst/>
-          <a:ahLst/>
-          <a:cxnLst/>
-          <a:rect l="0" t="0" r="0" b="0"/>
-          <a:pathLst>
-            <a:path>
-              <a:moveTo>
-                <a:pt x="0" y="11381"/>
-              </a:moveTo>
-              <a:lnTo>
-                <a:pt x="2910551" y="11381"/>
+                <a:pt x="2865614" y="10129"/>
               </a:lnTo>
             </a:path>
           </a:pathLst>
@@ -2699,19 +2599,19 @@
         </a:p>
       </dsp:txBody>
       <dsp:txXfrm>
-        <a:off x="7099858" y="2556134"/>
-        <a:ext cx="145527" cy="145527"/>
+        <a:off x="6503466" y="1757021"/>
+        <a:ext cx="143280" cy="143280"/>
       </dsp:txXfrm>
     </dsp:sp>
-    <dsp:sp modelId="{D823D98E-D95E-4255-9B33-C37FC3F27239}">
+    <dsp:sp modelId="{8A621903-5A73-4759-9303-8591285A1D0A}">
       <dsp:nvSpPr>
         <dsp:cNvPr id="0" name=""/>
         <dsp:cNvSpPr/>
       </dsp:nvSpPr>
       <dsp:spPr>
         <a:xfrm>
-          <a:off x="8610603" y="1981196"/>
-          <a:ext cx="1696042" cy="848021"/>
+          <a:off x="7820945" y="743620"/>
+          <a:ext cx="1509412" cy="754706"/>
         </a:xfrm>
         <a:prstGeom prst="roundRect">
           <a:avLst>
@@ -2755,12 +2655,12 @@
         </a:fontRef>
       </dsp:style>
       <dsp:txBody>
-        <a:bodyPr spcFirstLastPara="0" vert="horz" wrap="square" lIns="9525" tIns="9525" rIns="9525" bIns="9525" numCol="1" spcCol="1270" anchor="ctr" anchorCtr="0">
+        <a:bodyPr spcFirstLastPara="0" vert="horz" wrap="square" lIns="10160" tIns="10160" rIns="10160" bIns="10160" numCol="1" spcCol="1270" anchor="ctr" anchorCtr="0">
           <a:noAutofit/>
         </a:bodyPr>
         <a:lstStyle/>
         <a:p>
-          <a:pPr marL="0" lvl="0" indent="0" algn="ctr" defTabSz="666750">
+          <a:pPr marL="0" lvl="0" indent="0" algn="ctr" defTabSz="711200">
             <a:lnSpc>
               <a:spcPct val="90000"/>
             </a:lnSpc>
@@ -2773,25 +2673,25 @@
             <a:buNone/>
           </a:pPr>
           <a:r>
-            <a:rPr lang="en-US" sz="1500" kern="1200" dirty="0"/>
-            <a:t>PostgreSQL</a:t>
+            <a:rPr lang="en-US" sz="1600" kern="1200" dirty="0"/>
+            <a:t>Python</a:t>
           </a:r>
         </a:p>
       </dsp:txBody>
       <dsp:txXfrm>
-        <a:off x="8635441" y="2006034"/>
-        <a:ext cx="1646366" cy="798345"/>
+        <a:off x="7843050" y="765725"/>
+        <a:ext cx="1465202" cy="710496"/>
       </dsp:txXfrm>
     </dsp:sp>
-    <dsp:sp modelId="{97C5E344-2D91-45F1-BF13-231C9A593A0F}">
+    <dsp:sp modelId="{3D6E54CA-CC80-4E03-8E22-75411B1D0999}">
       <dsp:nvSpPr>
         <dsp:cNvPr id="0" name=""/>
         <dsp:cNvSpPr/>
       </dsp:nvSpPr>
       <dsp:spPr>
-        <a:xfrm rot="710990">
-          <a:off x="5702499" y="3150917"/>
-          <a:ext cx="3016449" cy="22763"/>
+        <a:xfrm rot="21069479">
+          <a:off x="5313876" y="2327144"/>
+          <a:ext cx="2590278" cy="20258"/>
         </a:xfrm>
         <a:custGeom>
           <a:avLst/>
@@ -2802,10 +2702,332 @@
           <a:pathLst>
             <a:path>
               <a:moveTo>
-                <a:pt x="0" y="11381"/>
+                <a:pt x="0" y="10129"/>
               </a:moveTo>
               <a:lnTo>
-                <a:pt x="3016449" y="11381"/>
+                <a:pt x="2590278" y="10129"/>
+              </a:lnTo>
+            </a:path>
+          </a:pathLst>
+        </a:custGeom>
+        <a:noFill/>
+        <a:ln w="12700" cap="flat" cmpd="sng" algn="ctr">
+          <a:solidFill>
+            <a:schemeClr val="accent5">
+              <a:shade val="80000"/>
+              <a:hueOff val="0"/>
+              <a:satOff val="0"/>
+              <a:lumOff val="0"/>
+              <a:alphaOff val="0"/>
+            </a:schemeClr>
+          </a:solidFill>
+          <a:prstDash val="solid"/>
+          <a:miter lim="800000"/>
+        </a:ln>
+        <a:effectLst/>
+      </dsp:spPr>
+      <dsp:style>
+        <a:lnRef idx="2">
+          <a:scrgbClr r="0" g="0" b="0"/>
+        </a:lnRef>
+        <a:fillRef idx="0">
+          <a:scrgbClr r="0" g="0" b="0"/>
+        </a:fillRef>
+        <a:effectRef idx="0">
+          <a:scrgbClr r="0" g="0" b="0"/>
+        </a:effectRef>
+        <a:fontRef idx="minor"/>
+      </dsp:style>
+      <dsp:txBody>
+        <a:bodyPr spcFirstLastPara="0" vert="horz" wrap="square" lIns="12700" tIns="0" rIns="12700" bIns="0" numCol="1" spcCol="1270" anchor="ctr" anchorCtr="0">
+          <a:noAutofit/>
+        </a:bodyPr>
+        <a:lstStyle/>
+        <a:p>
+          <a:pPr marL="0" lvl="0" indent="0" algn="ctr" defTabSz="400050">
+            <a:lnSpc>
+              <a:spcPct val="90000"/>
+            </a:lnSpc>
+            <a:spcBef>
+              <a:spcPct val="0"/>
+            </a:spcBef>
+            <a:spcAft>
+              <a:spcPct val="35000"/>
+            </a:spcAft>
+            <a:buNone/>
+          </a:pPr>
+          <a:endParaRPr lang="en-AU" sz="900" kern="1200"/>
+        </a:p>
+      </dsp:txBody>
+      <dsp:txXfrm>
+        <a:off x="6544258" y="2272516"/>
+        <a:ext cx="129513" cy="129513"/>
+      </dsp:txXfrm>
+    </dsp:sp>
+    <dsp:sp modelId="{D823D98E-D95E-4255-9B33-C37FC3F27239}">
+      <dsp:nvSpPr>
+        <dsp:cNvPr id="0" name=""/>
+        <dsp:cNvSpPr/>
+      </dsp:nvSpPr>
+      <dsp:spPr>
+        <a:xfrm>
+          <a:off x="7888763" y="1760843"/>
+          <a:ext cx="1509412" cy="754706"/>
+        </a:xfrm>
+        <a:prstGeom prst="roundRect">
+          <a:avLst>
+            <a:gd name="adj" fmla="val 10000"/>
+          </a:avLst>
+        </a:prstGeom>
+        <a:solidFill>
+          <a:schemeClr val="accent5">
+            <a:hueOff val="0"/>
+            <a:satOff val="0"/>
+            <a:lumOff val="0"/>
+            <a:alphaOff val="0"/>
+          </a:schemeClr>
+        </a:solidFill>
+        <a:ln w="19050" cap="flat" cmpd="sng" algn="ctr">
+          <a:solidFill>
+            <a:schemeClr val="lt1">
+              <a:hueOff val="0"/>
+              <a:satOff val="0"/>
+              <a:lumOff val="0"/>
+              <a:alphaOff val="0"/>
+            </a:schemeClr>
+          </a:solidFill>
+          <a:prstDash val="solid"/>
+          <a:miter lim="800000"/>
+        </a:ln>
+        <a:effectLst/>
+      </dsp:spPr>
+      <dsp:style>
+        <a:lnRef idx="3">
+          <a:scrgbClr r="0" g="0" b="0"/>
+        </a:lnRef>
+        <a:fillRef idx="1">
+          <a:scrgbClr r="0" g="0" b="0"/>
+        </a:fillRef>
+        <a:effectRef idx="1">
+          <a:scrgbClr r="0" g="0" b="0"/>
+        </a:effectRef>
+        <a:fontRef idx="minor">
+          <a:schemeClr val="lt1"/>
+        </a:fontRef>
+      </dsp:style>
+      <dsp:txBody>
+        <a:bodyPr spcFirstLastPara="0" vert="horz" wrap="square" lIns="10160" tIns="10160" rIns="10160" bIns="10160" numCol="1" spcCol="1270" anchor="ctr" anchorCtr="0">
+          <a:noAutofit/>
+        </a:bodyPr>
+        <a:lstStyle/>
+        <a:p>
+          <a:pPr marL="0" lvl="0" indent="0" algn="ctr" defTabSz="711200">
+            <a:lnSpc>
+              <a:spcPct val="90000"/>
+            </a:lnSpc>
+            <a:spcBef>
+              <a:spcPct val="0"/>
+            </a:spcBef>
+            <a:spcAft>
+              <a:spcPct val="35000"/>
+            </a:spcAft>
+            <a:buNone/>
+          </a:pPr>
+          <a:r>
+            <a:rPr lang="en-US" sz="1600" kern="1200" dirty="0"/>
+            <a:t>PostgreSQL</a:t>
+          </a:r>
+        </a:p>
+      </dsp:txBody>
+      <dsp:txXfrm>
+        <a:off x="7910868" y="1782948"/>
+        <a:ext cx="1465202" cy="710496"/>
+      </dsp:txXfrm>
+    </dsp:sp>
+    <dsp:sp modelId="{97C5E344-2D91-45F1-BF13-231C9A593A0F}">
+      <dsp:nvSpPr>
+        <dsp:cNvPr id="0" name=""/>
+        <dsp:cNvSpPr/>
+      </dsp:nvSpPr>
+      <dsp:spPr>
+        <a:xfrm rot="710990">
+          <a:off x="5300663" y="2801850"/>
+          <a:ext cx="2684523" cy="20258"/>
+        </a:xfrm>
+        <a:custGeom>
+          <a:avLst/>
+          <a:gdLst/>
+          <a:ahLst/>
+          <a:cxnLst/>
+          <a:rect l="0" t="0" r="0" b="0"/>
+          <a:pathLst>
+            <a:path>
+              <a:moveTo>
+                <a:pt x="0" y="10129"/>
+              </a:moveTo>
+              <a:lnTo>
+                <a:pt x="2684523" y="10129"/>
+              </a:lnTo>
+            </a:path>
+          </a:pathLst>
+        </a:custGeom>
+        <a:noFill/>
+        <a:ln w="12700" cap="flat" cmpd="sng" algn="ctr">
+          <a:solidFill>
+            <a:schemeClr val="accent5">
+              <a:shade val="80000"/>
+              <a:hueOff val="0"/>
+              <a:satOff val="0"/>
+              <a:lumOff val="0"/>
+              <a:alphaOff val="0"/>
+            </a:schemeClr>
+          </a:solidFill>
+          <a:prstDash val="solid"/>
+          <a:miter lim="800000"/>
+        </a:ln>
+        <a:effectLst/>
+      </dsp:spPr>
+      <dsp:style>
+        <a:lnRef idx="2">
+          <a:scrgbClr r="0" g="0" b="0"/>
+        </a:lnRef>
+        <a:fillRef idx="0">
+          <a:scrgbClr r="0" g="0" b="0"/>
+        </a:fillRef>
+        <a:effectRef idx="0">
+          <a:scrgbClr r="0" g="0" b="0"/>
+        </a:effectRef>
+        <a:fontRef idx="minor"/>
+      </dsp:style>
+      <dsp:txBody>
+        <a:bodyPr spcFirstLastPara="0" vert="horz" wrap="square" lIns="12700" tIns="0" rIns="12700" bIns="0" numCol="1" spcCol="1270" anchor="ctr" anchorCtr="0">
+          <a:noAutofit/>
+        </a:bodyPr>
+        <a:lstStyle/>
+        <a:p>
+          <a:pPr marL="0" lvl="0" indent="0" algn="ctr" defTabSz="400050">
+            <a:lnSpc>
+              <a:spcPct val="90000"/>
+            </a:lnSpc>
+            <a:spcBef>
+              <a:spcPct val="0"/>
+            </a:spcBef>
+            <a:spcAft>
+              <a:spcPct val="35000"/>
+            </a:spcAft>
+            <a:buNone/>
+          </a:pPr>
+          <a:endParaRPr lang="en-AU" sz="900" kern="1200"/>
+        </a:p>
+      </dsp:txBody>
+      <dsp:txXfrm>
+        <a:off x="6575811" y="2744866"/>
+        <a:ext cx="134226" cy="134226"/>
+      </dsp:txXfrm>
+    </dsp:sp>
+    <dsp:sp modelId="{CAF69FF8-E0F5-420D-A3C3-15E168D8F304}">
+      <dsp:nvSpPr>
+        <dsp:cNvPr id="0" name=""/>
+        <dsp:cNvSpPr/>
+      </dsp:nvSpPr>
+      <dsp:spPr>
+        <a:xfrm>
+          <a:off x="7956581" y="2710256"/>
+          <a:ext cx="1509412" cy="754706"/>
+        </a:xfrm>
+        <a:prstGeom prst="roundRect">
+          <a:avLst>
+            <a:gd name="adj" fmla="val 10000"/>
+          </a:avLst>
+        </a:prstGeom>
+        <a:solidFill>
+          <a:schemeClr val="accent5">
+            <a:hueOff val="0"/>
+            <a:satOff val="0"/>
+            <a:lumOff val="0"/>
+            <a:alphaOff val="0"/>
+          </a:schemeClr>
+        </a:solidFill>
+        <a:ln w="19050" cap="flat" cmpd="sng" algn="ctr">
+          <a:solidFill>
+            <a:schemeClr val="lt1">
+              <a:hueOff val="0"/>
+              <a:satOff val="0"/>
+              <a:lumOff val="0"/>
+              <a:alphaOff val="0"/>
+            </a:schemeClr>
+          </a:solidFill>
+          <a:prstDash val="solid"/>
+          <a:miter lim="800000"/>
+        </a:ln>
+        <a:effectLst/>
+      </dsp:spPr>
+      <dsp:style>
+        <a:lnRef idx="3">
+          <a:scrgbClr r="0" g="0" b="0"/>
+        </a:lnRef>
+        <a:fillRef idx="1">
+          <a:scrgbClr r="0" g="0" b="0"/>
+        </a:fillRef>
+        <a:effectRef idx="1">
+          <a:scrgbClr r="0" g="0" b="0"/>
+        </a:effectRef>
+        <a:fontRef idx="minor">
+          <a:schemeClr val="lt1"/>
+        </a:fontRef>
+      </dsp:style>
+      <dsp:txBody>
+        <a:bodyPr spcFirstLastPara="0" vert="horz" wrap="square" lIns="10160" tIns="10160" rIns="10160" bIns="10160" numCol="1" spcCol="1270" anchor="ctr" anchorCtr="0">
+          <a:noAutofit/>
+        </a:bodyPr>
+        <a:lstStyle/>
+        <a:p>
+          <a:pPr marL="0" lvl="0" indent="0" algn="ctr" defTabSz="711200">
+            <a:lnSpc>
+              <a:spcPct val="90000"/>
+            </a:lnSpc>
+            <a:spcBef>
+              <a:spcPct val="0"/>
+            </a:spcBef>
+            <a:spcAft>
+              <a:spcPct val="35000"/>
+            </a:spcAft>
+            <a:buNone/>
+          </a:pPr>
+          <a:r>
+            <a:rPr lang="en-US" sz="1600" kern="1200" dirty="0"/>
+            <a:t>Flask</a:t>
+          </a:r>
+        </a:p>
+      </dsp:txBody>
+      <dsp:txXfrm>
+        <a:off x="7978686" y="2732361"/>
+        <a:ext cx="1465202" cy="710496"/>
+      </dsp:txXfrm>
+    </dsp:sp>
+    <dsp:sp modelId="{79D478B1-7A98-462F-88D4-27E370A531B7}">
+      <dsp:nvSpPr>
+        <dsp:cNvPr id="0" name=""/>
+        <dsp:cNvSpPr/>
+      </dsp:nvSpPr>
+      <dsp:spPr>
+        <a:xfrm rot="1679837">
+          <a:off x="5150660" y="3242648"/>
+          <a:ext cx="3052331" cy="20258"/>
+        </a:xfrm>
+        <a:custGeom>
+          <a:avLst/>
+          <a:gdLst/>
+          <a:ahLst/>
+          <a:cxnLst/>
+          <a:rect l="0" t="0" r="0" b="0"/>
+          <a:pathLst>
+            <a:path>
+              <a:moveTo>
+                <a:pt x="0" y="10129"/>
+              </a:moveTo>
+              <a:lnTo>
+                <a:pt x="3052331" y="10129"/>
               </a:lnTo>
             </a:path>
           </a:pathLst>
@@ -2860,19 +3082,19 @@
         </a:p>
       </dsp:txBody>
       <dsp:txXfrm>
-        <a:off x="7135312" y="3086888"/>
-        <a:ext cx="150822" cy="150822"/>
+        <a:off x="6600517" y="3176469"/>
+        <a:ext cx="152616" cy="152616"/>
       </dsp:txXfrm>
     </dsp:sp>
-    <dsp:sp modelId="{CAF69FF8-E0F5-420D-A3C3-15E168D8F304}">
+    <dsp:sp modelId="{DF55D2D9-91AE-44C6-99A7-DBFC229C222F}">
       <dsp:nvSpPr>
         <dsp:cNvPr id="0" name=""/>
         <dsp:cNvSpPr/>
       </dsp:nvSpPr>
       <dsp:spPr>
         <a:xfrm>
-          <a:off x="8686807" y="3047999"/>
-          <a:ext cx="1696042" cy="848021"/>
+          <a:off x="8024384" y="3591851"/>
+          <a:ext cx="1509412" cy="754706"/>
         </a:xfrm>
         <a:prstGeom prst="roundRect">
           <a:avLst>
@@ -2916,12 +3138,12 @@
         </a:fontRef>
       </dsp:style>
       <dsp:txBody>
-        <a:bodyPr spcFirstLastPara="0" vert="horz" wrap="square" lIns="9525" tIns="9525" rIns="9525" bIns="9525" numCol="1" spcCol="1270" anchor="ctr" anchorCtr="0">
+        <a:bodyPr spcFirstLastPara="0" vert="horz" wrap="square" lIns="10160" tIns="10160" rIns="10160" bIns="10160" numCol="1" spcCol="1270" anchor="ctr" anchorCtr="0">
           <a:noAutofit/>
         </a:bodyPr>
         <a:lstStyle/>
         <a:p>
-          <a:pPr marL="0" lvl="0" indent="0" algn="ctr" defTabSz="666750">
+          <a:pPr marL="0" lvl="0" indent="0" algn="ctr" defTabSz="711200">
             <a:lnSpc>
               <a:spcPct val="90000"/>
             </a:lnSpc>
@@ -2934,25 +3156,25 @@
             <a:buNone/>
           </a:pPr>
           <a:r>
-            <a:rPr lang="en-US" sz="1500" kern="1200" dirty="0"/>
-            <a:t>Flask</a:t>
+            <a:rPr lang="en-US" sz="1600" kern="1200" dirty="0"/>
+            <a:t>JavaScript/Html</a:t>
           </a:r>
         </a:p>
       </dsp:txBody>
       <dsp:txXfrm>
-        <a:off x="8711645" y="3072837"/>
-        <a:ext cx="1646366" cy="798345"/>
+        <a:off x="8046489" y="3613956"/>
+        <a:ext cx="1465202" cy="710496"/>
       </dsp:txXfrm>
     </dsp:sp>
-    <dsp:sp modelId="{79D478B1-7A98-462F-88D4-27E370A531B7}">
+    <dsp:sp modelId="{22F78475-18D5-4AE7-B762-CC6E87991F53}">
       <dsp:nvSpPr>
         <dsp:cNvPr id="0" name=""/>
         <dsp:cNvSpPr/>
       </dsp:nvSpPr>
       <dsp:spPr>
-        <a:xfrm rot="1679837">
-          <a:off x="5533949" y="3646217"/>
-          <a:ext cx="3429734" cy="22763"/>
+        <a:xfrm rot="2039068">
+          <a:off x="2015545" y="3932371"/>
+          <a:ext cx="1666655" cy="20258"/>
         </a:xfrm>
         <a:custGeom>
           <a:avLst/>
@@ -2963,10 +3185,10 @@
           <a:pathLst>
             <a:path>
               <a:moveTo>
-                <a:pt x="0" y="11381"/>
+                <a:pt x="0" y="10129"/>
               </a:moveTo>
               <a:lnTo>
-                <a:pt x="3429734" y="11381"/>
+                <a:pt x="1666655" y="10129"/>
               </a:lnTo>
             </a:path>
           </a:pathLst>
@@ -2975,7 +3197,7 @@
         <a:ln w="12700" cap="flat" cmpd="sng" algn="ctr">
           <a:solidFill>
             <a:schemeClr val="accent5">
-              <a:shade val="80000"/>
+              <a:shade val="60000"/>
               <a:hueOff val="0"/>
               <a:satOff val="0"/>
               <a:lumOff val="0"/>
@@ -3005,7 +3227,7 @@
         </a:bodyPr>
         <a:lstStyle/>
         <a:p>
-          <a:pPr marL="0" lvl="0" indent="0" algn="ctr" defTabSz="533400">
+          <a:pPr marL="0" lvl="0" indent="0" algn="ctr" defTabSz="222250">
             <a:lnSpc>
               <a:spcPct val="90000"/>
             </a:lnSpc>
@@ -3017,23 +3239,23 @@
             </a:spcAft>
             <a:buNone/>
           </a:pPr>
-          <a:endParaRPr lang="en-AU" sz="1200" kern="1200"/>
+          <a:endParaRPr lang="en-US" sz="500" kern="1200"/>
         </a:p>
       </dsp:txBody>
       <dsp:txXfrm>
-        <a:off x="7163073" y="3571855"/>
-        <a:ext cx="171486" cy="171486"/>
+        <a:off x="2807206" y="3900834"/>
+        <a:ext cx="83332" cy="83332"/>
       </dsp:txXfrm>
     </dsp:sp>
-    <dsp:sp modelId="{DF55D2D9-91AE-44C6-99A7-DBFC229C222F}">
+    <dsp:sp modelId="{23BDEE41-CAC9-4155-B53A-E94F8758ADE9}">
       <dsp:nvSpPr>
         <dsp:cNvPr id="0" name=""/>
         <dsp:cNvSpPr/>
       </dsp:nvSpPr>
       <dsp:spPr>
         <a:xfrm>
-          <a:off x="8762993" y="4038598"/>
-          <a:ext cx="1696042" cy="848021"/>
+          <a:off x="3539859" y="4030951"/>
+          <a:ext cx="1509412" cy="754706"/>
         </a:xfrm>
         <a:prstGeom prst="roundRect">
           <a:avLst>
@@ -3077,12 +3299,12 @@
         </a:fontRef>
       </dsp:style>
       <dsp:txBody>
-        <a:bodyPr spcFirstLastPara="0" vert="horz" wrap="square" lIns="9525" tIns="9525" rIns="9525" bIns="9525" numCol="1" spcCol="1270" anchor="ctr" anchorCtr="0">
+        <a:bodyPr spcFirstLastPara="0" vert="horz" wrap="square" lIns="10160" tIns="10160" rIns="10160" bIns="10160" numCol="1" spcCol="1270" anchor="ctr" anchorCtr="0">
           <a:noAutofit/>
         </a:bodyPr>
         <a:lstStyle/>
         <a:p>
-          <a:pPr marL="0" lvl="0" indent="0" algn="ctr" defTabSz="666750">
+          <a:pPr marL="0" lvl="0" indent="0" algn="ctr" defTabSz="711200">
             <a:lnSpc>
               <a:spcPct val="90000"/>
             </a:lnSpc>
@@ -3095,25 +3317,26 @@
             <a:buNone/>
           </a:pPr>
           <a:r>
-            <a:rPr lang="en-US" sz="1500" kern="1200" dirty="0"/>
-            <a:t>JavaScript/Html</a:t>
+            <a:rPr lang="en-CA" sz="1600" kern="1200" dirty="0"/>
+            <a:t>Criteria for country’s inclusion</a:t>
           </a:r>
+          <a:endParaRPr lang="en-US" sz="1600" kern="1200" dirty="0"/>
         </a:p>
       </dsp:txBody>
       <dsp:txXfrm>
-        <a:off x="8787831" y="4063436"/>
-        <a:ext cx="1646366" cy="798345"/>
+        <a:off x="3561964" y="4053056"/>
+        <a:ext cx="1465202" cy="710496"/>
       </dsp:txXfrm>
     </dsp:sp>
-    <dsp:sp modelId="{22F78475-18D5-4AE7-B762-CC6E87991F53}">
+    <dsp:sp modelId="{AAC93F81-D18D-4468-BFBD-E8E4D9E2CA3F}">
       <dsp:nvSpPr>
         <dsp:cNvPr id="0" name=""/>
         <dsp:cNvSpPr/>
       </dsp:nvSpPr>
       <dsp:spPr>
-        <a:xfrm rot="1701568">
-          <a:off x="2065245" y="4108329"/>
-          <a:ext cx="1764627" cy="22763"/>
+        <a:xfrm rot="20720688">
+          <a:off x="5035065" y="4287699"/>
+          <a:ext cx="873321" cy="20258"/>
         </a:xfrm>
         <a:custGeom>
           <a:avLst/>
@@ -3124,172 +3347,10 @@
           <a:pathLst>
             <a:path>
               <a:moveTo>
-                <a:pt x="0" y="11381"/>
+                <a:pt x="0" y="10129"/>
               </a:moveTo>
               <a:lnTo>
-                <a:pt x="1764627" y="11381"/>
-              </a:lnTo>
-            </a:path>
-          </a:pathLst>
-        </a:custGeom>
-        <a:noFill/>
-        <a:ln w="12700" cap="flat" cmpd="sng" algn="ctr">
-          <a:solidFill>
-            <a:schemeClr val="accent5">
-              <a:shade val="60000"/>
-              <a:hueOff val="0"/>
-              <a:satOff val="0"/>
-              <a:lumOff val="0"/>
-              <a:alphaOff val="0"/>
-            </a:schemeClr>
-          </a:solidFill>
-          <a:prstDash val="solid"/>
-          <a:miter lim="800000"/>
-        </a:ln>
-        <a:effectLst/>
-      </dsp:spPr>
-      <dsp:style>
-        <a:lnRef idx="2">
-          <a:scrgbClr r="0" g="0" b="0"/>
-        </a:lnRef>
-        <a:fillRef idx="0">
-          <a:scrgbClr r="0" g="0" b="0"/>
-        </a:fillRef>
-        <a:effectRef idx="0">
-          <a:scrgbClr r="0" g="0" b="0"/>
-        </a:effectRef>
-        <a:fontRef idx="minor"/>
-      </dsp:style>
-      <dsp:txBody>
-        <a:bodyPr spcFirstLastPara="0" vert="horz" wrap="square" lIns="12700" tIns="0" rIns="12700" bIns="0" numCol="1" spcCol="1270" anchor="ctr" anchorCtr="0">
-          <a:noAutofit/>
-        </a:bodyPr>
-        <a:lstStyle/>
-        <a:p>
-          <a:pPr marL="0" lvl="0" indent="0" algn="ctr" defTabSz="266700">
-            <a:lnSpc>
-              <a:spcPct val="90000"/>
-            </a:lnSpc>
-            <a:spcBef>
-              <a:spcPct val="0"/>
-            </a:spcBef>
-            <a:spcAft>
-              <a:spcPct val="35000"/>
-            </a:spcAft>
-            <a:buNone/>
-          </a:pPr>
-          <a:endParaRPr lang="en-US" sz="600" kern="1200"/>
-        </a:p>
-      </dsp:txBody>
-      <dsp:txXfrm>
-        <a:off x="2903443" y="4075595"/>
-        <a:ext cx="88231" cy="88231"/>
-      </dsp:txXfrm>
-    </dsp:sp>
-    <dsp:sp modelId="{23BDEE41-CAC9-4155-B53A-E94F8758ADE9}">
-      <dsp:nvSpPr>
-        <dsp:cNvPr id="0" name=""/>
-        <dsp:cNvSpPr/>
-      </dsp:nvSpPr>
-      <dsp:spPr>
-        <a:xfrm>
-          <a:off x="3723982" y="4114801"/>
-          <a:ext cx="1696042" cy="848021"/>
-        </a:xfrm>
-        <a:prstGeom prst="roundRect">
-          <a:avLst>
-            <a:gd name="adj" fmla="val 10000"/>
-          </a:avLst>
-        </a:prstGeom>
-        <a:solidFill>
-          <a:schemeClr val="accent5">
-            <a:hueOff val="0"/>
-            <a:satOff val="0"/>
-            <a:lumOff val="0"/>
-            <a:alphaOff val="0"/>
-          </a:schemeClr>
-        </a:solidFill>
-        <a:ln w="19050" cap="flat" cmpd="sng" algn="ctr">
-          <a:solidFill>
-            <a:schemeClr val="lt1">
-              <a:hueOff val="0"/>
-              <a:satOff val="0"/>
-              <a:lumOff val="0"/>
-              <a:alphaOff val="0"/>
-            </a:schemeClr>
-          </a:solidFill>
-          <a:prstDash val="solid"/>
-          <a:miter lim="800000"/>
-        </a:ln>
-        <a:effectLst/>
-      </dsp:spPr>
-      <dsp:style>
-        <a:lnRef idx="3">
-          <a:scrgbClr r="0" g="0" b="0"/>
-        </a:lnRef>
-        <a:fillRef idx="1">
-          <a:scrgbClr r="0" g="0" b="0"/>
-        </a:fillRef>
-        <a:effectRef idx="1">
-          <a:scrgbClr r="0" g="0" b="0"/>
-        </a:effectRef>
-        <a:fontRef idx="minor">
-          <a:schemeClr val="lt1"/>
-        </a:fontRef>
-      </dsp:style>
-      <dsp:txBody>
-        <a:bodyPr spcFirstLastPara="0" vert="horz" wrap="square" lIns="9525" tIns="9525" rIns="9525" bIns="9525" numCol="1" spcCol="1270" anchor="ctr" anchorCtr="0">
-          <a:noAutofit/>
-        </a:bodyPr>
-        <a:lstStyle/>
-        <a:p>
-          <a:pPr marL="0" lvl="0" indent="0" algn="ctr" defTabSz="666750">
-            <a:lnSpc>
-              <a:spcPct val="90000"/>
-            </a:lnSpc>
-            <a:spcBef>
-              <a:spcPct val="0"/>
-            </a:spcBef>
-            <a:spcAft>
-              <a:spcPct val="35000"/>
-            </a:spcAft>
-            <a:buNone/>
-          </a:pPr>
-          <a:r>
-            <a:rPr lang="en-CA" sz="1500" kern="1200" dirty="0"/>
-            <a:t>criteria for country’s inclusion</a:t>
-          </a:r>
-          <a:endParaRPr lang="en-US" sz="1500" kern="1200" dirty="0"/>
-        </a:p>
-      </dsp:txBody>
-      <dsp:txXfrm>
-        <a:off x="3748820" y="4139639"/>
-        <a:ext cx="1646366" cy="798345"/>
-      </dsp:txXfrm>
-    </dsp:sp>
-    <dsp:sp modelId="{AAC93F81-D18D-4468-BFBD-E8E4D9E2CA3F}">
-      <dsp:nvSpPr>
-        <dsp:cNvPr id="0" name=""/>
-        <dsp:cNvSpPr/>
-      </dsp:nvSpPr>
-      <dsp:spPr>
-        <a:xfrm rot="1446949">
-          <a:off x="5354915" y="4832230"/>
-          <a:ext cx="1491988" cy="22763"/>
-        </a:xfrm>
-        <a:custGeom>
-          <a:avLst/>
-          <a:gdLst/>
-          <a:ahLst/>
-          <a:cxnLst/>
-          <a:rect l="0" t="0" r="0" b="0"/>
-          <a:pathLst>
-            <a:path>
-              <a:moveTo>
-                <a:pt x="0" y="11381"/>
-              </a:moveTo>
-              <a:lnTo>
-                <a:pt x="1491988" y="11381"/>
+                <a:pt x="873321" y="10129"/>
               </a:lnTo>
             </a:path>
           </a:pathLst>
@@ -3344,8 +3405,8 @@
         </a:p>
       </dsp:txBody>
       <dsp:txXfrm>
-        <a:off x="6063610" y="4806312"/>
-        <a:ext cx="74599" cy="74599"/>
+        <a:off x="5449893" y="4275995"/>
+        <a:ext cx="43666" cy="43666"/>
       </dsp:txXfrm>
     </dsp:sp>
     <dsp:sp modelId="{37DD8E4E-AAF9-49CC-AEA8-1D5BA9599EE6}">
@@ -3355,8 +3416,8 @@
       </dsp:nvSpPr>
       <dsp:spPr>
         <a:xfrm>
-          <a:off x="6781794" y="4724401"/>
-          <a:ext cx="1696042" cy="848021"/>
+          <a:off x="5894180" y="3809999"/>
+          <a:ext cx="1509412" cy="754706"/>
         </a:xfrm>
         <a:prstGeom prst="roundRect">
           <a:avLst>
@@ -3400,12 +3461,12 @@
         </a:fontRef>
       </dsp:style>
       <dsp:txBody>
-        <a:bodyPr spcFirstLastPara="0" vert="horz" wrap="square" lIns="9525" tIns="9525" rIns="9525" bIns="9525" numCol="1" spcCol="1270" anchor="ctr" anchorCtr="0">
+        <a:bodyPr spcFirstLastPara="0" vert="horz" wrap="square" lIns="10160" tIns="10160" rIns="10160" bIns="10160" numCol="1" spcCol="1270" anchor="ctr" anchorCtr="0">
           <a:noAutofit/>
         </a:bodyPr>
         <a:lstStyle/>
         <a:p>
-          <a:pPr marL="0" lvl="0" indent="0" algn="ctr" defTabSz="666750">
+          <a:pPr marL="0" lvl="0" indent="0" algn="ctr" defTabSz="711200">
             <a:lnSpc>
               <a:spcPct val="90000"/>
             </a:lnSpc>
@@ -3418,15 +3479,15 @@
             <a:buNone/>
           </a:pPr>
           <a:r>
-            <a:rPr lang="en-CA" sz="1500" kern="1200"/>
-            <a:t>population &gt; 500,000</a:t>
+            <a:rPr lang="en-CA" sz="1600" kern="1200" dirty="0"/>
+            <a:t>Population &gt; 500,000</a:t>
           </a:r>
-          <a:endParaRPr lang="en-US" sz="1500" kern="1200"/>
+          <a:endParaRPr lang="en-US" sz="1600" kern="1200" dirty="0"/>
         </a:p>
       </dsp:txBody>
       <dsp:txXfrm>
-        <a:off x="6806632" y="4749239"/>
-        <a:ext cx="1646366" cy="798345"/>
+        <a:off x="5916285" y="3832104"/>
+        <a:ext cx="1465202" cy="710496"/>
       </dsp:txXfrm>
     </dsp:sp>
     <dsp:sp modelId="{AC25F52D-65B8-496D-8005-64891226B4F8}">
@@ -3435,9 +3496,9 @@
         <dsp:cNvSpPr/>
       </dsp:nvSpPr>
       <dsp:spPr>
-        <a:xfrm rot="3234009">
-          <a:off x="4977779" y="5397258"/>
-          <a:ext cx="2153062" cy="22763"/>
+        <a:xfrm rot="2092489">
+          <a:off x="4938668" y="4750304"/>
+          <a:ext cx="1231682" cy="20258"/>
         </a:xfrm>
         <a:custGeom>
           <a:avLst/>
@@ -3448,10 +3509,10 @@
           <a:pathLst>
             <a:path>
               <a:moveTo>
-                <a:pt x="0" y="11381"/>
+                <a:pt x="0" y="10129"/>
               </a:moveTo>
               <a:lnTo>
-                <a:pt x="2153062" y="11381"/>
+                <a:pt x="1231682" y="10129"/>
               </a:lnTo>
             </a:path>
           </a:pathLst>
@@ -3490,7 +3551,7 @@
         </a:bodyPr>
         <a:lstStyle/>
         <a:p>
-          <a:pPr marL="0" lvl="0" indent="0" algn="ctr" defTabSz="311150">
+          <a:pPr marL="0" lvl="0" indent="0" algn="ctr" defTabSz="222250">
             <a:lnSpc>
               <a:spcPct val="90000"/>
             </a:lnSpc>
@@ -3502,12 +3563,12 @@
             </a:spcAft>
             <a:buNone/>
           </a:pPr>
-          <a:endParaRPr lang="en-US" sz="700" kern="1200"/>
+          <a:endParaRPr lang="en-US" sz="500" kern="1200"/>
         </a:p>
       </dsp:txBody>
       <dsp:txXfrm>
-        <a:off x="6000484" y="5354813"/>
-        <a:ext cx="107653" cy="107653"/>
+        <a:off x="5523718" y="4729641"/>
+        <a:ext cx="61584" cy="61584"/>
       </dsp:txXfrm>
     </dsp:sp>
     <dsp:sp modelId="{E3BA8EC6-7F82-4DD3-9F43-044BFBA16891}">
@@ -3517,8 +3578,8 @@
       </dsp:nvSpPr>
       <dsp:spPr>
         <a:xfrm>
-          <a:off x="6688597" y="5854458"/>
-          <a:ext cx="1696042" cy="848021"/>
+          <a:off x="6059748" y="4735209"/>
+          <a:ext cx="2534801" cy="754706"/>
         </a:xfrm>
         <a:prstGeom prst="roundRect">
           <a:avLst>
@@ -3562,12 +3623,12 @@
         </a:fontRef>
       </dsp:style>
       <dsp:txBody>
-        <a:bodyPr spcFirstLastPara="0" vert="horz" wrap="square" lIns="9525" tIns="9525" rIns="9525" bIns="9525" numCol="1" spcCol="1270" anchor="ctr" anchorCtr="0">
+        <a:bodyPr spcFirstLastPara="0" vert="horz" wrap="square" lIns="10160" tIns="10160" rIns="10160" bIns="10160" numCol="1" spcCol="1270" anchor="ctr" anchorCtr="0">
           <a:noAutofit/>
         </a:bodyPr>
         <a:lstStyle/>
         <a:p>
-          <a:pPr marL="0" lvl="0" indent="0" algn="ctr" defTabSz="666750">
+          <a:pPr marL="0" lvl="0" indent="0" algn="ctr" defTabSz="711200">
             <a:lnSpc>
               <a:spcPct val="90000"/>
             </a:lnSpc>
@@ -3580,26 +3641,107 @@
             <a:buNone/>
           </a:pPr>
           <a:r>
-            <a:rPr lang="en-CA" sz="1500" kern="1200" dirty="0"/>
-            <a:t>country have 30years (1990-2019) worth of data.</a:t>
+            <a:rPr lang="en-CA" sz="1600" kern="1200" dirty="0"/>
+            <a:t>30years of data available (1990-2019)</a:t>
           </a:r>
-          <a:endParaRPr lang="en-US" sz="1500" kern="1200" dirty="0"/>
+          <a:endParaRPr lang="en-US" sz="1600" kern="1200" dirty="0"/>
         </a:p>
       </dsp:txBody>
       <dsp:txXfrm>
-        <a:off x="6713435" y="5879296"/>
-        <a:ext cx="1646366" cy="798345"/>
+        <a:off x="6081853" y="4757314"/>
+        <a:ext cx="2490591" cy="710496"/>
       </dsp:txXfrm>
     </dsp:sp>
-    <dsp:sp modelId="{8165F82D-C410-4BC9-B18B-0BBCD1F68B12}">
+    <dsp:sp modelId="{AD5CFD4B-2A9E-2446-9673-4A7EE50C8D01}">
+      <dsp:nvSpPr>
+        <dsp:cNvPr id="0" name=""/>
+        <dsp:cNvSpPr/>
+      </dsp:nvSpPr>
+      <dsp:spPr>
+        <a:xfrm rot="3239570">
+          <a:off x="4655680" y="5170760"/>
+          <a:ext cx="1910109" cy="20258"/>
+        </a:xfrm>
+        <a:custGeom>
+          <a:avLst/>
+          <a:gdLst/>
+          <a:ahLst/>
+          <a:cxnLst/>
+          <a:rect l="0" t="0" r="0" b="0"/>
+          <a:pathLst>
+            <a:path>
+              <a:moveTo>
+                <a:pt x="0" y="10129"/>
+              </a:moveTo>
+              <a:lnTo>
+                <a:pt x="1910109" y="10129"/>
+              </a:lnTo>
+            </a:path>
+          </a:pathLst>
+        </a:custGeom>
+        <a:noFill/>
+        <a:ln w="12700" cap="flat" cmpd="sng" algn="ctr">
+          <a:solidFill>
+            <a:schemeClr val="accent5">
+              <a:shade val="80000"/>
+              <a:hueOff val="0"/>
+              <a:satOff val="0"/>
+              <a:lumOff val="0"/>
+              <a:alphaOff val="0"/>
+            </a:schemeClr>
+          </a:solidFill>
+          <a:prstDash val="solid"/>
+          <a:miter lim="800000"/>
+        </a:ln>
+        <a:effectLst/>
+      </dsp:spPr>
+      <dsp:style>
+        <a:lnRef idx="2">
+          <a:scrgbClr r="0" g="0" b="0"/>
+        </a:lnRef>
+        <a:fillRef idx="0">
+          <a:scrgbClr r="0" g="0" b="0"/>
+        </a:fillRef>
+        <a:effectRef idx="0">
+          <a:scrgbClr r="0" g="0" b="0"/>
+        </a:effectRef>
+        <a:fontRef idx="minor"/>
+      </dsp:style>
+      <dsp:txBody>
+        <a:bodyPr spcFirstLastPara="0" vert="horz" wrap="square" lIns="12700" tIns="0" rIns="12700" bIns="0" numCol="1" spcCol="1270" anchor="ctr" anchorCtr="0">
+          <a:noAutofit/>
+        </a:bodyPr>
+        <a:lstStyle/>
+        <a:p>
+          <a:pPr marL="0" lvl="0" indent="0" algn="ctr" defTabSz="266700">
+            <a:lnSpc>
+              <a:spcPct val="90000"/>
+            </a:lnSpc>
+            <a:spcBef>
+              <a:spcPct val="0"/>
+            </a:spcBef>
+            <a:spcAft>
+              <a:spcPct val="35000"/>
+            </a:spcAft>
+            <a:buNone/>
+          </a:pPr>
+          <a:endParaRPr lang="en-GB" sz="600" kern="1200"/>
+        </a:p>
+      </dsp:txBody>
+      <dsp:txXfrm>
+        <a:off x="5562982" y="5133137"/>
+        <a:ext cx="95505" cy="95505"/>
+      </dsp:txXfrm>
+    </dsp:sp>
+    <dsp:sp modelId="{C07E6253-54D6-804F-9862-32B577429B81}">
       <dsp:nvSpPr>
         <dsp:cNvPr id="0" name=""/>
         <dsp:cNvSpPr/>
       </dsp:nvSpPr>
       <dsp:spPr>
         <a:xfrm>
-          <a:off x="377266" y="5029197"/>
-          <a:ext cx="1696042" cy="848021"/>
+          <a:off x="6172199" y="5638796"/>
+          <a:ext cx="2391603" cy="629357"/>
         </a:xfrm>
         <a:prstGeom prst="roundRect">
           <a:avLst>
@@ -3643,12 +3785,12 @@
         </a:fontRef>
       </dsp:style>
       <dsp:txBody>
-        <a:bodyPr spcFirstLastPara="0" vert="horz" wrap="square" lIns="9525" tIns="9525" rIns="9525" bIns="9525" numCol="1" spcCol="1270" anchor="ctr" anchorCtr="0">
+        <a:bodyPr spcFirstLastPara="0" vert="horz" wrap="square" lIns="10160" tIns="10160" rIns="10160" bIns="10160" numCol="1" spcCol="1270" anchor="ctr" anchorCtr="0">
           <a:noAutofit/>
         </a:bodyPr>
         <a:lstStyle/>
         <a:p>
-          <a:pPr marL="0" lvl="0" indent="0" algn="ctr" defTabSz="666750">
+          <a:pPr marL="0" lvl="0" indent="0" algn="ctr" defTabSz="711200">
             <a:lnSpc>
               <a:spcPct val="90000"/>
             </a:lnSpc>
@@ -3661,15 +3803,95 @@
             <a:buNone/>
           </a:pPr>
           <a:r>
-            <a:rPr lang="en-CA" sz="1500" kern="1200"/>
-            <a:t>Lessons learned / Conclusion </a:t>
+            <a:rPr lang="en-US" sz="1600" kern="1200" dirty="0"/>
+            <a:t>149 countries included</a:t>
           </a:r>
-          <a:endParaRPr lang="en-US" sz="1500" kern="1200"/>
         </a:p>
       </dsp:txBody>
       <dsp:txXfrm>
-        <a:off x="402104" y="5054035"/>
-        <a:ext cx="1646366" cy="798345"/>
+        <a:off x="6190632" y="5657229"/>
+        <a:ext cx="2354737" cy="592491"/>
+      </dsp:txXfrm>
+    </dsp:sp>
+    <dsp:sp modelId="{8165F82D-C410-4BC9-B18B-0BBCD1F68B12}">
+      <dsp:nvSpPr>
+        <dsp:cNvPr id="0" name=""/>
+        <dsp:cNvSpPr/>
+      </dsp:nvSpPr>
+      <dsp:spPr>
+        <a:xfrm>
+          <a:off x="561410" y="4659087"/>
+          <a:ext cx="1509412" cy="754706"/>
+        </a:xfrm>
+        <a:prstGeom prst="roundRect">
+          <a:avLst>
+            <a:gd name="adj" fmla="val 10000"/>
+          </a:avLst>
+        </a:prstGeom>
+        <a:solidFill>
+          <a:schemeClr val="accent5">
+            <a:hueOff val="0"/>
+            <a:satOff val="0"/>
+            <a:lumOff val="0"/>
+            <a:alphaOff val="0"/>
+          </a:schemeClr>
+        </a:solidFill>
+        <a:ln w="19050" cap="flat" cmpd="sng" algn="ctr">
+          <a:solidFill>
+            <a:schemeClr val="lt1">
+              <a:hueOff val="0"/>
+              <a:satOff val="0"/>
+              <a:lumOff val="0"/>
+              <a:alphaOff val="0"/>
+            </a:schemeClr>
+          </a:solidFill>
+          <a:prstDash val="solid"/>
+          <a:miter lim="800000"/>
+        </a:ln>
+        <a:effectLst/>
+      </dsp:spPr>
+      <dsp:style>
+        <a:lnRef idx="3">
+          <a:scrgbClr r="0" g="0" b="0"/>
+        </a:lnRef>
+        <a:fillRef idx="1">
+          <a:scrgbClr r="0" g="0" b="0"/>
+        </a:fillRef>
+        <a:effectRef idx="1">
+          <a:scrgbClr r="0" g="0" b="0"/>
+        </a:effectRef>
+        <a:fontRef idx="minor">
+          <a:schemeClr val="lt1"/>
+        </a:fontRef>
+      </dsp:style>
+      <dsp:txBody>
+        <a:bodyPr spcFirstLastPara="0" vert="horz" wrap="square" lIns="10160" tIns="10160" rIns="10160" bIns="10160" numCol="1" spcCol="1270" anchor="ctr" anchorCtr="0">
+          <a:noAutofit/>
+        </a:bodyPr>
+        <a:lstStyle/>
+        <a:p>
+          <a:pPr marL="0" lvl="0" indent="0" algn="ctr" defTabSz="711200">
+            <a:lnSpc>
+              <a:spcPct val="90000"/>
+            </a:lnSpc>
+            <a:spcBef>
+              <a:spcPct val="0"/>
+            </a:spcBef>
+            <a:spcAft>
+              <a:spcPct val="35000"/>
+            </a:spcAft>
+            <a:buNone/>
+          </a:pPr>
+          <a:r>
+            <a:rPr lang="en-CA" sz="1600" kern="1200"/>
+            <a:t>Lessons learned / Conclusion </a:t>
+          </a:r>
+          <a:endParaRPr lang="en-US" sz="1600" kern="1200"/>
+        </a:p>
+      </dsp:txBody>
+      <dsp:txXfrm>
+        <a:off x="583515" y="4681192"/>
+        <a:ext cx="1465202" cy="710496"/>
       </dsp:txXfrm>
     </dsp:sp>
   </dsp:spTree>
@@ -5124,7 +5346,7 @@
           <a:p>
             <a:fld id="{A443712D-678B-4D6F-A140-D0F8F0FAE3A2}" type="datetimeFigureOut">
               <a:rPr lang="en-US" smtClean="0"/>
-              <a:t>4/11/2023</a:t>
+              <a:t>4/11/23</a:t>
             </a:fld>
             <a:endParaRPr lang="en-US"/>
           </a:p>
@@ -6013,7 +6235,7 @@
           <a:p>
             <a:fld id="{8DE6AADA-0D42-4ECA-804D-48801CC714DC}" type="datetimeFigureOut">
               <a:rPr lang="en-AU" smtClean="0"/>
-              <a:t>11/04/2023</a:t>
+              <a:t>11/4/2023</a:t>
             </a:fld>
             <a:endParaRPr lang="en-AU"/>
           </a:p>
@@ -6213,7 +6435,7 @@
           <a:p>
             <a:fld id="{8DE6AADA-0D42-4ECA-804D-48801CC714DC}" type="datetimeFigureOut">
               <a:rPr lang="en-AU" smtClean="0"/>
-              <a:t>11/04/2023</a:t>
+              <a:t>11/4/2023</a:t>
             </a:fld>
             <a:endParaRPr lang="en-AU"/>
           </a:p>
@@ -6423,7 +6645,7 @@
           <a:p>
             <a:fld id="{8DE6AADA-0D42-4ECA-804D-48801CC714DC}" type="datetimeFigureOut">
               <a:rPr lang="en-AU" smtClean="0"/>
-              <a:t>11/04/2023</a:t>
+              <a:t>11/4/2023</a:t>
             </a:fld>
             <a:endParaRPr lang="en-AU"/>
           </a:p>
@@ -25421,7 +25643,7 @@
           <a:p>
             <a:fld id="{6EBB0E32-0304-4451-ADB8-C044457D5B85}" type="datetimeFigureOut">
               <a:rPr lang="en-US" smtClean="0"/>
-              <a:t>4/11/2023</a:t>
+              <a:t>4/11/23</a:t>
             </a:fld>
             <a:endParaRPr lang="en-US"/>
           </a:p>
@@ -25673,7 +25895,7 @@
           <a:p>
             <a:fld id="{8DE6AADA-0D42-4ECA-804D-48801CC714DC}" type="datetimeFigureOut">
               <a:rPr lang="en-AU" smtClean="0"/>
-              <a:t>11/04/2023</a:t>
+              <a:t>11/4/2023</a:t>
             </a:fld>
             <a:endParaRPr lang="en-AU"/>
           </a:p>
@@ -25949,7 +26171,7 @@
           <a:p>
             <a:fld id="{8DE6AADA-0D42-4ECA-804D-48801CC714DC}" type="datetimeFigureOut">
               <a:rPr lang="en-AU" smtClean="0"/>
-              <a:t>11/04/2023</a:t>
+              <a:t>11/4/2023</a:t>
             </a:fld>
             <a:endParaRPr lang="en-AU"/>
           </a:p>
@@ -26217,7 +26439,7 @@
           <a:p>
             <a:fld id="{8DE6AADA-0D42-4ECA-804D-48801CC714DC}" type="datetimeFigureOut">
               <a:rPr lang="en-AU" smtClean="0"/>
-              <a:t>11/04/2023</a:t>
+              <a:t>11/4/2023</a:t>
             </a:fld>
             <a:endParaRPr lang="en-AU"/>
           </a:p>
@@ -26632,7 +26854,7 @@
           <a:p>
             <a:fld id="{8DE6AADA-0D42-4ECA-804D-48801CC714DC}" type="datetimeFigureOut">
               <a:rPr lang="en-AU" smtClean="0"/>
-              <a:t>11/04/2023</a:t>
+              <a:t>11/4/2023</a:t>
             </a:fld>
             <a:endParaRPr lang="en-AU"/>
           </a:p>
@@ -26774,7 +26996,7 @@
           <a:p>
             <a:fld id="{8DE6AADA-0D42-4ECA-804D-48801CC714DC}" type="datetimeFigureOut">
               <a:rPr lang="en-AU" smtClean="0"/>
-              <a:t>11/04/2023</a:t>
+              <a:t>11/4/2023</a:t>
             </a:fld>
             <a:endParaRPr lang="en-AU"/>
           </a:p>
@@ -26887,7 +27109,7 @@
           <a:p>
             <a:fld id="{8DE6AADA-0D42-4ECA-804D-48801CC714DC}" type="datetimeFigureOut">
               <a:rPr lang="en-AU" smtClean="0"/>
-              <a:t>11/04/2023</a:t>
+              <a:t>11/4/2023</a:t>
             </a:fld>
             <a:endParaRPr lang="en-AU"/>
           </a:p>
@@ -27200,7 +27422,7 @@
           <a:p>
             <a:fld id="{8DE6AADA-0D42-4ECA-804D-48801CC714DC}" type="datetimeFigureOut">
               <a:rPr lang="en-AU" smtClean="0"/>
-              <a:t>11/04/2023</a:t>
+              <a:t>11/4/2023</a:t>
             </a:fld>
             <a:endParaRPr lang="en-AU"/>
           </a:p>
@@ -27489,7 +27711,7 @@
           <a:p>
             <a:fld id="{8DE6AADA-0D42-4ECA-804D-48801CC714DC}" type="datetimeFigureOut">
               <a:rPr lang="en-AU" smtClean="0"/>
-              <a:t>11/04/2023</a:t>
+              <a:t>11/4/2023</a:t>
             </a:fld>
             <a:endParaRPr lang="en-AU"/>
           </a:p>
@@ -27732,7 +27954,7 @@
           <a:p>
             <a:fld id="{8DE6AADA-0D42-4ECA-804D-48801CC714DC}" type="datetimeFigureOut">
               <a:rPr lang="en-AU" smtClean="0"/>
-              <a:t>11/04/2023</a:t>
+              <a:t>11/4/2023</a:t>
             </a:fld>
             <a:endParaRPr lang="en-AU"/>
           </a:p>
@@ -28365,7 +28587,7 @@
             <a:pPr algn="ctr"/>
             <a:r>
               <a:rPr lang="en-US" sz="2400" b="1" dirty="0"/>
-              <a:t>IS POPULATION GROWTH A KEY DRIVER OF ECONOMIC GROWTH</a:t>
+              <a:t>IS POPULATION GROWTH A KEY DRIVER OF ECONOMIC GROWTH?</a:t>
             </a:r>
           </a:p>
         </p:txBody>
@@ -28554,7 +28776,7 @@
         </p:spPr>
         <p:txBody>
           <a:bodyPr vert="horz" lIns="91440" tIns="45720" rIns="91440" bIns="45720" rtlCol="0" anchor="t">
-            <a:normAutofit fontScale="70000" lnSpcReduction="20000"/>
+            <a:normAutofit fontScale="77500" lnSpcReduction="20000"/>
           </a:bodyPr>
           <a:lstStyle/>
           <a:p>
@@ -28569,39 +28791,11 @@
               <a:buChar char="•"/>
             </a:pPr>
             <a:r>
-              <a:rPr lang="en-US" sz="1700" b="1" dirty="0">
+              <a:rPr lang="en-US" sz="2900" b="1" dirty="0">
                 <a:effectLst/>
               </a:rPr>
               <a:t>Team members: </a:t>
             </a:r>
-          </a:p>
-          <a:p>
-            <a:pPr indent="-228600">
-              <a:lnSpc>
-                <a:spcPct val="90000"/>
-              </a:lnSpc>
-              <a:spcAft>
-                <a:spcPts val="600"/>
-              </a:spcAft>
-              <a:buFont typeface="Arial" panose="020B0604020202020204" pitchFamily="34" charset="0"/>
-              <a:buChar char="•"/>
-            </a:pPr>
-            <a:endParaRPr lang="en-US" sz="1700" b="1" dirty="0"/>
-          </a:p>
-          <a:p>
-            <a:pPr indent="-228600">
-              <a:lnSpc>
-                <a:spcPct val="90000"/>
-              </a:lnSpc>
-              <a:spcAft>
-                <a:spcPts val="600"/>
-              </a:spcAft>
-              <a:buFont typeface="Arial" panose="020B0604020202020204" pitchFamily="34" charset="0"/>
-              <a:buChar char="•"/>
-            </a:pPr>
-            <a:endParaRPr lang="en-US" sz="1700" b="1" dirty="0">
-              <a:effectLst/>
-            </a:endParaRPr>
           </a:p>
           <a:p>
             <a:pPr indent="-228600">
@@ -28765,65 +28959,6 @@
 </file>
 
 <file path=ppt/slides/slide10.xml><?xml version="1.0" encoding="utf-8"?>
-<p:sld xmlns:a="http://schemas.openxmlformats.org/drawingml/2006/main" xmlns:r="http://schemas.openxmlformats.org/officeDocument/2006/relationships" xmlns:p="http://schemas.openxmlformats.org/presentationml/2006/main">
-  <p:cSld>
-    <p:spTree>
-      <p:nvGrpSpPr>
-        <p:cNvPr id="1" name=""/>
-        <p:cNvGrpSpPr/>
-        <p:nvPr/>
-      </p:nvGrpSpPr>
-      <p:grpSpPr>
-        <a:xfrm>
-          <a:off x="0" y="0"/>
-          <a:ext cx="0" cy="0"/>
-          <a:chOff x="0" y="0"/>
-          <a:chExt cx="0" cy="0"/>
-        </a:xfrm>
-      </p:grpSpPr>
-      <p:sp>
-        <p:nvSpPr>
-          <p:cNvPr id="2" name="Title 1">
-            <a:extLst>
-              <a:ext uri="{FF2B5EF4-FFF2-40B4-BE49-F238E27FC236}">
-                <a16:creationId xmlns:a16="http://schemas.microsoft.com/office/drawing/2014/main" id="{67371BC6-1582-1632-9C39-7AC406EC8BF1}"/>
-              </a:ext>
-            </a:extLst>
-          </p:cNvPr>
-          <p:cNvSpPr>
-            <a:spLocks noGrp="1"/>
-          </p:cNvSpPr>
-          <p:nvPr>
-            <p:ph type="title"/>
-          </p:nvPr>
-        </p:nvSpPr>
-        <p:spPr/>
-        <p:txBody>
-          <a:bodyPr/>
-          <a:lstStyle/>
-          <a:p>
-            <a:r>
-              <a:rPr lang="en-CA" dirty="0"/>
-              <a:t>Conclusion </a:t>
-            </a:r>
-            <a:endParaRPr lang="en-AU" dirty="0"/>
-          </a:p>
-        </p:txBody>
-      </p:sp>
-    </p:spTree>
-    <p:extLst>
-      <p:ext uri="{BB962C8B-B14F-4D97-AF65-F5344CB8AC3E}">
-        <p14:creationId xmlns:p14="http://schemas.microsoft.com/office/powerpoint/2010/main" val="1017183375"/>
-      </p:ext>
-    </p:extLst>
-  </p:cSld>
-  <p:clrMapOvr>
-    <a:masterClrMapping/>
-  </p:clrMapOvr>
-</p:sld>
-</file>
-
-<file path=ppt/slides/slide11.xml><?xml version="1.0" encoding="utf-8"?>
 <p:sld xmlns:a="http://schemas.openxmlformats.org/drawingml/2006/main" xmlns:r="http://schemas.openxmlformats.org/officeDocument/2006/relationships" xmlns:p="http://schemas.openxmlformats.org/presentationml/2006/main">
   <p:cSld>
     <p:bg>
@@ -29369,8 +29504,8 @@
         </p:nvSpPr>
         <p:spPr>
           <a:xfrm>
-            <a:off x="838200" y="365125"/>
-            <a:ext cx="3822189" cy="1899912"/>
+            <a:off x="533400" y="152390"/>
+            <a:ext cx="4126989" cy="2112647"/>
           </a:xfrm>
         </p:spPr>
         <p:txBody>
@@ -29381,7 +29516,7 @@
           <a:p>
             <a:r>
               <a:rPr lang="en-US" sz="4000" dirty="0"/>
-              <a:t>In todays’ presentation</a:t>
+              <a:t>In today’s presentation</a:t>
             </a:r>
           </a:p>
         </p:txBody>
@@ -29399,7 +29534,7 @@
           <p:nvPr>
             <p:extLst>
               <p:ext uri="{D42A27DB-BD31-4B8C-83A1-F6EECF244321}">
-                <p14:modId xmlns:p14="http://schemas.microsoft.com/office/powerpoint/2010/main" val="2861825898"/>
+                <p14:modId xmlns:p14="http://schemas.microsoft.com/office/powerpoint/2010/main" val="2109665134"/>
               </p:ext>
             </p:extLst>
           </p:nvPr>
@@ -29765,7 +29900,7 @@
                 <a:ea typeface="+mn-ea"/>
                 <a:cs typeface="+mn-cs"/>
               </a:rPr>
-              <a:t>net migration.</a:t>
+              <a:t>Net migration</a:t>
             </a:r>
           </a:p>
           <a:p>
@@ -29786,7 +29921,7 @@
                 <a:ea typeface="+mn-ea"/>
                 <a:cs typeface="+mn-cs"/>
               </a:rPr>
-              <a:t>Natural birth rate,</a:t>
+              <a:t>Natural birth rate</a:t>
             </a:r>
           </a:p>
           <a:p>
@@ -29807,7 +29942,7 @@
                 <a:ea typeface="+mn-ea"/>
                 <a:cs typeface="+mn-cs"/>
               </a:rPr>
-              <a:t>Longevity</a:t>
+              <a:t>Longevity (aka. life expectancy)</a:t>
             </a:r>
           </a:p>
           <a:p>
@@ -29845,7 +29980,7 @@
                 <a:ea typeface="+mn-ea"/>
                 <a:cs typeface="+mn-cs"/>
               </a:rPr>
-              <a:t>We would determine whether any of these key drivers have a statistically significant relationship with a country’s economic growth rate</a:t>
+              <a:t>We will determine whether any of these key drivers have a statistically significant relationship with a country’s economic growth rate.</a:t>
             </a:r>
             <a:endParaRPr lang="en-US" sz="1700" dirty="0">
               <a:solidFill>
@@ -33350,8 +33485,8 @@
         </p:nvSpPr>
         <p:spPr>
           <a:xfrm>
-            <a:off x="5105400" y="3962400"/>
-            <a:ext cx="6857999" cy="2895589"/>
+            <a:off x="4495800" y="3614750"/>
+            <a:ext cx="7467599" cy="3243239"/>
           </a:xfrm>
         </p:spPr>
         <p:txBody>
@@ -33365,28 +33500,31 @@
               <a:buChar char="•"/>
             </a:pPr>
             <a:r>
-              <a:rPr lang="en-US" sz="1800" b="1" dirty="0">
+              <a:rPr lang="en-US" sz="1800" dirty="0">
                 <a:solidFill>
                   <a:schemeClr val="tx2"/>
                 </a:solidFill>
               </a:rPr>
-              <a:t>Create</a:t>
+              <a:t>Imported data into Pandas Notebook from multiple World Bank CSV’s.</a:t>
             </a:r>
+            <a:endParaRPr lang="en-US" sz="2000" dirty="0">
+              <a:solidFill>
+                <a:schemeClr val="tx2"/>
+              </a:solidFill>
+            </a:endParaRPr>
+          </a:p>
+          <a:p>
+            <a:pPr indent="-228600">
+              <a:buFont typeface="Arial" panose="020B0604020202020204" pitchFamily="34" charset="0"/>
+              <a:buChar char="•"/>
+            </a:pPr>
             <a:r>
               <a:rPr lang="en-US" sz="1800" dirty="0">
                 <a:solidFill>
                   <a:schemeClr val="tx2"/>
                 </a:solidFill>
               </a:rPr>
-              <a:t>: </a:t>
-            </a:r>
-            <a:r>
-              <a:rPr lang="en-US" sz="2000" dirty="0">
-                <a:solidFill>
-                  <a:schemeClr val="tx2"/>
-                </a:solidFill>
-              </a:rPr>
-              <a:t>We performed some operations to read in the csv and 	clean the data</a:t>
+              <a:t>Loaded data into data frames.</a:t>
             </a:r>
           </a:p>
           <a:p>
@@ -33395,20 +33533,54 @@
               <a:buChar char="•"/>
             </a:pPr>
             <a:r>
-              <a:rPr lang="en-US" sz="1800" b="1" dirty="0">
-                <a:solidFill>
-                  <a:schemeClr val="tx2"/>
-                </a:solidFill>
-              </a:rPr>
-              <a:t>Read</a:t>
-            </a:r>
-            <a:r>
               <a:rPr lang="en-US" sz="1800" dirty="0">
                 <a:solidFill>
                   <a:schemeClr val="tx2"/>
                 </a:solidFill>
               </a:rPr>
-              <a:t> in the final csv</a:t>
+              <a:t>Edited contents of data frames to:</a:t>
+            </a:r>
+          </a:p>
+          <a:p>
+            <a:pPr lvl="1" indent="-228600">
+              <a:buFont typeface="Arial" panose="020B0604020202020204" pitchFamily="34" charset="0"/>
+              <a:buChar char="•"/>
+            </a:pPr>
+            <a:r>
+              <a:rPr lang="en-US" sz="1600" dirty="0">
+                <a:solidFill>
+                  <a:schemeClr val="tx2"/>
+                </a:solidFill>
+              </a:rPr>
+              <a:t>1. Exclude entries will null values;</a:t>
+            </a:r>
+          </a:p>
+          <a:p>
+            <a:pPr lvl="1" indent="-228600">
+              <a:buFont typeface="Arial" panose="020B0604020202020204" pitchFamily="34" charset="0"/>
+              <a:buChar char="•"/>
+            </a:pPr>
+            <a:r>
+              <a:rPr lang="en-US" sz="1600" dirty="0">
+                <a:solidFill>
+                  <a:schemeClr val="tx2"/>
+                </a:solidFill>
+              </a:rPr>
+              <a:t>2. Exclude countries with population &lt; 500,000;</a:t>
+            </a:r>
+          </a:p>
+          <a:p>
+            <a:pPr lvl="1" indent="-228600">
+              <a:buFont typeface="Arial" panose="020B0604020202020204" pitchFamily="34" charset="0"/>
+              <a:buChar char="•"/>
+            </a:pPr>
+            <a:r>
+              <a:rPr lang="en-US" sz="1600" dirty="0">
+                <a:solidFill>
+                  <a:schemeClr val="tx2"/>
+                </a:solidFill>
+              </a:rPr>
+              <a:t>3. Drop unneeded columns;</a:t>
             </a:r>
           </a:p>
           <a:p>
@@ -33417,42 +33589,12 @@
               <a:buChar char="•"/>
             </a:pPr>
             <a:r>
-              <a:rPr lang="en-US" sz="1800" b="1" dirty="0">
-                <a:solidFill>
-                  <a:schemeClr val="tx2"/>
-                </a:solidFill>
-              </a:rPr>
-              <a:t>Updated</a:t>
-            </a:r>
-            <a:r>
               <a:rPr lang="en-US" sz="1800" dirty="0">
                 <a:solidFill>
                   <a:schemeClr val="tx2"/>
                 </a:solidFill>
               </a:rPr>
-              <a:t> the data by combining different data references and updating the existing one.</a:t>
-            </a:r>
-          </a:p>
-          <a:p>
-            <a:pPr indent="-228600">
-              <a:buFont typeface="Arial" panose="020B0604020202020204" pitchFamily="34" charset="0"/>
-              <a:buChar char="•"/>
-            </a:pPr>
-            <a:r>
-              <a:rPr lang="en-US" sz="1800" b="1" dirty="0">
-                <a:solidFill>
-                  <a:schemeClr val="tx2"/>
-                </a:solidFill>
-              </a:rPr>
-              <a:t>Delete</a:t>
-            </a:r>
-            <a:r>
-              <a:rPr lang="en-US" sz="1800" dirty="0">
-                <a:solidFill>
-                  <a:schemeClr val="tx2"/>
-                </a:solidFill>
-              </a:rPr>
-              <a:t>  all the data with null values thereby creating the dataset into the format we wanted and fed into PostgreSQL</a:t>
+              <a:t>Exported final data to a CSV.</a:t>
             </a:r>
           </a:p>
         </p:txBody>
@@ -33607,7 +33749,7 @@
         </p:blipFill>
         <p:spPr>
           <a:xfrm>
-            <a:off x="0" y="-614736"/>
+            <a:off x="-38077" y="-304800"/>
             <a:ext cx="9947062" cy="6857990"/>
           </a:xfrm>
           <a:prstGeom prst="rect">
@@ -34339,7 +34481,7 @@
             </a:pPr>
             <a:r>
               <a:rPr lang="en-US" sz="2000" dirty="0"/>
-              <a:t>Create a database and a table with various columns and load in the csv.</a:t>
+              <a:t>Create a database and a table with necessary columns and loaded in the CSV.</a:t>
             </a:r>
           </a:p>
         </p:txBody>
@@ -34593,7 +34735,7 @@
         </p:blipFill>
         <p:spPr>
           <a:xfrm>
-            <a:off x="30822" y="2028"/>
+            <a:off x="8473" y="10"/>
             <a:ext cx="12192001" cy="6857990"/>
           </a:xfrm>
           <a:prstGeom prst="rect">
@@ -34619,16 +34761,20 @@
         </p:nvSpPr>
         <p:spPr>
           <a:xfrm>
-            <a:off x="5512928" y="225762"/>
-            <a:ext cx="1523999" cy="766830"/>
+            <a:off x="7026565" y="1"/>
+            <a:ext cx="5162387" cy="685800"/>
           </a:xfrm>
+          <a:solidFill>
+            <a:schemeClr val="bg1"/>
+          </a:solidFill>
         </p:spPr>
         <p:txBody>
           <a:bodyPr vert="horz" lIns="91440" tIns="45720" rIns="91440" bIns="45720" rtlCol="0" anchor="t">
-            <a:normAutofit/>
+            <a:normAutofit fontScale="90000"/>
           </a:bodyPr>
           <a:lstStyle/>
           <a:p>
+            <a:pPr algn="ctr"/>
             <a:r>
               <a:rPr lang="en-US" sz="4400" dirty="0">
                 <a:solidFill>
@@ -34658,13 +34804,16 @@
         </p:nvSpPr>
         <p:spPr>
           <a:xfrm>
-            <a:off x="7039975" y="184666"/>
-            <a:ext cx="5170861" cy="1277969"/>
+            <a:off x="7026565" y="694982"/>
+            <a:ext cx="5173909" cy="1948934"/>
           </a:xfrm>
+          <a:solidFill>
+            <a:schemeClr val="bg1"/>
+          </a:solidFill>
         </p:spPr>
         <p:txBody>
           <a:bodyPr vert="horz" lIns="91440" tIns="45720" rIns="91440" bIns="45720" rtlCol="0">
-            <a:normAutofit fontScale="92500" lnSpcReduction="20000"/>
+            <a:normAutofit/>
           </a:bodyPr>
           <a:lstStyle/>
           <a:p>
@@ -34696,15 +34845,7 @@
                 </a:solidFill>
                 <a:effectLst/>
               </a:rPr>
-              <a:t> used to develop the web applications to </a:t>
-            </a:r>
-            <a:r>
-              <a:rPr lang="en-US" sz="2000" dirty="0">
-                <a:solidFill>
-                  <a:srgbClr val="C00000"/>
-                </a:solidFill>
-              </a:rPr>
-              <a:t>produce the data and JavaScript was used to pull from the dataset.</a:t>
+              <a:t> used to read the data from the database and convert it to a list of dictionaries in JSON format.</a:t>
             </a:r>
           </a:p>
           <a:p>
@@ -34718,7 +34859,7 @@
                   <a:srgbClr val="C00000"/>
                 </a:solidFill>
               </a:rPr>
-              <a:t>The dataset was stored as a list of dictionaries for easy access for JavaScript.</a:t>
+              <a:t>Flask enabled the dataset to be viewed in a browser window.</a:t>
             </a:r>
           </a:p>
         </p:txBody>
@@ -34771,7 +34912,7 @@
         </p:nvSpPr>
         <p:spPr>
           <a:xfrm>
-            <a:off x="839788" y="914400"/>
+            <a:off x="724693" y="533400"/>
             <a:ext cx="3932237" cy="762000"/>
           </a:xfrm>
         </p:spPr>
@@ -34781,7 +34922,7 @@
           <a:p>
             <a:r>
               <a:rPr lang="en-CA" dirty="0"/>
-              <a:t>JavaScript</a:t>
+              <a:t>JavaScript &amp; HTML</a:t>
             </a:r>
             <a:endParaRPr lang="en-AU" dirty="0"/>
           </a:p>
@@ -34810,7 +34951,7 @@
         </p:blipFill>
         <p:spPr>
           <a:xfrm>
-            <a:off x="5044610" y="887858"/>
+            <a:off x="5486400" y="914400"/>
             <a:ext cx="6461589" cy="4873625"/>
           </a:xfrm>
         </p:spPr>
@@ -34831,98 +34972,56 @@
             <p:ph type="body" sz="half" idx="2"/>
           </p:nvPr>
         </p:nvSpPr>
-        <p:spPr/>
+        <p:spPr>
+          <a:xfrm>
+            <a:off x="609600" y="1524000"/>
+            <a:ext cx="4419600" cy="4648200"/>
+          </a:xfrm>
+        </p:spPr>
         <p:txBody>
           <a:bodyPr>
             <a:normAutofit/>
           </a:bodyPr>
           <a:lstStyle/>
           <a:p>
+            <a:pPr marL="285750" indent="-285750">
+              <a:lnSpc>
+                <a:spcPct val="100000"/>
+              </a:lnSpc>
+              <a:spcAft>
+                <a:spcPts val="600"/>
+              </a:spcAft>
+              <a:buFont typeface="Arial" panose="020B0604020202020204" pitchFamily="34" charset="0"/>
+              <a:buChar char="•"/>
+            </a:pPr>
             <a:r>
-              <a:rPr lang="en-GB" b="0" i="0" dirty="0">
+              <a:rPr lang="en-GB" sz="1800" b="0" i="0" dirty="0">
                 <a:solidFill>
                   <a:srgbClr val="040C28"/>
                 </a:solidFill>
                 <a:effectLst/>
                 <a:latin typeface="Google Sans"/>
               </a:rPr>
-              <a:t>Was used to create dynamically updating content and </a:t>
+              <a:t>Was used to create scatter plot visualisations and  with a dynamic mouse-over function.</a:t>
             </a:r>
-            <a:r>
-              <a:rPr lang="en-GB" dirty="0">
-                <a:solidFill>
-                  <a:srgbClr val="040C28"/>
-                </a:solidFill>
-                <a:latin typeface="Google Sans"/>
-              </a:rPr>
-              <a:t>visualize charts</a:t>
-            </a:r>
-            <a:endParaRPr lang="en-CA" dirty="0"/>
+            <a:endParaRPr lang="en-CA" sz="1800" dirty="0"/>
           </a:p>
           <a:p>
+            <a:pPr marL="285750" indent="-285750">
+              <a:lnSpc>
+                <a:spcPct val="100000"/>
+              </a:lnSpc>
+              <a:spcAft>
+                <a:spcPts val="600"/>
+              </a:spcAft>
+              <a:buFont typeface="Arial" panose="020B0604020202020204" pitchFamily="34" charset="0"/>
+              <a:buChar char="•"/>
+            </a:pPr>
             <a:r>
-              <a:rPr lang="en-GB" b="0" i="0" dirty="0">
-                <a:solidFill>
-                  <a:srgbClr val="10162F"/>
-                </a:solidFill>
-                <a:effectLst/>
-                <a:latin typeface="Apercu"/>
-              </a:rPr>
-              <a:t>It was used along with </a:t>
+              <a:rPr lang="en-AU" sz="1800" dirty="0"/>
+              <a:t>The datapoints required for the visualisations were traced using a “.map()” function.</a:t>
             </a:r>
-            <a:r>
-              <a:rPr lang="en-GB" b="0" i="0" dirty="0">
-                <a:effectLst/>
-                <a:latin typeface="Apercu"/>
-                <a:hlinkClick r:id="rId3"/>
-              </a:rPr>
-              <a:t>HTML</a:t>
-            </a:r>
-            <a:r>
-              <a:rPr lang="en-GB" b="0" i="0" dirty="0">
-                <a:solidFill>
-                  <a:srgbClr val="10162F"/>
-                </a:solidFill>
-                <a:effectLst/>
-                <a:latin typeface="Apercu"/>
-              </a:rPr>
-              <a:t> and </a:t>
-            </a:r>
-            <a:r>
-              <a:rPr lang="en-GB" b="0" i="0" dirty="0">
-                <a:effectLst/>
-                <a:latin typeface="Apercu"/>
-                <a:hlinkClick r:id="rId4"/>
-              </a:rPr>
-              <a:t>CSS</a:t>
-            </a:r>
-            <a:r>
-              <a:rPr lang="en-GB" b="0" i="0" dirty="0">
-                <a:solidFill>
-                  <a:srgbClr val="10162F"/>
-                </a:solidFill>
-                <a:effectLst/>
-                <a:latin typeface="Apercu"/>
-              </a:rPr>
-              <a:t> to create the charts that can be seen and interacted with. </a:t>
-            </a:r>
-            <a:r>
-              <a:rPr lang="en-GB" b="0" i="0" dirty="0">
-                <a:solidFill>
-                  <a:srgbClr val="202124"/>
-                </a:solidFill>
-                <a:effectLst/>
-                <a:latin typeface="arial" panose="020B0604020202020204" pitchFamily="34" charset="0"/>
-              </a:rPr>
-              <a:t> </a:t>
-            </a:r>
-          </a:p>
-          <a:p>
-            <a:r>
-              <a:rPr lang="en-CA" dirty="0"/>
-              <a:t>Data was read in from the database created using flask above.</a:t>
-            </a:r>
-            <a:endParaRPr lang="en-GB" dirty="0">
+            <a:endParaRPr lang="en-GB" sz="1800" dirty="0">
               <a:solidFill>
                 <a:srgbClr val="202124"/>
               </a:solidFill>
@@ -34930,9 +35029,43 @@
             </a:endParaRPr>
           </a:p>
           <a:p>
+            <a:pPr marL="285750" indent="-285750">
+              <a:lnSpc>
+                <a:spcPct val="100000"/>
+              </a:lnSpc>
+              <a:spcAft>
+                <a:spcPts val="600"/>
+              </a:spcAft>
+              <a:buFont typeface="Arial" panose="020B0604020202020204" pitchFamily="34" charset="0"/>
+              <a:buChar char="•"/>
+            </a:pPr>
             <a:r>
-              <a:rPr lang="en-CA" dirty="0"/>
-              <a:t>It was used to get all the traces and plots to create all the charts and calculate the correlations.</a:t>
+              <a:rPr lang="en-CA" sz="1800" dirty="0"/>
+              <a:t>Correlations were calculated to display each factor’s ability to “explain” GDP growth.</a:t>
+            </a:r>
+          </a:p>
+          <a:p>
+            <a:pPr marL="285750" indent="-285750">
+              <a:lnSpc>
+                <a:spcPct val="100000"/>
+              </a:lnSpc>
+              <a:spcAft>
+                <a:spcPts val="600"/>
+              </a:spcAft>
+              <a:buFont typeface="Arial" panose="020B0604020202020204" pitchFamily="34" charset="0"/>
+              <a:buChar char="•"/>
+            </a:pPr>
+            <a:r>
+              <a:rPr lang="en-CA" sz="1800" dirty="0"/>
+              <a:t>An ”</a:t>
+            </a:r>
+            <a:r>
+              <a:rPr lang="en-CA" sz="1800" dirty="0" err="1"/>
+              <a:t>onchange</a:t>
+            </a:r>
+            <a:r>
+              <a:rPr lang="en-CA" sz="1800" dirty="0"/>
+              <a:t>” event was used update the Information Table when a user selects from the dropdown list.</a:t>
             </a:r>
           </a:p>
         </p:txBody>
@@ -34972,7 +35105,7 @@
           <p:cNvPr id="2" name="Title 1">
             <a:extLst>
               <a:ext uri="{FF2B5EF4-FFF2-40B4-BE49-F238E27FC236}">
-                <a16:creationId xmlns:a16="http://schemas.microsoft.com/office/drawing/2014/main" id="{A0FCF585-1A54-F72C-BE60-D107FFE0FFE3}"/>
+                <a16:creationId xmlns:a16="http://schemas.microsoft.com/office/drawing/2014/main" id="{67371BC6-1582-1632-9C39-7AC406EC8BF1}"/>
               </a:ext>
             </a:extLst>
           </p:cNvPr>
@@ -34989,19 +35122,246 @@
           <a:lstStyle/>
           <a:p>
             <a:r>
-              <a:rPr lang="en-AU" b="1" dirty="0"/>
-              <a:t>visualizations</a:t>
+              <a:rPr lang="en-CA" dirty="0"/>
+              <a:t>Conclusion </a:t>
             </a:r>
             <a:endParaRPr lang="en-AU" dirty="0"/>
           </a:p>
         </p:txBody>
       </p:sp>
+      <p:graphicFrame>
+        <p:nvGraphicFramePr>
+          <p:cNvPr id="3" name="Table 3">
+            <a:extLst>
+              <a:ext uri="{FF2B5EF4-FFF2-40B4-BE49-F238E27FC236}">
+                <a16:creationId xmlns:a16="http://schemas.microsoft.com/office/drawing/2014/main" id="{9AF72698-03CB-913D-3234-30E3A1EA0AC7}"/>
+              </a:ext>
+            </a:extLst>
+          </p:cNvPr>
+          <p:cNvGraphicFramePr>
+            <a:graphicFrameLocks noGrp="1"/>
+          </p:cNvGraphicFramePr>
+          <p:nvPr>
+            <p:extLst>
+              <p:ext uri="{D42A27DB-BD31-4B8C-83A1-F6EECF244321}">
+                <p14:modId xmlns:p14="http://schemas.microsoft.com/office/powerpoint/2010/main" val="2707871539"/>
+              </p:ext>
+            </p:extLst>
+          </p:nvPr>
+        </p:nvGraphicFramePr>
+        <p:xfrm>
+          <a:off x="762000" y="1600200"/>
+          <a:ext cx="5588000" cy="2424110"/>
+        </p:xfrm>
+        <a:graphic>
+          <a:graphicData uri="http://schemas.openxmlformats.org/drawingml/2006/table">
+            <a:tbl>
+              <a:tblPr firstRow="1" bandRow="1">
+                <a:tableStyleId>{5C22544A-7EE6-4342-B048-85BDC9FD1C3A}</a:tableStyleId>
+              </a:tblPr>
+              <a:tblGrid>
+                <a:gridCol w="2794000">
+                  <a:extLst>
+                    <a:ext uri="{9D8B030D-6E8A-4147-A177-3AD203B41FA5}">
+                      <a16:colId xmlns:a16="http://schemas.microsoft.com/office/drawing/2014/main" val="3287525841"/>
+                    </a:ext>
+                  </a:extLst>
+                </a:gridCol>
+                <a:gridCol w="2794000">
+                  <a:extLst>
+                    <a:ext uri="{9D8B030D-6E8A-4147-A177-3AD203B41FA5}">
+                      <a16:colId xmlns:a16="http://schemas.microsoft.com/office/drawing/2014/main" val="1271251"/>
+                    </a:ext>
+                  </a:extLst>
+                </a:gridCol>
+              </a:tblGrid>
+              <a:tr h="484822">
+                <a:tc>
+                  <a:txBody>
+                    <a:bodyPr/>
+                    <a:lstStyle/>
+                    <a:p>
+                      <a:r>
+                        <a:rPr lang="en-US" dirty="0"/>
+                        <a:t>Factor</a:t>
+                      </a:r>
+                    </a:p>
+                  </a:txBody>
+                  <a:tcPr/>
+                </a:tc>
+                <a:tc>
+                  <a:txBody>
+                    <a:bodyPr/>
+                    <a:lstStyle/>
+                    <a:p>
+                      <a:r>
+                        <a:rPr lang="en-US" dirty="0"/>
+                        <a:t>Correlation</a:t>
+                      </a:r>
+                    </a:p>
+                  </a:txBody>
+                  <a:tcPr/>
+                </a:tc>
+                <a:extLst>
+                  <a:ext uri="{0D108BD9-81ED-4DB2-BD59-A6C34878D82A}">
+                    <a16:rowId xmlns:a16="http://schemas.microsoft.com/office/drawing/2014/main" val="2913130427"/>
+                  </a:ext>
+                </a:extLst>
+              </a:tr>
+              <a:tr h="484822">
+                <a:tc>
+                  <a:txBody>
+                    <a:bodyPr/>
+                    <a:lstStyle/>
+                    <a:p>
+                      <a:r>
+                        <a:rPr lang="en-US" dirty="0"/>
+                        <a:t>Population Growth</a:t>
+                      </a:r>
+                    </a:p>
+                  </a:txBody>
+                  <a:tcPr/>
+                </a:tc>
+                <a:tc>
+                  <a:txBody>
+                    <a:bodyPr/>
+                    <a:lstStyle/>
+                    <a:p>
+                      <a:r>
+                        <a:rPr lang="en-US" dirty="0"/>
+                        <a:t>0.26</a:t>
+                      </a:r>
+                    </a:p>
+                  </a:txBody>
+                  <a:tcPr/>
+                </a:tc>
+                <a:extLst>
+                  <a:ext uri="{0D108BD9-81ED-4DB2-BD59-A6C34878D82A}">
+                    <a16:rowId xmlns:a16="http://schemas.microsoft.com/office/drawing/2014/main" val="3225783421"/>
+                  </a:ext>
+                </a:extLst>
+              </a:tr>
+              <a:tr h="484822">
+                <a:tc>
+                  <a:txBody>
+                    <a:bodyPr/>
+                    <a:lstStyle/>
+                    <a:p>
+                      <a:r>
+                        <a:rPr lang="en-US" dirty="0"/>
+                        <a:t>Net Migration</a:t>
+                      </a:r>
+                      <a:r>
+                        <a:rPr lang="en-US" baseline="30000" dirty="0"/>
+                        <a:t>1</a:t>
+                      </a:r>
+                    </a:p>
+                  </a:txBody>
+                  <a:tcPr/>
+                </a:tc>
+                <a:tc>
+                  <a:txBody>
+                    <a:bodyPr/>
+                    <a:lstStyle/>
+                    <a:p>
+                      <a:r>
+                        <a:rPr lang="en-US" dirty="0"/>
+                        <a:t>0.22</a:t>
+                      </a:r>
+                    </a:p>
+                  </a:txBody>
+                  <a:tcPr/>
+                </a:tc>
+                <a:extLst>
+                  <a:ext uri="{0D108BD9-81ED-4DB2-BD59-A6C34878D82A}">
+                    <a16:rowId xmlns:a16="http://schemas.microsoft.com/office/drawing/2014/main" val="1565036125"/>
+                  </a:ext>
+                </a:extLst>
+              </a:tr>
+              <a:tr h="484822">
+                <a:tc>
+                  <a:txBody>
+                    <a:bodyPr/>
+                    <a:lstStyle/>
+                    <a:p>
+                      <a:r>
+                        <a:rPr lang="en-US" dirty="0"/>
+                        <a:t>Natural Birth-rate</a:t>
+                      </a:r>
+                      <a:r>
+                        <a:rPr lang="en-US" baseline="30000" dirty="0"/>
+                        <a:t>1</a:t>
+                      </a:r>
+                    </a:p>
+                  </a:txBody>
+                  <a:tcPr/>
+                </a:tc>
+                <a:tc>
+                  <a:txBody>
+                    <a:bodyPr/>
+                    <a:lstStyle/>
+                    <a:p>
+                      <a:r>
+                        <a:rPr lang="en-US" dirty="0"/>
+                        <a:t>0.08</a:t>
+                      </a:r>
+                    </a:p>
+                  </a:txBody>
+                  <a:tcPr/>
+                </a:tc>
+                <a:extLst>
+                  <a:ext uri="{0D108BD9-81ED-4DB2-BD59-A6C34878D82A}">
+                    <a16:rowId xmlns:a16="http://schemas.microsoft.com/office/drawing/2014/main" val="949995264"/>
+                  </a:ext>
+                </a:extLst>
+              </a:tr>
+              <a:tr h="484822">
+                <a:tc>
+                  <a:txBody>
+                    <a:bodyPr/>
+                    <a:lstStyle/>
+                    <a:p>
+                      <a:r>
+                        <a:rPr lang="en-US" dirty="0"/>
+                        <a:t>Longevity (Life-expectancy)</a:t>
+                      </a:r>
+                      <a:r>
+                        <a:rPr lang="en-US" baseline="30000" dirty="0"/>
+                        <a:t>1</a:t>
+                      </a:r>
+                    </a:p>
+                  </a:txBody>
+                  <a:tcPr/>
+                </a:tc>
+                <a:tc>
+                  <a:txBody>
+                    <a:bodyPr/>
+                    <a:lstStyle/>
+                    <a:p>
+                      <a:r>
+                        <a:rPr lang="en-US" dirty="0"/>
+                        <a:t>0.11</a:t>
+                      </a:r>
+                    </a:p>
+                  </a:txBody>
+                  <a:tcPr/>
+                </a:tc>
+                <a:extLst>
+                  <a:ext uri="{0D108BD9-81ED-4DB2-BD59-A6C34878D82A}">
+                    <a16:rowId xmlns:a16="http://schemas.microsoft.com/office/drawing/2014/main" val="909987602"/>
+                  </a:ext>
+                </a:extLst>
+              </a:tr>
+            </a:tbl>
+          </a:graphicData>
+        </a:graphic>
+      </p:graphicFrame>
       <p:sp>
         <p:nvSpPr>
           <p:cNvPr id="4" name="TextBox 3">
             <a:extLst>
               <a:ext uri="{FF2B5EF4-FFF2-40B4-BE49-F238E27FC236}">
-                <a16:creationId xmlns:a16="http://schemas.microsoft.com/office/drawing/2014/main" id="{FB5EC5DB-0ED0-91C8-F506-A31D4A9A0247}"/>
+                <a16:creationId xmlns:a16="http://schemas.microsoft.com/office/drawing/2014/main" id="{AFE1927C-C6AA-B923-090C-A5907D9A015C}"/>
               </a:ext>
             </a:extLst>
           </p:cNvPr>
@@ -35010,8 +35370,8 @@
         </p:nvSpPr>
         <p:spPr>
           <a:xfrm>
-            <a:off x="761999" y="1905000"/>
-            <a:ext cx="10591801" cy="3785652"/>
+            <a:off x="6705600" y="1447800"/>
+            <a:ext cx="5105400" cy="5001369"/>
           </a:xfrm>
           <a:prstGeom prst="rect">
             <a:avLst/>
@@ -35019,132 +35379,161 @@
           <a:noFill/>
         </p:spPr>
         <p:txBody>
-          <a:bodyPr wrap="square">
+          <a:bodyPr wrap="square" rtlCol="0">
             <a:spAutoFit/>
           </a:bodyPr>
           <a:lstStyle/>
           <a:p>
-            <a:endParaRPr lang="en-AU" b="1" dirty="0">
-              <a:latin typeface="Arial" panose="020B0604020202020204" pitchFamily="34" charset="0"/>
-            </a:endParaRPr>
+            <a:pPr>
+              <a:spcBef>
+                <a:spcPts val="600"/>
+              </a:spcBef>
+              <a:spcAft>
+                <a:spcPts val="600"/>
+              </a:spcAft>
+            </a:pPr>
+            <a:r>
+              <a:rPr lang="en-US" b="1" dirty="0"/>
+              <a:t>Takeaways:</a:t>
+            </a:r>
           </a:p>
           <a:p>
-            <a:pPr algn="l">
+            <a:pPr marL="285750" indent="-285750">
+              <a:spcBef>
+                <a:spcPts val="600"/>
+              </a:spcBef>
+              <a:spcAft>
+                <a:spcPts val="1200"/>
+              </a:spcAft>
               <a:buFont typeface="Arial" panose="020B0604020202020204" pitchFamily="34" charset="0"/>
               <a:buChar char="•"/>
             </a:pPr>
             <a:r>
-              <a:rPr lang="en-GB" b="0" i="0" dirty="0">
-                <a:solidFill>
-                  <a:srgbClr val="1F2328"/>
-                </a:solidFill>
-                <a:effectLst/>
-                <a:latin typeface="-apple-system"/>
-              </a:rPr>
-              <a:t> 	Python Flask-powered API was used during the data gathering process.</a:t>
+              <a:rPr lang="en-US" dirty="0"/>
+              <a:t>Overall, population growth has a relatively low correlation with economic growth.</a:t>
             </a:r>
           </a:p>
           <a:p>
-            <a:pPr marL="342900" indent="-342900" algn="l">
+            <a:pPr marL="285750" indent="-285750">
+              <a:spcBef>
+                <a:spcPts val="600"/>
+              </a:spcBef>
+              <a:spcAft>
+                <a:spcPts val="1200"/>
+              </a:spcAft>
               <a:buFont typeface="Arial" panose="020B0604020202020204" pitchFamily="34" charset="0"/>
               <a:buChar char="•"/>
             </a:pPr>
             <a:r>
-              <a:rPr lang="en-GB" b="0" i="0" dirty="0">
-                <a:solidFill>
-                  <a:srgbClr val="1F2328"/>
-                </a:solidFill>
-                <a:effectLst/>
-                <a:latin typeface="-apple-system"/>
-              </a:rPr>
-              <a:t>	PostgreSQL database was used to store and retrieve data using </a:t>
-            </a:r>
-            <a:r>
-              <a:rPr lang="en-GB" b="0" i="0" dirty="0" err="1">
-                <a:solidFill>
-                  <a:srgbClr val="1F2328"/>
-                </a:solidFill>
-                <a:effectLst/>
-                <a:latin typeface="-apple-system"/>
-              </a:rPr>
-              <a:t>PgAdmin</a:t>
-            </a:r>
-            <a:r>
-              <a:rPr lang="en-GB" b="0" i="0" dirty="0">
-                <a:solidFill>
-                  <a:srgbClr val="1F2328"/>
-                </a:solidFill>
-                <a:effectLst/>
-                <a:latin typeface="-apple-system"/>
-              </a:rPr>
-              <a:t>.</a:t>
+              <a:rPr lang="en-US" i="1" dirty="0"/>
+              <a:t>This might imply that population growth is not necessary for a country to produce strong GDP growth.</a:t>
             </a:r>
           </a:p>
           <a:p>
-            <a:pPr marL="342900" indent="-342900" algn="l">
+            <a:pPr marL="285750" indent="-285750">
+              <a:spcBef>
+                <a:spcPts val="600"/>
+              </a:spcBef>
+              <a:spcAft>
+                <a:spcPts val="1200"/>
+              </a:spcAft>
               <a:buFont typeface="Arial" panose="020B0604020202020204" pitchFamily="34" charset="0"/>
               <a:buChar char="•"/>
             </a:pPr>
             <a:r>
-              <a:rPr lang="en-GB" dirty="0">
-                <a:solidFill>
-                  <a:srgbClr val="1F2328"/>
-                </a:solidFill>
-                <a:latin typeface="-apple-system"/>
-              </a:rPr>
-              <a:t>	We</a:t>
-            </a:r>
-            <a:r>
-              <a:rPr lang="en-GB" b="0" i="0" dirty="0">
-                <a:solidFill>
-                  <a:srgbClr val="1F2328"/>
-                </a:solidFill>
-                <a:effectLst/>
-                <a:latin typeface="-apple-system"/>
-              </a:rPr>
-              <a:t> used HTML/CSS and JavaScript for data visualisations and the charts.</a:t>
+              <a:rPr lang="en-US" dirty="0"/>
+              <a:t>Population growth is more highly correlated with GDP growth than any of its individual subfactors.</a:t>
             </a:r>
           </a:p>
           <a:p>
-            <a:endParaRPr lang="en-AU" b="1" dirty="0">
-              <a:effectLst/>
-              <a:latin typeface="Arial" panose="020B0604020202020204" pitchFamily="34" charset="0"/>
-            </a:endParaRPr>
+            <a:pPr marL="285750" indent="-285750">
+              <a:spcBef>
+                <a:spcPts val="600"/>
+              </a:spcBef>
+              <a:spcAft>
+                <a:spcPts val="1200"/>
+              </a:spcAft>
+              <a:buFont typeface="Arial" panose="020B0604020202020204" pitchFamily="34" charset="0"/>
+              <a:buChar char="•"/>
+            </a:pPr>
+            <a:r>
+              <a:rPr lang="en-US" dirty="0"/>
+              <a:t>Of the subfactors, net migration has the highest correlation.</a:t>
+            </a:r>
           </a:p>
           <a:p>
-            <a:endParaRPr lang="en-AU" b="1" dirty="0">
-              <a:latin typeface="Arial" panose="020B0604020202020204" pitchFamily="34" charset="0"/>
-            </a:endParaRPr>
+            <a:pPr marL="285750" indent="-285750">
+              <a:spcBef>
+                <a:spcPts val="600"/>
+              </a:spcBef>
+              <a:spcAft>
+                <a:spcPts val="1200"/>
+              </a:spcAft>
+              <a:buFont typeface="Arial" panose="020B0604020202020204" pitchFamily="34" charset="0"/>
+              <a:buChar char="•"/>
+            </a:pPr>
+            <a:r>
+              <a:rPr lang="en-US" dirty="0"/>
+              <a:t>All of the correlations are positive.</a:t>
+            </a:r>
           </a:p>
           <a:p>
-            <a:endParaRPr lang="en-AU" b="1" dirty="0">
-              <a:effectLst/>
-              <a:latin typeface="Arial" panose="020B0604020202020204" pitchFamily="34" charset="0"/>
-            </a:endParaRPr>
+            <a:pPr marL="285750" indent="-285750">
+              <a:spcBef>
+                <a:spcPts val="600"/>
+              </a:spcBef>
+              <a:spcAft>
+                <a:spcPts val="1200"/>
+              </a:spcAft>
+              <a:buFont typeface="Arial" panose="020B0604020202020204" pitchFamily="34" charset="0"/>
+              <a:buChar char="•"/>
+            </a:pPr>
+            <a:r>
+              <a:rPr lang="en-US" i="1" dirty="0"/>
+              <a:t>This might imply that, overall, all factors have a positive impact on GDP growth.</a:t>
+            </a:r>
           </a:p>
+        </p:txBody>
+      </p:sp>
+      <p:sp>
+        <p:nvSpPr>
+          <p:cNvPr id="5" name="TextBox 4">
+            <a:extLst>
+              <a:ext uri="{FF2B5EF4-FFF2-40B4-BE49-F238E27FC236}">
+                <a16:creationId xmlns:a16="http://schemas.microsoft.com/office/drawing/2014/main" id="{5DD8D185-DB00-F3C7-897B-40663D9FB735}"/>
+              </a:ext>
+            </a:extLst>
+          </p:cNvPr>
+          <p:cNvSpPr txBox="1"/>
+          <p:nvPr/>
+        </p:nvSpPr>
+        <p:spPr>
+          <a:xfrm>
+            <a:off x="1143000" y="4343400"/>
+            <a:ext cx="5207000" cy="369332"/>
+          </a:xfrm>
+          <a:prstGeom prst="rect">
+            <a:avLst/>
+          </a:prstGeom>
+          <a:noFill/>
+        </p:spPr>
+        <p:txBody>
+          <a:bodyPr wrap="square" rtlCol="0">
+            <a:spAutoFit/>
+          </a:bodyPr>
+          <a:lstStyle/>
           <a:p>
-            <a:endParaRPr lang="en-AU" b="1" dirty="0">
-              <a:latin typeface="Arial" panose="020B0604020202020204" pitchFamily="34" charset="0"/>
-            </a:endParaRPr>
-          </a:p>
-          <a:p>
-            <a:endParaRPr lang="en-AU" b="1" dirty="0">
-              <a:effectLst/>
-              <a:latin typeface="Arial" panose="020B0604020202020204" pitchFamily="34" charset="0"/>
-            </a:endParaRPr>
-          </a:p>
-          <a:p>
-            <a:endParaRPr lang="en-AU" b="1" dirty="0">
-              <a:effectLst/>
-              <a:latin typeface="Arial" panose="020B0604020202020204" pitchFamily="34" charset="0"/>
-            </a:endParaRPr>
+            <a:r>
+              <a:rPr lang="en-US" i="1" dirty="0"/>
+              <a:t>1. Denotes a subfactor of Population Growth</a:t>
+            </a:r>
           </a:p>
         </p:txBody>
       </p:sp>
     </p:spTree>
     <p:extLst>
       <p:ext uri="{BB962C8B-B14F-4D97-AF65-F5344CB8AC3E}">
-        <p14:creationId xmlns:p14="http://schemas.microsoft.com/office/powerpoint/2010/main" val="287666526"/>
+        <p14:creationId xmlns:p14="http://schemas.microsoft.com/office/powerpoint/2010/main" val="1017183375"/>
       </p:ext>
     </p:extLst>
   </p:cSld>
@@ -36028,20 +36417,20 @@
 </file>
 
 <file path=customXml/item1.xml><?xml version="1.0" encoding="utf-8"?>
+<p:properties xmlns:p="http://schemas.microsoft.com/office/2006/metadata/properties" xmlns:xsi="http://www.w3.org/2001/XMLSchema-instance" xmlns:pc="http://schemas.microsoft.com/office/infopath/2007/PartnerControls">
+  <documentManagement>
+    <MediaServiceKeyPoints xmlns="71af3243-3dd4-4a8d-8c0d-dd76da1f02a5" xsi:nil="true"/>
+  </documentManagement>
+</p:properties>
+</file>
+
+<file path=customXml/item2.xml><?xml version="1.0" encoding="utf-8"?>
 <?mso-contentType ?>
 <FormTemplates xmlns="http://schemas.microsoft.com/sharepoint/v3/contenttype/forms">
   <Display>DocumentLibraryForm</Display>
   <Edit>DocumentLibraryForm</Edit>
   <New>DocumentLibraryForm</New>
 </FormTemplates>
-</file>
-
-<file path=customXml/item2.xml><?xml version="1.0" encoding="utf-8"?>
-<p:properties xmlns:p="http://schemas.microsoft.com/office/2006/metadata/properties" xmlns:xsi="http://www.w3.org/2001/XMLSchema-instance" xmlns:pc="http://schemas.microsoft.com/office/infopath/2007/PartnerControls">
-  <documentManagement>
-    <MediaServiceKeyPoints xmlns="71af3243-3dd4-4a8d-8c0d-dd76da1f02a5" xsi:nil="true"/>
-  </documentManagement>
-</p:properties>
 </file>
 
 <file path=customXml/item3.xml><?xml version="1.0" encoding="utf-8"?>
@@ -36256,19 +36645,19 @@
 </file>
 
 <file path=customXml/itemProps1.xml><?xml version="1.0" encoding="utf-8"?>
-<ds:datastoreItem xmlns:ds="http://schemas.openxmlformats.org/officeDocument/2006/customXml" ds:itemID="{1050AFE8-A560-4DCF-9BA0-FFF107A3C767}">
+<ds:datastoreItem xmlns:ds="http://schemas.openxmlformats.org/officeDocument/2006/customXml" ds:itemID="{765DCA2E-A3A3-4379-AF49-80069EEF140F}">
   <ds:schemaRefs>
-    <ds:schemaRef ds:uri="http://schemas.microsoft.com/sharepoint/v3/contenttype/forms"/>
+    <ds:schemaRef ds:uri="http://schemas.microsoft.com/office/2006/metadata/properties"/>
+    <ds:schemaRef ds:uri="http://schemas.microsoft.com/office/infopath/2007/PartnerControls"/>
+    <ds:schemaRef ds:uri="71af3243-3dd4-4a8d-8c0d-dd76da1f02a5"/>
   </ds:schemaRefs>
 </ds:datastoreItem>
 </file>
 
 <file path=customXml/itemProps2.xml><?xml version="1.0" encoding="utf-8"?>
-<ds:datastoreItem xmlns:ds="http://schemas.openxmlformats.org/officeDocument/2006/customXml" ds:itemID="{765DCA2E-A3A3-4379-AF49-80069EEF140F}">
+<ds:datastoreItem xmlns:ds="http://schemas.openxmlformats.org/officeDocument/2006/customXml" ds:itemID="{1050AFE8-A560-4DCF-9BA0-FFF107A3C767}">
   <ds:schemaRefs>
-    <ds:schemaRef ds:uri="http://schemas.microsoft.com/office/2006/metadata/properties"/>
-    <ds:schemaRef ds:uri="http://schemas.microsoft.com/office/infopath/2007/PartnerControls"/>
-    <ds:schemaRef ds:uri="71af3243-3dd4-4a8d-8c0d-dd76da1f02a5"/>
+    <ds:schemaRef ds:uri="http://schemas.microsoft.com/sharepoint/v3/contenttype/forms"/>
   </ds:schemaRefs>
 </ds:datastoreItem>
 </file>

</xml_diff>

<commit_message>
udpating ppt, readme and hiding password for postgres via gitignore
</commit_message>
<xml_diff>
--- a/Project 3 Oliver King and Ufuoma Atakere-ufilolo.pptx
+++ b/Project 3 Oliver King and Ufuoma Atakere-ufilolo.pptx
@@ -5,22 +5,23 @@
     <p:sldMasterId id="2147483676" r:id="rId4"/>
   </p:sldMasterIdLst>
   <p:notesMasterIdLst>
-    <p:notesMasterId r:id="rId15"/>
+    <p:notesMasterId r:id="rId16"/>
   </p:notesMasterIdLst>
   <p:handoutMasterIdLst>
-    <p:handoutMasterId r:id="rId16"/>
+    <p:handoutMasterId r:id="rId17"/>
   </p:handoutMasterIdLst>
   <p:sldIdLst>
     <p:sldId id="282" r:id="rId5"/>
     <p:sldId id="286" r:id="rId6"/>
     <p:sldId id="287" r:id="rId7"/>
-    <p:sldId id="284" r:id="rId8"/>
-    <p:sldId id="288" r:id="rId9"/>
-    <p:sldId id="289" r:id="rId10"/>
-    <p:sldId id="294" r:id="rId11"/>
-    <p:sldId id="290" r:id="rId12"/>
-    <p:sldId id="291" r:id="rId13"/>
-    <p:sldId id="295" r:id="rId14"/>
+    <p:sldId id="296" r:id="rId8"/>
+    <p:sldId id="284" r:id="rId9"/>
+    <p:sldId id="288" r:id="rId10"/>
+    <p:sldId id="289" r:id="rId11"/>
+    <p:sldId id="294" r:id="rId12"/>
+    <p:sldId id="290" r:id="rId13"/>
+    <p:sldId id="291" r:id="rId14"/>
+    <p:sldId id="295" r:id="rId15"/>
   </p:sldIdLst>
   <p:sldSz cx="12192000" cy="6858000"/>
   <p:notesSz cx="6858000" cy="9144000"/>
@@ -1414,6 +1415,13 @@
     <dgm:pt modelId="{CE981E0C-4CE9-EC48-BFE5-81658B58E72A}" type="sibTrans" cxnId="{02A0B6D1-D35B-A94D-8289-81FCA4F6ABF1}">
       <dgm:prSet/>
       <dgm:spPr/>
+      <dgm:t>
+        <a:bodyPr/>
+        <a:lstStyle/>
+        <a:p>
+          <a:endParaRPr lang="en-GB"/>
+        </a:p>
+      </dgm:t>
     </dgm:pt>
     <dgm:pt modelId="{38B6E48D-E636-43AC-BDD9-1A0236B5E68F}" type="pres">
       <dgm:prSet presAssocID="{E4043D2D-5320-4B7D-B7CA-3F43E90899F4}" presName="diagram" presStyleCnt="0">
@@ -6067,7 +6075,7 @@
             <a:fld id="{74E8BD9B-2A2F-494A-A6AA-7B0C58709D3C}" type="slidenum">
               <a:rPr lang="en-US" smtClean="0"/>
               <a:pPr/>
-              <a:t>4</a:t>
+              <a:t>5</a:t>
             </a:fld>
             <a:endParaRPr lang="en-US"/>
           </a:p>
@@ -28961,6 +28969,466 @@
 <file path=ppt/slides/slide10.xml><?xml version="1.0" encoding="utf-8"?>
 <p:sld xmlns:a="http://schemas.openxmlformats.org/drawingml/2006/main" xmlns:r="http://schemas.openxmlformats.org/officeDocument/2006/relationships" xmlns:p="http://schemas.openxmlformats.org/presentationml/2006/main">
   <p:cSld>
+    <p:spTree>
+      <p:nvGrpSpPr>
+        <p:cNvPr id="1" name=""/>
+        <p:cNvGrpSpPr/>
+        <p:nvPr/>
+      </p:nvGrpSpPr>
+      <p:grpSpPr>
+        <a:xfrm>
+          <a:off x="0" y="0"/>
+          <a:ext cx="0" cy="0"/>
+          <a:chOff x="0" y="0"/>
+          <a:chExt cx="0" cy="0"/>
+        </a:xfrm>
+      </p:grpSpPr>
+      <p:sp>
+        <p:nvSpPr>
+          <p:cNvPr id="2" name="Title 1">
+            <a:extLst>
+              <a:ext uri="{FF2B5EF4-FFF2-40B4-BE49-F238E27FC236}">
+                <a16:creationId xmlns:a16="http://schemas.microsoft.com/office/drawing/2014/main" id="{67371BC6-1582-1632-9C39-7AC406EC8BF1}"/>
+              </a:ext>
+            </a:extLst>
+          </p:cNvPr>
+          <p:cNvSpPr>
+            <a:spLocks noGrp="1"/>
+          </p:cNvSpPr>
+          <p:nvPr>
+            <p:ph type="title"/>
+          </p:nvPr>
+        </p:nvSpPr>
+        <p:spPr/>
+        <p:txBody>
+          <a:bodyPr/>
+          <a:lstStyle/>
+          <a:p>
+            <a:r>
+              <a:rPr lang="en-CA" dirty="0"/>
+              <a:t>Conclusion </a:t>
+            </a:r>
+            <a:endParaRPr lang="en-AU" dirty="0"/>
+          </a:p>
+        </p:txBody>
+      </p:sp>
+      <p:graphicFrame>
+        <p:nvGraphicFramePr>
+          <p:cNvPr id="3" name="Table 3">
+            <a:extLst>
+              <a:ext uri="{FF2B5EF4-FFF2-40B4-BE49-F238E27FC236}">
+                <a16:creationId xmlns:a16="http://schemas.microsoft.com/office/drawing/2014/main" id="{9AF72698-03CB-913D-3234-30E3A1EA0AC7}"/>
+              </a:ext>
+            </a:extLst>
+          </p:cNvPr>
+          <p:cNvGraphicFramePr>
+            <a:graphicFrameLocks noGrp="1"/>
+          </p:cNvGraphicFramePr>
+          <p:nvPr>
+            <p:extLst>
+              <p:ext uri="{D42A27DB-BD31-4B8C-83A1-F6EECF244321}">
+                <p14:modId xmlns:p14="http://schemas.microsoft.com/office/powerpoint/2010/main" val="2707871539"/>
+              </p:ext>
+            </p:extLst>
+          </p:nvPr>
+        </p:nvGraphicFramePr>
+        <p:xfrm>
+          <a:off x="762000" y="1600200"/>
+          <a:ext cx="5588000" cy="2424110"/>
+        </p:xfrm>
+        <a:graphic>
+          <a:graphicData uri="http://schemas.openxmlformats.org/drawingml/2006/table">
+            <a:tbl>
+              <a:tblPr firstRow="1" bandRow="1">
+                <a:tableStyleId>{5C22544A-7EE6-4342-B048-85BDC9FD1C3A}</a:tableStyleId>
+              </a:tblPr>
+              <a:tblGrid>
+                <a:gridCol w="2794000">
+                  <a:extLst>
+                    <a:ext uri="{9D8B030D-6E8A-4147-A177-3AD203B41FA5}">
+                      <a16:colId xmlns:a16="http://schemas.microsoft.com/office/drawing/2014/main" val="3287525841"/>
+                    </a:ext>
+                  </a:extLst>
+                </a:gridCol>
+                <a:gridCol w="2794000">
+                  <a:extLst>
+                    <a:ext uri="{9D8B030D-6E8A-4147-A177-3AD203B41FA5}">
+                      <a16:colId xmlns:a16="http://schemas.microsoft.com/office/drawing/2014/main" val="1271251"/>
+                    </a:ext>
+                  </a:extLst>
+                </a:gridCol>
+              </a:tblGrid>
+              <a:tr h="484822">
+                <a:tc>
+                  <a:txBody>
+                    <a:bodyPr/>
+                    <a:lstStyle/>
+                    <a:p>
+                      <a:r>
+                        <a:rPr lang="en-US" dirty="0"/>
+                        <a:t>Factor</a:t>
+                      </a:r>
+                    </a:p>
+                  </a:txBody>
+                  <a:tcPr/>
+                </a:tc>
+                <a:tc>
+                  <a:txBody>
+                    <a:bodyPr/>
+                    <a:lstStyle/>
+                    <a:p>
+                      <a:r>
+                        <a:rPr lang="en-US" dirty="0"/>
+                        <a:t>Correlation</a:t>
+                      </a:r>
+                    </a:p>
+                  </a:txBody>
+                  <a:tcPr/>
+                </a:tc>
+                <a:extLst>
+                  <a:ext uri="{0D108BD9-81ED-4DB2-BD59-A6C34878D82A}">
+                    <a16:rowId xmlns:a16="http://schemas.microsoft.com/office/drawing/2014/main" val="2913130427"/>
+                  </a:ext>
+                </a:extLst>
+              </a:tr>
+              <a:tr h="484822">
+                <a:tc>
+                  <a:txBody>
+                    <a:bodyPr/>
+                    <a:lstStyle/>
+                    <a:p>
+                      <a:r>
+                        <a:rPr lang="en-US" dirty="0"/>
+                        <a:t>Population Growth</a:t>
+                      </a:r>
+                    </a:p>
+                  </a:txBody>
+                  <a:tcPr/>
+                </a:tc>
+                <a:tc>
+                  <a:txBody>
+                    <a:bodyPr/>
+                    <a:lstStyle/>
+                    <a:p>
+                      <a:r>
+                        <a:rPr lang="en-US" dirty="0"/>
+                        <a:t>0.26</a:t>
+                      </a:r>
+                    </a:p>
+                  </a:txBody>
+                  <a:tcPr/>
+                </a:tc>
+                <a:extLst>
+                  <a:ext uri="{0D108BD9-81ED-4DB2-BD59-A6C34878D82A}">
+                    <a16:rowId xmlns:a16="http://schemas.microsoft.com/office/drawing/2014/main" val="3225783421"/>
+                  </a:ext>
+                </a:extLst>
+              </a:tr>
+              <a:tr h="484822">
+                <a:tc>
+                  <a:txBody>
+                    <a:bodyPr/>
+                    <a:lstStyle/>
+                    <a:p>
+                      <a:r>
+                        <a:rPr lang="en-US" dirty="0"/>
+                        <a:t>Net Migration</a:t>
+                      </a:r>
+                      <a:r>
+                        <a:rPr lang="en-US" baseline="30000" dirty="0"/>
+                        <a:t>1</a:t>
+                      </a:r>
+                    </a:p>
+                  </a:txBody>
+                  <a:tcPr/>
+                </a:tc>
+                <a:tc>
+                  <a:txBody>
+                    <a:bodyPr/>
+                    <a:lstStyle/>
+                    <a:p>
+                      <a:r>
+                        <a:rPr lang="en-US" dirty="0"/>
+                        <a:t>0.22</a:t>
+                      </a:r>
+                    </a:p>
+                  </a:txBody>
+                  <a:tcPr/>
+                </a:tc>
+                <a:extLst>
+                  <a:ext uri="{0D108BD9-81ED-4DB2-BD59-A6C34878D82A}">
+                    <a16:rowId xmlns:a16="http://schemas.microsoft.com/office/drawing/2014/main" val="1565036125"/>
+                  </a:ext>
+                </a:extLst>
+              </a:tr>
+              <a:tr h="484822">
+                <a:tc>
+                  <a:txBody>
+                    <a:bodyPr/>
+                    <a:lstStyle/>
+                    <a:p>
+                      <a:r>
+                        <a:rPr lang="en-US" dirty="0"/>
+                        <a:t>Natural Birth-rate</a:t>
+                      </a:r>
+                      <a:r>
+                        <a:rPr lang="en-US" baseline="30000" dirty="0"/>
+                        <a:t>1</a:t>
+                      </a:r>
+                    </a:p>
+                  </a:txBody>
+                  <a:tcPr/>
+                </a:tc>
+                <a:tc>
+                  <a:txBody>
+                    <a:bodyPr/>
+                    <a:lstStyle/>
+                    <a:p>
+                      <a:r>
+                        <a:rPr lang="en-US" dirty="0"/>
+                        <a:t>0.08</a:t>
+                      </a:r>
+                    </a:p>
+                  </a:txBody>
+                  <a:tcPr/>
+                </a:tc>
+                <a:extLst>
+                  <a:ext uri="{0D108BD9-81ED-4DB2-BD59-A6C34878D82A}">
+                    <a16:rowId xmlns:a16="http://schemas.microsoft.com/office/drawing/2014/main" val="949995264"/>
+                  </a:ext>
+                </a:extLst>
+              </a:tr>
+              <a:tr h="484822">
+                <a:tc>
+                  <a:txBody>
+                    <a:bodyPr/>
+                    <a:lstStyle/>
+                    <a:p>
+                      <a:r>
+                        <a:rPr lang="en-US" dirty="0"/>
+                        <a:t>Longevity (Life-expectancy)</a:t>
+                      </a:r>
+                      <a:r>
+                        <a:rPr lang="en-US" baseline="30000" dirty="0"/>
+                        <a:t>1</a:t>
+                      </a:r>
+                    </a:p>
+                  </a:txBody>
+                  <a:tcPr/>
+                </a:tc>
+                <a:tc>
+                  <a:txBody>
+                    <a:bodyPr/>
+                    <a:lstStyle/>
+                    <a:p>
+                      <a:r>
+                        <a:rPr lang="en-US" dirty="0"/>
+                        <a:t>0.11</a:t>
+                      </a:r>
+                    </a:p>
+                  </a:txBody>
+                  <a:tcPr/>
+                </a:tc>
+                <a:extLst>
+                  <a:ext uri="{0D108BD9-81ED-4DB2-BD59-A6C34878D82A}">
+                    <a16:rowId xmlns:a16="http://schemas.microsoft.com/office/drawing/2014/main" val="909987602"/>
+                  </a:ext>
+                </a:extLst>
+              </a:tr>
+            </a:tbl>
+          </a:graphicData>
+        </a:graphic>
+      </p:graphicFrame>
+      <p:sp>
+        <p:nvSpPr>
+          <p:cNvPr id="4" name="TextBox 3">
+            <a:extLst>
+              <a:ext uri="{FF2B5EF4-FFF2-40B4-BE49-F238E27FC236}">
+                <a16:creationId xmlns:a16="http://schemas.microsoft.com/office/drawing/2014/main" id="{AFE1927C-C6AA-B923-090C-A5907D9A015C}"/>
+              </a:ext>
+            </a:extLst>
+          </p:cNvPr>
+          <p:cNvSpPr txBox="1"/>
+          <p:nvPr/>
+        </p:nvSpPr>
+        <p:spPr>
+          <a:xfrm>
+            <a:off x="6705600" y="1447800"/>
+            <a:ext cx="5105400" cy="5001369"/>
+          </a:xfrm>
+          <a:prstGeom prst="rect">
+            <a:avLst/>
+          </a:prstGeom>
+          <a:noFill/>
+        </p:spPr>
+        <p:txBody>
+          <a:bodyPr wrap="square" rtlCol="0">
+            <a:spAutoFit/>
+          </a:bodyPr>
+          <a:lstStyle/>
+          <a:p>
+            <a:pPr>
+              <a:spcBef>
+                <a:spcPts val="600"/>
+              </a:spcBef>
+              <a:spcAft>
+                <a:spcPts val="600"/>
+              </a:spcAft>
+            </a:pPr>
+            <a:r>
+              <a:rPr lang="en-US" b="1" dirty="0"/>
+              <a:t>Takeaways:</a:t>
+            </a:r>
+          </a:p>
+          <a:p>
+            <a:pPr marL="285750" indent="-285750">
+              <a:spcBef>
+                <a:spcPts val="600"/>
+              </a:spcBef>
+              <a:spcAft>
+                <a:spcPts val="1200"/>
+              </a:spcAft>
+              <a:buFont typeface="Arial" panose="020B0604020202020204" pitchFamily="34" charset="0"/>
+              <a:buChar char="•"/>
+            </a:pPr>
+            <a:r>
+              <a:rPr lang="en-US" dirty="0"/>
+              <a:t>Overall, population growth has a relatively low correlation with economic growth.</a:t>
+            </a:r>
+          </a:p>
+          <a:p>
+            <a:pPr marL="285750" indent="-285750">
+              <a:spcBef>
+                <a:spcPts val="600"/>
+              </a:spcBef>
+              <a:spcAft>
+                <a:spcPts val="1200"/>
+              </a:spcAft>
+              <a:buFont typeface="Arial" panose="020B0604020202020204" pitchFamily="34" charset="0"/>
+              <a:buChar char="•"/>
+            </a:pPr>
+            <a:r>
+              <a:rPr lang="en-US" i="1" dirty="0"/>
+              <a:t>This might imply that population growth is not necessary for a country to produce strong GDP growth.</a:t>
+            </a:r>
+          </a:p>
+          <a:p>
+            <a:pPr marL="285750" indent="-285750">
+              <a:spcBef>
+                <a:spcPts val="600"/>
+              </a:spcBef>
+              <a:spcAft>
+                <a:spcPts val="1200"/>
+              </a:spcAft>
+              <a:buFont typeface="Arial" panose="020B0604020202020204" pitchFamily="34" charset="0"/>
+              <a:buChar char="•"/>
+            </a:pPr>
+            <a:r>
+              <a:rPr lang="en-US" dirty="0"/>
+              <a:t>Population growth is more highly correlated with GDP growth than any of its individual subfactors.</a:t>
+            </a:r>
+          </a:p>
+          <a:p>
+            <a:pPr marL="285750" indent="-285750">
+              <a:spcBef>
+                <a:spcPts val="600"/>
+              </a:spcBef>
+              <a:spcAft>
+                <a:spcPts val="1200"/>
+              </a:spcAft>
+              <a:buFont typeface="Arial" panose="020B0604020202020204" pitchFamily="34" charset="0"/>
+              <a:buChar char="•"/>
+            </a:pPr>
+            <a:r>
+              <a:rPr lang="en-US" dirty="0"/>
+              <a:t>Of the subfactors, net migration has the highest correlation.</a:t>
+            </a:r>
+          </a:p>
+          <a:p>
+            <a:pPr marL="285750" indent="-285750">
+              <a:spcBef>
+                <a:spcPts val="600"/>
+              </a:spcBef>
+              <a:spcAft>
+                <a:spcPts val="1200"/>
+              </a:spcAft>
+              <a:buFont typeface="Arial" panose="020B0604020202020204" pitchFamily="34" charset="0"/>
+              <a:buChar char="•"/>
+            </a:pPr>
+            <a:r>
+              <a:rPr lang="en-US" dirty="0"/>
+              <a:t>All of the correlations are positive.</a:t>
+            </a:r>
+          </a:p>
+          <a:p>
+            <a:pPr marL="285750" indent="-285750">
+              <a:spcBef>
+                <a:spcPts val="600"/>
+              </a:spcBef>
+              <a:spcAft>
+                <a:spcPts val="1200"/>
+              </a:spcAft>
+              <a:buFont typeface="Arial" panose="020B0604020202020204" pitchFamily="34" charset="0"/>
+              <a:buChar char="•"/>
+            </a:pPr>
+            <a:r>
+              <a:rPr lang="en-US" i="1" dirty="0"/>
+              <a:t>This might imply that, overall, all factors have a positive impact on GDP growth.</a:t>
+            </a:r>
+          </a:p>
+        </p:txBody>
+      </p:sp>
+      <p:sp>
+        <p:nvSpPr>
+          <p:cNvPr id="5" name="TextBox 4">
+            <a:extLst>
+              <a:ext uri="{FF2B5EF4-FFF2-40B4-BE49-F238E27FC236}">
+                <a16:creationId xmlns:a16="http://schemas.microsoft.com/office/drawing/2014/main" id="{5DD8D185-DB00-F3C7-897B-40663D9FB735}"/>
+              </a:ext>
+            </a:extLst>
+          </p:cNvPr>
+          <p:cNvSpPr txBox="1"/>
+          <p:nvPr/>
+        </p:nvSpPr>
+        <p:spPr>
+          <a:xfrm>
+            <a:off x="1143000" y="4343400"/>
+            <a:ext cx="5207000" cy="369332"/>
+          </a:xfrm>
+          <a:prstGeom prst="rect">
+            <a:avLst/>
+          </a:prstGeom>
+          <a:noFill/>
+        </p:spPr>
+        <p:txBody>
+          <a:bodyPr wrap="square" rtlCol="0">
+            <a:spAutoFit/>
+          </a:bodyPr>
+          <a:lstStyle/>
+          <a:p>
+            <a:r>
+              <a:rPr lang="en-US" i="1" dirty="0"/>
+              <a:t>1. Denotes a subfactor of Population Growth</a:t>
+            </a:r>
+          </a:p>
+        </p:txBody>
+      </p:sp>
+    </p:spTree>
+    <p:extLst>
+      <p:ext uri="{BB962C8B-B14F-4D97-AF65-F5344CB8AC3E}">
+        <p14:creationId xmlns:p14="http://schemas.microsoft.com/office/powerpoint/2010/main" val="1017183375"/>
+      </p:ext>
+    </p:extLst>
+  </p:cSld>
+  <p:clrMapOvr>
+    <a:masterClrMapping/>
+  </p:clrMapOvr>
+</p:sld>
+</file>
+
+<file path=ppt/slides/slide11.xml><?xml version="1.0" encoding="utf-8"?>
+<p:sld xmlns:a="http://schemas.openxmlformats.org/drawingml/2006/main" xmlns:r="http://schemas.openxmlformats.org/officeDocument/2006/relationships" xmlns:p="http://schemas.openxmlformats.org/presentationml/2006/main">
+  <p:cSld>
     <p:bg>
       <p:bgPr>
         <a:solidFill>
@@ -30009,6 +30477,481 @@
 <file path=ppt/slides/slide4.xml><?xml version="1.0" encoding="utf-8"?>
 <p:sld xmlns:a="http://schemas.openxmlformats.org/drawingml/2006/main" xmlns:r="http://schemas.openxmlformats.org/officeDocument/2006/relationships" xmlns:p="http://schemas.openxmlformats.org/presentationml/2006/main">
   <p:cSld>
+    <p:bg>
+      <p:bgPr>
+        <a:solidFill>
+          <a:schemeClr val="bg1"/>
+        </a:solidFill>
+        <a:effectLst/>
+      </p:bgPr>
+    </p:bg>
+    <p:spTree>
+      <p:nvGrpSpPr>
+        <p:cNvPr id="1" name=""/>
+        <p:cNvGrpSpPr/>
+        <p:nvPr/>
+      </p:nvGrpSpPr>
+      <p:grpSpPr>
+        <a:xfrm>
+          <a:off x="0" y="0"/>
+          <a:ext cx="0" cy="0"/>
+          <a:chOff x="0" y="0"/>
+          <a:chExt cx="0" cy="0"/>
+        </a:xfrm>
+      </p:grpSpPr>
+      <p:sp useBgFill="1">
+        <p:nvSpPr>
+          <p:cNvPr id="8" name="Rectangle 7">
+            <a:extLst>
+              <a:ext uri="{FF2B5EF4-FFF2-40B4-BE49-F238E27FC236}">
+                <a16:creationId xmlns:a16="http://schemas.microsoft.com/office/drawing/2014/main" id="{E91DC736-0EF8-4F87-9146-EBF1D2EE4D3D}"/>
+              </a:ext>
+              <a:ext uri="{C183D7F6-B498-43B3-948B-1728B52AA6E4}">
+                <adec:decorative xmlns:adec="http://schemas.microsoft.com/office/drawing/2017/decorative" val="1"/>
+              </a:ext>
+            </a:extLst>
+          </p:cNvPr>
+          <p:cNvSpPr>
+            <a:spLocks noGrp="1" noRot="1" noChangeAspect="1" noMove="1" noResize="1" noEditPoints="1" noAdjustHandles="1" noChangeArrowheads="1" noChangeShapeType="1" noTextEdit="1"/>
+          </p:cNvSpPr>
+          <p:nvPr>
+            <p:extLst>
+              <p:ext uri="{386F3935-93C4-4BCD-93E2-E3B085C9AB24}">
+                <p16:designElem xmlns:p16="http://schemas.microsoft.com/office/powerpoint/2015/main" val="1"/>
+              </p:ext>
+            </p:extLst>
+          </p:nvPr>
+        </p:nvSpPr>
+        <p:spPr>
+          <a:xfrm>
+            <a:off x="0" y="0"/>
+            <a:ext cx="12192000" cy="6858000"/>
+          </a:xfrm>
+          <a:prstGeom prst="rect">
+            <a:avLst/>
+          </a:prstGeom>
+          <a:ln>
+            <a:noFill/>
+          </a:ln>
+        </p:spPr>
+        <p:style>
+          <a:lnRef idx="2">
+            <a:schemeClr val="accent1">
+              <a:shade val="50000"/>
+            </a:schemeClr>
+          </a:lnRef>
+          <a:fillRef idx="1">
+            <a:schemeClr val="accent1"/>
+          </a:fillRef>
+          <a:effectRef idx="0">
+            <a:schemeClr val="accent1"/>
+          </a:effectRef>
+          <a:fontRef idx="minor">
+            <a:schemeClr val="lt1"/>
+          </a:fontRef>
+        </p:style>
+        <p:txBody>
+          <a:bodyPr rtlCol="0" anchor="ctr"/>
+          <a:lstStyle/>
+          <a:p>
+            <a:pPr algn="ctr"/>
+            <a:endParaRPr lang="en-US"/>
+          </a:p>
+        </p:txBody>
+      </p:sp>
+      <p:pic>
+        <p:nvPicPr>
+          <p:cNvPr id="3" name="Picture 2">
+            <a:extLst>
+              <a:ext uri="{FF2B5EF4-FFF2-40B4-BE49-F238E27FC236}">
+                <a16:creationId xmlns:a16="http://schemas.microsoft.com/office/drawing/2014/main" id="{1FC40F34-9F34-4902-CF3C-3EA3C40E01AA}"/>
+              </a:ext>
+            </a:extLst>
+          </p:cNvPr>
+          <p:cNvPicPr>
+            <a:picLocks noChangeAspect="1"/>
+          </p:cNvPicPr>
+          <p:nvPr/>
+        </p:nvPicPr>
+        <p:blipFill rotWithShape="1">
+          <a:blip r:embed="rId2"/>
+          <a:srcRect t="4627" r="23585" b="4464"/>
+          <a:stretch/>
+        </p:blipFill>
+        <p:spPr>
+          <a:xfrm>
+            <a:off x="3523488" y="10"/>
+            <a:ext cx="8668512" cy="6857990"/>
+          </a:xfrm>
+          <a:prstGeom prst="rect">
+            <a:avLst/>
+          </a:prstGeom>
+        </p:spPr>
+      </p:pic>
+      <p:sp>
+        <p:nvSpPr>
+          <p:cNvPr id="10" name="Rectangle 9">
+            <a:extLst>
+              <a:ext uri="{FF2B5EF4-FFF2-40B4-BE49-F238E27FC236}">
+                <a16:creationId xmlns:a16="http://schemas.microsoft.com/office/drawing/2014/main" id="{097CD68E-23E3-4007-8847-CD0944C4F7BE}"/>
+              </a:ext>
+              <a:ext uri="{C183D7F6-B498-43B3-948B-1728B52AA6E4}">
+                <adec:decorative xmlns:adec="http://schemas.microsoft.com/office/drawing/2017/decorative" val="1"/>
+              </a:ext>
+            </a:extLst>
+          </p:cNvPr>
+          <p:cNvSpPr>
+            <a:spLocks noGrp="1" noRot="1" noChangeAspect="1" noMove="1" noResize="1" noEditPoints="1" noAdjustHandles="1" noChangeArrowheads="1" noChangeShapeType="1" noTextEdit="1"/>
+          </p:cNvSpPr>
+          <p:nvPr>
+            <p:extLst>
+              <p:ext uri="{386F3935-93C4-4BCD-93E2-E3B085C9AB24}">
+                <p16:designElem xmlns:p16="http://schemas.microsoft.com/office/powerpoint/2015/main" val="1"/>
+              </p:ext>
+            </p:extLst>
+          </p:nvPr>
+        </p:nvSpPr>
+        <p:spPr>
+          <a:xfrm>
+            <a:off x="0" y="0"/>
+            <a:ext cx="9756601" cy="6858000"/>
+          </a:xfrm>
+          <a:prstGeom prst="rect">
+            <a:avLst/>
+          </a:prstGeom>
+          <a:gradFill>
+            <a:gsLst>
+              <a:gs pos="58000">
+                <a:schemeClr val="bg1"/>
+              </a:gs>
+              <a:gs pos="35000">
+                <a:schemeClr val="bg1">
+                  <a:alpha val="79000"/>
+                </a:schemeClr>
+              </a:gs>
+              <a:gs pos="19000">
+                <a:schemeClr val="bg1">
+                  <a:alpha val="38000"/>
+                </a:schemeClr>
+              </a:gs>
+              <a:gs pos="0">
+                <a:schemeClr val="bg1">
+                  <a:alpha val="0"/>
+                </a:schemeClr>
+              </a:gs>
+              <a:gs pos="100000">
+                <a:schemeClr val="bg1"/>
+              </a:gs>
+            </a:gsLst>
+            <a:lin ang="10800000" scaled="0"/>
+          </a:gradFill>
+          <a:ln>
+            <a:noFill/>
+          </a:ln>
+        </p:spPr>
+        <p:style>
+          <a:lnRef idx="2">
+            <a:schemeClr val="accent1">
+              <a:shade val="50000"/>
+            </a:schemeClr>
+          </a:lnRef>
+          <a:fillRef idx="1">
+            <a:schemeClr val="accent1"/>
+          </a:fillRef>
+          <a:effectRef idx="0">
+            <a:schemeClr val="accent1"/>
+          </a:effectRef>
+          <a:fontRef idx="minor">
+            <a:schemeClr val="lt1"/>
+          </a:fontRef>
+        </p:style>
+        <p:txBody>
+          <a:bodyPr rtlCol="0" anchor="ctr"/>
+          <a:lstStyle/>
+          <a:p>
+            <a:pPr algn="ctr"/>
+            <a:endParaRPr lang="en-US" dirty="0"/>
+          </a:p>
+        </p:txBody>
+      </p:sp>
+      <p:sp>
+        <p:nvSpPr>
+          <p:cNvPr id="12" name="Rectangle 11">
+            <a:extLst>
+              <a:ext uri="{FF2B5EF4-FFF2-40B4-BE49-F238E27FC236}">
+                <a16:creationId xmlns:a16="http://schemas.microsoft.com/office/drawing/2014/main" id="{AF2F604E-43BE-4DC3-B983-E071523364F8}"/>
+              </a:ext>
+              <a:ext uri="{C183D7F6-B498-43B3-948B-1728B52AA6E4}">
+                <adec:decorative xmlns:adec="http://schemas.microsoft.com/office/drawing/2017/decorative" val="1"/>
+              </a:ext>
+            </a:extLst>
+          </p:cNvPr>
+          <p:cNvSpPr>
+            <a:spLocks noGrp="1" noRot="1" noChangeAspect="1" noMove="1" noResize="1" noEditPoints="1" noAdjustHandles="1" noChangeArrowheads="1" noChangeShapeType="1" noTextEdit="1"/>
+          </p:cNvSpPr>
+          <p:nvPr>
+            <p:extLst>
+              <p:ext uri="{386F3935-93C4-4BCD-93E2-E3B085C9AB24}">
+                <p16:designElem xmlns:p16="http://schemas.microsoft.com/office/powerpoint/2015/main" val="1"/>
+              </p:ext>
+            </p:extLst>
+          </p:nvPr>
+        </p:nvSpPr>
+        <p:spPr>
+          <a:xfrm rot="5400000">
+            <a:off x="759921" y="346791"/>
+            <a:ext cx="146304" cy="704088"/>
+          </a:xfrm>
+          <a:prstGeom prst="rect">
+            <a:avLst/>
+          </a:prstGeom>
+          <a:solidFill>
+            <a:schemeClr val="accent2"/>
+          </a:solidFill>
+          <a:ln>
+            <a:noFill/>
+          </a:ln>
+        </p:spPr>
+        <p:style>
+          <a:lnRef idx="2">
+            <a:schemeClr val="accent1">
+              <a:shade val="50000"/>
+            </a:schemeClr>
+          </a:lnRef>
+          <a:fillRef idx="1">
+            <a:schemeClr val="accent1"/>
+          </a:fillRef>
+          <a:effectRef idx="0">
+            <a:schemeClr val="accent1"/>
+          </a:effectRef>
+          <a:fontRef idx="minor">
+            <a:schemeClr val="lt1"/>
+          </a:fontRef>
+        </p:style>
+        <p:txBody>
+          <a:bodyPr rtlCol="0" anchor="ctr"/>
+          <a:lstStyle/>
+          <a:p>
+            <a:pPr algn="ctr"/>
+            <a:endParaRPr lang="en-US">
+              <a:solidFill>
+                <a:prstClr val="white"/>
+              </a:solidFill>
+              <a:latin typeface="Calibri" panose="020F0502020204030204"/>
+            </a:endParaRPr>
+          </a:p>
+        </p:txBody>
+      </p:sp>
+      <p:sp>
+        <p:nvSpPr>
+          <p:cNvPr id="14" name="Rectangle 13">
+            <a:extLst>
+              <a:ext uri="{FF2B5EF4-FFF2-40B4-BE49-F238E27FC236}">
+                <a16:creationId xmlns:a16="http://schemas.microsoft.com/office/drawing/2014/main" id="{08C9B587-E65E-4B52-B37C-ABEBB6E87928}"/>
+              </a:ext>
+              <a:ext uri="{C183D7F6-B498-43B3-948B-1728B52AA6E4}">
+                <adec:decorative xmlns:adec="http://schemas.microsoft.com/office/drawing/2017/decorative" val="1"/>
+              </a:ext>
+            </a:extLst>
+          </p:cNvPr>
+          <p:cNvSpPr>
+            <a:spLocks noGrp="1" noRot="1" noChangeAspect="1" noMove="1" noResize="1" noEditPoints="1" noAdjustHandles="1" noChangeArrowheads="1" noChangeShapeType="1" noTextEdit="1"/>
+          </p:cNvSpPr>
+          <p:nvPr>
+            <p:extLst>
+              <p:ext uri="{386F3935-93C4-4BCD-93E2-E3B085C9AB24}">
+                <p16:designElem xmlns:p16="http://schemas.microsoft.com/office/powerpoint/2015/main" val="1"/>
+              </p:ext>
+            </p:extLst>
+          </p:nvPr>
+        </p:nvSpPr>
+        <p:spPr>
+          <a:xfrm>
+            <a:off x="481029" y="4546920"/>
+            <a:ext cx="3977640" cy="18288"/>
+          </a:xfrm>
+          <a:prstGeom prst="rect">
+            <a:avLst/>
+          </a:prstGeom>
+          <a:solidFill>
+            <a:srgbClr val="D5D5D5"/>
+          </a:solidFill>
+          <a:ln w="3175">
+            <a:noFill/>
+          </a:ln>
+          <a:effectLst/>
+        </p:spPr>
+        <p:style>
+          <a:lnRef idx="2">
+            <a:schemeClr val="accent1">
+              <a:shade val="50000"/>
+            </a:schemeClr>
+          </a:lnRef>
+          <a:fillRef idx="1">
+            <a:schemeClr val="accent1"/>
+          </a:fillRef>
+          <a:effectRef idx="0">
+            <a:schemeClr val="accent1"/>
+          </a:effectRef>
+          <a:fontRef idx="minor">
+            <a:schemeClr val="lt1"/>
+          </a:fontRef>
+        </p:style>
+        <p:txBody>
+          <a:bodyPr rtlCol="0" anchor="ctr"/>
+          <a:lstStyle/>
+          <a:p>
+            <a:pPr marL="0" marR="0" lvl="0" indent="0" algn="ctr" defTabSz="914400" rtl="0" eaLnBrk="1" fontAlgn="auto" latinLnBrk="0" hangingPunct="1">
+              <a:lnSpc>
+                <a:spcPct val="100000"/>
+              </a:lnSpc>
+              <a:spcBef>
+                <a:spcPts val="0"/>
+              </a:spcBef>
+              <a:spcAft>
+                <a:spcPts val="0"/>
+              </a:spcAft>
+              <a:buClrTx/>
+              <a:buSzTx/>
+              <a:buFontTx/>
+              <a:buNone/>
+              <a:tabLst/>
+              <a:defRPr/>
+            </a:pPr>
+            <a:endParaRPr kumimoji="0" lang="en-US" sz="1800" b="0" i="0" u="none" strike="noStrike" kern="1200" cap="none" spc="0" normalizeH="0" baseline="0" noProof="0">
+              <a:ln>
+                <a:noFill/>
+              </a:ln>
+              <a:solidFill>
+                <a:prstClr val="white"/>
+              </a:solidFill>
+              <a:effectLst/>
+              <a:uLnTx/>
+              <a:uFillTx/>
+              <a:latin typeface="Calibri" panose="020F0502020204030204"/>
+              <a:ea typeface="+mn-ea"/>
+              <a:cs typeface="+mn-cs"/>
+            </a:endParaRPr>
+          </a:p>
+        </p:txBody>
+      </p:sp>
+      <p:sp>
+        <p:nvSpPr>
+          <p:cNvPr id="4" name="TextBox 3">
+            <a:extLst>
+              <a:ext uri="{FF2B5EF4-FFF2-40B4-BE49-F238E27FC236}">
+                <a16:creationId xmlns:a16="http://schemas.microsoft.com/office/drawing/2014/main" id="{20667186-DDC9-FD25-7894-A10611F1C7BE}"/>
+              </a:ext>
+            </a:extLst>
+          </p:cNvPr>
+          <p:cNvSpPr txBox="1"/>
+          <p:nvPr/>
+        </p:nvSpPr>
+        <p:spPr>
+          <a:xfrm>
+            <a:off x="152400" y="152400"/>
+            <a:ext cx="4648200" cy="4262705"/>
+          </a:xfrm>
+          <a:prstGeom prst="rect">
+            <a:avLst/>
+          </a:prstGeom>
+          <a:solidFill>
+            <a:schemeClr val="bg1"/>
+          </a:solidFill>
+        </p:spPr>
+        <p:txBody>
+          <a:bodyPr wrap="square" rtlCol="0">
+            <a:spAutoFit/>
+          </a:bodyPr>
+          <a:lstStyle/>
+          <a:p>
+            <a:pPr>
+              <a:spcBef>
+                <a:spcPts val="600"/>
+              </a:spcBef>
+              <a:spcAft>
+                <a:spcPts val="1200"/>
+              </a:spcAft>
+            </a:pPr>
+            <a:r>
+              <a:rPr lang="en-US" sz="1800" b="1" dirty="0"/>
+              <a:t>Notes o</a:t>
+            </a:r>
+            <a:r>
+              <a:rPr lang="en-US" b="1" dirty="0"/>
+              <a:t>n Dataset:</a:t>
+            </a:r>
+          </a:p>
+          <a:p>
+            <a:pPr>
+              <a:spcBef>
+                <a:spcPts val="600"/>
+              </a:spcBef>
+              <a:spcAft>
+                <a:spcPts val="1200"/>
+              </a:spcAft>
+            </a:pPr>
+            <a:r>
+              <a:rPr lang="en-US" sz="1800" dirty="0"/>
+              <a:t>We have chosen to </a:t>
+            </a:r>
+            <a:r>
+              <a:rPr lang="en-US" sz="1800" dirty="0" err="1"/>
+              <a:t>analyse</a:t>
+            </a:r>
+            <a:r>
+              <a:rPr lang="en-US" sz="1800" dirty="0"/>
+              <a:t> data to 2019 for two key reasons:</a:t>
+            </a:r>
+          </a:p>
+          <a:p>
+            <a:pPr marL="342900" indent="-342900">
+              <a:spcBef>
+                <a:spcPts val="1200"/>
+              </a:spcBef>
+              <a:spcAft>
+                <a:spcPts val="1200"/>
+              </a:spcAft>
+              <a:buAutoNum type="arabicPeriod"/>
+            </a:pPr>
+            <a:r>
+              <a:rPr lang="en-US" dirty="0"/>
+              <a:t>Including 2020 data would have reduced the number of countries that met our study’s criteria (as more countries would have null entries for certain fields);</a:t>
+            </a:r>
+          </a:p>
+          <a:p>
+            <a:pPr marL="342900" indent="-342900">
+              <a:spcBef>
+                <a:spcPts val="1200"/>
+              </a:spcBef>
+              <a:spcAft>
+                <a:spcPts val="1200"/>
+              </a:spcAft>
+              <a:buAutoNum type="arabicPeriod"/>
+            </a:pPr>
+            <a:r>
+              <a:rPr lang="en-US" dirty="0"/>
+              <a:t> The impact of covid on both GDP and net-migration was dramatic. By excluding 2020 data we’re likely to get a more reliable approximation of population growth’s effect on GDP growth.</a:t>
+            </a:r>
+          </a:p>
+        </p:txBody>
+      </p:sp>
+    </p:spTree>
+    <p:extLst>
+      <p:ext uri="{BB962C8B-B14F-4D97-AF65-F5344CB8AC3E}">
+        <p14:creationId xmlns:p14="http://schemas.microsoft.com/office/powerpoint/2010/main" val="3536052794"/>
+      </p:ext>
+    </p:extLst>
+  </p:cSld>
+  <p:clrMapOvr>
+    <a:masterClrMapping/>
+  </p:clrMapOvr>
+</p:sld>
+</file>
+
+<file path=ppt/slides/slide5.xml><?xml version="1.0" encoding="utf-8"?>
+<p:sld xmlns:a="http://schemas.openxmlformats.org/drawingml/2006/main" xmlns:r="http://schemas.openxmlformats.org/officeDocument/2006/relationships" xmlns:p="http://schemas.openxmlformats.org/presentationml/2006/main">
+  <p:cSld>
     <p:spTree>
       <p:nvGrpSpPr>
         <p:cNvPr id="1" name=""/>
@@ -30041,8 +30984,8 @@
         </p:nvSpPr>
         <p:spPr>
           <a:xfrm>
-            <a:off x="2037390" y="1447801"/>
-            <a:ext cx="8961478" cy="3276598"/>
+            <a:off x="2037390" y="1143000"/>
+            <a:ext cx="8961478" cy="3581399"/>
           </a:xfrm>
         </p:spPr>
         <p:txBody>
@@ -30051,6 +30994,15 @@
           <a:p>
             <a:endParaRPr lang="en-AU" b="1" dirty="0">
               <a:latin typeface="Arial" panose="020B0604020202020204" pitchFamily="34" charset="0"/>
+            </a:endParaRPr>
+          </a:p>
+          <a:p>
+            <a:pPr algn="ctr"/>
+            <a:endParaRPr lang="en-GB" sz="6600" dirty="0">
+              <a:solidFill>
+                <a:srgbClr val="1F2328"/>
+              </a:solidFill>
+              <a:latin typeface="Algerian" panose="04020705040A02060702" pitchFamily="82" charset="0"/>
             </a:endParaRPr>
           </a:p>
           <a:p>
@@ -30093,7 +31045,7 @@
 </p:sld>
 </file>
 
-<file path=ppt/slides/slide5.xml><?xml version="1.0" encoding="utf-8"?>
+<file path=ppt/slides/slide6.xml><?xml version="1.0" encoding="utf-8"?>
 <p:sld xmlns:a="http://schemas.openxmlformats.org/drawingml/2006/main" xmlns:r="http://schemas.openxmlformats.org/officeDocument/2006/relationships" xmlns:p="http://schemas.openxmlformats.org/presentationml/2006/main">
   <p:cSld>
     <p:bg>
@@ -33612,7 +34564,7 @@
 </p:sld>
 </file>
 
-<file path=ppt/slides/slide6.xml><?xml version="1.0" encoding="utf-8"?>
+<file path=ppt/slides/slide7.xml><?xml version="1.0" encoding="utf-8"?>
 <p:sld xmlns:a="http://schemas.openxmlformats.org/drawingml/2006/main" xmlns:r="http://schemas.openxmlformats.org/officeDocument/2006/relationships" xmlns:p="http://schemas.openxmlformats.org/presentationml/2006/main">
   <p:cSld>
     <p:bg>
@@ -34499,7 +35451,7 @@
 </p:sld>
 </file>
 
-<file path=ppt/slides/slide7.xml><?xml version="1.0" encoding="utf-8"?>
+<file path=ppt/slides/slide8.xml><?xml version="1.0" encoding="utf-8"?>
 <p:sld xmlns:a="http://schemas.openxmlformats.org/drawingml/2006/main" xmlns:r="http://schemas.openxmlformats.org/officeDocument/2006/relationships" xmlns:p="http://schemas.openxmlformats.org/presentationml/2006/main">
   <p:cSld>
     <p:bg>
@@ -34877,7 +35829,7 @@
 </p:sld>
 </file>
 
-<file path=ppt/slides/slide8.xml><?xml version="1.0" encoding="utf-8"?>
+<file path=ppt/slides/slide9.xml><?xml version="1.0" encoding="utf-8"?>
 <p:sld xmlns:a="http://schemas.openxmlformats.org/drawingml/2006/main" xmlns:r="http://schemas.openxmlformats.org/officeDocument/2006/relationships" xmlns:p="http://schemas.openxmlformats.org/presentationml/2006/main">
   <p:cSld>
     <p:spTree>
@@ -35074,466 +36026,6 @@
     <p:extLst>
       <p:ext uri="{BB962C8B-B14F-4D97-AF65-F5344CB8AC3E}">
         <p14:creationId xmlns:p14="http://schemas.microsoft.com/office/powerpoint/2010/main" val="285687948"/>
-      </p:ext>
-    </p:extLst>
-  </p:cSld>
-  <p:clrMapOvr>
-    <a:masterClrMapping/>
-  </p:clrMapOvr>
-</p:sld>
-</file>
-
-<file path=ppt/slides/slide9.xml><?xml version="1.0" encoding="utf-8"?>
-<p:sld xmlns:a="http://schemas.openxmlformats.org/drawingml/2006/main" xmlns:r="http://schemas.openxmlformats.org/officeDocument/2006/relationships" xmlns:p="http://schemas.openxmlformats.org/presentationml/2006/main">
-  <p:cSld>
-    <p:spTree>
-      <p:nvGrpSpPr>
-        <p:cNvPr id="1" name=""/>
-        <p:cNvGrpSpPr/>
-        <p:nvPr/>
-      </p:nvGrpSpPr>
-      <p:grpSpPr>
-        <a:xfrm>
-          <a:off x="0" y="0"/>
-          <a:ext cx="0" cy="0"/>
-          <a:chOff x="0" y="0"/>
-          <a:chExt cx="0" cy="0"/>
-        </a:xfrm>
-      </p:grpSpPr>
-      <p:sp>
-        <p:nvSpPr>
-          <p:cNvPr id="2" name="Title 1">
-            <a:extLst>
-              <a:ext uri="{FF2B5EF4-FFF2-40B4-BE49-F238E27FC236}">
-                <a16:creationId xmlns:a16="http://schemas.microsoft.com/office/drawing/2014/main" id="{67371BC6-1582-1632-9C39-7AC406EC8BF1}"/>
-              </a:ext>
-            </a:extLst>
-          </p:cNvPr>
-          <p:cNvSpPr>
-            <a:spLocks noGrp="1"/>
-          </p:cNvSpPr>
-          <p:nvPr>
-            <p:ph type="title"/>
-          </p:nvPr>
-        </p:nvSpPr>
-        <p:spPr/>
-        <p:txBody>
-          <a:bodyPr/>
-          <a:lstStyle/>
-          <a:p>
-            <a:r>
-              <a:rPr lang="en-CA" dirty="0"/>
-              <a:t>Conclusion </a:t>
-            </a:r>
-            <a:endParaRPr lang="en-AU" dirty="0"/>
-          </a:p>
-        </p:txBody>
-      </p:sp>
-      <p:graphicFrame>
-        <p:nvGraphicFramePr>
-          <p:cNvPr id="3" name="Table 3">
-            <a:extLst>
-              <a:ext uri="{FF2B5EF4-FFF2-40B4-BE49-F238E27FC236}">
-                <a16:creationId xmlns:a16="http://schemas.microsoft.com/office/drawing/2014/main" id="{9AF72698-03CB-913D-3234-30E3A1EA0AC7}"/>
-              </a:ext>
-            </a:extLst>
-          </p:cNvPr>
-          <p:cNvGraphicFramePr>
-            <a:graphicFrameLocks noGrp="1"/>
-          </p:cNvGraphicFramePr>
-          <p:nvPr>
-            <p:extLst>
-              <p:ext uri="{D42A27DB-BD31-4B8C-83A1-F6EECF244321}">
-                <p14:modId xmlns:p14="http://schemas.microsoft.com/office/powerpoint/2010/main" val="2707871539"/>
-              </p:ext>
-            </p:extLst>
-          </p:nvPr>
-        </p:nvGraphicFramePr>
-        <p:xfrm>
-          <a:off x="762000" y="1600200"/>
-          <a:ext cx="5588000" cy="2424110"/>
-        </p:xfrm>
-        <a:graphic>
-          <a:graphicData uri="http://schemas.openxmlformats.org/drawingml/2006/table">
-            <a:tbl>
-              <a:tblPr firstRow="1" bandRow="1">
-                <a:tableStyleId>{5C22544A-7EE6-4342-B048-85BDC9FD1C3A}</a:tableStyleId>
-              </a:tblPr>
-              <a:tblGrid>
-                <a:gridCol w="2794000">
-                  <a:extLst>
-                    <a:ext uri="{9D8B030D-6E8A-4147-A177-3AD203B41FA5}">
-                      <a16:colId xmlns:a16="http://schemas.microsoft.com/office/drawing/2014/main" val="3287525841"/>
-                    </a:ext>
-                  </a:extLst>
-                </a:gridCol>
-                <a:gridCol w="2794000">
-                  <a:extLst>
-                    <a:ext uri="{9D8B030D-6E8A-4147-A177-3AD203B41FA5}">
-                      <a16:colId xmlns:a16="http://schemas.microsoft.com/office/drawing/2014/main" val="1271251"/>
-                    </a:ext>
-                  </a:extLst>
-                </a:gridCol>
-              </a:tblGrid>
-              <a:tr h="484822">
-                <a:tc>
-                  <a:txBody>
-                    <a:bodyPr/>
-                    <a:lstStyle/>
-                    <a:p>
-                      <a:r>
-                        <a:rPr lang="en-US" dirty="0"/>
-                        <a:t>Factor</a:t>
-                      </a:r>
-                    </a:p>
-                  </a:txBody>
-                  <a:tcPr/>
-                </a:tc>
-                <a:tc>
-                  <a:txBody>
-                    <a:bodyPr/>
-                    <a:lstStyle/>
-                    <a:p>
-                      <a:r>
-                        <a:rPr lang="en-US" dirty="0"/>
-                        <a:t>Correlation</a:t>
-                      </a:r>
-                    </a:p>
-                  </a:txBody>
-                  <a:tcPr/>
-                </a:tc>
-                <a:extLst>
-                  <a:ext uri="{0D108BD9-81ED-4DB2-BD59-A6C34878D82A}">
-                    <a16:rowId xmlns:a16="http://schemas.microsoft.com/office/drawing/2014/main" val="2913130427"/>
-                  </a:ext>
-                </a:extLst>
-              </a:tr>
-              <a:tr h="484822">
-                <a:tc>
-                  <a:txBody>
-                    <a:bodyPr/>
-                    <a:lstStyle/>
-                    <a:p>
-                      <a:r>
-                        <a:rPr lang="en-US" dirty="0"/>
-                        <a:t>Population Growth</a:t>
-                      </a:r>
-                    </a:p>
-                  </a:txBody>
-                  <a:tcPr/>
-                </a:tc>
-                <a:tc>
-                  <a:txBody>
-                    <a:bodyPr/>
-                    <a:lstStyle/>
-                    <a:p>
-                      <a:r>
-                        <a:rPr lang="en-US" dirty="0"/>
-                        <a:t>0.26</a:t>
-                      </a:r>
-                    </a:p>
-                  </a:txBody>
-                  <a:tcPr/>
-                </a:tc>
-                <a:extLst>
-                  <a:ext uri="{0D108BD9-81ED-4DB2-BD59-A6C34878D82A}">
-                    <a16:rowId xmlns:a16="http://schemas.microsoft.com/office/drawing/2014/main" val="3225783421"/>
-                  </a:ext>
-                </a:extLst>
-              </a:tr>
-              <a:tr h="484822">
-                <a:tc>
-                  <a:txBody>
-                    <a:bodyPr/>
-                    <a:lstStyle/>
-                    <a:p>
-                      <a:r>
-                        <a:rPr lang="en-US" dirty="0"/>
-                        <a:t>Net Migration</a:t>
-                      </a:r>
-                      <a:r>
-                        <a:rPr lang="en-US" baseline="30000" dirty="0"/>
-                        <a:t>1</a:t>
-                      </a:r>
-                    </a:p>
-                  </a:txBody>
-                  <a:tcPr/>
-                </a:tc>
-                <a:tc>
-                  <a:txBody>
-                    <a:bodyPr/>
-                    <a:lstStyle/>
-                    <a:p>
-                      <a:r>
-                        <a:rPr lang="en-US" dirty="0"/>
-                        <a:t>0.22</a:t>
-                      </a:r>
-                    </a:p>
-                  </a:txBody>
-                  <a:tcPr/>
-                </a:tc>
-                <a:extLst>
-                  <a:ext uri="{0D108BD9-81ED-4DB2-BD59-A6C34878D82A}">
-                    <a16:rowId xmlns:a16="http://schemas.microsoft.com/office/drawing/2014/main" val="1565036125"/>
-                  </a:ext>
-                </a:extLst>
-              </a:tr>
-              <a:tr h="484822">
-                <a:tc>
-                  <a:txBody>
-                    <a:bodyPr/>
-                    <a:lstStyle/>
-                    <a:p>
-                      <a:r>
-                        <a:rPr lang="en-US" dirty="0"/>
-                        <a:t>Natural Birth-rate</a:t>
-                      </a:r>
-                      <a:r>
-                        <a:rPr lang="en-US" baseline="30000" dirty="0"/>
-                        <a:t>1</a:t>
-                      </a:r>
-                    </a:p>
-                  </a:txBody>
-                  <a:tcPr/>
-                </a:tc>
-                <a:tc>
-                  <a:txBody>
-                    <a:bodyPr/>
-                    <a:lstStyle/>
-                    <a:p>
-                      <a:r>
-                        <a:rPr lang="en-US" dirty="0"/>
-                        <a:t>0.08</a:t>
-                      </a:r>
-                    </a:p>
-                  </a:txBody>
-                  <a:tcPr/>
-                </a:tc>
-                <a:extLst>
-                  <a:ext uri="{0D108BD9-81ED-4DB2-BD59-A6C34878D82A}">
-                    <a16:rowId xmlns:a16="http://schemas.microsoft.com/office/drawing/2014/main" val="949995264"/>
-                  </a:ext>
-                </a:extLst>
-              </a:tr>
-              <a:tr h="484822">
-                <a:tc>
-                  <a:txBody>
-                    <a:bodyPr/>
-                    <a:lstStyle/>
-                    <a:p>
-                      <a:r>
-                        <a:rPr lang="en-US" dirty="0"/>
-                        <a:t>Longevity (Life-expectancy)</a:t>
-                      </a:r>
-                      <a:r>
-                        <a:rPr lang="en-US" baseline="30000" dirty="0"/>
-                        <a:t>1</a:t>
-                      </a:r>
-                    </a:p>
-                  </a:txBody>
-                  <a:tcPr/>
-                </a:tc>
-                <a:tc>
-                  <a:txBody>
-                    <a:bodyPr/>
-                    <a:lstStyle/>
-                    <a:p>
-                      <a:r>
-                        <a:rPr lang="en-US" dirty="0"/>
-                        <a:t>0.11</a:t>
-                      </a:r>
-                    </a:p>
-                  </a:txBody>
-                  <a:tcPr/>
-                </a:tc>
-                <a:extLst>
-                  <a:ext uri="{0D108BD9-81ED-4DB2-BD59-A6C34878D82A}">
-                    <a16:rowId xmlns:a16="http://schemas.microsoft.com/office/drawing/2014/main" val="909987602"/>
-                  </a:ext>
-                </a:extLst>
-              </a:tr>
-            </a:tbl>
-          </a:graphicData>
-        </a:graphic>
-      </p:graphicFrame>
-      <p:sp>
-        <p:nvSpPr>
-          <p:cNvPr id="4" name="TextBox 3">
-            <a:extLst>
-              <a:ext uri="{FF2B5EF4-FFF2-40B4-BE49-F238E27FC236}">
-                <a16:creationId xmlns:a16="http://schemas.microsoft.com/office/drawing/2014/main" id="{AFE1927C-C6AA-B923-090C-A5907D9A015C}"/>
-              </a:ext>
-            </a:extLst>
-          </p:cNvPr>
-          <p:cNvSpPr txBox="1"/>
-          <p:nvPr/>
-        </p:nvSpPr>
-        <p:spPr>
-          <a:xfrm>
-            <a:off x="6705600" y="1447800"/>
-            <a:ext cx="5105400" cy="5001369"/>
-          </a:xfrm>
-          <a:prstGeom prst="rect">
-            <a:avLst/>
-          </a:prstGeom>
-          <a:noFill/>
-        </p:spPr>
-        <p:txBody>
-          <a:bodyPr wrap="square" rtlCol="0">
-            <a:spAutoFit/>
-          </a:bodyPr>
-          <a:lstStyle/>
-          <a:p>
-            <a:pPr>
-              <a:spcBef>
-                <a:spcPts val="600"/>
-              </a:spcBef>
-              <a:spcAft>
-                <a:spcPts val="600"/>
-              </a:spcAft>
-            </a:pPr>
-            <a:r>
-              <a:rPr lang="en-US" b="1" dirty="0"/>
-              <a:t>Takeaways:</a:t>
-            </a:r>
-          </a:p>
-          <a:p>
-            <a:pPr marL="285750" indent="-285750">
-              <a:spcBef>
-                <a:spcPts val="600"/>
-              </a:spcBef>
-              <a:spcAft>
-                <a:spcPts val="1200"/>
-              </a:spcAft>
-              <a:buFont typeface="Arial" panose="020B0604020202020204" pitchFamily="34" charset="0"/>
-              <a:buChar char="•"/>
-            </a:pPr>
-            <a:r>
-              <a:rPr lang="en-US" dirty="0"/>
-              <a:t>Overall, population growth has a relatively low correlation with economic growth.</a:t>
-            </a:r>
-          </a:p>
-          <a:p>
-            <a:pPr marL="285750" indent="-285750">
-              <a:spcBef>
-                <a:spcPts val="600"/>
-              </a:spcBef>
-              <a:spcAft>
-                <a:spcPts val="1200"/>
-              </a:spcAft>
-              <a:buFont typeface="Arial" panose="020B0604020202020204" pitchFamily="34" charset="0"/>
-              <a:buChar char="•"/>
-            </a:pPr>
-            <a:r>
-              <a:rPr lang="en-US" i="1" dirty="0"/>
-              <a:t>This might imply that population growth is not necessary for a country to produce strong GDP growth.</a:t>
-            </a:r>
-          </a:p>
-          <a:p>
-            <a:pPr marL="285750" indent="-285750">
-              <a:spcBef>
-                <a:spcPts val="600"/>
-              </a:spcBef>
-              <a:spcAft>
-                <a:spcPts val="1200"/>
-              </a:spcAft>
-              <a:buFont typeface="Arial" panose="020B0604020202020204" pitchFamily="34" charset="0"/>
-              <a:buChar char="•"/>
-            </a:pPr>
-            <a:r>
-              <a:rPr lang="en-US" dirty="0"/>
-              <a:t>Population growth is more highly correlated with GDP growth than any of its individual subfactors.</a:t>
-            </a:r>
-          </a:p>
-          <a:p>
-            <a:pPr marL="285750" indent="-285750">
-              <a:spcBef>
-                <a:spcPts val="600"/>
-              </a:spcBef>
-              <a:spcAft>
-                <a:spcPts val="1200"/>
-              </a:spcAft>
-              <a:buFont typeface="Arial" panose="020B0604020202020204" pitchFamily="34" charset="0"/>
-              <a:buChar char="•"/>
-            </a:pPr>
-            <a:r>
-              <a:rPr lang="en-US" dirty="0"/>
-              <a:t>Of the subfactors, net migration has the highest correlation.</a:t>
-            </a:r>
-          </a:p>
-          <a:p>
-            <a:pPr marL="285750" indent="-285750">
-              <a:spcBef>
-                <a:spcPts val="600"/>
-              </a:spcBef>
-              <a:spcAft>
-                <a:spcPts val="1200"/>
-              </a:spcAft>
-              <a:buFont typeface="Arial" panose="020B0604020202020204" pitchFamily="34" charset="0"/>
-              <a:buChar char="•"/>
-            </a:pPr>
-            <a:r>
-              <a:rPr lang="en-US" dirty="0"/>
-              <a:t>All of the correlations are positive.</a:t>
-            </a:r>
-          </a:p>
-          <a:p>
-            <a:pPr marL="285750" indent="-285750">
-              <a:spcBef>
-                <a:spcPts val="600"/>
-              </a:spcBef>
-              <a:spcAft>
-                <a:spcPts val="1200"/>
-              </a:spcAft>
-              <a:buFont typeface="Arial" panose="020B0604020202020204" pitchFamily="34" charset="0"/>
-              <a:buChar char="•"/>
-            </a:pPr>
-            <a:r>
-              <a:rPr lang="en-US" i="1" dirty="0"/>
-              <a:t>This might imply that, overall, all factors have a positive impact on GDP growth.</a:t>
-            </a:r>
-          </a:p>
-        </p:txBody>
-      </p:sp>
-      <p:sp>
-        <p:nvSpPr>
-          <p:cNvPr id="5" name="TextBox 4">
-            <a:extLst>
-              <a:ext uri="{FF2B5EF4-FFF2-40B4-BE49-F238E27FC236}">
-                <a16:creationId xmlns:a16="http://schemas.microsoft.com/office/drawing/2014/main" id="{5DD8D185-DB00-F3C7-897B-40663D9FB735}"/>
-              </a:ext>
-            </a:extLst>
-          </p:cNvPr>
-          <p:cNvSpPr txBox="1"/>
-          <p:nvPr/>
-        </p:nvSpPr>
-        <p:spPr>
-          <a:xfrm>
-            <a:off x="1143000" y="4343400"/>
-            <a:ext cx="5207000" cy="369332"/>
-          </a:xfrm>
-          <a:prstGeom prst="rect">
-            <a:avLst/>
-          </a:prstGeom>
-          <a:noFill/>
-        </p:spPr>
-        <p:txBody>
-          <a:bodyPr wrap="square" rtlCol="0">
-            <a:spAutoFit/>
-          </a:bodyPr>
-          <a:lstStyle/>
-          <a:p>
-            <a:r>
-              <a:rPr lang="en-US" i="1" dirty="0"/>
-              <a:t>1. Denotes a subfactor of Population Growth</a:t>
-            </a:r>
-          </a:p>
-        </p:txBody>
-      </p:sp>
-    </p:spTree>
-    <p:extLst>
-      <p:ext uri="{BB962C8B-B14F-4D97-AF65-F5344CB8AC3E}">
-        <p14:creationId xmlns:p14="http://schemas.microsoft.com/office/powerpoint/2010/main" val="1017183375"/>
       </p:ext>
     </p:extLst>
   </p:cSld>
@@ -36417,20 +36909,20 @@
 </file>
 
 <file path=customXml/item1.xml><?xml version="1.0" encoding="utf-8"?>
-<p:properties xmlns:p="http://schemas.microsoft.com/office/2006/metadata/properties" xmlns:xsi="http://www.w3.org/2001/XMLSchema-instance" xmlns:pc="http://schemas.microsoft.com/office/infopath/2007/PartnerControls">
-  <documentManagement>
-    <MediaServiceKeyPoints xmlns="71af3243-3dd4-4a8d-8c0d-dd76da1f02a5" xsi:nil="true"/>
-  </documentManagement>
-</p:properties>
-</file>
-
-<file path=customXml/item2.xml><?xml version="1.0" encoding="utf-8"?>
 <?mso-contentType ?>
 <FormTemplates xmlns="http://schemas.microsoft.com/sharepoint/v3/contenttype/forms">
   <Display>DocumentLibraryForm</Display>
   <Edit>DocumentLibraryForm</Edit>
   <New>DocumentLibraryForm</New>
 </FormTemplates>
+</file>
+
+<file path=customXml/item2.xml><?xml version="1.0" encoding="utf-8"?>
+<p:properties xmlns:p="http://schemas.microsoft.com/office/2006/metadata/properties" xmlns:xsi="http://www.w3.org/2001/XMLSchema-instance" xmlns:pc="http://schemas.microsoft.com/office/infopath/2007/PartnerControls">
+  <documentManagement>
+    <MediaServiceKeyPoints xmlns="71af3243-3dd4-4a8d-8c0d-dd76da1f02a5" xsi:nil="true"/>
+  </documentManagement>
+</p:properties>
 </file>
 
 <file path=customXml/item3.xml><?xml version="1.0" encoding="utf-8"?>
@@ -36645,19 +37137,19 @@
 </file>
 
 <file path=customXml/itemProps1.xml><?xml version="1.0" encoding="utf-8"?>
+<ds:datastoreItem xmlns:ds="http://schemas.openxmlformats.org/officeDocument/2006/customXml" ds:itemID="{1050AFE8-A560-4DCF-9BA0-FFF107A3C767}">
+  <ds:schemaRefs>
+    <ds:schemaRef ds:uri="http://schemas.microsoft.com/sharepoint/v3/contenttype/forms"/>
+  </ds:schemaRefs>
+</ds:datastoreItem>
+</file>
+
+<file path=customXml/itemProps2.xml><?xml version="1.0" encoding="utf-8"?>
 <ds:datastoreItem xmlns:ds="http://schemas.openxmlformats.org/officeDocument/2006/customXml" ds:itemID="{765DCA2E-A3A3-4379-AF49-80069EEF140F}">
   <ds:schemaRefs>
     <ds:schemaRef ds:uri="http://schemas.microsoft.com/office/2006/metadata/properties"/>
     <ds:schemaRef ds:uri="http://schemas.microsoft.com/office/infopath/2007/PartnerControls"/>
     <ds:schemaRef ds:uri="71af3243-3dd4-4a8d-8c0d-dd76da1f02a5"/>
-  </ds:schemaRefs>
-</ds:datastoreItem>
-</file>
-
-<file path=customXml/itemProps2.xml><?xml version="1.0" encoding="utf-8"?>
-<ds:datastoreItem xmlns:ds="http://schemas.openxmlformats.org/officeDocument/2006/customXml" ds:itemID="{1050AFE8-A560-4DCF-9BA0-FFF107A3C767}">
-  <ds:schemaRefs>
-    <ds:schemaRef ds:uri="http://schemas.microsoft.com/sharepoint/v3/contenttype/forms"/>
   </ds:schemaRefs>
 </ds:datastoreItem>
 </file>

</xml_diff>

<commit_message>
added a comment to app.js and minor changes to ppt
</commit_message>
<xml_diff>
--- a/Project 3 Oliver King and Ufuoma Atakere-ufilolo.pptx
+++ b/Project 3 Oliver King and Ufuoma Atakere-ufilolo.pptx
@@ -897,788 +897,6 @@
 </dgm:colorsDef>
 </file>
 
-<file path=ppt/diagrams/colors2.xml><?xml version="1.0" encoding="utf-8"?>
-<dgm:colorsDef xmlns:dgm="http://schemas.openxmlformats.org/drawingml/2006/diagram" xmlns:a="http://schemas.openxmlformats.org/drawingml/2006/main" uniqueId="urn:microsoft.com/office/officeart/2005/8/colors/colorful2">
-  <dgm:title val=""/>
-  <dgm:desc val=""/>
-  <dgm:catLst>
-    <dgm:cat type="colorful" pri="10200"/>
-  </dgm:catLst>
-  <dgm:styleLbl name="node0">
-    <dgm:fillClrLst meth="repeat">
-      <a:schemeClr val="accent1"/>
-    </dgm:fillClrLst>
-    <dgm:linClrLst meth="repeat">
-      <a:schemeClr val="lt1"/>
-    </dgm:linClrLst>
-    <dgm:effectClrLst/>
-    <dgm:txLinClrLst/>
-    <dgm:txFillClrLst/>
-    <dgm:txEffectClrLst/>
-  </dgm:styleLbl>
-  <dgm:styleLbl name="node1">
-    <dgm:fillClrLst>
-      <a:schemeClr val="accent2"/>
-      <a:schemeClr val="accent3"/>
-    </dgm:fillClrLst>
-    <dgm:linClrLst meth="repeat">
-      <a:schemeClr val="lt1"/>
-    </dgm:linClrLst>
-    <dgm:effectClrLst/>
-    <dgm:txLinClrLst/>
-    <dgm:txFillClrLst/>
-    <dgm:txEffectClrLst/>
-  </dgm:styleLbl>
-  <dgm:styleLbl name="alignNode1">
-    <dgm:fillClrLst>
-      <a:schemeClr val="accent2"/>
-      <a:schemeClr val="accent3"/>
-    </dgm:fillClrLst>
-    <dgm:linClrLst>
-      <a:schemeClr val="accent2"/>
-      <a:schemeClr val="accent3"/>
-    </dgm:linClrLst>
-    <dgm:effectClrLst/>
-    <dgm:txLinClrLst/>
-    <dgm:txFillClrLst/>
-    <dgm:txEffectClrLst/>
-  </dgm:styleLbl>
-  <dgm:styleLbl name="lnNode1">
-    <dgm:fillClrLst>
-      <a:schemeClr val="accent2"/>
-      <a:schemeClr val="accent3"/>
-    </dgm:fillClrLst>
-    <dgm:linClrLst meth="repeat">
-      <a:schemeClr val="lt1"/>
-    </dgm:linClrLst>
-    <dgm:effectClrLst/>
-    <dgm:txLinClrLst/>
-    <dgm:txFillClrLst/>
-    <dgm:txEffectClrLst/>
-  </dgm:styleLbl>
-  <dgm:styleLbl name="vennNode1">
-    <dgm:fillClrLst>
-      <a:schemeClr val="accent2">
-        <a:alpha val="50000"/>
-      </a:schemeClr>
-      <a:schemeClr val="accent3">
-        <a:alpha val="50000"/>
-      </a:schemeClr>
-    </dgm:fillClrLst>
-    <dgm:linClrLst meth="repeat">
-      <a:schemeClr val="lt1"/>
-    </dgm:linClrLst>
-    <dgm:effectClrLst/>
-    <dgm:txLinClrLst/>
-    <dgm:txFillClrLst/>
-    <dgm:txEffectClrLst/>
-  </dgm:styleLbl>
-  <dgm:styleLbl name="node2">
-    <dgm:fillClrLst>
-      <a:schemeClr val="accent3"/>
-    </dgm:fillClrLst>
-    <dgm:linClrLst meth="repeat">
-      <a:schemeClr val="lt1"/>
-    </dgm:linClrLst>
-    <dgm:effectClrLst/>
-    <dgm:txLinClrLst/>
-    <dgm:txFillClrLst/>
-    <dgm:txEffectClrLst/>
-  </dgm:styleLbl>
-  <dgm:styleLbl name="node3">
-    <dgm:fillClrLst>
-      <a:schemeClr val="accent4"/>
-    </dgm:fillClrLst>
-    <dgm:linClrLst meth="repeat">
-      <a:schemeClr val="lt1"/>
-    </dgm:linClrLst>
-    <dgm:effectClrLst/>
-    <dgm:txLinClrLst/>
-    <dgm:txFillClrLst/>
-    <dgm:txEffectClrLst/>
-  </dgm:styleLbl>
-  <dgm:styleLbl name="node4">
-    <dgm:fillClrLst>
-      <a:schemeClr val="accent5"/>
-    </dgm:fillClrLst>
-    <dgm:linClrLst meth="repeat">
-      <a:schemeClr val="lt1"/>
-    </dgm:linClrLst>
-    <dgm:effectClrLst/>
-    <dgm:txLinClrLst/>
-    <dgm:txFillClrLst/>
-    <dgm:txEffectClrLst/>
-  </dgm:styleLbl>
-  <dgm:styleLbl name="fgImgPlace1">
-    <dgm:fillClrLst>
-      <a:schemeClr val="accent2">
-        <a:tint val="50000"/>
-      </a:schemeClr>
-      <a:schemeClr val="accent3">
-        <a:tint val="50000"/>
-      </a:schemeClr>
-    </dgm:fillClrLst>
-    <dgm:linClrLst meth="repeat">
-      <a:schemeClr val="lt1"/>
-    </dgm:linClrLst>
-    <dgm:effectClrLst/>
-    <dgm:txLinClrLst/>
-    <dgm:txFillClrLst meth="repeat">
-      <a:schemeClr val="lt1"/>
-    </dgm:txFillClrLst>
-    <dgm:txEffectClrLst/>
-  </dgm:styleLbl>
-  <dgm:styleLbl name="alignImgPlace1">
-    <dgm:fillClrLst>
-      <a:schemeClr val="accent2">
-        <a:tint val="50000"/>
-      </a:schemeClr>
-      <a:schemeClr val="accent3">
-        <a:tint val="20000"/>
-      </a:schemeClr>
-    </dgm:fillClrLst>
-    <dgm:linClrLst meth="repeat">
-      <a:schemeClr val="lt1"/>
-    </dgm:linClrLst>
-    <dgm:effectClrLst/>
-    <dgm:txLinClrLst/>
-    <dgm:txFillClrLst meth="repeat">
-      <a:schemeClr val="lt1"/>
-    </dgm:txFillClrLst>
-    <dgm:txEffectClrLst/>
-  </dgm:styleLbl>
-  <dgm:styleLbl name="bgImgPlace1">
-    <dgm:fillClrLst>
-      <a:schemeClr val="accent2">
-        <a:tint val="50000"/>
-      </a:schemeClr>
-      <a:schemeClr val="accent3">
-        <a:tint val="20000"/>
-      </a:schemeClr>
-    </dgm:fillClrLst>
-    <dgm:linClrLst meth="repeat">
-      <a:schemeClr val="lt1"/>
-    </dgm:linClrLst>
-    <dgm:effectClrLst/>
-    <dgm:txLinClrLst/>
-    <dgm:txFillClrLst meth="repeat">
-      <a:schemeClr val="lt1"/>
-    </dgm:txFillClrLst>
-    <dgm:txEffectClrLst/>
-  </dgm:styleLbl>
-  <dgm:styleLbl name="sibTrans2D1">
-    <dgm:fillClrLst>
-      <a:schemeClr val="accent2"/>
-      <a:schemeClr val="accent3"/>
-    </dgm:fillClrLst>
-    <dgm:linClrLst meth="repeat">
-      <a:schemeClr val="lt1"/>
-    </dgm:linClrLst>
-    <dgm:effectClrLst/>
-    <dgm:txLinClrLst/>
-    <dgm:txFillClrLst/>
-    <dgm:txEffectClrLst/>
-  </dgm:styleLbl>
-  <dgm:styleLbl name="fgSibTrans2D1">
-    <dgm:fillClrLst>
-      <a:schemeClr val="accent2"/>
-      <a:schemeClr val="accent3"/>
-    </dgm:fillClrLst>
-    <dgm:linClrLst meth="repeat">
-      <a:schemeClr val="lt1"/>
-    </dgm:linClrLst>
-    <dgm:effectClrLst/>
-    <dgm:txLinClrLst/>
-    <dgm:txFillClrLst meth="repeat">
-      <a:schemeClr val="lt1"/>
-    </dgm:txFillClrLst>
-    <dgm:txEffectClrLst/>
-  </dgm:styleLbl>
-  <dgm:styleLbl name="bgSibTrans2D1">
-    <dgm:fillClrLst>
-      <a:schemeClr val="accent2"/>
-      <a:schemeClr val="accent3"/>
-    </dgm:fillClrLst>
-    <dgm:linClrLst meth="repeat">
-      <a:schemeClr val="lt1"/>
-    </dgm:linClrLst>
-    <dgm:effectClrLst/>
-    <dgm:txLinClrLst/>
-    <dgm:txFillClrLst meth="repeat">
-      <a:schemeClr val="lt1"/>
-    </dgm:txFillClrLst>
-    <dgm:txEffectClrLst/>
-  </dgm:styleLbl>
-  <dgm:styleLbl name="sibTrans1D1">
-    <dgm:fillClrLst/>
-    <dgm:linClrLst>
-      <a:schemeClr val="accent2"/>
-      <a:schemeClr val="accent3"/>
-    </dgm:linClrLst>
-    <dgm:effectClrLst/>
-    <dgm:txLinClrLst/>
-    <dgm:txFillClrLst meth="repeat">
-      <a:schemeClr val="tx1"/>
-    </dgm:txFillClrLst>
-    <dgm:txEffectClrLst/>
-  </dgm:styleLbl>
-  <dgm:styleLbl name="callout">
-    <dgm:fillClrLst meth="repeat">
-      <a:schemeClr val="accent2"/>
-    </dgm:fillClrLst>
-    <dgm:linClrLst meth="repeat">
-      <a:schemeClr val="accent2">
-        <a:tint val="50000"/>
-      </a:schemeClr>
-    </dgm:linClrLst>
-    <dgm:effectClrLst/>
-    <dgm:txLinClrLst/>
-    <dgm:txFillClrLst meth="repeat">
-      <a:schemeClr val="tx1"/>
-    </dgm:txFillClrLst>
-    <dgm:txEffectClrLst/>
-  </dgm:styleLbl>
-  <dgm:styleLbl name="asst0">
-    <dgm:fillClrLst meth="repeat">
-      <a:schemeClr val="accent2"/>
-    </dgm:fillClrLst>
-    <dgm:linClrLst meth="repeat">
-      <a:schemeClr val="lt1">
-        <a:shade val="80000"/>
-      </a:schemeClr>
-    </dgm:linClrLst>
-    <dgm:effectClrLst/>
-    <dgm:txLinClrLst/>
-    <dgm:txFillClrLst/>
-    <dgm:txEffectClrLst/>
-  </dgm:styleLbl>
-  <dgm:styleLbl name="asst1">
-    <dgm:fillClrLst meth="repeat">
-      <a:schemeClr val="accent3"/>
-    </dgm:fillClrLst>
-    <dgm:linClrLst meth="repeat">
-      <a:schemeClr val="lt1">
-        <a:shade val="80000"/>
-      </a:schemeClr>
-    </dgm:linClrLst>
-    <dgm:effectClrLst/>
-    <dgm:txLinClrLst/>
-    <dgm:txFillClrLst/>
-    <dgm:txEffectClrLst/>
-  </dgm:styleLbl>
-  <dgm:styleLbl name="asst2">
-    <dgm:fillClrLst>
-      <a:schemeClr val="accent4"/>
-    </dgm:fillClrLst>
-    <dgm:linClrLst meth="repeat">
-      <a:schemeClr val="lt1"/>
-    </dgm:linClrLst>
-    <dgm:effectClrLst/>
-    <dgm:txLinClrLst/>
-    <dgm:txFillClrLst/>
-    <dgm:txEffectClrLst/>
-  </dgm:styleLbl>
-  <dgm:styleLbl name="asst3">
-    <dgm:fillClrLst>
-      <a:schemeClr val="accent5"/>
-    </dgm:fillClrLst>
-    <dgm:linClrLst meth="repeat">
-      <a:schemeClr val="lt1"/>
-    </dgm:linClrLst>
-    <dgm:effectClrLst/>
-    <dgm:txLinClrLst/>
-    <dgm:txFillClrLst/>
-    <dgm:txEffectClrLst/>
-  </dgm:styleLbl>
-  <dgm:styleLbl name="asst4">
-    <dgm:fillClrLst>
-      <a:schemeClr val="accent6"/>
-    </dgm:fillClrLst>
-    <dgm:linClrLst meth="repeat">
-      <a:schemeClr val="lt1"/>
-    </dgm:linClrLst>
-    <dgm:effectClrLst/>
-    <dgm:txLinClrLst/>
-    <dgm:txFillClrLst/>
-    <dgm:txEffectClrLst/>
-  </dgm:styleLbl>
-  <dgm:styleLbl name="parChTrans2D1">
-    <dgm:fillClrLst meth="repeat">
-      <a:schemeClr val="accent2"/>
-    </dgm:fillClrLst>
-    <dgm:linClrLst meth="repeat">
-      <a:schemeClr val="lt1"/>
-    </dgm:linClrLst>
-    <dgm:effectClrLst/>
-    <dgm:txLinClrLst/>
-    <dgm:txFillClrLst meth="repeat">
-      <a:schemeClr val="lt1"/>
-    </dgm:txFillClrLst>
-    <dgm:txEffectClrLst/>
-  </dgm:styleLbl>
-  <dgm:styleLbl name="parChTrans2D2">
-    <dgm:fillClrLst meth="repeat">
-      <a:schemeClr val="accent3"/>
-    </dgm:fillClrLst>
-    <dgm:linClrLst meth="repeat">
-      <a:schemeClr val="lt1"/>
-    </dgm:linClrLst>
-    <dgm:effectClrLst/>
-    <dgm:txLinClrLst/>
-    <dgm:txFillClrLst/>
-    <dgm:txEffectClrLst/>
-  </dgm:styleLbl>
-  <dgm:styleLbl name="parChTrans2D3">
-    <dgm:fillClrLst meth="repeat">
-      <a:schemeClr val="accent4"/>
-    </dgm:fillClrLst>
-    <dgm:linClrLst meth="repeat">
-      <a:schemeClr val="lt1"/>
-    </dgm:linClrLst>
-    <dgm:effectClrLst/>
-    <dgm:txLinClrLst/>
-    <dgm:txFillClrLst/>
-    <dgm:txEffectClrLst/>
-  </dgm:styleLbl>
-  <dgm:styleLbl name="parChTrans2D4">
-    <dgm:fillClrLst meth="repeat">
-      <a:schemeClr val="accent5"/>
-    </dgm:fillClrLst>
-    <dgm:linClrLst meth="repeat">
-      <a:schemeClr val="lt1"/>
-    </dgm:linClrLst>
-    <dgm:effectClrLst/>
-    <dgm:txLinClrLst/>
-    <dgm:txFillClrLst meth="repeat">
-      <a:schemeClr val="lt1"/>
-    </dgm:txFillClrLst>
-    <dgm:txEffectClrLst/>
-  </dgm:styleLbl>
-  <dgm:styleLbl name="parChTrans1D1">
-    <dgm:fillClrLst meth="repeat">
-      <a:schemeClr val="accent2"/>
-    </dgm:fillClrLst>
-    <dgm:linClrLst meth="repeat">
-      <a:schemeClr val="accent2"/>
-    </dgm:linClrLst>
-    <dgm:effectClrLst/>
-    <dgm:txLinClrLst/>
-    <dgm:txFillClrLst meth="repeat">
-      <a:schemeClr val="tx1"/>
-    </dgm:txFillClrLst>
-    <dgm:txEffectClrLst/>
-  </dgm:styleLbl>
-  <dgm:styleLbl name="parChTrans1D2">
-    <dgm:fillClrLst meth="repeat">
-      <a:schemeClr val="accent2">
-        <a:tint val="90000"/>
-      </a:schemeClr>
-    </dgm:fillClrLst>
-    <dgm:linClrLst meth="repeat">
-      <a:schemeClr val="accent3"/>
-    </dgm:linClrLst>
-    <dgm:effectClrLst/>
-    <dgm:txLinClrLst/>
-    <dgm:txFillClrLst meth="repeat">
-      <a:schemeClr val="tx1"/>
-    </dgm:txFillClrLst>
-    <dgm:txEffectClrLst/>
-  </dgm:styleLbl>
-  <dgm:styleLbl name="parChTrans1D3">
-    <dgm:fillClrLst meth="repeat">
-      <a:schemeClr val="accent2">
-        <a:tint val="70000"/>
-      </a:schemeClr>
-    </dgm:fillClrLst>
-    <dgm:linClrLst meth="repeat">
-      <a:schemeClr val="accent4"/>
-    </dgm:linClrLst>
-    <dgm:effectClrLst/>
-    <dgm:txLinClrLst/>
-    <dgm:txFillClrLst meth="repeat">
-      <a:schemeClr val="tx1"/>
-    </dgm:txFillClrLst>
-    <dgm:txEffectClrLst/>
-  </dgm:styleLbl>
-  <dgm:styleLbl name="parChTrans1D4">
-    <dgm:fillClrLst meth="repeat">
-      <a:schemeClr val="accent2">
-        <a:tint val="50000"/>
-      </a:schemeClr>
-    </dgm:fillClrLst>
-    <dgm:linClrLst meth="repeat">
-      <a:schemeClr val="accent5"/>
-    </dgm:linClrLst>
-    <dgm:effectClrLst/>
-    <dgm:txLinClrLst/>
-    <dgm:txFillClrLst meth="repeat">
-      <a:schemeClr val="tx1"/>
-    </dgm:txFillClrLst>
-    <dgm:txEffectClrLst/>
-  </dgm:styleLbl>
-  <dgm:styleLbl name="fgAcc1">
-    <dgm:fillClrLst meth="repeat">
-      <a:schemeClr val="lt1">
-        <a:alpha val="90000"/>
-      </a:schemeClr>
-    </dgm:fillClrLst>
-    <dgm:linClrLst>
-      <a:schemeClr val="accent2"/>
-      <a:schemeClr val="accent3"/>
-    </dgm:linClrLst>
-    <dgm:effectClrLst/>
-    <dgm:txLinClrLst/>
-    <dgm:txFillClrLst meth="repeat">
-      <a:schemeClr val="dk1"/>
-    </dgm:txFillClrLst>
-    <dgm:txEffectClrLst/>
-  </dgm:styleLbl>
-  <dgm:styleLbl name="conFgAcc1">
-    <dgm:fillClrLst meth="repeat">
-      <a:schemeClr val="lt1">
-        <a:alpha val="90000"/>
-      </a:schemeClr>
-    </dgm:fillClrLst>
-    <dgm:linClrLst>
-      <a:schemeClr val="accent2"/>
-      <a:schemeClr val="accent3"/>
-    </dgm:linClrLst>
-    <dgm:effectClrLst/>
-    <dgm:txLinClrLst/>
-    <dgm:txFillClrLst meth="repeat">
-      <a:schemeClr val="dk1"/>
-    </dgm:txFillClrLst>
-    <dgm:txEffectClrLst/>
-  </dgm:styleLbl>
-  <dgm:styleLbl name="alignAcc1">
-    <dgm:fillClrLst meth="repeat">
-      <a:schemeClr val="lt1">
-        <a:alpha val="90000"/>
-      </a:schemeClr>
-    </dgm:fillClrLst>
-    <dgm:linClrLst>
-      <a:schemeClr val="accent2"/>
-      <a:schemeClr val="accent3"/>
-    </dgm:linClrLst>
-    <dgm:effectClrLst/>
-    <dgm:txLinClrLst/>
-    <dgm:txFillClrLst meth="repeat">
-      <a:schemeClr val="dk1"/>
-    </dgm:txFillClrLst>
-    <dgm:txEffectClrLst/>
-  </dgm:styleLbl>
-  <dgm:styleLbl name="trAlignAcc1">
-    <dgm:fillClrLst meth="repeat">
-      <a:schemeClr val="lt1">
-        <a:alpha val="40000"/>
-      </a:schemeClr>
-    </dgm:fillClrLst>
-    <dgm:linClrLst meth="repeat">
-      <a:schemeClr val="accent2"/>
-    </dgm:linClrLst>
-    <dgm:effectClrLst/>
-    <dgm:txLinClrLst/>
-    <dgm:txFillClrLst meth="repeat">
-      <a:schemeClr val="dk1"/>
-    </dgm:txFillClrLst>
-    <dgm:txEffectClrLst/>
-  </dgm:styleLbl>
-  <dgm:styleLbl name="bgAcc1">
-    <dgm:fillClrLst meth="repeat">
-      <a:schemeClr val="lt1">
-        <a:alpha val="90000"/>
-      </a:schemeClr>
-    </dgm:fillClrLst>
-    <dgm:linClrLst>
-      <a:schemeClr val="accent2"/>
-      <a:schemeClr val="accent3"/>
-    </dgm:linClrLst>
-    <dgm:effectClrLst/>
-    <dgm:txLinClrLst/>
-    <dgm:txFillClrLst meth="repeat">
-      <a:schemeClr val="dk1"/>
-    </dgm:txFillClrLst>
-    <dgm:txEffectClrLst/>
-  </dgm:styleLbl>
-  <dgm:styleLbl name="solidFgAcc1">
-    <dgm:fillClrLst meth="repeat">
-      <a:schemeClr val="lt1"/>
-    </dgm:fillClrLst>
-    <dgm:linClrLst>
-      <a:schemeClr val="accent2"/>
-      <a:schemeClr val="accent3"/>
-    </dgm:linClrLst>
-    <dgm:effectClrLst/>
-    <dgm:txLinClrLst/>
-    <dgm:txFillClrLst meth="repeat">
-      <a:schemeClr val="dk1"/>
-    </dgm:txFillClrLst>
-    <dgm:txEffectClrLst/>
-  </dgm:styleLbl>
-  <dgm:styleLbl name="solidAlignAcc1">
-    <dgm:fillClrLst meth="repeat">
-      <a:schemeClr val="lt1"/>
-    </dgm:fillClrLst>
-    <dgm:linClrLst>
-      <a:schemeClr val="accent2"/>
-      <a:schemeClr val="accent3"/>
-    </dgm:linClrLst>
-    <dgm:effectClrLst/>
-    <dgm:txLinClrLst/>
-    <dgm:txFillClrLst meth="repeat">
-      <a:schemeClr val="dk1"/>
-    </dgm:txFillClrLst>
-    <dgm:txEffectClrLst/>
-  </dgm:styleLbl>
-  <dgm:styleLbl name="solidBgAcc1">
-    <dgm:fillClrLst meth="repeat">
-      <a:schemeClr val="lt1"/>
-    </dgm:fillClrLst>
-    <dgm:linClrLst>
-      <a:schemeClr val="accent2"/>
-      <a:schemeClr val="accent3"/>
-    </dgm:linClrLst>
-    <dgm:effectClrLst/>
-    <dgm:txLinClrLst/>
-    <dgm:txFillClrLst meth="repeat">
-      <a:schemeClr val="dk1"/>
-    </dgm:txFillClrLst>
-    <dgm:txEffectClrLst/>
-  </dgm:styleLbl>
-  <dgm:styleLbl name="fgAccFollowNode1">
-    <dgm:fillClrLst>
-      <a:schemeClr val="accent2">
-        <a:tint val="40000"/>
-        <a:alpha val="90000"/>
-      </a:schemeClr>
-      <a:schemeClr val="accent3">
-        <a:tint val="40000"/>
-        <a:alpha val="90000"/>
-      </a:schemeClr>
-    </dgm:fillClrLst>
-    <dgm:linClrLst>
-      <a:schemeClr val="accent2">
-        <a:tint val="40000"/>
-        <a:alpha val="90000"/>
-      </a:schemeClr>
-      <a:schemeClr val="accent3">
-        <a:tint val="40000"/>
-        <a:alpha val="90000"/>
-      </a:schemeClr>
-    </dgm:linClrLst>
-    <dgm:effectClrLst/>
-    <dgm:txLinClrLst/>
-    <dgm:txFillClrLst meth="repeat">
-      <a:schemeClr val="dk1"/>
-    </dgm:txFillClrLst>
-    <dgm:txEffectClrLst/>
-  </dgm:styleLbl>
-  <dgm:styleLbl name="alignAccFollowNode1">
-    <dgm:fillClrLst>
-      <a:schemeClr val="accent2">
-        <a:tint val="40000"/>
-        <a:alpha val="90000"/>
-      </a:schemeClr>
-      <a:schemeClr val="accent3">
-        <a:tint val="40000"/>
-        <a:alpha val="90000"/>
-      </a:schemeClr>
-    </dgm:fillClrLst>
-    <dgm:linClrLst>
-      <a:schemeClr val="accent2">
-        <a:tint val="40000"/>
-        <a:alpha val="90000"/>
-      </a:schemeClr>
-      <a:schemeClr val="accent3">
-        <a:tint val="40000"/>
-        <a:alpha val="90000"/>
-      </a:schemeClr>
-    </dgm:linClrLst>
-    <dgm:effectClrLst/>
-    <dgm:txLinClrLst/>
-    <dgm:txFillClrLst meth="repeat">
-      <a:schemeClr val="dk1"/>
-    </dgm:txFillClrLst>
-    <dgm:txEffectClrLst/>
-  </dgm:styleLbl>
-  <dgm:styleLbl name="bgAccFollowNode1">
-    <dgm:fillClrLst>
-      <a:schemeClr val="accent2">
-        <a:tint val="40000"/>
-        <a:alpha val="90000"/>
-      </a:schemeClr>
-      <a:schemeClr val="accent3">
-        <a:tint val="40000"/>
-        <a:alpha val="90000"/>
-      </a:schemeClr>
-    </dgm:fillClrLst>
-    <dgm:linClrLst>
-      <a:schemeClr val="accent2">
-        <a:tint val="40000"/>
-        <a:alpha val="90000"/>
-      </a:schemeClr>
-      <a:schemeClr val="accent3">
-        <a:tint val="40000"/>
-        <a:alpha val="90000"/>
-      </a:schemeClr>
-    </dgm:linClrLst>
-    <dgm:effectClrLst/>
-    <dgm:txLinClrLst/>
-    <dgm:txFillClrLst meth="repeat">
-      <a:schemeClr val="dk1"/>
-    </dgm:txFillClrLst>
-    <dgm:txEffectClrLst/>
-  </dgm:styleLbl>
-  <dgm:styleLbl name="fgAcc0">
-    <dgm:fillClrLst meth="repeat">
-      <a:schemeClr val="lt1">
-        <a:alpha val="90000"/>
-      </a:schemeClr>
-    </dgm:fillClrLst>
-    <dgm:linClrLst>
-      <a:schemeClr val="accent1"/>
-    </dgm:linClrLst>
-    <dgm:effectClrLst/>
-    <dgm:txLinClrLst/>
-    <dgm:txFillClrLst meth="repeat">
-      <a:schemeClr val="dk1"/>
-    </dgm:txFillClrLst>
-    <dgm:txEffectClrLst/>
-  </dgm:styleLbl>
-  <dgm:styleLbl name="fgAcc2">
-    <dgm:fillClrLst meth="repeat">
-      <a:schemeClr val="lt1">
-        <a:alpha val="90000"/>
-      </a:schemeClr>
-    </dgm:fillClrLst>
-    <dgm:linClrLst>
-      <a:schemeClr val="accent3"/>
-    </dgm:linClrLst>
-    <dgm:effectClrLst/>
-    <dgm:txLinClrLst/>
-    <dgm:txFillClrLst meth="repeat">
-      <a:schemeClr val="dk1"/>
-    </dgm:txFillClrLst>
-    <dgm:txEffectClrLst/>
-  </dgm:styleLbl>
-  <dgm:styleLbl name="fgAcc3">
-    <dgm:fillClrLst meth="repeat">
-      <a:schemeClr val="lt1">
-        <a:alpha val="90000"/>
-      </a:schemeClr>
-    </dgm:fillClrLst>
-    <dgm:linClrLst>
-      <a:schemeClr val="accent4"/>
-    </dgm:linClrLst>
-    <dgm:effectClrLst/>
-    <dgm:txLinClrLst/>
-    <dgm:txFillClrLst meth="repeat">
-      <a:schemeClr val="dk1"/>
-    </dgm:txFillClrLst>
-    <dgm:txEffectClrLst/>
-  </dgm:styleLbl>
-  <dgm:styleLbl name="fgAcc4">
-    <dgm:fillClrLst meth="repeat">
-      <a:schemeClr val="lt1">
-        <a:alpha val="90000"/>
-      </a:schemeClr>
-    </dgm:fillClrLst>
-    <dgm:linClrLst>
-      <a:schemeClr val="accent5"/>
-    </dgm:linClrLst>
-    <dgm:effectClrLst/>
-    <dgm:txLinClrLst/>
-    <dgm:txFillClrLst meth="repeat">
-      <a:schemeClr val="dk1"/>
-    </dgm:txFillClrLst>
-    <dgm:txEffectClrLst/>
-  </dgm:styleLbl>
-  <dgm:styleLbl name="bgShp">
-    <dgm:fillClrLst meth="repeat">
-      <a:schemeClr val="accent2">
-        <a:tint val="40000"/>
-      </a:schemeClr>
-    </dgm:fillClrLst>
-    <dgm:linClrLst meth="repeat">
-      <a:schemeClr val="dk1"/>
-    </dgm:linClrLst>
-    <dgm:effectClrLst/>
-    <dgm:txLinClrLst/>
-    <dgm:txFillClrLst meth="repeat">
-      <a:schemeClr val="dk1"/>
-    </dgm:txFillClrLst>
-    <dgm:txEffectClrLst/>
-  </dgm:styleLbl>
-  <dgm:styleLbl name="dkBgShp">
-    <dgm:fillClrLst meth="repeat">
-      <a:schemeClr val="accent2">
-        <a:shade val="90000"/>
-      </a:schemeClr>
-    </dgm:fillClrLst>
-    <dgm:linClrLst meth="repeat">
-      <a:schemeClr val="dk1"/>
-    </dgm:linClrLst>
-    <dgm:effectClrLst/>
-    <dgm:txLinClrLst/>
-    <dgm:txFillClrLst meth="repeat">
-      <a:schemeClr val="lt1"/>
-    </dgm:txFillClrLst>
-    <dgm:txEffectClrLst/>
-  </dgm:styleLbl>
-  <dgm:styleLbl name="trBgShp">
-    <dgm:fillClrLst meth="repeat">
-      <a:schemeClr val="accent2">
-        <a:tint val="50000"/>
-        <a:alpha val="40000"/>
-      </a:schemeClr>
-    </dgm:fillClrLst>
-    <dgm:linClrLst meth="repeat">
-      <a:schemeClr val="accent2"/>
-    </dgm:linClrLst>
-    <dgm:effectClrLst/>
-    <dgm:txLinClrLst/>
-    <dgm:txFillClrLst meth="repeat">
-      <a:schemeClr val="lt1"/>
-    </dgm:txFillClrLst>
-    <dgm:txEffectClrLst/>
-  </dgm:styleLbl>
-  <dgm:styleLbl name="fgShp">
-    <dgm:fillClrLst meth="repeat">
-      <a:schemeClr val="accent2">
-        <a:tint val="40000"/>
-      </a:schemeClr>
-    </dgm:fillClrLst>
-    <dgm:linClrLst meth="repeat">
-      <a:schemeClr val="lt1"/>
-    </dgm:linClrLst>
-    <dgm:effectClrLst/>
-    <dgm:txLinClrLst/>
-    <dgm:txFillClrLst meth="repeat">
-      <a:schemeClr val="dk1"/>
-    </dgm:txFillClrLst>
-    <dgm:txEffectClrLst/>
-  </dgm:styleLbl>
-  <dgm:styleLbl name="revTx">
-    <dgm:fillClrLst meth="repeat">
-      <a:schemeClr val="lt1">
-        <a:alpha val="0"/>
-      </a:schemeClr>
-    </dgm:fillClrLst>
-    <dgm:linClrLst meth="repeat">
-      <a:schemeClr val="dk1">
-        <a:alpha val="0"/>
-      </a:schemeClr>
-    </dgm:linClrLst>
-    <dgm:effectClrLst/>
-    <dgm:txLinClrLst/>
-    <dgm:txFillClrLst meth="repeat">
-      <a:schemeClr val="tx1"/>
-    </dgm:txFillClrLst>
-    <dgm:txEffectClrLst/>
-  </dgm:styleLbl>
-</dgm:colorsDef>
-</file>
-
 <file path=ppt/diagrams/data1.xml><?xml version="1.0" encoding="utf-8"?>
 <dgm:dataModel xmlns:dgm="http://schemas.openxmlformats.org/drawingml/2006/diagram" xmlns:a="http://schemas.openxmlformats.org/drawingml/2006/main">
   <dgm:ptLst>
@@ -2545,15 +1763,15 @@
     <dgm:cxn modelId="{9D462B33-2121-4359-A11D-5126E378922F}" srcId="{E4043D2D-5320-4B7D-B7CA-3F43E90899F4}" destId="{579CA616-881E-43D5-8B9A-9187DB74A11B}" srcOrd="1" destOrd="0" parTransId="{6425992A-E855-40B3-9E12-EA15C90DEF48}" sibTransId="{AD0A0084-E97E-4705-8291-2C63B9F20081}"/>
     <dgm:cxn modelId="{D218EC3C-C77F-432B-8B94-C5F31952EE1E}" type="presOf" srcId="{FD569D1E-9D7E-4609-B8D2-80AF84D260F6}" destId="{AAC93F81-D18D-4468-BFBD-E8E4D9E2CA3F}" srcOrd="0" destOrd="0" presId="urn:microsoft.com/office/officeart/2005/8/layout/hierarchy2"/>
     <dgm:cxn modelId="{A848C33F-A708-4244-8030-D72B84983676}" type="presOf" srcId="{97E2F834-291F-4C5C-9045-8D295801748E}" destId="{23BDEE41-CAC9-4155-B53A-E94F8758ADE9}" srcOrd="0" destOrd="0" presId="urn:microsoft.com/office/officeart/2005/8/layout/hierarchy2"/>
+    <dgm:cxn modelId="{3D55F041-112D-4EA9-BD05-77B4ABAE3FA7}" type="presOf" srcId="{921CB138-45A7-41D5-9C4B-46A9336A4C69}" destId="{79D478B1-7A98-462F-88D4-27E370A531B7}" srcOrd="0" destOrd="0" presId="urn:microsoft.com/office/officeart/2005/8/layout/hierarchy2"/>
+    <dgm:cxn modelId="{6BFE1145-CB3E-4240-A0FD-A1E6C11C753A}" srcId="{D79E583B-7818-40BB-B99F-F27E07A7B3B5}" destId="{5D4E1112-DA3F-45B5-B1BD-EB34EB61EC2F}" srcOrd="0" destOrd="0" parTransId="{BCEDF365-9EC9-4DFD-8658-CCE4D348EEFE}" sibTransId="{75E68CB5-3209-4F18-9392-5A8845EF792B}"/>
+    <dgm:cxn modelId="{9F03894D-E270-4AE9-8C09-AD97A9E9AC2E}" srcId="{4398B25D-1C12-4472-83EA-C0C3A80F8063}" destId="{DC11DD24-324F-4A67-88B6-5DD5F5A5BFB3}" srcOrd="0" destOrd="0" parTransId="{5553595A-7192-4D98-8F25-F7C49033699E}" sibTransId="{FC89D4C8-C960-46EC-A021-CAE63FBDB7E0}"/>
     <dgm:cxn modelId="{339B375C-ED5A-4679-BD50-E488527C77B6}" type="presOf" srcId="{C006BECE-FFA8-4BED-9D86-71BC3439130B}" destId="{3795D5B8-3F06-47D4-8AC1-0FFA2A9A77AC}" srcOrd="0" destOrd="0" presId="urn:microsoft.com/office/officeart/2005/8/layout/hierarchy2"/>
     <dgm:cxn modelId="{A2672160-38D7-473D-B13A-7C5EBC1BB526}" type="presOf" srcId="{DC11DD24-324F-4A67-88B6-5DD5F5A5BFB3}" destId="{D19BCD9B-3EF8-4982-AC3C-362244FF4B82}" srcOrd="0" destOrd="0" presId="urn:microsoft.com/office/officeart/2005/8/layout/hierarchy2"/>
     <dgm:cxn modelId="{05974B61-1689-4576-8F56-94FD6C64AE4C}" type="presOf" srcId="{921CB138-45A7-41D5-9C4B-46A9336A4C69}" destId="{F3AE2DAF-BDA4-415F-978E-0185B53EBD19}" srcOrd="1" destOrd="0" presId="urn:microsoft.com/office/officeart/2005/8/layout/hierarchy2"/>
-    <dgm:cxn modelId="{3D55F041-112D-4EA9-BD05-77B4ABAE3FA7}" type="presOf" srcId="{921CB138-45A7-41D5-9C4B-46A9336A4C69}" destId="{79D478B1-7A98-462F-88D4-27E370A531B7}" srcOrd="0" destOrd="0" presId="urn:microsoft.com/office/officeart/2005/8/layout/hierarchy2"/>
     <dgm:cxn modelId="{5AEBA864-DAEF-46AF-AEEC-C55A5D1F0A86}" type="presOf" srcId="{64E3ED19-44C4-4893-8A88-783BB1D389B5}" destId="{7A252C85-73E3-4873-A134-F78366BFD5F9}" srcOrd="1" destOrd="0" presId="urn:microsoft.com/office/officeart/2005/8/layout/hierarchy2"/>
-    <dgm:cxn modelId="{6BFE1145-CB3E-4240-A0FD-A1E6C11C753A}" srcId="{D79E583B-7818-40BB-B99F-F27E07A7B3B5}" destId="{5D4E1112-DA3F-45B5-B1BD-EB34EB61EC2F}" srcOrd="0" destOrd="0" parTransId="{BCEDF365-9EC9-4DFD-8658-CCE4D348EEFE}" sibTransId="{75E68CB5-3209-4F18-9392-5A8845EF792B}"/>
     <dgm:cxn modelId="{F276B067-F872-4DA5-B65A-FF9D9F3319B5}" srcId="{579CA616-881E-43D5-8B9A-9187DB74A11B}" destId="{D79E583B-7818-40BB-B99F-F27E07A7B3B5}" srcOrd="1" destOrd="0" parTransId="{6480750C-AA62-4803-8857-BA914E570E24}" sibTransId="{04777137-3260-49A0-8F7A-0B47B0FCF9A4}"/>
     <dgm:cxn modelId="{7A8E1A6A-9BF3-4EFD-ADD4-2A975180C600}" srcId="{579CA616-881E-43D5-8B9A-9187DB74A11B}" destId="{4398B25D-1C12-4472-83EA-C0C3A80F8063}" srcOrd="0" destOrd="0" parTransId="{C006BECE-FFA8-4BED-9D86-71BC3439130B}" sibTransId="{6AE2B271-064C-4A7E-82D6-21D09C49C5F7}"/>
-    <dgm:cxn modelId="{9F03894D-E270-4AE9-8C09-AD97A9E9AC2E}" srcId="{4398B25D-1C12-4472-83EA-C0C3A80F8063}" destId="{DC11DD24-324F-4A67-88B6-5DD5F5A5BFB3}" srcOrd="0" destOrd="0" parTransId="{5553595A-7192-4D98-8F25-F7C49033699E}" sibTransId="{FC89D4C8-C960-46EC-A021-CAE63FBDB7E0}"/>
     <dgm:cxn modelId="{4313C06D-6B8F-44D8-BF02-C10EA80A3151}" type="presOf" srcId="{FD569D1E-9D7E-4609-B8D2-80AF84D260F6}" destId="{7A6698F5-1338-4712-B45B-F2A1695C5787}" srcOrd="1" destOrd="0" presId="urn:microsoft.com/office/officeart/2005/8/layout/hierarchy2"/>
     <dgm:cxn modelId="{486C757E-2622-42B1-99E8-5E23F6FBA5FA}" type="presOf" srcId="{E3BCF8B7-CEC1-4E23-BD0C-E2EC2DBECB43}" destId="{37DD8E4E-AAF9-49CC-AEA8-1D5BA9599EE6}" srcOrd="0" destOrd="0" presId="urn:microsoft.com/office/officeart/2005/8/layout/hierarchy2"/>
     <dgm:cxn modelId="{B03DFC80-BA29-41CE-A475-C962FDA2607E}" srcId="{D79E583B-7818-40BB-B99F-F27E07A7B3B5}" destId="{4024505D-E84E-4F96-A70D-E9EE7B812CC7}" srcOrd="1" destOrd="0" parTransId="{64E3ED19-44C4-4893-8A88-783BB1D389B5}" sibTransId="{D6098CC2-1657-4C82-8001-C048F8A03FF5}"/>
@@ -2646,327 +1864,6 @@
     <dgm:cxn modelId="{E2AC9B80-4519-4072-ABDE-0D57FFD3AAF8}" type="presParOf" srcId="{38B6E48D-E636-43AC-BDD9-1A0236B5E68F}" destId="{FD119F9E-325C-41AB-8BDC-67AC0AFBA3C0}" srcOrd="2" destOrd="0" presId="urn:microsoft.com/office/officeart/2005/8/layout/hierarchy2"/>
     <dgm:cxn modelId="{E0E99FD2-B470-4EC4-AA69-2911B7CB6889}" type="presParOf" srcId="{FD119F9E-325C-41AB-8BDC-67AC0AFBA3C0}" destId="{8165F82D-C410-4BC9-B18B-0BBCD1F68B12}" srcOrd="0" destOrd="0" presId="urn:microsoft.com/office/officeart/2005/8/layout/hierarchy2"/>
     <dgm:cxn modelId="{F7D3B6E5-C46C-443A-829E-C34D24E50D9D}" type="presParOf" srcId="{FD119F9E-325C-41AB-8BDC-67AC0AFBA3C0}" destId="{62D8B1E4-9D30-41FF-9379-3646DF0F5AD0}" srcOrd="1" destOrd="0" presId="urn:microsoft.com/office/officeart/2005/8/layout/hierarchy2"/>
-  </dgm:cxnLst>
-  <dgm:bg/>
-  <dgm:whole/>
-  <dgm:extLst>
-    <a:ext uri="http://schemas.microsoft.com/office/drawing/2008/diagram">
-      <dsp:dataModelExt xmlns:dsp="http://schemas.microsoft.com/office/drawing/2008/diagram" relId="rId7" minVer="http://schemas.openxmlformats.org/drawingml/2006/diagram"/>
-    </a:ext>
-  </dgm:extLst>
-</dgm:dataModel>
-</file>
-
-<file path=ppt/diagrams/data2.xml><?xml version="1.0" encoding="utf-8"?>
-<dgm:dataModel xmlns:dgm="http://schemas.openxmlformats.org/drawingml/2006/diagram" xmlns:a="http://schemas.openxmlformats.org/drawingml/2006/main">
-  <dgm:ptLst>
-    <dgm:pt modelId="{9B0FD355-DB49-4E50-9133-11E85BAE3D97}" type="doc">
-      <dgm:prSet loTypeId="urn:microsoft.com/office/officeart/2005/8/layout/hierarchy1" loCatId="hierarchy" qsTypeId="urn:microsoft.com/office/officeart/2005/8/quickstyle/simple5" qsCatId="simple" csTypeId="urn:microsoft.com/office/officeart/2005/8/colors/colorful2" csCatId="colorful" phldr="1"/>
-      <dgm:spPr/>
-      <dgm:t>
-        <a:bodyPr/>
-        <a:lstStyle/>
-        <a:p>
-          <a:endParaRPr lang="en-US"/>
-        </a:p>
-      </dgm:t>
-    </dgm:pt>
-    <dgm:pt modelId="{326489E0-003A-46D2-AD5C-D8CA1E221D10}">
-      <dgm:prSet/>
-      <dgm:spPr/>
-      <dgm:t>
-        <a:bodyPr/>
-        <a:lstStyle/>
-        <a:p>
-          <a:r>
-            <a:rPr lang="en-US" b="1"/>
-            <a:t>Dataset Used:</a:t>
-          </a:r>
-          <a:endParaRPr lang="en-US" dirty="0"/>
-        </a:p>
-      </dgm:t>
-    </dgm:pt>
-    <dgm:pt modelId="{EBCAB1E5-12E4-4B60-A4B9-3E79AEC5F112}" type="parTrans" cxnId="{3CD25658-9C0A-45C1-8B44-36AAFBF3F1A9}">
-      <dgm:prSet/>
-      <dgm:spPr/>
-      <dgm:t>
-        <a:bodyPr/>
-        <a:lstStyle/>
-        <a:p>
-          <a:endParaRPr lang="en-US"/>
-        </a:p>
-      </dgm:t>
-    </dgm:pt>
-    <dgm:pt modelId="{967FE380-572D-40EF-BFBD-DA515F0D1528}" type="sibTrans" cxnId="{3CD25658-9C0A-45C1-8B44-36AAFBF3F1A9}">
-      <dgm:prSet/>
-      <dgm:spPr/>
-      <dgm:t>
-        <a:bodyPr/>
-        <a:lstStyle/>
-        <a:p>
-          <a:endParaRPr lang="en-US"/>
-        </a:p>
-      </dgm:t>
-    </dgm:pt>
-    <dgm:pt modelId="{2C130556-FD20-4C9D-8A22-ACC03551E227}">
-      <dgm:prSet/>
-      <dgm:spPr/>
-      <dgm:t>
-        <a:bodyPr/>
-        <a:lstStyle/>
-        <a:p>
-          <a:r>
-            <a:rPr lang="en-US" dirty="0"/>
-            <a:t>We have chosen to analyze data to 2019 for two key reasons:</a:t>
-          </a:r>
-        </a:p>
-      </dgm:t>
-    </dgm:pt>
-    <dgm:pt modelId="{7787E97A-30EE-440D-943A-4FB8EBAFC7F4}" type="parTrans" cxnId="{544689EA-E840-425E-B55D-B6A58E0AB76F}">
-      <dgm:prSet/>
-      <dgm:spPr/>
-      <dgm:t>
-        <a:bodyPr/>
-        <a:lstStyle/>
-        <a:p>
-          <a:endParaRPr lang="en-US"/>
-        </a:p>
-      </dgm:t>
-    </dgm:pt>
-    <dgm:pt modelId="{3EBAB516-AE67-40A8-9379-E515BE0F1A1E}" type="sibTrans" cxnId="{544689EA-E840-425E-B55D-B6A58E0AB76F}">
-      <dgm:prSet/>
-      <dgm:spPr/>
-      <dgm:t>
-        <a:bodyPr/>
-        <a:lstStyle/>
-        <a:p>
-          <a:endParaRPr lang="en-US"/>
-        </a:p>
-      </dgm:t>
-    </dgm:pt>
-    <dgm:pt modelId="{289C10CA-6A5A-4919-8382-6A2E08AC5FEE}">
-      <dgm:prSet/>
-      <dgm:spPr/>
-      <dgm:t>
-        <a:bodyPr/>
-        <a:lstStyle/>
-        <a:p>
-          <a:r>
-            <a:rPr lang="en-US" dirty="0"/>
-            <a:t>Including 2020 data would have reduced the number of countries that met our study’s criteria (as more countries would have null entries for certain fields);</a:t>
-          </a:r>
-        </a:p>
-      </dgm:t>
-    </dgm:pt>
-    <dgm:pt modelId="{45E73EBF-D339-4D8D-A1BA-4B9C4DAE2F7F}" type="parTrans" cxnId="{C25E14F9-F796-4A32-A406-40A1E624CC7A}">
-      <dgm:prSet/>
-      <dgm:spPr/>
-      <dgm:t>
-        <a:bodyPr/>
-        <a:lstStyle/>
-        <a:p>
-          <a:endParaRPr lang="en-US"/>
-        </a:p>
-      </dgm:t>
-    </dgm:pt>
-    <dgm:pt modelId="{2EBD0BF0-DD0A-457A-BD45-1FF6DDB8577C}" type="sibTrans" cxnId="{C25E14F9-F796-4A32-A406-40A1E624CC7A}">
-      <dgm:prSet/>
-      <dgm:spPr/>
-      <dgm:t>
-        <a:bodyPr/>
-        <a:lstStyle/>
-        <a:p>
-          <a:endParaRPr lang="en-US"/>
-        </a:p>
-      </dgm:t>
-    </dgm:pt>
-    <dgm:pt modelId="{ED53C24B-2D25-48F3-A13F-FF4C746EC8DE}">
-      <dgm:prSet/>
-      <dgm:spPr/>
-      <dgm:t>
-        <a:bodyPr/>
-        <a:lstStyle/>
-        <a:p>
-          <a:r>
-            <a:rPr lang="en-US"/>
-            <a:t>The impact of covid on both GDP and net-migration was dramatic. By excluding 2020 data we’re likely to get a more reliable approximation of population growth’s effect on GDP growth.</a:t>
-          </a:r>
-        </a:p>
-      </dgm:t>
-    </dgm:pt>
-    <dgm:pt modelId="{9F137101-21C4-4901-BDBF-83984DA40137}" type="parTrans" cxnId="{0C7FDD56-3C74-4672-9DFB-89956622C333}">
-      <dgm:prSet/>
-      <dgm:spPr/>
-      <dgm:t>
-        <a:bodyPr/>
-        <a:lstStyle/>
-        <a:p>
-          <a:endParaRPr lang="en-US"/>
-        </a:p>
-      </dgm:t>
-    </dgm:pt>
-    <dgm:pt modelId="{EA076752-7866-4166-88F8-14D96391DB80}" type="sibTrans" cxnId="{0C7FDD56-3C74-4672-9DFB-89956622C333}">
-      <dgm:prSet/>
-      <dgm:spPr/>
-      <dgm:t>
-        <a:bodyPr/>
-        <a:lstStyle/>
-        <a:p>
-          <a:endParaRPr lang="en-US"/>
-        </a:p>
-      </dgm:t>
-    </dgm:pt>
-    <dgm:pt modelId="{94B6A35C-86B4-492B-8D79-1CDFCD6E2708}" type="pres">
-      <dgm:prSet presAssocID="{9B0FD355-DB49-4E50-9133-11E85BAE3D97}" presName="hierChild1" presStyleCnt="0">
-        <dgm:presLayoutVars>
-          <dgm:chPref val="1"/>
-          <dgm:dir/>
-          <dgm:animOne val="branch"/>
-          <dgm:animLvl val="lvl"/>
-          <dgm:resizeHandles/>
-        </dgm:presLayoutVars>
-      </dgm:prSet>
-      <dgm:spPr/>
-    </dgm:pt>
-    <dgm:pt modelId="{54648CDF-3D17-4B2E-8215-7482DD435532}" type="pres">
-      <dgm:prSet presAssocID="{326489E0-003A-46D2-AD5C-D8CA1E221D10}" presName="hierRoot1" presStyleCnt="0"/>
-      <dgm:spPr/>
-    </dgm:pt>
-    <dgm:pt modelId="{32C5B5B8-4D5E-4A2E-A586-3F996872425D}" type="pres">
-      <dgm:prSet presAssocID="{326489E0-003A-46D2-AD5C-D8CA1E221D10}" presName="composite" presStyleCnt="0"/>
-      <dgm:spPr/>
-    </dgm:pt>
-    <dgm:pt modelId="{DD8AA830-BFE4-4C98-AFAE-B058422F4300}" type="pres">
-      <dgm:prSet presAssocID="{326489E0-003A-46D2-AD5C-D8CA1E221D10}" presName="background" presStyleLbl="node0" presStyleIdx="0" presStyleCnt="2"/>
-      <dgm:spPr/>
-    </dgm:pt>
-    <dgm:pt modelId="{86EA6B4B-22AC-494C-A104-BB7F10B33773}" type="pres">
-      <dgm:prSet presAssocID="{326489E0-003A-46D2-AD5C-D8CA1E221D10}" presName="text" presStyleLbl="fgAcc0" presStyleIdx="0" presStyleCnt="2" custLinFactNeighborX="-88613" custLinFactNeighborY="-99176">
-        <dgm:presLayoutVars>
-          <dgm:chPref val="3"/>
-        </dgm:presLayoutVars>
-      </dgm:prSet>
-      <dgm:spPr/>
-    </dgm:pt>
-    <dgm:pt modelId="{E367AF02-00E9-4703-B971-F342A10EB0D7}" type="pres">
-      <dgm:prSet presAssocID="{326489E0-003A-46D2-AD5C-D8CA1E221D10}" presName="hierChild2" presStyleCnt="0"/>
-      <dgm:spPr/>
-    </dgm:pt>
-    <dgm:pt modelId="{62463B54-6FA0-4B1E-854B-75655351D443}" type="pres">
-      <dgm:prSet presAssocID="{2C130556-FD20-4C9D-8A22-ACC03551E227}" presName="hierRoot1" presStyleCnt="0"/>
-      <dgm:spPr/>
-    </dgm:pt>
-    <dgm:pt modelId="{F851BE65-03CF-4B5D-AB3C-F731E213EDE7}" type="pres">
-      <dgm:prSet presAssocID="{2C130556-FD20-4C9D-8A22-ACC03551E227}" presName="composite" presStyleCnt="0"/>
-      <dgm:spPr/>
-    </dgm:pt>
-    <dgm:pt modelId="{13BA4A8B-C448-4D9A-BA2B-33F405BC663F}" type="pres">
-      <dgm:prSet presAssocID="{2C130556-FD20-4C9D-8A22-ACC03551E227}" presName="background" presStyleLbl="node0" presStyleIdx="1" presStyleCnt="2"/>
-      <dgm:spPr/>
-    </dgm:pt>
-    <dgm:pt modelId="{E22E8E0E-072C-422A-A74B-05BF11ACAE6D}" type="pres">
-      <dgm:prSet presAssocID="{2C130556-FD20-4C9D-8A22-ACC03551E227}" presName="text" presStyleLbl="fgAcc0" presStyleIdx="1" presStyleCnt="2">
-        <dgm:presLayoutVars>
-          <dgm:chPref val="3"/>
-        </dgm:presLayoutVars>
-      </dgm:prSet>
-      <dgm:spPr/>
-    </dgm:pt>
-    <dgm:pt modelId="{76126FDD-7AC7-4D7E-A73A-9FB86AFAE4D7}" type="pres">
-      <dgm:prSet presAssocID="{2C130556-FD20-4C9D-8A22-ACC03551E227}" presName="hierChild2" presStyleCnt="0"/>
-      <dgm:spPr/>
-    </dgm:pt>
-    <dgm:pt modelId="{0859CE55-EAA6-4F97-B010-C8C68BF1C9EF}" type="pres">
-      <dgm:prSet presAssocID="{45E73EBF-D339-4D8D-A1BA-4B9C4DAE2F7F}" presName="Name10" presStyleLbl="parChTrans1D2" presStyleIdx="0" presStyleCnt="2"/>
-      <dgm:spPr/>
-    </dgm:pt>
-    <dgm:pt modelId="{A2677F7E-CE7C-4ADE-8775-678AAA4DB29D}" type="pres">
-      <dgm:prSet presAssocID="{289C10CA-6A5A-4919-8382-6A2E08AC5FEE}" presName="hierRoot2" presStyleCnt="0"/>
-      <dgm:spPr/>
-    </dgm:pt>
-    <dgm:pt modelId="{55C34F2F-F75A-4D9D-BF6B-33CDF1DA682B}" type="pres">
-      <dgm:prSet presAssocID="{289C10CA-6A5A-4919-8382-6A2E08AC5FEE}" presName="composite2" presStyleCnt="0"/>
-      <dgm:spPr/>
-    </dgm:pt>
-    <dgm:pt modelId="{B08E0912-614D-4940-887B-58CCF2771A2E}" type="pres">
-      <dgm:prSet presAssocID="{289C10CA-6A5A-4919-8382-6A2E08AC5FEE}" presName="background2" presStyleLbl="node2" presStyleIdx="0" presStyleCnt="2"/>
-      <dgm:spPr/>
-    </dgm:pt>
-    <dgm:pt modelId="{83EE13E5-645D-4EB8-B3A3-5FA8441CD3A7}" type="pres">
-      <dgm:prSet presAssocID="{289C10CA-6A5A-4919-8382-6A2E08AC5FEE}" presName="text2" presStyleLbl="fgAcc2" presStyleIdx="0" presStyleCnt="2">
-        <dgm:presLayoutVars>
-          <dgm:chPref val="3"/>
-        </dgm:presLayoutVars>
-      </dgm:prSet>
-      <dgm:spPr/>
-    </dgm:pt>
-    <dgm:pt modelId="{1129AEB5-871F-4EB2-90A2-7BD0FCAF9493}" type="pres">
-      <dgm:prSet presAssocID="{289C10CA-6A5A-4919-8382-6A2E08AC5FEE}" presName="hierChild3" presStyleCnt="0"/>
-      <dgm:spPr/>
-    </dgm:pt>
-    <dgm:pt modelId="{63AFB486-1C84-47E9-8E84-34B5C98A7757}" type="pres">
-      <dgm:prSet presAssocID="{9F137101-21C4-4901-BDBF-83984DA40137}" presName="Name10" presStyleLbl="parChTrans1D2" presStyleIdx="1" presStyleCnt="2"/>
-      <dgm:spPr/>
-    </dgm:pt>
-    <dgm:pt modelId="{26162867-A803-4320-B3C7-ADA5C13785DE}" type="pres">
-      <dgm:prSet presAssocID="{ED53C24B-2D25-48F3-A13F-FF4C746EC8DE}" presName="hierRoot2" presStyleCnt="0"/>
-      <dgm:spPr/>
-    </dgm:pt>
-    <dgm:pt modelId="{F8C02A56-1CB4-417B-ACE2-82854324D721}" type="pres">
-      <dgm:prSet presAssocID="{ED53C24B-2D25-48F3-A13F-FF4C746EC8DE}" presName="composite2" presStyleCnt="0"/>
-      <dgm:spPr/>
-    </dgm:pt>
-    <dgm:pt modelId="{D02A2892-5DEB-4D0B-A1F5-0067FD962848}" type="pres">
-      <dgm:prSet presAssocID="{ED53C24B-2D25-48F3-A13F-FF4C746EC8DE}" presName="background2" presStyleLbl="node2" presStyleIdx="1" presStyleCnt="2"/>
-      <dgm:spPr/>
-    </dgm:pt>
-    <dgm:pt modelId="{84FC5D8F-3E2A-4408-A91A-147E9DAB4620}" type="pres">
-      <dgm:prSet presAssocID="{ED53C24B-2D25-48F3-A13F-FF4C746EC8DE}" presName="text2" presStyleLbl="fgAcc2" presStyleIdx="1" presStyleCnt="2">
-        <dgm:presLayoutVars>
-          <dgm:chPref val="3"/>
-        </dgm:presLayoutVars>
-      </dgm:prSet>
-      <dgm:spPr/>
-    </dgm:pt>
-    <dgm:pt modelId="{1C8F9768-DEA7-4C6B-8165-C22C23BBCA47}" type="pres">
-      <dgm:prSet presAssocID="{ED53C24B-2D25-48F3-A13F-FF4C746EC8DE}" presName="hierChild3" presStyleCnt="0"/>
-      <dgm:spPr/>
-    </dgm:pt>
-  </dgm:ptLst>
-  <dgm:cxnLst>
-    <dgm:cxn modelId="{A305863D-E30F-4C73-B8E3-C5AE1AC07D3C}" type="presOf" srcId="{ED53C24B-2D25-48F3-A13F-FF4C746EC8DE}" destId="{84FC5D8F-3E2A-4408-A91A-147E9DAB4620}" srcOrd="0" destOrd="0" presId="urn:microsoft.com/office/officeart/2005/8/layout/hierarchy1"/>
-    <dgm:cxn modelId="{51B33E5D-237A-4645-9C33-98E9E08ED6F1}" type="presOf" srcId="{9B0FD355-DB49-4E50-9133-11E85BAE3D97}" destId="{94B6A35C-86B4-492B-8D79-1CDFCD6E2708}" srcOrd="0" destOrd="0" presId="urn:microsoft.com/office/officeart/2005/8/layout/hierarchy1"/>
-    <dgm:cxn modelId="{C9FF484C-6B05-4507-B9A7-4BF6A0AEE966}" type="presOf" srcId="{2C130556-FD20-4C9D-8A22-ACC03551E227}" destId="{E22E8E0E-072C-422A-A74B-05BF11ACAE6D}" srcOrd="0" destOrd="0" presId="urn:microsoft.com/office/officeart/2005/8/layout/hierarchy1"/>
-    <dgm:cxn modelId="{2FC8CA71-5AD2-466C-8291-F9A0A91C2B63}" type="presOf" srcId="{326489E0-003A-46D2-AD5C-D8CA1E221D10}" destId="{86EA6B4B-22AC-494C-A104-BB7F10B33773}" srcOrd="0" destOrd="0" presId="urn:microsoft.com/office/officeart/2005/8/layout/hierarchy1"/>
-    <dgm:cxn modelId="{0C7FDD56-3C74-4672-9DFB-89956622C333}" srcId="{2C130556-FD20-4C9D-8A22-ACC03551E227}" destId="{ED53C24B-2D25-48F3-A13F-FF4C746EC8DE}" srcOrd="1" destOrd="0" parTransId="{9F137101-21C4-4901-BDBF-83984DA40137}" sibTransId="{EA076752-7866-4166-88F8-14D96391DB80}"/>
-    <dgm:cxn modelId="{3CD25658-9C0A-45C1-8B44-36AAFBF3F1A9}" srcId="{9B0FD355-DB49-4E50-9133-11E85BAE3D97}" destId="{326489E0-003A-46D2-AD5C-D8CA1E221D10}" srcOrd="0" destOrd="0" parTransId="{EBCAB1E5-12E4-4B60-A4B9-3E79AEC5F112}" sibTransId="{967FE380-572D-40EF-BFBD-DA515F0D1528}"/>
-    <dgm:cxn modelId="{4B99BA94-AB71-42CC-825F-C5D4668EBE60}" type="presOf" srcId="{9F137101-21C4-4901-BDBF-83984DA40137}" destId="{63AFB486-1C84-47E9-8E84-34B5C98A7757}" srcOrd="0" destOrd="0" presId="urn:microsoft.com/office/officeart/2005/8/layout/hierarchy1"/>
-    <dgm:cxn modelId="{313D9AD6-2E20-470A-A06C-B55FD2B30D88}" type="presOf" srcId="{289C10CA-6A5A-4919-8382-6A2E08AC5FEE}" destId="{83EE13E5-645D-4EB8-B3A3-5FA8441CD3A7}" srcOrd="0" destOrd="0" presId="urn:microsoft.com/office/officeart/2005/8/layout/hierarchy1"/>
-    <dgm:cxn modelId="{544689EA-E840-425E-B55D-B6A58E0AB76F}" srcId="{9B0FD355-DB49-4E50-9133-11E85BAE3D97}" destId="{2C130556-FD20-4C9D-8A22-ACC03551E227}" srcOrd="1" destOrd="0" parTransId="{7787E97A-30EE-440D-943A-4FB8EBAFC7F4}" sibTransId="{3EBAB516-AE67-40A8-9379-E515BE0F1A1E}"/>
-    <dgm:cxn modelId="{1B3929F7-E99D-4380-BCC2-259538A783E8}" type="presOf" srcId="{45E73EBF-D339-4D8D-A1BA-4B9C4DAE2F7F}" destId="{0859CE55-EAA6-4F97-B010-C8C68BF1C9EF}" srcOrd="0" destOrd="0" presId="urn:microsoft.com/office/officeart/2005/8/layout/hierarchy1"/>
-    <dgm:cxn modelId="{C25E14F9-F796-4A32-A406-40A1E624CC7A}" srcId="{2C130556-FD20-4C9D-8A22-ACC03551E227}" destId="{289C10CA-6A5A-4919-8382-6A2E08AC5FEE}" srcOrd="0" destOrd="0" parTransId="{45E73EBF-D339-4D8D-A1BA-4B9C4DAE2F7F}" sibTransId="{2EBD0BF0-DD0A-457A-BD45-1FF6DDB8577C}"/>
-    <dgm:cxn modelId="{E0EEB65E-0BD1-43CB-9419-37EBAACBD66F}" type="presParOf" srcId="{94B6A35C-86B4-492B-8D79-1CDFCD6E2708}" destId="{54648CDF-3D17-4B2E-8215-7482DD435532}" srcOrd="0" destOrd="0" presId="urn:microsoft.com/office/officeart/2005/8/layout/hierarchy1"/>
-    <dgm:cxn modelId="{67BFDBF7-CDC1-4AF6-8C3A-99650FD47D77}" type="presParOf" srcId="{54648CDF-3D17-4B2E-8215-7482DD435532}" destId="{32C5B5B8-4D5E-4A2E-A586-3F996872425D}" srcOrd="0" destOrd="0" presId="urn:microsoft.com/office/officeart/2005/8/layout/hierarchy1"/>
-    <dgm:cxn modelId="{75CA4A37-7A94-4C9C-B8C7-6912C442F5AD}" type="presParOf" srcId="{32C5B5B8-4D5E-4A2E-A586-3F996872425D}" destId="{DD8AA830-BFE4-4C98-AFAE-B058422F4300}" srcOrd="0" destOrd="0" presId="urn:microsoft.com/office/officeart/2005/8/layout/hierarchy1"/>
-    <dgm:cxn modelId="{52E58909-8087-4E4A-8C9E-1F095CF2A2DD}" type="presParOf" srcId="{32C5B5B8-4D5E-4A2E-A586-3F996872425D}" destId="{86EA6B4B-22AC-494C-A104-BB7F10B33773}" srcOrd="1" destOrd="0" presId="urn:microsoft.com/office/officeart/2005/8/layout/hierarchy1"/>
-    <dgm:cxn modelId="{CC46E324-3DC1-4760-B7B7-3F5F9677C268}" type="presParOf" srcId="{54648CDF-3D17-4B2E-8215-7482DD435532}" destId="{E367AF02-00E9-4703-B971-F342A10EB0D7}" srcOrd="1" destOrd="0" presId="urn:microsoft.com/office/officeart/2005/8/layout/hierarchy1"/>
-    <dgm:cxn modelId="{DBC17096-67EB-48A6-93C4-7B0A29F8BAC6}" type="presParOf" srcId="{94B6A35C-86B4-492B-8D79-1CDFCD6E2708}" destId="{62463B54-6FA0-4B1E-854B-75655351D443}" srcOrd="1" destOrd="0" presId="urn:microsoft.com/office/officeart/2005/8/layout/hierarchy1"/>
-    <dgm:cxn modelId="{F35A21D9-E4B8-4B5C-BB57-09D6FA870160}" type="presParOf" srcId="{62463B54-6FA0-4B1E-854B-75655351D443}" destId="{F851BE65-03CF-4B5D-AB3C-F731E213EDE7}" srcOrd="0" destOrd="0" presId="urn:microsoft.com/office/officeart/2005/8/layout/hierarchy1"/>
-    <dgm:cxn modelId="{C3405A3C-111E-45CA-9C6C-66D21372C0AE}" type="presParOf" srcId="{F851BE65-03CF-4B5D-AB3C-F731E213EDE7}" destId="{13BA4A8B-C448-4D9A-BA2B-33F405BC663F}" srcOrd="0" destOrd="0" presId="urn:microsoft.com/office/officeart/2005/8/layout/hierarchy1"/>
-    <dgm:cxn modelId="{76437DD1-6371-4AB2-9530-FBB7D9B98901}" type="presParOf" srcId="{F851BE65-03CF-4B5D-AB3C-F731E213EDE7}" destId="{E22E8E0E-072C-422A-A74B-05BF11ACAE6D}" srcOrd="1" destOrd="0" presId="urn:microsoft.com/office/officeart/2005/8/layout/hierarchy1"/>
-    <dgm:cxn modelId="{38E937BD-F471-4202-89BE-E70399F40C76}" type="presParOf" srcId="{62463B54-6FA0-4B1E-854B-75655351D443}" destId="{76126FDD-7AC7-4D7E-A73A-9FB86AFAE4D7}" srcOrd="1" destOrd="0" presId="urn:microsoft.com/office/officeart/2005/8/layout/hierarchy1"/>
-    <dgm:cxn modelId="{D748EC84-65F3-4159-8057-7D8F92DF5571}" type="presParOf" srcId="{76126FDD-7AC7-4D7E-A73A-9FB86AFAE4D7}" destId="{0859CE55-EAA6-4F97-B010-C8C68BF1C9EF}" srcOrd="0" destOrd="0" presId="urn:microsoft.com/office/officeart/2005/8/layout/hierarchy1"/>
-    <dgm:cxn modelId="{8F84AD04-B3A2-4B24-8F29-1D1559934E8D}" type="presParOf" srcId="{76126FDD-7AC7-4D7E-A73A-9FB86AFAE4D7}" destId="{A2677F7E-CE7C-4ADE-8775-678AAA4DB29D}" srcOrd="1" destOrd="0" presId="urn:microsoft.com/office/officeart/2005/8/layout/hierarchy1"/>
-    <dgm:cxn modelId="{66157852-10E5-49F7-9C45-FA5942723BB3}" type="presParOf" srcId="{A2677F7E-CE7C-4ADE-8775-678AAA4DB29D}" destId="{55C34F2F-F75A-4D9D-BF6B-33CDF1DA682B}" srcOrd="0" destOrd="0" presId="urn:microsoft.com/office/officeart/2005/8/layout/hierarchy1"/>
-    <dgm:cxn modelId="{3CBB392E-929D-4D6E-979D-A17675EB634A}" type="presParOf" srcId="{55C34F2F-F75A-4D9D-BF6B-33CDF1DA682B}" destId="{B08E0912-614D-4940-887B-58CCF2771A2E}" srcOrd="0" destOrd="0" presId="urn:microsoft.com/office/officeart/2005/8/layout/hierarchy1"/>
-    <dgm:cxn modelId="{E1207923-63C4-43E6-92AB-A8CF9023B398}" type="presParOf" srcId="{55C34F2F-F75A-4D9D-BF6B-33CDF1DA682B}" destId="{83EE13E5-645D-4EB8-B3A3-5FA8441CD3A7}" srcOrd="1" destOrd="0" presId="urn:microsoft.com/office/officeart/2005/8/layout/hierarchy1"/>
-    <dgm:cxn modelId="{7AD1F473-E162-40A1-A0CB-336CFAAF7615}" type="presParOf" srcId="{A2677F7E-CE7C-4ADE-8775-678AAA4DB29D}" destId="{1129AEB5-871F-4EB2-90A2-7BD0FCAF9493}" srcOrd="1" destOrd="0" presId="urn:microsoft.com/office/officeart/2005/8/layout/hierarchy1"/>
-    <dgm:cxn modelId="{E1FF567C-F6EE-4510-B6AF-1E3012D19BF2}" type="presParOf" srcId="{76126FDD-7AC7-4D7E-A73A-9FB86AFAE4D7}" destId="{63AFB486-1C84-47E9-8E84-34B5C98A7757}" srcOrd="2" destOrd="0" presId="urn:microsoft.com/office/officeart/2005/8/layout/hierarchy1"/>
-    <dgm:cxn modelId="{3864A5FA-1C3A-47AB-AAF3-35B7BEEC76E5}" type="presParOf" srcId="{76126FDD-7AC7-4D7E-A73A-9FB86AFAE4D7}" destId="{26162867-A803-4320-B3C7-ADA5C13785DE}" srcOrd="3" destOrd="0" presId="urn:microsoft.com/office/officeart/2005/8/layout/hierarchy1"/>
-    <dgm:cxn modelId="{532060A4-8F94-4495-9947-4306AAAA808F}" type="presParOf" srcId="{26162867-A803-4320-B3C7-ADA5C13785DE}" destId="{F8C02A56-1CB4-417B-ACE2-82854324D721}" srcOrd="0" destOrd="0" presId="urn:microsoft.com/office/officeart/2005/8/layout/hierarchy1"/>
-    <dgm:cxn modelId="{BCECC7F7-037D-4E50-90F5-A8506406B9D9}" type="presParOf" srcId="{F8C02A56-1CB4-417B-ACE2-82854324D721}" destId="{D02A2892-5DEB-4D0B-A1F5-0067FD962848}" srcOrd="0" destOrd="0" presId="urn:microsoft.com/office/officeart/2005/8/layout/hierarchy1"/>
-    <dgm:cxn modelId="{42E6240E-7DC5-4E56-B909-23823B9280B8}" type="presParOf" srcId="{F8C02A56-1CB4-417B-ACE2-82854324D721}" destId="{84FC5D8F-3E2A-4408-A91A-147E9DAB4620}" srcOrd="1" destOrd="0" presId="urn:microsoft.com/office/officeart/2005/8/layout/hierarchy1"/>
-    <dgm:cxn modelId="{CD18DE82-B81F-4929-9ACA-39C0992AE876}" type="presParOf" srcId="{26162867-A803-4320-B3C7-ADA5C13785DE}" destId="{1C8F9768-DEA7-4C6B-8165-C22C23BBCA47}" srcOrd="1" destOrd="0" presId="urn:microsoft.com/office/officeart/2005/8/layout/hierarchy1"/>
   </dgm:cxnLst>
   <dgm:bg/>
   <dgm:whole/>
@@ -5009,773 +3906,6 @@
 </dsp:drawing>
 </file>
 
-<file path=ppt/diagrams/drawing2.xml><?xml version="1.0" encoding="utf-8"?>
-<dsp:drawing xmlns:dgm="http://schemas.openxmlformats.org/drawingml/2006/diagram" xmlns:dsp="http://schemas.microsoft.com/office/drawing/2008/diagram" xmlns:a="http://schemas.openxmlformats.org/drawingml/2006/main">
-  <dsp:spTree>
-    <dsp:nvGrpSpPr>
-      <dsp:cNvPr id="0" name=""/>
-      <dsp:cNvGrpSpPr/>
-    </dsp:nvGrpSpPr>
-    <dsp:grpSpPr/>
-    <dsp:sp modelId="{63AFB486-1C84-47E9-8E84-34B5C98A7757}">
-      <dsp:nvSpPr>
-        <dsp:cNvPr id="0" name=""/>
-        <dsp:cNvSpPr/>
-      </dsp:nvSpPr>
-      <dsp:spPr>
-        <a:xfrm>
-          <a:off x="6149674" y="2383010"/>
-          <a:ext cx="2180138" cy="1037547"/>
-        </a:xfrm>
-        <a:custGeom>
-          <a:avLst/>
-          <a:gdLst/>
-          <a:ahLst/>
-          <a:cxnLst/>
-          <a:rect l="0" t="0" r="0" b="0"/>
-          <a:pathLst>
-            <a:path>
-              <a:moveTo>
-                <a:pt x="0" y="0"/>
-              </a:moveTo>
-              <a:lnTo>
-                <a:pt x="0" y="707058"/>
-              </a:lnTo>
-              <a:lnTo>
-                <a:pt x="2180138" y="707058"/>
-              </a:lnTo>
-              <a:lnTo>
-                <a:pt x="2180138" y="1037547"/>
-              </a:lnTo>
-            </a:path>
-          </a:pathLst>
-        </a:custGeom>
-        <a:noFill/>
-        <a:ln w="12700" cap="flat" cmpd="sng" algn="ctr">
-          <a:solidFill>
-            <a:schemeClr val="accent3">
-              <a:hueOff val="0"/>
-              <a:satOff val="0"/>
-              <a:lumOff val="0"/>
-              <a:alphaOff val="0"/>
-            </a:schemeClr>
-          </a:solidFill>
-          <a:prstDash val="solid"/>
-          <a:miter lim="800000"/>
-        </a:ln>
-        <a:effectLst/>
-      </dsp:spPr>
-      <dsp:style>
-        <a:lnRef idx="2">
-          <a:scrgbClr r="0" g="0" b="0"/>
-        </a:lnRef>
-        <a:fillRef idx="0">
-          <a:scrgbClr r="0" g="0" b="0"/>
-        </a:fillRef>
-        <a:effectRef idx="0">
-          <a:scrgbClr r="0" g="0" b="0"/>
-        </a:effectRef>
-        <a:fontRef idx="minor"/>
-      </dsp:style>
-    </dsp:sp>
-    <dsp:sp modelId="{0859CE55-EAA6-4F97-B010-C8C68BF1C9EF}">
-      <dsp:nvSpPr>
-        <dsp:cNvPr id="0" name=""/>
-        <dsp:cNvSpPr/>
-      </dsp:nvSpPr>
-      <dsp:spPr>
-        <a:xfrm>
-          <a:off x="3969536" y="2383010"/>
-          <a:ext cx="2180138" cy="1037547"/>
-        </a:xfrm>
-        <a:custGeom>
-          <a:avLst/>
-          <a:gdLst/>
-          <a:ahLst/>
-          <a:cxnLst/>
-          <a:rect l="0" t="0" r="0" b="0"/>
-          <a:pathLst>
-            <a:path>
-              <a:moveTo>
-                <a:pt x="2180138" y="0"/>
-              </a:moveTo>
-              <a:lnTo>
-                <a:pt x="2180138" y="707058"/>
-              </a:lnTo>
-              <a:lnTo>
-                <a:pt x="0" y="707058"/>
-              </a:lnTo>
-              <a:lnTo>
-                <a:pt x="0" y="1037547"/>
-              </a:lnTo>
-            </a:path>
-          </a:pathLst>
-        </a:custGeom>
-        <a:noFill/>
-        <a:ln w="12700" cap="flat" cmpd="sng" algn="ctr">
-          <a:solidFill>
-            <a:schemeClr val="accent3">
-              <a:hueOff val="0"/>
-              <a:satOff val="0"/>
-              <a:lumOff val="0"/>
-              <a:alphaOff val="0"/>
-            </a:schemeClr>
-          </a:solidFill>
-          <a:prstDash val="solid"/>
-          <a:miter lim="800000"/>
-        </a:ln>
-        <a:effectLst/>
-      </dsp:spPr>
-      <dsp:style>
-        <a:lnRef idx="2">
-          <a:scrgbClr r="0" g="0" b="0"/>
-        </a:lnRef>
-        <a:fillRef idx="0">
-          <a:scrgbClr r="0" g="0" b="0"/>
-        </a:fillRef>
-        <a:effectRef idx="0">
-          <a:scrgbClr r="0" g="0" b="0"/>
-        </a:effectRef>
-        <a:fontRef idx="minor"/>
-      </dsp:style>
-    </dsp:sp>
-    <dsp:sp modelId="{DD8AA830-BFE4-4C98-AFAE-B058422F4300}">
-      <dsp:nvSpPr>
-        <dsp:cNvPr id="0" name=""/>
-        <dsp:cNvSpPr/>
-      </dsp:nvSpPr>
-      <dsp:spPr>
-        <a:xfrm>
-          <a:off x="-396388" y="-376569"/>
-          <a:ext cx="3567499" cy="2265362"/>
-        </a:xfrm>
-        <a:prstGeom prst="roundRect">
-          <a:avLst>
-            <a:gd name="adj" fmla="val 10000"/>
-          </a:avLst>
-        </a:prstGeom>
-        <a:gradFill rotWithShape="0">
-          <a:gsLst>
-            <a:gs pos="0">
-              <a:schemeClr val="accent1">
-                <a:hueOff val="0"/>
-                <a:satOff val="0"/>
-                <a:lumOff val="0"/>
-                <a:alphaOff val="0"/>
-                <a:satMod val="103000"/>
-                <a:lumMod val="102000"/>
-                <a:tint val="94000"/>
-              </a:schemeClr>
-            </a:gs>
-            <a:gs pos="50000">
-              <a:schemeClr val="accent1">
-                <a:hueOff val="0"/>
-                <a:satOff val="0"/>
-                <a:lumOff val="0"/>
-                <a:alphaOff val="0"/>
-                <a:satMod val="110000"/>
-                <a:lumMod val="100000"/>
-                <a:shade val="100000"/>
-              </a:schemeClr>
-            </a:gs>
-            <a:gs pos="100000">
-              <a:schemeClr val="accent1">
-                <a:hueOff val="0"/>
-                <a:satOff val="0"/>
-                <a:lumOff val="0"/>
-                <a:alphaOff val="0"/>
-                <a:lumMod val="99000"/>
-                <a:satMod val="120000"/>
-                <a:shade val="78000"/>
-              </a:schemeClr>
-            </a:gs>
-          </a:gsLst>
-          <a:lin ang="5400000" scaled="0"/>
-        </a:gradFill>
-        <a:ln>
-          <a:noFill/>
-        </a:ln>
-        <a:effectLst>
-          <a:outerShdw blurRad="57150" dist="19050" dir="5400000" algn="ctr" rotWithShape="0">
-            <a:srgbClr val="000000">
-              <a:alpha val="63000"/>
-            </a:srgbClr>
-          </a:outerShdw>
-        </a:effectLst>
-      </dsp:spPr>
-      <dsp:style>
-        <a:lnRef idx="0">
-          <a:scrgbClr r="0" g="0" b="0"/>
-        </a:lnRef>
-        <a:fillRef idx="3">
-          <a:scrgbClr r="0" g="0" b="0"/>
-        </a:fillRef>
-        <a:effectRef idx="3">
-          <a:scrgbClr r="0" g="0" b="0"/>
-        </a:effectRef>
-        <a:fontRef idx="minor">
-          <a:schemeClr val="lt1"/>
-        </a:fontRef>
-      </dsp:style>
-    </dsp:sp>
-    <dsp:sp modelId="{86EA6B4B-22AC-494C-A104-BB7F10B33773}">
-      <dsp:nvSpPr>
-        <dsp:cNvPr id="0" name=""/>
-        <dsp:cNvSpPr/>
-      </dsp:nvSpPr>
-      <dsp:spPr>
-        <a:xfrm>
-          <a:off x="0" y="0"/>
-          <a:ext cx="3567499" cy="2265362"/>
-        </a:xfrm>
-        <a:prstGeom prst="roundRect">
-          <a:avLst>
-            <a:gd name="adj" fmla="val 10000"/>
-          </a:avLst>
-        </a:prstGeom>
-        <a:solidFill>
-          <a:schemeClr val="lt1">
-            <a:alpha val="90000"/>
-            <a:hueOff val="0"/>
-            <a:satOff val="0"/>
-            <a:lumOff val="0"/>
-            <a:alphaOff val="0"/>
-          </a:schemeClr>
-        </a:solidFill>
-        <a:ln w="6350" cap="flat" cmpd="sng" algn="ctr">
-          <a:solidFill>
-            <a:schemeClr val="accent1">
-              <a:hueOff val="0"/>
-              <a:satOff val="0"/>
-              <a:lumOff val="0"/>
-              <a:alphaOff val="0"/>
-            </a:schemeClr>
-          </a:solidFill>
-          <a:prstDash val="solid"/>
-          <a:miter lim="800000"/>
-        </a:ln>
-        <a:effectLst/>
-      </dsp:spPr>
-      <dsp:style>
-        <a:lnRef idx="1">
-          <a:scrgbClr r="0" g="0" b="0"/>
-        </a:lnRef>
-        <a:fillRef idx="1">
-          <a:scrgbClr r="0" g="0" b="0"/>
-        </a:fillRef>
-        <a:effectRef idx="2">
-          <a:scrgbClr r="0" g="0" b="0"/>
-        </a:effectRef>
-        <a:fontRef idx="minor"/>
-      </dsp:style>
-      <dsp:txBody>
-        <a:bodyPr spcFirstLastPara="0" vert="horz" wrap="square" lIns="76200" tIns="76200" rIns="76200" bIns="76200" numCol="1" spcCol="1270" anchor="ctr" anchorCtr="0">
-          <a:noAutofit/>
-        </a:bodyPr>
-        <a:lstStyle/>
-        <a:p>
-          <a:pPr marL="0" lvl="0" indent="0" algn="ctr" defTabSz="889000">
-            <a:lnSpc>
-              <a:spcPct val="90000"/>
-            </a:lnSpc>
-            <a:spcBef>
-              <a:spcPct val="0"/>
-            </a:spcBef>
-            <a:spcAft>
-              <a:spcPct val="35000"/>
-            </a:spcAft>
-            <a:buNone/>
-          </a:pPr>
-          <a:r>
-            <a:rPr lang="en-US" sz="2000" b="1" kern="1200"/>
-            <a:t>Dataset Used:</a:t>
-          </a:r>
-          <a:endParaRPr lang="en-US" sz="2000" kern="1200" dirty="0"/>
-        </a:p>
-      </dsp:txBody>
-      <dsp:txXfrm>
-        <a:off x="66350" y="66350"/>
-        <a:ext cx="3434799" cy="2132662"/>
-      </dsp:txXfrm>
-    </dsp:sp>
-    <dsp:sp modelId="{13BA4A8B-C448-4D9A-BA2B-33F405BC663F}">
-      <dsp:nvSpPr>
-        <dsp:cNvPr id="0" name=""/>
-        <dsp:cNvSpPr/>
-      </dsp:nvSpPr>
-      <dsp:spPr>
-        <a:xfrm>
-          <a:off x="4365925" y="117648"/>
-          <a:ext cx="3567499" cy="2265362"/>
-        </a:xfrm>
-        <a:prstGeom prst="roundRect">
-          <a:avLst>
-            <a:gd name="adj" fmla="val 10000"/>
-          </a:avLst>
-        </a:prstGeom>
-        <a:gradFill rotWithShape="0">
-          <a:gsLst>
-            <a:gs pos="0">
-              <a:schemeClr val="accent1">
-                <a:hueOff val="0"/>
-                <a:satOff val="0"/>
-                <a:lumOff val="0"/>
-                <a:alphaOff val="0"/>
-                <a:satMod val="103000"/>
-                <a:lumMod val="102000"/>
-                <a:tint val="94000"/>
-              </a:schemeClr>
-            </a:gs>
-            <a:gs pos="50000">
-              <a:schemeClr val="accent1">
-                <a:hueOff val="0"/>
-                <a:satOff val="0"/>
-                <a:lumOff val="0"/>
-                <a:alphaOff val="0"/>
-                <a:satMod val="110000"/>
-                <a:lumMod val="100000"/>
-                <a:shade val="100000"/>
-              </a:schemeClr>
-            </a:gs>
-            <a:gs pos="100000">
-              <a:schemeClr val="accent1">
-                <a:hueOff val="0"/>
-                <a:satOff val="0"/>
-                <a:lumOff val="0"/>
-                <a:alphaOff val="0"/>
-                <a:lumMod val="99000"/>
-                <a:satMod val="120000"/>
-                <a:shade val="78000"/>
-              </a:schemeClr>
-            </a:gs>
-          </a:gsLst>
-          <a:lin ang="5400000" scaled="0"/>
-        </a:gradFill>
-        <a:ln>
-          <a:noFill/>
-        </a:ln>
-        <a:effectLst>
-          <a:outerShdw blurRad="57150" dist="19050" dir="5400000" algn="ctr" rotWithShape="0">
-            <a:srgbClr val="000000">
-              <a:alpha val="63000"/>
-            </a:srgbClr>
-          </a:outerShdw>
-        </a:effectLst>
-      </dsp:spPr>
-      <dsp:style>
-        <a:lnRef idx="0">
-          <a:scrgbClr r="0" g="0" b="0"/>
-        </a:lnRef>
-        <a:fillRef idx="3">
-          <a:scrgbClr r="0" g="0" b="0"/>
-        </a:fillRef>
-        <a:effectRef idx="3">
-          <a:scrgbClr r="0" g="0" b="0"/>
-        </a:effectRef>
-        <a:fontRef idx="minor">
-          <a:schemeClr val="lt1"/>
-        </a:fontRef>
-      </dsp:style>
-    </dsp:sp>
-    <dsp:sp modelId="{E22E8E0E-072C-422A-A74B-05BF11ACAE6D}">
-      <dsp:nvSpPr>
-        <dsp:cNvPr id="0" name=""/>
-        <dsp:cNvSpPr/>
-      </dsp:nvSpPr>
-      <dsp:spPr>
-        <a:xfrm>
-          <a:off x="4762313" y="494217"/>
-          <a:ext cx="3567499" cy="2265362"/>
-        </a:xfrm>
-        <a:prstGeom prst="roundRect">
-          <a:avLst>
-            <a:gd name="adj" fmla="val 10000"/>
-          </a:avLst>
-        </a:prstGeom>
-        <a:solidFill>
-          <a:schemeClr val="lt1">
-            <a:alpha val="90000"/>
-            <a:hueOff val="0"/>
-            <a:satOff val="0"/>
-            <a:lumOff val="0"/>
-            <a:alphaOff val="0"/>
-          </a:schemeClr>
-        </a:solidFill>
-        <a:ln w="6350" cap="flat" cmpd="sng" algn="ctr">
-          <a:solidFill>
-            <a:schemeClr val="accent1">
-              <a:hueOff val="0"/>
-              <a:satOff val="0"/>
-              <a:lumOff val="0"/>
-              <a:alphaOff val="0"/>
-            </a:schemeClr>
-          </a:solidFill>
-          <a:prstDash val="solid"/>
-          <a:miter lim="800000"/>
-        </a:ln>
-        <a:effectLst/>
-      </dsp:spPr>
-      <dsp:style>
-        <a:lnRef idx="1">
-          <a:scrgbClr r="0" g="0" b="0"/>
-        </a:lnRef>
-        <a:fillRef idx="1">
-          <a:scrgbClr r="0" g="0" b="0"/>
-        </a:fillRef>
-        <a:effectRef idx="2">
-          <a:scrgbClr r="0" g="0" b="0"/>
-        </a:effectRef>
-        <a:fontRef idx="minor"/>
-      </dsp:style>
-      <dsp:txBody>
-        <a:bodyPr spcFirstLastPara="0" vert="horz" wrap="square" lIns="76200" tIns="76200" rIns="76200" bIns="76200" numCol="1" spcCol="1270" anchor="ctr" anchorCtr="0">
-          <a:noAutofit/>
-        </a:bodyPr>
-        <a:lstStyle/>
-        <a:p>
-          <a:pPr marL="0" lvl="0" indent="0" algn="ctr" defTabSz="889000">
-            <a:lnSpc>
-              <a:spcPct val="90000"/>
-            </a:lnSpc>
-            <a:spcBef>
-              <a:spcPct val="0"/>
-            </a:spcBef>
-            <a:spcAft>
-              <a:spcPct val="35000"/>
-            </a:spcAft>
-            <a:buNone/>
-          </a:pPr>
-          <a:r>
-            <a:rPr lang="en-US" sz="2000" kern="1200" dirty="0"/>
-            <a:t>We have chosen to analyze data to 2019 for two key reasons:</a:t>
-          </a:r>
-        </a:p>
-      </dsp:txBody>
-      <dsp:txXfrm>
-        <a:off x="4828663" y="560567"/>
-        <a:ext cx="3434799" cy="2132662"/>
-      </dsp:txXfrm>
-    </dsp:sp>
-    <dsp:sp modelId="{B08E0912-614D-4940-887B-58CCF2771A2E}">
-      <dsp:nvSpPr>
-        <dsp:cNvPr id="0" name=""/>
-        <dsp:cNvSpPr/>
-      </dsp:nvSpPr>
-      <dsp:spPr>
-        <a:xfrm>
-          <a:off x="2185786" y="3420558"/>
-          <a:ext cx="3567499" cy="2265362"/>
-        </a:xfrm>
-        <a:prstGeom prst="roundRect">
-          <a:avLst>
-            <a:gd name="adj" fmla="val 10000"/>
-          </a:avLst>
-        </a:prstGeom>
-        <a:gradFill rotWithShape="0">
-          <a:gsLst>
-            <a:gs pos="0">
-              <a:schemeClr val="accent3">
-                <a:hueOff val="0"/>
-                <a:satOff val="0"/>
-                <a:lumOff val="0"/>
-                <a:alphaOff val="0"/>
-                <a:satMod val="103000"/>
-                <a:lumMod val="102000"/>
-                <a:tint val="94000"/>
-              </a:schemeClr>
-            </a:gs>
-            <a:gs pos="50000">
-              <a:schemeClr val="accent3">
-                <a:hueOff val="0"/>
-                <a:satOff val="0"/>
-                <a:lumOff val="0"/>
-                <a:alphaOff val="0"/>
-                <a:satMod val="110000"/>
-                <a:lumMod val="100000"/>
-                <a:shade val="100000"/>
-              </a:schemeClr>
-            </a:gs>
-            <a:gs pos="100000">
-              <a:schemeClr val="accent3">
-                <a:hueOff val="0"/>
-                <a:satOff val="0"/>
-                <a:lumOff val="0"/>
-                <a:alphaOff val="0"/>
-                <a:lumMod val="99000"/>
-                <a:satMod val="120000"/>
-                <a:shade val="78000"/>
-              </a:schemeClr>
-            </a:gs>
-          </a:gsLst>
-          <a:lin ang="5400000" scaled="0"/>
-        </a:gradFill>
-        <a:ln>
-          <a:noFill/>
-        </a:ln>
-        <a:effectLst>
-          <a:outerShdw blurRad="57150" dist="19050" dir="5400000" algn="ctr" rotWithShape="0">
-            <a:srgbClr val="000000">
-              <a:alpha val="63000"/>
-            </a:srgbClr>
-          </a:outerShdw>
-        </a:effectLst>
-      </dsp:spPr>
-      <dsp:style>
-        <a:lnRef idx="0">
-          <a:scrgbClr r="0" g="0" b="0"/>
-        </a:lnRef>
-        <a:fillRef idx="3">
-          <a:scrgbClr r="0" g="0" b="0"/>
-        </a:fillRef>
-        <a:effectRef idx="3">
-          <a:scrgbClr r="0" g="0" b="0"/>
-        </a:effectRef>
-        <a:fontRef idx="minor">
-          <a:schemeClr val="lt1"/>
-        </a:fontRef>
-      </dsp:style>
-    </dsp:sp>
-    <dsp:sp modelId="{83EE13E5-645D-4EB8-B3A3-5FA8441CD3A7}">
-      <dsp:nvSpPr>
-        <dsp:cNvPr id="0" name=""/>
-        <dsp:cNvSpPr/>
-      </dsp:nvSpPr>
-      <dsp:spPr>
-        <a:xfrm>
-          <a:off x="2582175" y="3797127"/>
-          <a:ext cx="3567499" cy="2265362"/>
-        </a:xfrm>
-        <a:prstGeom prst="roundRect">
-          <a:avLst>
-            <a:gd name="adj" fmla="val 10000"/>
-          </a:avLst>
-        </a:prstGeom>
-        <a:solidFill>
-          <a:schemeClr val="lt1">
-            <a:alpha val="90000"/>
-            <a:hueOff val="0"/>
-            <a:satOff val="0"/>
-            <a:lumOff val="0"/>
-            <a:alphaOff val="0"/>
-          </a:schemeClr>
-        </a:solidFill>
-        <a:ln w="6350" cap="flat" cmpd="sng" algn="ctr">
-          <a:solidFill>
-            <a:schemeClr val="accent3">
-              <a:hueOff val="0"/>
-              <a:satOff val="0"/>
-              <a:lumOff val="0"/>
-              <a:alphaOff val="0"/>
-            </a:schemeClr>
-          </a:solidFill>
-          <a:prstDash val="solid"/>
-          <a:miter lim="800000"/>
-        </a:ln>
-        <a:effectLst/>
-      </dsp:spPr>
-      <dsp:style>
-        <a:lnRef idx="1">
-          <a:scrgbClr r="0" g="0" b="0"/>
-        </a:lnRef>
-        <a:fillRef idx="1">
-          <a:scrgbClr r="0" g="0" b="0"/>
-        </a:fillRef>
-        <a:effectRef idx="2">
-          <a:scrgbClr r="0" g="0" b="0"/>
-        </a:effectRef>
-        <a:fontRef idx="minor"/>
-      </dsp:style>
-      <dsp:txBody>
-        <a:bodyPr spcFirstLastPara="0" vert="horz" wrap="square" lIns="76200" tIns="76200" rIns="76200" bIns="76200" numCol="1" spcCol="1270" anchor="ctr" anchorCtr="0">
-          <a:noAutofit/>
-        </a:bodyPr>
-        <a:lstStyle/>
-        <a:p>
-          <a:pPr marL="0" lvl="0" indent="0" algn="ctr" defTabSz="889000">
-            <a:lnSpc>
-              <a:spcPct val="90000"/>
-            </a:lnSpc>
-            <a:spcBef>
-              <a:spcPct val="0"/>
-            </a:spcBef>
-            <a:spcAft>
-              <a:spcPct val="35000"/>
-            </a:spcAft>
-            <a:buNone/>
-          </a:pPr>
-          <a:r>
-            <a:rPr lang="en-US" sz="2000" kern="1200" dirty="0"/>
-            <a:t>Including 2020 data would have reduced the number of countries that met our study’s criteria (as more countries would have null entries for certain fields);</a:t>
-          </a:r>
-        </a:p>
-      </dsp:txBody>
-      <dsp:txXfrm>
-        <a:off x="2648525" y="3863477"/>
-        <a:ext cx="3434799" cy="2132662"/>
-      </dsp:txXfrm>
-    </dsp:sp>
-    <dsp:sp modelId="{D02A2892-5DEB-4D0B-A1F5-0067FD962848}">
-      <dsp:nvSpPr>
-        <dsp:cNvPr id="0" name=""/>
-        <dsp:cNvSpPr/>
-      </dsp:nvSpPr>
-      <dsp:spPr>
-        <a:xfrm>
-          <a:off x="6546063" y="3420558"/>
-          <a:ext cx="3567499" cy="2265362"/>
-        </a:xfrm>
-        <a:prstGeom prst="roundRect">
-          <a:avLst>
-            <a:gd name="adj" fmla="val 10000"/>
-          </a:avLst>
-        </a:prstGeom>
-        <a:gradFill rotWithShape="0">
-          <a:gsLst>
-            <a:gs pos="0">
-              <a:schemeClr val="accent3">
-                <a:hueOff val="0"/>
-                <a:satOff val="0"/>
-                <a:lumOff val="0"/>
-                <a:alphaOff val="0"/>
-                <a:satMod val="103000"/>
-                <a:lumMod val="102000"/>
-                <a:tint val="94000"/>
-              </a:schemeClr>
-            </a:gs>
-            <a:gs pos="50000">
-              <a:schemeClr val="accent3">
-                <a:hueOff val="0"/>
-                <a:satOff val="0"/>
-                <a:lumOff val="0"/>
-                <a:alphaOff val="0"/>
-                <a:satMod val="110000"/>
-                <a:lumMod val="100000"/>
-                <a:shade val="100000"/>
-              </a:schemeClr>
-            </a:gs>
-            <a:gs pos="100000">
-              <a:schemeClr val="accent3">
-                <a:hueOff val="0"/>
-                <a:satOff val="0"/>
-                <a:lumOff val="0"/>
-                <a:alphaOff val="0"/>
-                <a:lumMod val="99000"/>
-                <a:satMod val="120000"/>
-                <a:shade val="78000"/>
-              </a:schemeClr>
-            </a:gs>
-          </a:gsLst>
-          <a:lin ang="5400000" scaled="0"/>
-        </a:gradFill>
-        <a:ln>
-          <a:noFill/>
-        </a:ln>
-        <a:effectLst>
-          <a:outerShdw blurRad="57150" dist="19050" dir="5400000" algn="ctr" rotWithShape="0">
-            <a:srgbClr val="000000">
-              <a:alpha val="63000"/>
-            </a:srgbClr>
-          </a:outerShdw>
-        </a:effectLst>
-      </dsp:spPr>
-      <dsp:style>
-        <a:lnRef idx="0">
-          <a:scrgbClr r="0" g="0" b="0"/>
-        </a:lnRef>
-        <a:fillRef idx="3">
-          <a:scrgbClr r="0" g="0" b="0"/>
-        </a:fillRef>
-        <a:effectRef idx="3">
-          <a:scrgbClr r="0" g="0" b="0"/>
-        </a:effectRef>
-        <a:fontRef idx="minor">
-          <a:schemeClr val="lt1"/>
-        </a:fontRef>
-      </dsp:style>
-    </dsp:sp>
-    <dsp:sp modelId="{84FC5D8F-3E2A-4408-A91A-147E9DAB4620}">
-      <dsp:nvSpPr>
-        <dsp:cNvPr id="0" name=""/>
-        <dsp:cNvSpPr/>
-      </dsp:nvSpPr>
-      <dsp:spPr>
-        <a:xfrm>
-          <a:off x="6942452" y="3797127"/>
-          <a:ext cx="3567499" cy="2265362"/>
-        </a:xfrm>
-        <a:prstGeom prst="roundRect">
-          <a:avLst>
-            <a:gd name="adj" fmla="val 10000"/>
-          </a:avLst>
-        </a:prstGeom>
-        <a:solidFill>
-          <a:schemeClr val="lt1">
-            <a:alpha val="90000"/>
-            <a:hueOff val="0"/>
-            <a:satOff val="0"/>
-            <a:lumOff val="0"/>
-            <a:alphaOff val="0"/>
-          </a:schemeClr>
-        </a:solidFill>
-        <a:ln w="6350" cap="flat" cmpd="sng" algn="ctr">
-          <a:solidFill>
-            <a:schemeClr val="accent3">
-              <a:hueOff val="0"/>
-              <a:satOff val="0"/>
-              <a:lumOff val="0"/>
-              <a:alphaOff val="0"/>
-            </a:schemeClr>
-          </a:solidFill>
-          <a:prstDash val="solid"/>
-          <a:miter lim="800000"/>
-        </a:ln>
-        <a:effectLst/>
-      </dsp:spPr>
-      <dsp:style>
-        <a:lnRef idx="1">
-          <a:scrgbClr r="0" g="0" b="0"/>
-        </a:lnRef>
-        <a:fillRef idx="1">
-          <a:scrgbClr r="0" g="0" b="0"/>
-        </a:fillRef>
-        <a:effectRef idx="2">
-          <a:scrgbClr r="0" g="0" b="0"/>
-        </a:effectRef>
-        <a:fontRef idx="minor"/>
-      </dsp:style>
-      <dsp:txBody>
-        <a:bodyPr spcFirstLastPara="0" vert="horz" wrap="square" lIns="76200" tIns="76200" rIns="76200" bIns="76200" numCol="1" spcCol="1270" anchor="ctr" anchorCtr="0">
-          <a:noAutofit/>
-        </a:bodyPr>
-        <a:lstStyle/>
-        <a:p>
-          <a:pPr marL="0" lvl="0" indent="0" algn="ctr" defTabSz="889000">
-            <a:lnSpc>
-              <a:spcPct val="90000"/>
-            </a:lnSpc>
-            <a:spcBef>
-              <a:spcPct val="0"/>
-            </a:spcBef>
-            <a:spcAft>
-              <a:spcPct val="35000"/>
-            </a:spcAft>
-            <a:buNone/>
-          </a:pPr>
-          <a:r>
-            <a:rPr lang="en-US" sz="2000" kern="1200"/>
-            <a:t>The impact of covid on both GDP and net-migration was dramatic. By excluding 2020 data we’re likely to get a more reliable approximation of population growth’s effect on GDP growth.</a:t>
-          </a:r>
-        </a:p>
-      </dsp:txBody>
-      <dsp:txXfrm>
-        <a:off x="7008802" y="3863477"/>
-        <a:ext cx="3434799" cy="2132662"/>
-      </dsp:txXfrm>
-    </dsp:sp>
-  </dsp:spTree>
-</dsp:drawing>
-</file>
-
 <file path=ppt/diagrams/layout1.xml><?xml version="1.0" encoding="utf-8"?>
 <dgm:layoutDef xmlns:dgm="http://schemas.openxmlformats.org/drawingml/2006/diagram" xmlns:a="http://schemas.openxmlformats.org/drawingml/2006/main" uniqueId="urn:microsoft.com/office/officeart/2005/8/layout/hierarchy2">
   <dgm:title val=""/>
@@ -6084,569 +4214,6 @@
                     <dgm:constrLst/>
                     <dgm:ruleLst/>
                     <dgm:forEach name="Name22" ref="repeat"/>
-                  </dgm:layoutNode>
-                </dgm:layoutNode>
-              </dgm:forEach>
-            </dgm:forEach>
-          </dgm:layoutNode>
-        </dgm:layoutNode>
-      </dgm:forEach>
-    </dgm:forEach>
-  </dgm:layoutNode>
-</dgm:layoutDef>
-</file>
-
-<file path=ppt/diagrams/layout2.xml><?xml version="1.0" encoding="utf-8"?>
-<dgm:layoutDef xmlns:dgm="http://schemas.openxmlformats.org/drawingml/2006/diagram" xmlns:a="http://schemas.openxmlformats.org/drawingml/2006/main" uniqueId="urn:microsoft.com/office/officeart/2005/8/layout/hierarchy1">
-  <dgm:title val=""/>
-  <dgm:desc val=""/>
-  <dgm:catLst>
-    <dgm:cat type="hierarchy" pri="2000"/>
-  </dgm:catLst>
-  <dgm:sampData>
-    <dgm:dataModel>
-      <dgm:ptLst>
-        <dgm:pt modelId="0" type="doc"/>
-        <dgm:pt modelId="1">
-          <dgm:prSet phldr="1"/>
-        </dgm:pt>
-        <dgm:pt modelId="2">
-          <dgm:prSet phldr="1"/>
-        </dgm:pt>
-        <dgm:pt modelId="21">
-          <dgm:prSet phldr="1"/>
-        </dgm:pt>
-        <dgm:pt modelId="22">
-          <dgm:prSet phldr="1"/>
-        </dgm:pt>
-        <dgm:pt modelId="3">
-          <dgm:prSet phldr="1"/>
-        </dgm:pt>
-        <dgm:pt modelId="31">
-          <dgm:prSet phldr="1"/>
-        </dgm:pt>
-      </dgm:ptLst>
-      <dgm:cxnLst>
-        <dgm:cxn modelId="4" srcId="0" destId="1" srcOrd="0" destOrd="0"/>
-        <dgm:cxn modelId="5" srcId="1" destId="2" srcOrd="0" destOrd="0"/>
-        <dgm:cxn modelId="6" srcId="1" destId="3" srcOrd="1" destOrd="0"/>
-        <dgm:cxn modelId="23" srcId="2" destId="21" srcOrd="0" destOrd="0"/>
-        <dgm:cxn modelId="24" srcId="2" destId="22" srcOrd="1" destOrd="0"/>
-        <dgm:cxn modelId="33" srcId="3" destId="31" srcOrd="0" destOrd="0"/>
-      </dgm:cxnLst>
-      <dgm:bg/>
-      <dgm:whole/>
-    </dgm:dataModel>
-  </dgm:sampData>
-  <dgm:styleData>
-    <dgm:dataModel>
-      <dgm:ptLst>
-        <dgm:pt modelId="0" type="doc"/>
-        <dgm:pt modelId="1"/>
-        <dgm:pt modelId="11"/>
-        <dgm:pt modelId="12"/>
-      </dgm:ptLst>
-      <dgm:cxnLst>
-        <dgm:cxn modelId="2" srcId="0" destId="1" srcOrd="0" destOrd="0"/>
-        <dgm:cxn modelId="13" srcId="1" destId="11" srcOrd="0" destOrd="0"/>
-        <dgm:cxn modelId="14" srcId="1" destId="12" srcOrd="1" destOrd="0"/>
-      </dgm:cxnLst>
-      <dgm:bg/>
-      <dgm:whole/>
-    </dgm:dataModel>
-  </dgm:styleData>
-  <dgm:clrData>
-    <dgm:dataModel>
-      <dgm:ptLst>
-        <dgm:pt modelId="0" type="doc"/>
-        <dgm:pt modelId="1"/>
-        <dgm:pt modelId="2"/>
-        <dgm:pt modelId="21"/>
-        <dgm:pt modelId="211"/>
-        <dgm:pt modelId="3"/>
-        <dgm:pt modelId="31"/>
-        <dgm:pt modelId="311"/>
-      </dgm:ptLst>
-      <dgm:cxnLst>
-        <dgm:cxn modelId="4" srcId="0" destId="1" srcOrd="0" destOrd="0"/>
-        <dgm:cxn modelId="5" srcId="1" destId="2" srcOrd="0" destOrd="0"/>
-        <dgm:cxn modelId="6" srcId="1" destId="3" srcOrd="1" destOrd="0"/>
-        <dgm:cxn modelId="23" srcId="2" destId="21" srcOrd="0" destOrd="0"/>
-        <dgm:cxn modelId="24" srcId="21" destId="211" srcOrd="0" destOrd="0"/>
-        <dgm:cxn modelId="33" srcId="3" destId="31" srcOrd="0" destOrd="0"/>
-        <dgm:cxn modelId="34" srcId="31" destId="311" srcOrd="0" destOrd="0"/>
-      </dgm:cxnLst>
-      <dgm:bg/>
-      <dgm:whole/>
-    </dgm:dataModel>
-  </dgm:clrData>
-  <dgm:layoutNode name="hierChild1">
-    <dgm:varLst>
-      <dgm:chPref val="1"/>
-      <dgm:dir/>
-      <dgm:animOne val="branch"/>
-      <dgm:animLvl val="lvl"/>
-      <dgm:resizeHandles/>
-    </dgm:varLst>
-    <dgm:choose name="Name0">
-      <dgm:if name="Name1" func="var" arg="dir" op="equ" val="norm">
-        <dgm:alg type="hierChild">
-          <dgm:param type="linDir" val="fromL"/>
-        </dgm:alg>
-      </dgm:if>
-      <dgm:else name="Name2">
-        <dgm:alg type="hierChild">
-          <dgm:param type="linDir" val="fromR"/>
-        </dgm:alg>
-      </dgm:else>
-    </dgm:choose>
-    <dgm:shape xmlns:r="http://schemas.openxmlformats.org/officeDocument/2006/relationships" r:blip="">
-      <dgm:adjLst/>
-    </dgm:shape>
-    <dgm:presOf/>
-    <dgm:constrLst>
-      <dgm:constr type="primFontSz" for="des" ptType="node" op="equ" val="65"/>
-      <dgm:constr type="w" for="des" forName="composite" refType="w"/>
-      <dgm:constr type="h" for="des" forName="composite" refType="w" refFor="des" refForName="composite" fact="0.667"/>
-      <dgm:constr type="w" for="des" forName="composite2" refType="w" refFor="des" refForName="composite"/>
-      <dgm:constr type="h" for="des" forName="composite2" refType="h" refFor="des" refForName="composite"/>
-      <dgm:constr type="w" for="des" forName="composite3" refType="w" refFor="des" refForName="composite"/>
-      <dgm:constr type="h" for="des" forName="composite3" refType="h" refFor="des" refForName="composite"/>
-      <dgm:constr type="w" for="des" forName="composite4" refType="w" refFor="des" refForName="composite"/>
-      <dgm:constr type="h" for="des" forName="composite4" refType="h" refFor="des" refForName="composite"/>
-      <dgm:constr type="w" for="des" forName="composite5" refType="w" refFor="des" refForName="composite"/>
-      <dgm:constr type="h" for="des" forName="composite5" refType="h" refFor="des" refForName="composite"/>
-      <dgm:constr type="sibSp" refType="w" refFor="des" refForName="composite" fact="0.1"/>
-      <dgm:constr type="sibSp" for="des" forName="hierChild2" refType="sibSp"/>
-      <dgm:constr type="sibSp" for="des" forName="hierChild3" refType="sibSp"/>
-      <dgm:constr type="sibSp" for="des" forName="hierChild4" refType="sibSp"/>
-      <dgm:constr type="sibSp" for="des" forName="hierChild5" refType="sibSp"/>
-      <dgm:constr type="sibSp" for="des" forName="hierChild6" refType="sibSp"/>
-      <dgm:constr type="sp" for="des" forName="hierRoot1" refType="h" refFor="des" refForName="composite" fact="0.25"/>
-      <dgm:constr type="sp" for="des" forName="hierRoot2" refType="sp" refFor="des" refForName="hierRoot1"/>
-      <dgm:constr type="sp" for="des" forName="hierRoot3" refType="sp" refFor="des" refForName="hierRoot1"/>
-      <dgm:constr type="sp" for="des" forName="hierRoot4" refType="sp" refFor="des" refForName="hierRoot1"/>
-      <dgm:constr type="sp" for="des" forName="hierRoot5" refType="sp" refFor="des" refForName="hierRoot1"/>
-    </dgm:constrLst>
-    <dgm:ruleLst/>
-    <dgm:forEach name="Name3" axis="ch">
-      <dgm:forEach name="Name4" axis="self" ptType="node">
-        <dgm:layoutNode name="hierRoot1">
-          <dgm:alg type="hierRoot"/>
-          <dgm:shape xmlns:r="http://schemas.openxmlformats.org/officeDocument/2006/relationships" r:blip="">
-            <dgm:adjLst/>
-          </dgm:shape>
-          <dgm:presOf/>
-          <dgm:constrLst>
-            <dgm:constr type="bendDist" for="des" ptType="parTrans" refType="sp" fact="0.5"/>
-          </dgm:constrLst>
-          <dgm:ruleLst/>
-          <dgm:layoutNode name="composite">
-            <dgm:alg type="composite"/>
-            <dgm:shape xmlns:r="http://schemas.openxmlformats.org/officeDocument/2006/relationships" r:blip="">
-              <dgm:adjLst/>
-            </dgm:shape>
-            <dgm:presOf/>
-            <dgm:constrLst>
-              <dgm:constr type="w" for="ch" forName="background" refType="w" fact="0.9"/>
-              <dgm:constr type="h" for="ch" forName="background" refType="w" refFor="ch" refForName="background" fact="0.635"/>
-              <dgm:constr type="t" for="ch" forName="background"/>
-              <dgm:constr type="l" for="ch" forName="background"/>
-              <dgm:constr type="w" for="ch" forName="text" refType="w" fact="0.9"/>
-              <dgm:constr type="h" for="ch" forName="text" refType="w" refFor="ch" refForName="text" fact="0.635"/>
-              <dgm:constr type="t" for="ch" forName="text" refType="w" fact="0.095"/>
-              <dgm:constr type="l" for="ch" forName="text" refType="w" fact="0.1"/>
-            </dgm:constrLst>
-            <dgm:ruleLst/>
-            <dgm:layoutNode name="background" styleLbl="node0" moveWith="text">
-              <dgm:alg type="sp"/>
-              <dgm:shape xmlns:r="http://schemas.openxmlformats.org/officeDocument/2006/relationships" type="roundRect" r:blip="">
-                <dgm:adjLst>
-                  <dgm:adj idx="1" val="0.1"/>
-                </dgm:adjLst>
-              </dgm:shape>
-              <dgm:presOf/>
-              <dgm:constrLst/>
-              <dgm:ruleLst/>
-            </dgm:layoutNode>
-            <dgm:layoutNode name="text" styleLbl="fgAcc0">
-              <dgm:varLst>
-                <dgm:chPref val="3"/>
-              </dgm:varLst>
-              <dgm:alg type="tx"/>
-              <dgm:shape xmlns:r="http://schemas.openxmlformats.org/officeDocument/2006/relationships" type="roundRect" r:blip="">
-                <dgm:adjLst>
-                  <dgm:adj idx="1" val="0.1"/>
-                </dgm:adjLst>
-              </dgm:shape>
-              <dgm:presOf axis="self"/>
-              <dgm:constrLst>
-                <dgm:constr type="tMarg" refType="primFontSz" fact="0.3"/>
-                <dgm:constr type="bMarg" refType="primFontSz" fact="0.3"/>
-                <dgm:constr type="lMarg" refType="primFontSz" fact="0.3"/>
-                <dgm:constr type="rMarg" refType="primFontSz" fact="0.3"/>
-              </dgm:constrLst>
-              <dgm:ruleLst>
-                <dgm:rule type="primFontSz" val="5" fact="NaN" max="NaN"/>
-              </dgm:ruleLst>
-            </dgm:layoutNode>
-          </dgm:layoutNode>
-          <dgm:layoutNode name="hierChild2">
-            <dgm:choose name="Name5">
-              <dgm:if name="Name6" func="var" arg="dir" op="equ" val="norm">
-                <dgm:alg type="hierChild">
-                  <dgm:param type="linDir" val="fromL"/>
-                </dgm:alg>
-              </dgm:if>
-              <dgm:else name="Name7">
-                <dgm:alg type="hierChild">
-                  <dgm:param type="linDir" val="fromR"/>
-                </dgm:alg>
-              </dgm:else>
-            </dgm:choose>
-            <dgm:shape xmlns:r="http://schemas.openxmlformats.org/officeDocument/2006/relationships" r:blip="">
-              <dgm:adjLst/>
-            </dgm:shape>
-            <dgm:presOf/>
-            <dgm:constrLst/>
-            <dgm:ruleLst/>
-            <dgm:forEach name="Name8" axis="ch">
-              <dgm:forEach name="Name9" axis="self" ptType="parTrans" cnt="1">
-                <dgm:layoutNode name="Name10">
-                  <dgm:alg type="conn">
-                    <dgm:param type="dim" val="1D"/>
-                    <dgm:param type="endSty" val="noArr"/>
-                    <dgm:param type="connRout" val="bend"/>
-                    <dgm:param type="bendPt" val="end"/>
-                    <dgm:param type="begPts" val="bCtr"/>
-                    <dgm:param type="endPts" val="tCtr"/>
-                    <dgm:param type="srcNode" val="background"/>
-                    <dgm:param type="dstNode" val="background2"/>
-                  </dgm:alg>
-                  <dgm:shape xmlns:r="http://schemas.openxmlformats.org/officeDocument/2006/relationships" type="conn" r:blip="" zOrderOff="-999">
-                    <dgm:adjLst/>
-                  </dgm:shape>
-                  <dgm:presOf axis="self"/>
-                  <dgm:constrLst>
-                    <dgm:constr type="begPad"/>
-                    <dgm:constr type="endPad"/>
-                  </dgm:constrLst>
-                  <dgm:ruleLst/>
-                </dgm:layoutNode>
-              </dgm:forEach>
-              <dgm:forEach name="Name11" axis="self" ptType="node">
-                <dgm:layoutNode name="hierRoot2">
-                  <dgm:alg type="hierRoot"/>
-                  <dgm:shape xmlns:r="http://schemas.openxmlformats.org/officeDocument/2006/relationships" r:blip="">
-                    <dgm:adjLst/>
-                  </dgm:shape>
-                  <dgm:presOf/>
-                  <dgm:constrLst>
-                    <dgm:constr type="bendDist" for="des" ptType="parTrans" refType="sp" fact="0.5"/>
-                  </dgm:constrLst>
-                  <dgm:ruleLst/>
-                  <dgm:layoutNode name="composite2">
-                    <dgm:alg type="composite"/>
-                    <dgm:shape xmlns:r="http://schemas.openxmlformats.org/officeDocument/2006/relationships" r:blip="">
-                      <dgm:adjLst/>
-                    </dgm:shape>
-                    <dgm:presOf/>
-                    <dgm:constrLst>
-                      <dgm:constr type="w" for="ch" forName="background2" refType="w" fact="0.9"/>
-                      <dgm:constr type="h" for="ch" forName="background2" refType="w" refFor="ch" refForName="background2" fact="0.635"/>
-                      <dgm:constr type="t" for="ch" forName="background2"/>
-                      <dgm:constr type="l" for="ch" forName="background2"/>
-                      <dgm:constr type="w" for="ch" forName="text2" refType="w" fact="0.9"/>
-                      <dgm:constr type="h" for="ch" forName="text2" refType="w" refFor="ch" refForName="text2" fact="0.635"/>
-                      <dgm:constr type="t" for="ch" forName="text2" refType="w" fact="0.095"/>
-                      <dgm:constr type="l" for="ch" forName="text2" refType="w" fact="0.1"/>
-                    </dgm:constrLst>
-                    <dgm:ruleLst/>
-                    <dgm:layoutNode name="background2" moveWith="text2">
-                      <dgm:alg type="sp"/>
-                      <dgm:shape xmlns:r="http://schemas.openxmlformats.org/officeDocument/2006/relationships" type="roundRect" r:blip="">
-                        <dgm:adjLst>
-                          <dgm:adj idx="1" val="0.1"/>
-                        </dgm:adjLst>
-                      </dgm:shape>
-                      <dgm:presOf/>
-                      <dgm:constrLst/>
-                      <dgm:ruleLst/>
-                    </dgm:layoutNode>
-                    <dgm:layoutNode name="text2" styleLbl="fgAcc2">
-                      <dgm:varLst>
-                        <dgm:chPref val="3"/>
-                      </dgm:varLst>
-                      <dgm:alg type="tx"/>
-                      <dgm:shape xmlns:r="http://schemas.openxmlformats.org/officeDocument/2006/relationships" type="roundRect" r:blip="">
-                        <dgm:adjLst>
-                          <dgm:adj idx="1" val="0.1"/>
-                        </dgm:adjLst>
-                      </dgm:shape>
-                      <dgm:presOf axis="self"/>
-                      <dgm:constrLst>
-                        <dgm:constr type="tMarg" refType="primFontSz" fact="0.3"/>
-                        <dgm:constr type="bMarg" refType="primFontSz" fact="0.3"/>
-                        <dgm:constr type="lMarg" refType="primFontSz" fact="0.3"/>
-                        <dgm:constr type="rMarg" refType="primFontSz" fact="0.3"/>
-                      </dgm:constrLst>
-                      <dgm:ruleLst>
-                        <dgm:rule type="primFontSz" val="5" fact="NaN" max="NaN"/>
-                      </dgm:ruleLst>
-                    </dgm:layoutNode>
-                  </dgm:layoutNode>
-                  <dgm:layoutNode name="hierChild3">
-                    <dgm:choose name="Name12">
-                      <dgm:if name="Name13" func="var" arg="dir" op="equ" val="norm">
-                        <dgm:alg type="hierChild">
-                          <dgm:param type="linDir" val="fromL"/>
-                        </dgm:alg>
-                      </dgm:if>
-                      <dgm:else name="Name14">
-                        <dgm:alg type="hierChild">
-                          <dgm:param type="linDir" val="fromR"/>
-                        </dgm:alg>
-                      </dgm:else>
-                    </dgm:choose>
-                    <dgm:shape xmlns:r="http://schemas.openxmlformats.org/officeDocument/2006/relationships" r:blip="">
-                      <dgm:adjLst/>
-                    </dgm:shape>
-                    <dgm:presOf/>
-                    <dgm:constrLst/>
-                    <dgm:ruleLst/>
-                    <dgm:forEach name="Name15" axis="ch">
-                      <dgm:forEach name="Name16" axis="self" ptType="parTrans" cnt="1">
-                        <dgm:layoutNode name="Name17">
-                          <dgm:alg type="conn">
-                            <dgm:param type="dim" val="1D"/>
-                            <dgm:param type="endSty" val="noArr"/>
-                            <dgm:param type="connRout" val="bend"/>
-                            <dgm:param type="bendPt" val="end"/>
-                            <dgm:param type="begPts" val="bCtr"/>
-                            <dgm:param type="endPts" val="tCtr"/>
-                            <dgm:param type="srcNode" val="background2"/>
-                            <dgm:param type="dstNode" val="background3"/>
-                          </dgm:alg>
-                          <dgm:shape xmlns:r="http://schemas.openxmlformats.org/officeDocument/2006/relationships" type="conn" r:blip="" zOrderOff="-999">
-                            <dgm:adjLst/>
-                          </dgm:shape>
-                          <dgm:presOf axis="self"/>
-                          <dgm:constrLst>
-                            <dgm:constr type="begPad"/>
-                            <dgm:constr type="endPad"/>
-                          </dgm:constrLst>
-                          <dgm:ruleLst/>
-                        </dgm:layoutNode>
-                      </dgm:forEach>
-                      <dgm:forEach name="Name18" axis="self" ptType="node">
-                        <dgm:layoutNode name="hierRoot3">
-                          <dgm:alg type="hierRoot"/>
-                          <dgm:shape xmlns:r="http://schemas.openxmlformats.org/officeDocument/2006/relationships" r:blip="">
-                            <dgm:adjLst/>
-                          </dgm:shape>
-                          <dgm:presOf/>
-                          <dgm:constrLst>
-                            <dgm:constr type="bendDist" for="des" ptType="parTrans" refType="sp" fact="0.5"/>
-                          </dgm:constrLst>
-                          <dgm:ruleLst/>
-                          <dgm:layoutNode name="composite3">
-                            <dgm:alg type="composite"/>
-                            <dgm:shape xmlns:r="http://schemas.openxmlformats.org/officeDocument/2006/relationships" r:blip="">
-                              <dgm:adjLst/>
-                            </dgm:shape>
-                            <dgm:presOf/>
-                            <dgm:constrLst>
-                              <dgm:constr type="w" for="ch" forName="background3" refType="w" fact="0.9"/>
-                              <dgm:constr type="h" for="ch" forName="background3" refType="w" refFor="ch" refForName="background3" fact="0.635"/>
-                              <dgm:constr type="t" for="ch" forName="background3"/>
-                              <dgm:constr type="l" for="ch" forName="background3"/>
-                              <dgm:constr type="w" for="ch" forName="text3" refType="w" fact="0.9"/>
-                              <dgm:constr type="h" for="ch" forName="text3" refType="w" refFor="ch" refForName="text3" fact="0.635"/>
-                              <dgm:constr type="t" for="ch" forName="text3" refType="w" fact="0.095"/>
-                              <dgm:constr type="l" for="ch" forName="text3" refType="w" fact="0.1"/>
-                            </dgm:constrLst>
-                            <dgm:ruleLst/>
-                            <dgm:layoutNode name="background3" moveWith="text3">
-                              <dgm:alg type="sp"/>
-                              <dgm:shape xmlns:r="http://schemas.openxmlformats.org/officeDocument/2006/relationships" type="roundRect" r:blip="">
-                                <dgm:adjLst>
-                                  <dgm:adj idx="1" val="0.1"/>
-                                </dgm:adjLst>
-                              </dgm:shape>
-                              <dgm:presOf/>
-                              <dgm:constrLst/>
-                              <dgm:ruleLst/>
-                            </dgm:layoutNode>
-                            <dgm:layoutNode name="text3" styleLbl="fgAcc3">
-                              <dgm:varLst>
-                                <dgm:chPref val="3"/>
-                              </dgm:varLst>
-                              <dgm:alg type="tx"/>
-                              <dgm:shape xmlns:r="http://schemas.openxmlformats.org/officeDocument/2006/relationships" type="roundRect" r:blip="">
-                                <dgm:adjLst>
-                                  <dgm:adj idx="1" val="0.1"/>
-                                </dgm:adjLst>
-                              </dgm:shape>
-                              <dgm:presOf axis="self"/>
-                              <dgm:constrLst>
-                                <dgm:constr type="tMarg" refType="primFontSz" fact="0.3"/>
-                                <dgm:constr type="bMarg" refType="primFontSz" fact="0.3"/>
-                                <dgm:constr type="lMarg" refType="primFontSz" fact="0.3"/>
-                                <dgm:constr type="rMarg" refType="primFontSz" fact="0.3"/>
-                              </dgm:constrLst>
-                              <dgm:ruleLst>
-                                <dgm:rule type="primFontSz" val="5" fact="NaN" max="NaN"/>
-                              </dgm:ruleLst>
-                            </dgm:layoutNode>
-                          </dgm:layoutNode>
-                          <dgm:layoutNode name="hierChild4">
-                            <dgm:choose name="Name19">
-                              <dgm:if name="Name20" func="var" arg="dir" op="equ" val="norm">
-                                <dgm:alg type="hierChild">
-                                  <dgm:param type="linDir" val="fromL"/>
-                                </dgm:alg>
-                              </dgm:if>
-                              <dgm:else name="Name21">
-                                <dgm:alg type="hierChild">
-                                  <dgm:param type="linDir" val="fromR"/>
-                                </dgm:alg>
-                              </dgm:else>
-                            </dgm:choose>
-                            <dgm:shape xmlns:r="http://schemas.openxmlformats.org/officeDocument/2006/relationships" r:blip="">
-                              <dgm:adjLst/>
-                            </dgm:shape>
-                            <dgm:presOf/>
-                            <dgm:constrLst/>
-                            <dgm:ruleLst/>
-                            <dgm:forEach name="repeat" axis="ch">
-                              <dgm:forEach name="Name22" axis="self" ptType="parTrans" cnt="1">
-                                <dgm:layoutNode name="Name23">
-                                  <dgm:choose name="Name24">
-                                    <dgm:if name="Name25" axis="self" func="depth" op="lte" val="4">
-                                      <dgm:alg type="conn">
-                                        <dgm:param type="dim" val="1D"/>
-                                        <dgm:param type="endSty" val="noArr"/>
-                                        <dgm:param type="connRout" val="bend"/>
-                                        <dgm:param type="bendPt" val="end"/>
-                                        <dgm:param type="begPts" val="bCtr"/>
-                                        <dgm:param type="endPts" val="tCtr"/>
-                                        <dgm:param type="srcNode" val="background3"/>
-                                        <dgm:param type="dstNode" val="background4"/>
-                                      </dgm:alg>
-                                    </dgm:if>
-                                    <dgm:else name="Name26">
-                                      <dgm:alg type="conn">
-                                        <dgm:param type="dim" val="1D"/>
-                                        <dgm:param type="endSty" val="noArr"/>
-                                        <dgm:param type="connRout" val="bend"/>
-                                        <dgm:param type="bendPt" val="end"/>
-                                        <dgm:param type="begPts" val="bCtr"/>
-                                        <dgm:param type="endPts" val="tCtr"/>
-                                        <dgm:param type="srcNode" val="background4"/>
-                                        <dgm:param type="dstNode" val="background4"/>
-                                      </dgm:alg>
-                                    </dgm:else>
-                                  </dgm:choose>
-                                  <dgm:shape xmlns:r="http://schemas.openxmlformats.org/officeDocument/2006/relationships" type="conn" r:blip="" zOrderOff="-999">
-                                    <dgm:adjLst/>
-                                  </dgm:shape>
-                                  <dgm:presOf axis="self"/>
-                                  <dgm:constrLst>
-                                    <dgm:constr type="begPad"/>
-                                    <dgm:constr type="endPad"/>
-                                  </dgm:constrLst>
-                                  <dgm:ruleLst/>
-                                </dgm:layoutNode>
-                              </dgm:forEach>
-                              <dgm:forEach name="Name27" axis="self" ptType="node">
-                                <dgm:layoutNode name="hierRoot4">
-                                  <dgm:alg type="hierRoot"/>
-                                  <dgm:shape xmlns:r="http://schemas.openxmlformats.org/officeDocument/2006/relationships" r:blip="">
-                                    <dgm:adjLst/>
-                                  </dgm:shape>
-                                  <dgm:presOf/>
-                                  <dgm:constrLst>
-                                    <dgm:constr type="bendDist" for="des" ptType="parTrans" refType="sp" fact="0.5"/>
-                                  </dgm:constrLst>
-                                  <dgm:ruleLst/>
-                                  <dgm:layoutNode name="composite4">
-                                    <dgm:alg type="composite"/>
-                                    <dgm:shape xmlns:r="http://schemas.openxmlformats.org/officeDocument/2006/relationships" r:blip="">
-                                      <dgm:adjLst/>
-                                    </dgm:shape>
-                                    <dgm:presOf/>
-                                    <dgm:constrLst>
-                                      <dgm:constr type="w" for="ch" forName="background4" refType="w" fact="0.9"/>
-                                      <dgm:constr type="h" for="ch" forName="background4" refType="w" refFor="ch" refForName="background4" fact="0.635"/>
-                                      <dgm:constr type="t" for="ch" forName="background4"/>
-                                      <dgm:constr type="l" for="ch" forName="background4"/>
-                                      <dgm:constr type="w" for="ch" forName="text4" refType="w" fact="0.9"/>
-                                      <dgm:constr type="h" for="ch" forName="text4" refType="w" refFor="ch" refForName="text4" fact="0.635"/>
-                                      <dgm:constr type="t" for="ch" forName="text4" refType="w" fact="0.095"/>
-                                      <dgm:constr type="l" for="ch" forName="text4" refType="w" fact="0.1"/>
-                                    </dgm:constrLst>
-                                    <dgm:ruleLst/>
-                                    <dgm:layoutNode name="background4" moveWith="text4">
-                                      <dgm:alg type="sp"/>
-                                      <dgm:shape xmlns:r="http://schemas.openxmlformats.org/officeDocument/2006/relationships" type="roundRect" r:blip="">
-                                        <dgm:adjLst>
-                                          <dgm:adj idx="1" val="0.1"/>
-                                        </dgm:adjLst>
-                                      </dgm:shape>
-                                      <dgm:presOf/>
-                                      <dgm:constrLst/>
-                                      <dgm:ruleLst/>
-                                    </dgm:layoutNode>
-                                    <dgm:layoutNode name="text4" styleLbl="fgAcc4">
-                                      <dgm:varLst>
-                                        <dgm:chPref val="3"/>
-                                      </dgm:varLst>
-                                      <dgm:alg type="tx"/>
-                                      <dgm:shape xmlns:r="http://schemas.openxmlformats.org/officeDocument/2006/relationships" type="roundRect" r:blip="">
-                                        <dgm:adjLst>
-                                          <dgm:adj idx="1" val="0.1"/>
-                                        </dgm:adjLst>
-                                      </dgm:shape>
-                                      <dgm:presOf axis="self"/>
-                                      <dgm:constrLst>
-                                        <dgm:constr type="tMarg" refType="primFontSz" fact="0.3"/>
-                                        <dgm:constr type="bMarg" refType="primFontSz" fact="0.3"/>
-                                        <dgm:constr type="lMarg" refType="primFontSz" fact="0.3"/>
-                                        <dgm:constr type="rMarg" refType="primFontSz" fact="0.3"/>
-                                      </dgm:constrLst>
-                                      <dgm:ruleLst>
-                                        <dgm:rule type="primFontSz" val="5" fact="NaN" max="NaN"/>
-                                      </dgm:ruleLst>
-                                    </dgm:layoutNode>
-                                  </dgm:layoutNode>
-                                  <dgm:layoutNode name="hierChild5">
-                                    <dgm:choose name="Name28">
-                                      <dgm:if name="Name29" func="var" arg="dir" op="equ" val="norm">
-                                        <dgm:alg type="hierChild">
-                                          <dgm:param type="linDir" val="fromL"/>
-                                        </dgm:alg>
-                                      </dgm:if>
-                                      <dgm:else name="Name30">
-                                        <dgm:alg type="hierChild">
-                                          <dgm:param type="linDir" val="fromR"/>
-                                        </dgm:alg>
-                                      </dgm:else>
-                                    </dgm:choose>
-                                    <dgm:shape xmlns:r="http://schemas.openxmlformats.org/officeDocument/2006/relationships" r:blip="">
-                                      <dgm:adjLst/>
-                                    </dgm:shape>
-                                    <dgm:presOf/>
-                                    <dgm:constrLst/>
-                                    <dgm:ruleLst/>
-                                    <dgm:forEach name="Name31" ref="repeat"/>
-                                  </dgm:layoutNode>
-                                </dgm:layoutNode>
-                              </dgm:forEach>
-                            </dgm:forEach>
-                          </dgm:layoutNode>
-                        </dgm:layoutNode>
-                      </dgm:forEach>
-                    </dgm:forEach>
                   </dgm:layoutNode>
                 </dgm:layoutNode>
               </dgm:forEach>
@@ -7693,1040 +5260,6 @@
 </dgm:styleDef>
 </file>
 
-<file path=ppt/diagrams/quickStyle2.xml><?xml version="1.0" encoding="utf-8"?>
-<dgm:styleDef xmlns:dgm="http://schemas.openxmlformats.org/drawingml/2006/diagram" xmlns:a="http://schemas.openxmlformats.org/drawingml/2006/main" uniqueId="urn:microsoft.com/office/officeart/2005/8/quickstyle/simple5">
-  <dgm:title val=""/>
-  <dgm:desc val=""/>
-  <dgm:catLst>
-    <dgm:cat type="simple" pri="10500"/>
-  </dgm:catLst>
-  <dgm:scene3d>
-    <a:camera prst="orthographicFront"/>
-    <a:lightRig rig="threePt" dir="t"/>
-  </dgm:scene3d>
-  <dgm:styleLbl name="node0">
-    <dgm:scene3d>
-      <a:camera prst="orthographicFront"/>
-      <a:lightRig rig="threePt" dir="t"/>
-    </dgm:scene3d>
-    <dgm:sp3d/>
-    <dgm:txPr/>
-    <dgm:style>
-      <a:lnRef idx="0">
-        <a:scrgbClr r="0" g="0" b="0"/>
-      </a:lnRef>
-      <a:fillRef idx="3">
-        <a:scrgbClr r="0" g="0" b="0"/>
-      </a:fillRef>
-      <a:effectRef idx="3">
-        <a:scrgbClr r="0" g="0" b="0"/>
-      </a:effectRef>
-      <a:fontRef idx="minor">
-        <a:schemeClr val="lt1"/>
-      </a:fontRef>
-    </dgm:style>
-  </dgm:styleLbl>
-  <dgm:styleLbl name="lnNode1">
-    <dgm:scene3d>
-      <a:camera prst="orthographicFront"/>
-      <a:lightRig rig="threePt" dir="t"/>
-    </dgm:scene3d>
-    <dgm:sp3d/>
-    <dgm:txPr/>
-    <dgm:style>
-      <a:lnRef idx="0">
-        <a:scrgbClr r="0" g="0" b="0"/>
-      </a:lnRef>
-      <a:fillRef idx="3">
-        <a:scrgbClr r="0" g="0" b="0"/>
-      </a:fillRef>
-      <a:effectRef idx="3">
-        <a:scrgbClr r="0" g="0" b="0"/>
-      </a:effectRef>
-      <a:fontRef idx="minor">
-        <a:schemeClr val="lt1"/>
-      </a:fontRef>
-    </dgm:style>
-  </dgm:styleLbl>
-  <dgm:styleLbl name="vennNode1">
-    <dgm:scene3d>
-      <a:camera prst="orthographicFront"/>
-      <a:lightRig rig="threePt" dir="t"/>
-    </dgm:scene3d>
-    <dgm:sp3d/>
-    <dgm:txPr/>
-    <dgm:style>
-      <a:lnRef idx="0">
-        <a:scrgbClr r="0" g="0" b="0"/>
-      </a:lnRef>
-      <a:fillRef idx="3">
-        <a:scrgbClr r="0" g="0" b="0"/>
-      </a:fillRef>
-      <a:effectRef idx="3">
-        <a:scrgbClr r="0" g="0" b="0"/>
-      </a:effectRef>
-      <a:fontRef idx="minor">
-        <a:schemeClr val="tx1"/>
-      </a:fontRef>
-    </dgm:style>
-  </dgm:styleLbl>
-  <dgm:styleLbl name="alignNode1">
-    <dgm:scene3d>
-      <a:camera prst="orthographicFront"/>
-      <a:lightRig rig="threePt" dir="t"/>
-    </dgm:scene3d>
-    <dgm:sp3d/>
-    <dgm:txPr/>
-    <dgm:style>
-      <a:lnRef idx="1">
-        <a:scrgbClr r="0" g="0" b="0"/>
-      </a:lnRef>
-      <a:fillRef idx="3">
-        <a:scrgbClr r="0" g="0" b="0"/>
-      </a:fillRef>
-      <a:effectRef idx="3">
-        <a:scrgbClr r="0" g="0" b="0"/>
-      </a:effectRef>
-      <a:fontRef idx="minor">
-        <a:schemeClr val="lt1"/>
-      </a:fontRef>
-    </dgm:style>
-  </dgm:styleLbl>
-  <dgm:styleLbl name="node1">
-    <dgm:scene3d>
-      <a:camera prst="orthographicFront"/>
-      <a:lightRig rig="threePt" dir="t"/>
-    </dgm:scene3d>
-    <dgm:sp3d/>
-    <dgm:txPr/>
-    <dgm:style>
-      <a:lnRef idx="0">
-        <a:scrgbClr r="0" g="0" b="0"/>
-      </a:lnRef>
-      <a:fillRef idx="3">
-        <a:scrgbClr r="0" g="0" b="0"/>
-      </a:fillRef>
-      <a:effectRef idx="3">
-        <a:scrgbClr r="0" g="0" b="0"/>
-      </a:effectRef>
-      <a:fontRef idx="minor">
-        <a:schemeClr val="lt1"/>
-      </a:fontRef>
-    </dgm:style>
-  </dgm:styleLbl>
-  <dgm:styleLbl name="node2">
-    <dgm:scene3d>
-      <a:camera prst="orthographicFront"/>
-      <a:lightRig rig="threePt" dir="t"/>
-    </dgm:scene3d>
-    <dgm:sp3d/>
-    <dgm:txPr/>
-    <dgm:style>
-      <a:lnRef idx="0">
-        <a:scrgbClr r="0" g="0" b="0"/>
-      </a:lnRef>
-      <a:fillRef idx="3">
-        <a:scrgbClr r="0" g="0" b="0"/>
-      </a:fillRef>
-      <a:effectRef idx="3">
-        <a:scrgbClr r="0" g="0" b="0"/>
-      </a:effectRef>
-      <a:fontRef idx="minor">
-        <a:schemeClr val="lt1"/>
-      </a:fontRef>
-    </dgm:style>
-  </dgm:styleLbl>
-  <dgm:styleLbl name="node3">
-    <dgm:scene3d>
-      <a:camera prst="orthographicFront"/>
-      <a:lightRig rig="threePt" dir="t"/>
-    </dgm:scene3d>
-    <dgm:sp3d/>
-    <dgm:txPr/>
-    <dgm:style>
-      <a:lnRef idx="0">
-        <a:scrgbClr r="0" g="0" b="0"/>
-      </a:lnRef>
-      <a:fillRef idx="3">
-        <a:scrgbClr r="0" g="0" b="0"/>
-      </a:fillRef>
-      <a:effectRef idx="3">
-        <a:scrgbClr r="0" g="0" b="0"/>
-      </a:effectRef>
-      <a:fontRef idx="minor">
-        <a:schemeClr val="lt1"/>
-      </a:fontRef>
-    </dgm:style>
-  </dgm:styleLbl>
-  <dgm:styleLbl name="node4">
-    <dgm:scene3d>
-      <a:camera prst="orthographicFront"/>
-      <a:lightRig rig="threePt" dir="t"/>
-    </dgm:scene3d>
-    <dgm:sp3d/>
-    <dgm:txPr/>
-    <dgm:style>
-      <a:lnRef idx="0">
-        <a:scrgbClr r="0" g="0" b="0"/>
-      </a:lnRef>
-      <a:fillRef idx="3">
-        <a:scrgbClr r="0" g="0" b="0"/>
-      </a:fillRef>
-      <a:effectRef idx="3">
-        <a:scrgbClr r="0" g="0" b="0"/>
-      </a:effectRef>
-      <a:fontRef idx="minor">
-        <a:schemeClr val="lt1"/>
-      </a:fontRef>
-    </dgm:style>
-  </dgm:styleLbl>
-  <dgm:styleLbl name="fgImgPlace1">
-    <dgm:scene3d>
-      <a:camera prst="orthographicFront"/>
-      <a:lightRig rig="threePt" dir="t"/>
-    </dgm:scene3d>
-    <dgm:sp3d/>
-    <dgm:txPr/>
-    <dgm:style>
-      <a:lnRef idx="0">
-        <a:scrgbClr r="0" g="0" b="0"/>
-      </a:lnRef>
-      <a:fillRef idx="1">
-        <a:scrgbClr r="0" g="0" b="0"/>
-      </a:fillRef>
-      <a:effectRef idx="3">
-        <a:scrgbClr r="0" g="0" b="0"/>
-      </a:effectRef>
-      <a:fontRef idx="minor"/>
-    </dgm:style>
-  </dgm:styleLbl>
-  <dgm:styleLbl name="alignImgPlace1">
-    <dgm:scene3d>
-      <a:camera prst="orthographicFront"/>
-      <a:lightRig rig="threePt" dir="t"/>
-    </dgm:scene3d>
-    <dgm:sp3d/>
-    <dgm:txPr/>
-    <dgm:style>
-      <a:lnRef idx="0">
-        <a:scrgbClr r="0" g="0" b="0"/>
-      </a:lnRef>
-      <a:fillRef idx="1">
-        <a:scrgbClr r="0" g="0" b="0"/>
-      </a:fillRef>
-      <a:effectRef idx="3">
-        <a:scrgbClr r="0" g="0" b="0"/>
-      </a:effectRef>
-      <a:fontRef idx="minor"/>
-    </dgm:style>
-  </dgm:styleLbl>
-  <dgm:styleLbl name="bgImgPlace1">
-    <dgm:scene3d>
-      <a:camera prst="orthographicFront"/>
-      <a:lightRig rig="threePt" dir="t"/>
-    </dgm:scene3d>
-    <dgm:sp3d/>
-    <dgm:txPr/>
-    <dgm:style>
-      <a:lnRef idx="0">
-        <a:scrgbClr r="0" g="0" b="0"/>
-      </a:lnRef>
-      <a:fillRef idx="1">
-        <a:scrgbClr r="0" g="0" b="0"/>
-      </a:fillRef>
-      <a:effectRef idx="3">
-        <a:scrgbClr r="0" g="0" b="0"/>
-      </a:effectRef>
-      <a:fontRef idx="minor"/>
-    </dgm:style>
-  </dgm:styleLbl>
-  <dgm:styleLbl name="sibTrans2D1">
-    <dgm:scene3d>
-      <a:camera prst="orthographicFront"/>
-      <a:lightRig rig="threePt" dir="t"/>
-    </dgm:scene3d>
-    <dgm:sp3d/>
-    <dgm:txPr/>
-    <dgm:style>
-      <a:lnRef idx="0">
-        <a:scrgbClr r="0" g="0" b="0"/>
-      </a:lnRef>
-      <a:fillRef idx="3">
-        <a:scrgbClr r="0" g="0" b="0"/>
-      </a:fillRef>
-      <a:effectRef idx="3">
-        <a:scrgbClr r="0" g="0" b="0"/>
-      </a:effectRef>
-      <a:fontRef idx="minor">
-        <a:schemeClr val="lt1"/>
-      </a:fontRef>
-    </dgm:style>
-  </dgm:styleLbl>
-  <dgm:styleLbl name="fgSibTrans2D1">
-    <dgm:scene3d>
-      <a:camera prst="orthographicFront"/>
-      <a:lightRig rig="threePt" dir="t"/>
-    </dgm:scene3d>
-    <dgm:sp3d/>
-    <dgm:txPr/>
-    <dgm:style>
-      <a:lnRef idx="0">
-        <a:scrgbClr r="0" g="0" b="0"/>
-      </a:lnRef>
-      <a:fillRef idx="3">
-        <a:scrgbClr r="0" g="0" b="0"/>
-      </a:fillRef>
-      <a:effectRef idx="3">
-        <a:scrgbClr r="0" g="0" b="0"/>
-      </a:effectRef>
-      <a:fontRef idx="minor">
-        <a:schemeClr val="lt1"/>
-      </a:fontRef>
-    </dgm:style>
-  </dgm:styleLbl>
-  <dgm:styleLbl name="bgSibTrans2D1">
-    <dgm:scene3d>
-      <a:camera prst="orthographicFront"/>
-      <a:lightRig rig="threePt" dir="t"/>
-    </dgm:scene3d>
-    <dgm:sp3d/>
-    <dgm:txPr/>
-    <dgm:style>
-      <a:lnRef idx="0">
-        <a:scrgbClr r="0" g="0" b="0"/>
-      </a:lnRef>
-      <a:fillRef idx="3">
-        <a:scrgbClr r="0" g="0" b="0"/>
-      </a:fillRef>
-      <a:effectRef idx="3">
-        <a:scrgbClr r="0" g="0" b="0"/>
-      </a:effectRef>
-      <a:fontRef idx="minor">
-        <a:schemeClr val="lt1"/>
-      </a:fontRef>
-    </dgm:style>
-  </dgm:styleLbl>
-  <dgm:styleLbl name="sibTrans1D1">
-    <dgm:scene3d>
-      <a:camera prst="orthographicFront"/>
-      <a:lightRig rig="threePt" dir="t"/>
-    </dgm:scene3d>
-    <dgm:sp3d/>
-    <dgm:txPr/>
-    <dgm:style>
-      <a:lnRef idx="1">
-        <a:scrgbClr r="0" g="0" b="0"/>
-      </a:lnRef>
-      <a:fillRef idx="0">
-        <a:scrgbClr r="0" g="0" b="0"/>
-      </a:fillRef>
-      <a:effectRef idx="0">
-        <a:scrgbClr r="0" g="0" b="0"/>
-      </a:effectRef>
-      <a:fontRef idx="minor"/>
-    </dgm:style>
-  </dgm:styleLbl>
-  <dgm:styleLbl name="callout">
-    <dgm:scene3d>
-      <a:camera prst="orthographicFront"/>
-      <a:lightRig rig="threePt" dir="t"/>
-    </dgm:scene3d>
-    <dgm:sp3d/>
-    <dgm:txPr/>
-    <dgm:style>
-      <a:lnRef idx="1">
-        <a:scrgbClr r="0" g="0" b="0"/>
-      </a:lnRef>
-      <a:fillRef idx="0">
-        <a:scrgbClr r="0" g="0" b="0"/>
-      </a:fillRef>
-      <a:effectRef idx="1">
-        <a:scrgbClr r="0" g="0" b="0"/>
-      </a:effectRef>
-      <a:fontRef idx="minor"/>
-    </dgm:style>
-  </dgm:styleLbl>
-  <dgm:styleLbl name="asst0">
-    <dgm:scene3d>
-      <a:camera prst="orthographicFront"/>
-      <a:lightRig rig="threePt" dir="t"/>
-    </dgm:scene3d>
-    <dgm:sp3d/>
-    <dgm:txPr/>
-    <dgm:style>
-      <a:lnRef idx="0">
-        <a:scrgbClr r="0" g="0" b="0"/>
-      </a:lnRef>
-      <a:fillRef idx="3">
-        <a:scrgbClr r="0" g="0" b="0"/>
-      </a:fillRef>
-      <a:effectRef idx="3">
-        <a:scrgbClr r="0" g="0" b="0"/>
-      </a:effectRef>
-      <a:fontRef idx="minor">
-        <a:schemeClr val="lt1"/>
-      </a:fontRef>
-    </dgm:style>
-  </dgm:styleLbl>
-  <dgm:styleLbl name="asst1">
-    <dgm:scene3d>
-      <a:camera prst="orthographicFront"/>
-      <a:lightRig rig="threePt" dir="t"/>
-    </dgm:scene3d>
-    <dgm:sp3d/>
-    <dgm:txPr/>
-    <dgm:style>
-      <a:lnRef idx="0">
-        <a:scrgbClr r="0" g="0" b="0"/>
-      </a:lnRef>
-      <a:fillRef idx="3">
-        <a:scrgbClr r="0" g="0" b="0"/>
-      </a:fillRef>
-      <a:effectRef idx="3">
-        <a:scrgbClr r="0" g="0" b="0"/>
-      </a:effectRef>
-      <a:fontRef idx="minor">
-        <a:schemeClr val="lt1"/>
-      </a:fontRef>
-    </dgm:style>
-  </dgm:styleLbl>
-  <dgm:styleLbl name="asst2">
-    <dgm:scene3d>
-      <a:camera prst="orthographicFront"/>
-      <a:lightRig rig="threePt" dir="t"/>
-    </dgm:scene3d>
-    <dgm:sp3d/>
-    <dgm:txPr/>
-    <dgm:style>
-      <a:lnRef idx="0">
-        <a:scrgbClr r="0" g="0" b="0"/>
-      </a:lnRef>
-      <a:fillRef idx="3">
-        <a:scrgbClr r="0" g="0" b="0"/>
-      </a:fillRef>
-      <a:effectRef idx="3">
-        <a:scrgbClr r="0" g="0" b="0"/>
-      </a:effectRef>
-      <a:fontRef idx="minor">
-        <a:schemeClr val="lt1"/>
-      </a:fontRef>
-    </dgm:style>
-  </dgm:styleLbl>
-  <dgm:styleLbl name="asst3">
-    <dgm:scene3d>
-      <a:camera prst="orthographicFront"/>
-      <a:lightRig rig="threePt" dir="t"/>
-    </dgm:scene3d>
-    <dgm:sp3d/>
-    <dgm:txPr/>
-    <dgm:style>
-      <a:lnRef idx="0">
-        <a:scrgbClr r="0" g="0" b="0"/>
-      </a:lnRef>
-      <a:fillRef idx="3">
-        <a:scrgbClr r="0" g="0" b="0"/>
-      </a:fillRef>
-      <a:effectRef idx="3">
-        <a:scrgbClr r="0" g="0" b="0"/>
-      </a:effectRef>
-      <a:fontRef idx="minor">
-        <a:schemeClr val="lt1"/>
-      </a:fontRef>
-    </dgm:style>
-  </dgm:styleLbl>
-  <dgm:styleLbl name="asst4">
-    <dgm:scene3d>
-      <a:camera prst="orthographicFront"/>
-      <a:lightRig rig="threePt" dir="t"/>
-    </dgm:scene3d>
-    <dgm:sp3d/>
-    <dgm:txPr/>
-    <dgm:style>
-      <a:lnRef idx="0">
-        <a:scrgbClr r="0" g="0" b="0"/>
-      </a:lnRef>
-      <a:fillRef idx="3">
-        <a:scrgbClr r="0" g="0" b="0"/>
-      </a:fillRef>
-      <a:effectRef idx="3">
-        <a:scrgbClr r="0" g="0" b="0"/>
-      </a:effectRef>
-      <a:fontRef idx="minor">
-        <a:schemeClr val="lt1"/>
-      </a:fontRef>
-    </dgm:style>
-  </dgm:styleLbl>
-  <dgm:styleLbl name="parChTrans2D1">
-    <dgm:scene3d>
-      <a:camera prst="orthographicFront"/>
-      <a:lightRig rig="threePt" dir="t"/>
-    </dgm:scene3d>
-    <dgm:sp3d/>
-    <dgm:txPr/>
-    <dgm:style>
-      <a:lnRef idx="0">
-        <a:scrgbClr r="0" g="0" b="0"/>
-      </a:lnRef>
-      <a:fillRef idx="3">
-        <a:scrgbClr r="0" g="0" b="0"/>
-      </a:fillRef>
-      <a:effectRef idx="3">
-        <a:scrgbClr r="0" g="0" b="0"/>
-      </a:effectRef>
-      <a:fontRef idx="minor">
-        <a:schemeClr val="lt1"/>
-      </a:fontRef>
-    </dgm:style>
-  </dgm:styleLbl>
-  <dgm:styleLbl name="parChTrans2D2">
-    <dgm:scene3d>
-      <a:camera prst="orthographicFront"/>
-      <a:lightRig rig="threePt" dir="t"/>
-    </dgm:scene3d>
-    <dgm:sp3d/>
-    <dgm:txPr/>
-    <dgm:style>
-      <a:lnRef idx="0">
-        <a:scrgbClr r="0" g="0" b="0"/>
-      </a:lnRef>
-      <a:fillRef idx="3">
-        <a:scrgbClr r="0" g="0" b="0"/>
-      </a:fillRef>
-      <a:effectRef idx="3">
-        <a:scrgbClr r="0" g="0" b="0"/>
-      </a:effectRef>
-      <a:fontRef idx="minor">
-        <a:schemeClr val="lt1"/>
-      </a:fontRef>
-    </dgm:style>
-  </dgm:styleLbl>
-  <dgm:styleLbl name="parChTrans2D3">
-    <dgm:scene3d>
-      <a:camera prst="orthographicFront"/>
-      <a:lightRig rig="threePt" dir="t"/>
-    </dgm:scene3d>
-    <dgm:sp3d/>
-    <dgm:txPr/>
-    <dgm:style>
-      <a:lnRef idx="0">
-        <a:scrgbClr r="0" g="0" b="0"/>
-      </a:lnRef>
-      <a:fillRef idx="3">
-        <a:scrgbClr r="0" g="0" b="0"/>
-      </a:fillRef>
-      <a:effectRef idx="3">
-        <a:scrgbClr r="0" g="0" b="0"/>
-      </a:effectRef>
-      <a:fontRef idx="minor">
-        <a:schemeClr val="lt1"/>
-      </a:fontRef>
-    </dgm:style>
-  </dgm:styleLbl>
-  <dgm:styleLbl name="parChTrans2D4">
-    <dgm:scene3d>
-      <a:camera prst="orthographicFront"/>
-      <a:lightRig rig="threePt" dir="t"/>
-    </dgm:scene3d>
-    <dgm:sp3d/>
-    <dgm:txPr/>
-    <dgm:style>
-      <a:lnRef idx="0">
-        <a:scrgbClr r="0" g="0" b="0"/>
-      </a:lnRef>
-      <a:fillRef idx="3">
-        <a:scrgbClr r="0" g="0" b="0"/>
-      </a:fillRef>
-      <a:effectRef idx="3">
-        <a:scrgbClr r="0" g="0" b="0"/>
-      </a:effectRef>
-      <a:fontRef idx="minor">
-        <a:schemeClr val="lt1"/>
-      </a:fontRef>
-    </dgm:style>
-  </dgm:styleLbl>
-  <dgm:styleLbl name="parChTrans1D1">
-    <dgm:scene3d>
-      <a:camera prst="orthographicFront"/>
-      <a:lightRig rig="threePt" dir="t"/>
-    </dgm:scene3d>
-    <dgm:sp3d/>
-    <dgm:txPr/>
-    <dgm:style>
-      <a:lnRef idx="2">
-        <a:scrgbClr r="0" g="0" b="0"/>
-      </a:lnRef>
-      <a:fillRef idx="0">
-        <a:scrgbClr r="0" g="0" b="0"/>
-      </a:fillRef>
-      <a:effectRef idx="0">
-        <a:scrgbClr r="0" g="0" b="0"/>
-      </a:effectRef>
-      <a:fontRef idx="minor"/>
-    </dgm:style>
-  </dgm:styleLbl>
-  <dgm:styleLbl name="parChTrans1D2">
-    <dgm:scene3d>
-      <a:camera prst="orthographicFront"/>
-      <a:lightRig rig="threePt" dir="t"/>
-    </dgm:scene3d>
-    <dgm:sp3d/>
-    <dgm:txPr/>
-    <dgm:style>
-      <a:lnRef idx="2">
-        <a:scrgbClr r="0" g="0" b="0"/>
-      </a:lnRef>
-      <a:fillRef idx="0">
-        <a:scrgbClr r="0" g="0" b="0"/>
-      </a:fillRef>
-      <a:effectRef idx="0">
-        <a:scrgbClr r="0" g="0" b="0"/>
-      </a:effectRef>
-      <a:fontRef idx="minor"/>
-    </dgm:style>
-  </dgm:styleLbl>
-  <dgm:styleLbl name="parChTrans1D3">
-    <dgm:scene3d>
-      <a:camera prst="orthographicFront"/>
-      <a:lightRig rig="threePt" dir="t"/>
-    </dgm:scene3d>
-    <dgm:sp3d/>
-    <dgm:txPr/>
-    <dgm:style>
-      <a:lnRef idx="2">
-        <a:scrgbClr r="0" g="0" b="0"/>
-      </a:lnRef>
-      <a:fillRef idx="0">
-        <a:scrgbClr r="0" g="0" b="0"/>
-      </a:fillRef>
-      <a:effectRef idx="0">
-        <a:scrgbClr r="0" g="0" b="0"/>
-      </a:effectRef>
-      <a:fontRef idx="minor"/>
-    </dgm:style>
-  </dgm:styleLbl>
-  <dgm:styleLbl name="parChTrans1D4">
-    <dgm:scene3d>
-      <a:camera prst="orthographicFront"/>
-      <a:lightRig rig="threePt" dir="t"/>
-    </dgm:scene3d>
-    <dgm:sp3d/>
-    <dgm:txPr/>
-    <dgm:style>
-      <a:lnRef idx="2">
-        <a:scrgbClr r="0" g="0" b="0"/>
-      </a:lnRef>
-      <a:fillRef idx="0">
-        <a:scrgbClr r="0" g="0" b="0"/>
-      </a:fillRef>
-      <a:effectRef idx="0">
-        <a:scrgbClr r="0" g="0" b="0"/>
-      </a:effectRef>
-      <a:fontRef idx="minor"/>
-    </dgm:style>
-  </dgm:styleLbl>
-  <dgm:styleLbl name="fgAcc1">
-    <dgm:scene3d>
-      <a:camera prst="orthographicFront"/>
-      <a:lightRig rig="threePt" dir="t"/>
-    </dgm:scene3d>
-    <dgm:sp3d/>
-    <dgm:txPr/>
-    <dgm:style>
-      <a:lnRef idx="1">
-        <a:scrgbClr r="0" g="0" b="0"/>
-      </a:lnRef>
-      <a:fillRef idx="1">
-        <a:scrgbClr r="0" g="0" b="0"/>
-      </a:fillRef>
-      <a:effectRef idx="2">
-        <a:scrgbClr r="0" g="0" b="0"/>
-      </a:effectRef>
-      <a:fontRef idx="minor"/>
-    </dgm:style>
-  </dgm:styleLbl>
-  <dgm:styleLbl name="conFgAcc1">
-    <dgm:scene3d>
-      <a:camera prst="orthographicFront"/>
-      <a:lightRig rig="threePt" dir="t"/>
-    </dgm:scene3d>
-    <dgm:sp3d/>
-    <dgm:txPr/>
-    <dgm:style>
-      <a:lnRef idx="1">
-        <a:scrgbClr r="0" g="0" b="0"/>
-      </a:lnRef>
-      <a:fillRef idx="1">
-        <a:scrgbClr r="0" g="0" b="0"/>
-      </a:fillRef>
-      <a:effectRef idx="2">
-        <a:scrgbClr r="0" g="0" b="0"/>
-      </a:effectRef>
-      <a:fontRef idx="minor"/>
-    </dgm:style>
-  </dgm:styleLbl>
-  <dgm:styleLbl name="alignAcc1">
-    <dgm:scene3d>
-      <a:camera prst="orthographicFront"/>
-      <a:lightRig rig="threePt" dir="t"/>
-    </dgm:scene3d>
-    <dgm:sp3d/>
-    <dgm:txPr/>
-    <dgm:style>
-      <a:lnRef idx="1">
-        <a:scrgbClr r="0" g="0" b="0"/>
-      </a:lnRef>
-      <a:fillRef idx="1">
-        <a:scrgbClr r="0" g="0" b="0"/>
-      </a:fillRef>
-      <a:effectRef idx="2">
-        <a:scrgbClr r="0" g="0" b="0"/>
-      </a:effectRef>
-      <a:fontRef idx="minor"/>
-    </dgm:style>
-  </dgm:styleLbl>
-  <dgm:styleLbl name="trAlignAcc1">
-    <dgm:scene3d>
-      <a:camera prst="orthographicFront"/>
-      <a:lightRig rig="threePt" dir="t"/>
-    </dgm:scene3d>
-    <dgm:sp3d/>
-    <dgm:txPr/>
-    <dgm:style>
-      <a:lnRef idx="1">
-        <a:scrgbClr r="0" g="0" b="0"/>
-      </a:lnRef>
-      <a:fillRef idx="1">
-        <a:scrgbClr r="0" g="0" b="0"/>
-      </a:fillRef>
-      <a:effectRef idx="0">
-        <a:scrgbClr r="0" g="0" b="0"/>
-      </a:effectRef>
-      <a:fontRef idx="minor"/>
-    </dgm:style>
-  </dgm:styleLbl>
-  <dgm:styleLbl name="bgAcc1">
-    <dgm:scene3d>
-      <a:camera prst="orthographicFront"/>
-      <a:lightRig rig="threePt" dir="t"/>
-    </dgm:scene3d>
-    <dgm:sp3d/>
-    <dgm:txPr/>
-    <dgm:style>
-      <a:lnRef idx="1">
-        <a:scrgbClr r="0" g="0" b="0"/>
-      </a:lnRef>
-      <a:fillRef idx="1">
-        <a:scrgbClr r="0" g="0" b="0"/>
-      </a:fillRef>
-      <a:effectRef idx="2">
-        <a:scrgbClr r="0" g="0" b="0"/>
-      </a:effectRef>
-      <a:fontRef idx="minor"/>
-    </dgm:style>
-  </dgm:styleLbl>
-  <dgm:styleLbl name="solidFgAcc1">
-    <dgm:scene3d>
-      <a:camera prst="orthographicFront"/>
-      <a:lightRig rig="threePt" dir="t"/>
-    </dgm:scene3d>
-    <dgm:sp3d/>
-    <dgm:txPr/>
-    <dgm:style>
-      <a:lnRef idx="1">
-        <a:scrgbClr r="0" g="0" b="0"/>
-      </a:lnRef>
-      <a:fillRef idx="1">
-        <a:scrgbClr r="0" g="0" b="0"/>
-      </a:fillRef>
-      <a:effectRef idx="2">
-        <a:scrgbClr r="0" g="0" b="0"/>
-      </a:effectRef>
-      <a:fontRef idx="minor"/>
-    </dgm:style>
-  </dgm:styleLbl>
-  <dgm:styleLbl name="solidAlignAcc1">
-    <dgm:scene3d>
-      <a:camera prst="orthographicFront"/>
-      <a:lightRig rig="threePt" dir="t"/>
-    </dgm:scene3d>
-    <dgm:sp3d/>
-    <dgm:txPr/>
-    <dgm:style>
-      <a:lnRef idx="1">
-        <a:scrgbClr r="0" g="0" b="0"/>
-      </a:lnRef>
-      <a:fillRef idx="1">
-        <a:scrgbClr r="0" g="0" b="0"/>
-      </a:fillRef>
-      <a:effectRef idx="3">
-        <a:scrgbClr r="0" g="0" b="0"/>
-      </a:effectRef>
-      <a:fontRef idx="minor"/>
-    </dgm:style>
-  </dgm:styleLbl>
-  <dgm:styleLbl name="solidBgAcc1">
-    <dgm:scene3d>
-      <a:camera prst="orthographicFront"/>
-      <a:lightRig rig="threePt" dir="t"/>
-    </dgm:scene3d>
-    <dgm:sp3d/>
-    <dgm:txPr/>
-    <dgm:style>
-      <a:lnRef idx="1">
-        <a:scrgbClr r="0" g="0" b="0"/>
-      </a:lnRef>
-      <a:fillRef idx="1">
-        <a:scrgbClr r="0" g="0" b="0"/>
-      </a:fillRef>
-      <a:effectRef idx="3">
-        <a:scrgbClr r="0" g="0" b="0"/>
-      </a:effectRef>
-      <a:fontRef idx="minor"/>
-    </dgm:style>
-  </dgm:styleLbl>
-  <dgm:styleLbl name="fgAccFollowNode1">
-    <dgm:scene3d>
-      <a:camera prst="orthographicFront"/>
-      <a:lightRig rig="threePt" dir="t"/>
-    </dgm:scene3d>
-    <dgm:sp3d/>
-    <dgm:txPr/>
-    <dgm:style>
-      <a:lnRef idx="1">
-        <a:scrgbClr r="0" g="0" b="0"/>
-      </a:lnRef>
-      <a:fillRef idx="1">
-        <a:scrgbClr r="0" g="0" b="0"/>
-      </a:fillRef>
-      <a:effectRef idx="2">
-        <a:scrgbClr r="0" g="0" b="0"/>
-      </a:effectRef>
-      <a:fontRef idx="minor"/>
-    </dgm:style>
-  </dgm:styleLbl>
-  <dgm:styleLbl name="alignAccFollowNode1">
-    <dgm:scene3d>
-      <a:camera prst="orthographicFront"/>
-      <a:lightRig rig="threePt" dir="t"/>
-    </dgm:scene3d>
-    <dgm:sp3d/>
-    <dgm:txPr/>
-    <dgm:style>
-      <a:lnRef idx="1">
-        <a:scrgbClr r="0" g="0" b="0"/>
-      </a:lnRef>
-      <a:fillRef idx="1">
-        <a:scrgbClr r="0" g="0" b="0"/>
-      </a:fillRef>
-      <a:effectRef idx="2">
-        <a:scrgbClr r="0" g="0" b="0"/>
-      </a:effectRef>
-      <a:fontRef idx="minor"/>
-    </dgm:style>
-  </dgm:styleLbl>
-  <dgm:styleLbl name="bgAccFollowNode1">
-    <dgm:scene3d>
-      <a:camera prst="orthographicFront"/>
-      <a:lightRig rig="threePt" dir="t"/>
-    </dgm:scene3d>
-    <dgm:sp3d/>
-    <dgm:txPr/>
-    <dgm:style>
-      <a:lnRef idx="1">
-        <a:scrgbClr r="0" g="0" b="0"/>
-      </a:lnRef>
-      <a:fillRef idx="1">
-        <a:scrgbClr r="0" g="0" b="0"/>
-      </a:fillRef>
-      <a:effectRef idx="2">
-        <a:scrgbClr r="0" g="0" b="0"/>
-      </a:effectRef>
-      <a:fontRef idx="minor"/>
-    </dgm:style>
-  </dgm:styleLbl>
-  <dgm:styleLbl name="fgAcc0">
-    <dgm:scene3d>
-      <a:camera prst="orthographicFront"/>
-      <a:lightRig rig="threePt" dir="t"/>
-    </dgm:scene3d>
-    <dgm:sp3d/>
-    <dgm:txPr/>
-    <dgm:style>
-      <a:lnRef idx="1">
-        <a:scrgbClr r="0" g="0" b="0"/>
-      </a:lnRef>
-      <a:fillRef idx="1">
-        <a:scrgbClr r="0" g="0" b="0"/>
-      </a:fillRef>
-      <a:effectRef idx="2">
-        <a:scrgbClr r="0" g="0" b="0"/>
-      </a:effectRef>
-      <a:fontRef idx="minor"/>
-    </dgm:style>
-  </dgm:styleLbl>
-  <dgm:styleLbl name="fgAcc2">
-    <dgm:scene3d>
-      <a:camera prst="orthographicFront"/>
-      <a:lightRig rig="threePt" dir="t"/>
-    </dgm:scene3d>
-    <dgm:sp3d/>
-    <dgm:txPr/>
-    <dgm:style>
-      <a:lnRef idx="1">
-        <a:scrgbClr r="0" g="0" b="0"/>
-      </a:lnRef>
-      <a:fillRef idx="1">
-        <a:scrgbClr r="0" g="0" b="0"/>
-      </a:fillRef>
-      <a:effectRef idx="2">
-        <a:scrgbClr r="0" g="0" b="0"/>
-      </a:effectRef>
-      <a:fontRef idx="minor"/>
-    </dgm:style>
-  </dgm:styleLbl>
-  <dgm:styleLbl name="fgAcc3">
-    <dgm:scene3d>
-      <a:camera prst="orthographicFront"/>
-      <a:lightRig rig="threePt" dir="t"/>
-    </dgm:scene3d>
-    <dgm:sp3d/>
-    <dgm:txPr/>
-    <dgm:style>
-      <a:lnRef idx="1">
-        <a:scrgbClr r="0" g="0" b="0"/>
-      </a:lnRef>
-      <a:fillRef idx="1">
-        <a:scrgbClr r="0" g="0" b="0"/>
-      </a:fillRef>
-      <a:effectRef idx="2">
-        <a:scrgbClr r="0" g="0" b="0"/>
-      </a:effectRef>
-      <a:fontRef idx="minor"/>
-    </dgm:style>
-  </dgm:styleLbl>
-  <dgm:styleLbl name="fgAcc4">
-    <dgm:scene3d>
-      <a:camera prst="orthographicFront"/>
-      <a:lightRig rig="threePt" dir="t"/>
-    </dgm:scene3d>
-    <dgm:sp3d/>
-    <dgm:txPr/>
-    <dgm:style>
-      <a:lnRef idx="1">
-        <a:scrgbClr r="0" g="0" b="0"/>
-      </a:lnRef>
-      <a:fillRef idx="1">
-        <a:scrgbClr r="0" g="0" b="0"/>
-      </a:fillRef>
-      <a:effectRef idx="2">
-        <a:scrgbClr r="0" g="0" b="0"/>
-      </a:effectRef>
-      <a:fontRef idx="minor"/>
-    </dgm:style>
-  </dgm:styleLbl>
-  <dgm:styleLbl name="bgShp">
-    <dgm:scene3d>
-      <a:camera prst="orthographicFront"/>
-      <a:lightRig rig="threePt" dir="t"/>
-    </dgm:scene3d>
-    <dgm:sp3d/>
-    <dgm:txPr/>
-    <dgm:style>
-      <a:lnRef idx="0">
-        <a:scrgbClr r="0" g="0" b="0"/>
-      </a:lnRef>
-      <a:fillRef idx="1">
-        <a:scrgbClr r="0" g="0" b="0"/>
-      </a:fillRef>
-      <a:effectRef idx="2">
-        <a:scrgbClr r="0" g="0" b="0"/>
-      </a:effectRef>
-      <a:fontRef idx="minor"/>
-    </dgm:style>
-  </dgm:styleLbl>
-  <dgm:styleLbl name="dkBgShp">
-    <dgm:scene3d>
-      <a:camera prst="orthographicFront"/>
-      <a:lightRig rig="threePt" dir="t"/>
-    </dgm:scene3d>
-    <dgm:sp3d/>
-    <dgm:txPr/>
-    <dgm:style>
-      <a:lnRef idx="0">
-        <a:scrgbClr r="0" g="0" b="0"/>
-      </a:lnRef>
-      <a:fillRef idx="1">
-        <a:scrgbClr r="0" g="0" b="0"/>
-      </a:fillRef>
-      <a:effectRef idx="3">
-        <a:scrgbClr r="0" g="0" b="0"/>
-      </a:effectRef>
-      <a:fontRef idx="minor"/>
-    </dgm:style>
-  </dgm:styleLbl>
-  <dgm:styleLbl name="trBgShp">
-    <dgm:scene3d>
-      <a:camera prst="orthographicFront"/>
-      <a:lightRig rig="threePt" dir="t"/>
-    </dgm:scene3d>
-    <dgm:sp3d/>
-    <dgm:txPr/>
-    <dgm:style>
-      <a:lnRef idx="0">
-        <a:scrgbClr r="0" g="0" b="0"/>
-      </a:lnRef>
-      <a:fillRef idx="1">
-        <a:scrgbClr r="0" g="0" b="0"/>
-      </a:fillRef>
-      <a:effectRef idx="0">
-        <a:scrgbClr r="0" g="0" b="0"/>
-      </a:effectRef>
-      <a:fontRef idx="minor"/>
-    </dgm:style>
-  </dgm:styleLbl>
-  <dgm:styleLbl name="fgShp">
-    <dgm:scene3d>
-      <a:camera prst="orthographicFront"/>
-      <a:lightRig rig="threePt" dir="t"/>
-    </dgm:scene3d>
-    <dgm:sp3d/>
-    <dgm:txPr/>
-    <dgm:style>
-      <a:lnRef idx="0">
-        <a:scrgbClr r="0" g="0" b="0"/>
-      </a:lnRef>
-      <a:fillRef idx="3">
-        <a:scrgbClr r="0" g="0" b="0"/>
-      </a:fillRef>
-      <a:effectRef idx="3">
-        <a:scrgbClr r="0" g="0" b="0"/>
-      </a:effectRef>
-      <a:fontRef idx="minor"/>
-    </dgm:style>
-  </dgm:styleLbl>
-  <dgm:styleLbl name="revTx">
-    <dgm:scene3d>
-      <a:camera prst="orthographicFront"/>
-      <a:lightRig rig="threePt" dir="t"/>
-    </dgm:scene3d>
-    <dgm:sp3d/>
-    <dgm:txPr/>
-    <dgm:style>
-      <a:lnRef idx="0">
-        <a:scrgbClr r="0" g="0" b="0"/>
-      </a:lnRef>
-      <a:fillRef idx="0">
-        <a:scrgbClr r="0" g="0" b="0"/>
-      </a:fillRef>
-      <a:effectRef idx="0">
-        <a:scrgbClr r="0" g="0" b="0"/>
-      </a:effectRef>
-      <a:fontRef idx="minor"/>
-    </dgm:style>
-  </dgm:styleLbl>
-</dgm:styleDef>
-</file>
-
 <file path=ppt/handoutMasters/handoutMaster1.xml><?xml version="1.0" encoding="utf-8"?>
 <p:handoutMaster xmlns:a="http://schemas.openxmlformats.org/drawingml/2006/main" xmlns:r="http://schemas.openxmlformats.org/officeDocument/2006/relationships" xmlns:p="http://schemas.openxmlformats.org/presentationml/2006/main">
   <p:cSld>
@@ -8821,7 +5354,7 @@
           <a:p>
             <a:fld id="{A443712D-678B-4D6F-A140-D0F8F0FAE3A2}" type="datetimeFigureOut">
               <a:rPr lang="en-US" smtClean="0"/>
-              <a:t>4/11/2023</a:t>
+              <a:t>4/11/23</a:t>
             </a:fld>
             <a:endParaRPr lang="en-US"/>
           </a:p>
@@ -9419,7 +5952,27 @@
                 <a:effectLst/>
                 <a:latin typeface="-apple-system"/>
               </a:rPr>
-              <a:t>We scrutinized and cleaned the data with python and concluded with the data</a:t>
+              <a:t>We </a:t>
+            </a:r>
+            <a:r>
+              <a:rPr lang="en-GB" b="0" i="0" dirty="0" err="1">
+                <a:solidFill>
+                  <a:srgbClr val="1F2328"/>
+                </a:solidFill>
+                <a:effectLst/>
+                <a:latin typeface="-apple-system"/>
+              </a:rPr>
+              <a:t>scrotinized</a:t>
+            </a:r>
+            <a:r>
+              <a:rPr lang="en-GB" b="0" i="0" dirty="0">
+                <a:solidFill>
+                  <a:srgbClr val="1F2328"/>
+                </a:solidFill>
+                <a:effectLst/>
+                <a:latin typeface="-apple-system"/>
+              </a:rPr>
+              <a:t> and cleaned the data with python and concluded with the data</a:t>
             </a:r>
           </a:p>
           <a:p>
@@ -9690,7 +6243,7 @@
           <a:p>
             <a:fld id="{8DE6AADA-0D42-4ECA-804D-48801CC714DC}" type="datetimeFigureOut">
               <a:rPr lang="en-AU" smtClean="0"/>
-              <a:t>11/04/2023</a:t>
+              <a:t>11/4/2023</a:t>
             </a:fld>
             <a:endParaRPr lang="en-AU"/>
           </a:p>
@@ -9890,7 +6443,7 @@
           <a:p>
             <a:fld id="{8DE6AADA-0D42-4ECA-804D-48801CC714DC}" type="datetimeFigureOut">
               <a:rPr lang="en-AU" smtClean="0"/>
-              <a:t>11/04/2023</a:t>
+              <a:t>11/4/2023</a:t>
             </a:fld>
             <a:endParaRPr lang="en-AU"/>
           </a:p>
@@ -10100,7 +6653,7 @@
           <a:p>
             <a:fld id="{8DE6AADA-0D42-4ECA-804D-48801CC714DC}" type="datetimeFigureOut">
               <a:rPr lang="en-AU" smtClean="0"/>
-              <a:t>11/04/2023</a:t>
+              <a:t>11/4/2023</a:t>
             </a:fld>
             <a:endParaRPr lang="en-AU"/>
           </a:p>
@@ -29098,7 +25651,7 @@
           <a:p>
             <a:fld id="{6EBB0E32-0304-4451-ADB8-C044457D5B85}" type="datetimeFigureOut">
               <a:rPr lang="en-US" smtClean="0"/>
-              <a:t>4/11/2023</a:t>
+              <a:t>4/11/23</a:t>
             </a:fld>
             <a:endParaRPr lang="en-US"/>
           </a:p>
@@ -29350,7 +25903,7 @@
           <a:p>
             <a:fld id="{8DE6AADA-0D42-4ECA-804D-48801CC714DC}" type="datetimeFigureOut">
               <a:rPr lang="en-AU" smtClean="0"/>
-              <a:t>11/04/2023</a:t>
+              <a:t>11/4/2023</a:t>
             </a:fld>
             <a:endParaRPr lang="en-AU"/>
           </a:p>
@@ -29626,7 +26179,7 @@
           <a:p>
             <a:fld id="{8DE6AADA-0D42-4ECA-804D-48801CC714DC}" type="datetimeFigureOut">
               <a:rPr lang="en-AU" smtClean="0"/>
-              <a:t>11/04/2023</a:t>
+              <a:t>11/4/2023</a:t>
             </a:fld>
             <a:endParaRPr lang="en-AU"/>
           </a:p>
@@ -29894,7 +26447,7 @@
           <a:p>
             <a:fld id="{8DE6AADA-0D42-4ECA-804D-48801CC714DC}" type="datetimeFigureOut">
               <a:rPr lang="en-AU" smtClean="0"/>
-              <a:t>11/04/2023</a:t>
+              <a:t>11/4/2023</a:t>
             </a:fld>
             <a:endParaRPr lang="en-AU"/>
           </a:p>
@@ -30309,7 +26862,7 @@
           <a:p>
             <a:fld id="{8DE6AADA-0D42-4ECA-804D-48801CC714DC}" type="datetimeFigureOut">
               <a:rPr lang="en-AU" smtClean="0"/>
-              <a:t>11/04/2023</a:t>
+              <a:t>11/4/2023</a:t>
             </a:fld>
             <a:endParaRPr lang="en-AU"/>
           </a:p>
@@ -30451,7 +27004,7 @@
           <a:p>
             <a:fld id="{8DE6AADA-0D42-4ECA-804D-48801CC714DC}" type="datetimeFigureOut">
               <a:rPr lang="en-AU" smtClean="0"/>
-              <a:t>11/04/2023</a:t>
+              <a:t>11/4/2023</a:t>
             </a:fld>
             <a:endParaRPr lang="en-AU"/>
           </a:p>
@@ -30564,7 +27117,7 @@
           <a:p>
             <a:fld id="{8DE6AADA-0D42-4ECA-804D-48801CC714DC}" type="datetimeFigureOut">
               <a:rPr lang="en-AU" smtClean="0"/>
-              <a:t>11/04/2023</a:t>
+              <a:t>11/4/2023</a:t>
             </a:fld>
             <a:endParaRPr lang="en-AU"/>
           </a:p>
@@ -30877,7 +27430,7 @@
           <a:p>
             <a:fld id="{8DE6AADA-0D42-4ECA-804D-48801CC714DC}" type="datetimeFigureOut">
               <a:rPr lang="en-AU" smtClean="0"/>
-              <a:t>11/04/2023</a:t>
+              <a:t>11/4/2023</a:t>
             </a:fld>
             <a:endParaRPr lang="en-AU"/>
           </a:p>
@@ -31166,7 +27719,7 @@
           <a:p>
             <a:fld id="{8DE6AADA-0D42-4ECA-804D-48801CC714DC}" type="datetimeFigureOut">
               <a:rPr lang="en-AU" smtClean="0"/>
-              <a:t>11/04/2023</a:t>
+              <a:t>11/4/2023</a:t>
             </a:fld>
             <a:endParaRPr lang="en-AU"/>
           </a:p>
@@ -31409,7 +27962,7 @@
           <a:p>
             <a:fld id="{8DE6AADA-0D42-4ECA-804D-48801CC714DC}" type="datetimeFigureOut">
               <a:rPr lang="en-AU" smtClean="0"/>
-              <a:t>11/04/2023</a:t>
+              <a:t>11/4/2023</a:t>
             </a:fld>
             <a:endParaRPr lang="en-AU"/>
           </a:p>
@@ -31917,8 +28470,8 @@
         </p:blipFill>
         <p:spPr>
           <a:xfrm>
-            <a:off x="4347976" y="36575"/>
-            <a:ext cx="7844024" cy="6204976"/>
+            <a:off x="4347976" y="0"/>
+            <a:ext cx="7844024" cy="6858000"/>
           </a:xfrm>
           <a:prstGeom prst="rect">
             <a:avLst/>
@@ -33419,8 +29972,8 @@
         </p:nvSpPr>
         <p:spPr>
           <a:xfrm>
-            <a:off x="533400" y="152390"/>
-            <a:ext cx="4126989" cy="2112647"/>
+            <a:off x="533400" y="152391"/>
+            <a:ext cx="4126989" cy="1752610"/>
           </a:xfrm>
         </p:spPr>
         <p:txBody>
@@ -33431,7 +29984,7 @@
           <a:p>
             <a:r>
               <a:rPr lang="en-US" sz="4000" dirty="0"/>
-              <a:t>In today’s presentation</a:t>
+              <a:t>Overview</a:t>
             </a:r>
           </a:p>
         </p:txBody>
@@ -33588,8 +30141,8 @@
         </p:blipFill>
         <p:spPr>
           <a:xfrm>
-            <a:off x="20" y="1"/>
-            <a:ext cx="12191980" cy="6857999"/>
+            <a:off x="20" y="-152400"/>
+            <a:ext cx="12191980" cy="7010400"/>
           </a:xfrm>
           <a:prstGeom prst="rect">
             <a:avLst/>
@@ -33614,8 +30167,8 @@
         </p:nvSpPr>
         <p:spPr>
           <a:xfrm>
-            <a:off x="838199" y="1065862"/>
-            <a:ext cx="6052955" cy="4726276"/>
+            <a:off x="838200" y="1065862"/>
+            <a:ext cx="4572000" cy="4726276"/>
           </a:xfrm>
         </p:spPr>
         <p:txBody>
@@ -33707,8 +30260,8 @@
         </p:nvSpPr>
         <p:spPr>
           <a:xfrm>
-            <a:off x="7534641" y="1065862"/>
-            <a:ext cx="3860002" cy="4726276"/>
+            <a:off x="7289099" y="1065862"/>
+            <a:ext cx="4571987" cy="4726276"/>
           </a:xfrm>
           <a:prstGeom prst="rect">
             <a:avLst/>
@@ -33785,6 +30338,17 @@
               <a:buChar char="•"/>
             </a:pPr>
             <a:r>
+              <a:rPr lang="en-US" sz="1700" dirty="0">
+                <a:solidFill>
+                  <a:srgbClr val="FFFFFF"/>
+                </a:solidFill>
+                <a:latin typeface="+mn-lt"/>
+                <a:ea typeface="+mn-ea"/>
+                <a:cs typeface="+mn-cs"/>
+              </a:rPr>
+              <a:t>W</a:t>
+            </a:r>
+            <a:r>
               <a:rPr lang="en-US" sz="1700" b="0" i="0" dirty="0">
                 <a:solidFill>
                   <a:srgbClr val="FFFFFF"/>
@@ -33794,7 +30358,7 @@
                 <a:ea typeface="+mn-ea"/>
                 <a:cs typeface="+mn-cs"/>
               </a:rPr>
-              <a:t>we will break down population growth into its key drivers</a:t>
+              <a:t>e will break down population growth into its key drivers</a:t>
             </a:r>
           </a:p>
           <a:p>
@@ -33927,7 +30491,7 @@
     <p:bg>
       <p:bgPr>
         <a:solidFill>
-          <a:schemeClr val="bg2"/>
+          <a:schemeClr val="bg1"/>
         </a:solidFill>
         <a:effectLst/>
       </p:bgPr>
@@ -33946,6 +30510,66 @@
           <a:chExt cx="0" cy="0"/>
         </a:xfrm>
       </p:grpSpPr>
+      <p:sp useBgFill="1">
+        <p:nvSpPr>
+          <p:cNvPr id="8" name="Rectangle 7">
+            <a:extLst>
+              <a:ext uri="{FF2B5EF4-FFF2-40B4-BE49-F238E27FC236}">
+                <a16:creationId xmlns:a16="http://schemas.microsoft.com/office/drawing/2014/main" id="{E91DC736-0EF8-4F87-9146-EBF1D2EE4D3D}"/>
+              </a:ext>
+              <a:ext uri="{C183D7F6-B498-43B3-948B-1728B52AA6E4}">
+                <adec:decorative xmlns:adec="http://schemas.microsoft.com/office/drawing/2017/decorative" val="1"/>
+              </a:ext>
+            </a:extLst>
+          </p:cNvPr>
+          <p:cNvSpPr>
+            <a:spLocks noGrp="1" noRot="1" noChangeAspect="1" noMove="1" noResize="1" noEditPoints="1" noAdjustHandles="1" noChangeArrowheads="1" noChangeShapeType="1" noTextEdit="1"/>
+          </p:cNvSpPr>
+          <p:nvPr>
+            <p:extLst>
+              <p:ext uri="{386F3935-93C4-4BCD-93E2-E3B085C9AB24}">
+                <p16:designElem xmlns:p16="http://schemas.microsoft.com/office/powerpoint/2015/main" val="1"/>
+              </p:ext>
+            </p:extLst>
+          </p:nvPr>
+        </p:nvSpPr>
+        <p:spPr>
+          <a:xfrm>
+            <a:off x="0" y="0"/>
+            <a:ext cx="12192000" cy="6858000"/>
+          </a:xfrm>
+          <a:prstGeom prst="rect">
+            <a:avLst/>
+          </a:prstGeom>
+          <a:ln>
+            <a:noFill/>
+          </a:ln>
+        </p:spPr>
+        <p:style>
+          <a:lnRef idx="2">
+            <a:schemeClr val="accent1">
+              <a:shade val="50000"/>
+            </a:schemeClr>
+          </a:lnRef>
+          <a:fillRef idx="1">
+            <a:schemeClr val="accent1"/>
+          </a:fillRef>
+          <a:effectRef idx="0">
+            <a:schemeClr val="accent1"/>
+          </a:effectRef>
+          <a:fontRef idx="minor">
+            <a:schemeClr val="lt1"/>
+          </a:fontRef>
+        </p:style>
+        <p:txBody>
+          <a:bodyPr rtlCol="0" anchor="ctr"/>
+          <a:lstStyle/>
+          <a:p>
+            <a:pPr algn="ctr"/>
+            <a:endParaRPr lang="en-US"/>
+          </a:p>
+        </p:txBody>
+      </p:sp>
       <p:pic>
         <p:nvPicPr>
           <p:cNvPr id="3" name="Picture 2">
@@ -33961,57 +30585,368 @@
           <p:nvPr/>
         </p:nvPicPr>
         <p:blipFill rotWithShape="1">
-          <a:blip r:embed="rId2">
-            <a:duotone>
-              <a:prstClr val="black"/>
-              <a:schemeClr val="tx2">
-                <a:tint val="45000"/>
-                <a:satMod val="400000"/>
-              </a:schemeClr>
-            </a:duotone>
-            <a:alphaModFix amt="25000"/>
-          </a:blip>
-          <a:srcRect t="7788" b="7625"/>
+          <a:blip r:embed="rId2"/>
+          <a:srcRect t="4627" r="23585" b="4464"/>
           <a:stretch/>
         </p:blipFill>
         <p:spPr>
           <a:xfrm>
-            <a:off x="20" y="10"/>
-            <a:ext cx="12191980" cy="6857990"/>
+            <a:off x="3523488" y="10"/>
+            <a:ext cx="8668512" cy="6857990"/>
           </a:xfrm>
           <a:prstGeom prst="rect">
             <a:avLst/>
           </a:prstGeom>
         </p:spPr>
       </p:pic>
-      <p:graphicFrame>
-        <p:nvGraphicFramePr>
-          <p:cNvPr id="16" name="TextBox 3">
+      <p:sp>
+        <p:nvSpPr>
+          <p:cNvPr id="10" name="Rectangle 9">
             <a:extLst>
               <a:ext uri="{FF2B5EF4-FFF2-40B4-BE49-F238E27FC236}">
-                <a16:creationId xmlns:a16="http://schemas.microsoft.com/office/drawing/2014/main" id="{819D15BC-E3C8-62AC-275E-87D5839F03EC}"/>
+                <a16:creationId xmlns:a16="http://schemas.microsoft.com/office/drawing/2014/main" id="{097CD68E-23E3-4007-8847-CD0944C4F7BE}"/>
+              </a:ext>
+              <a:ext uri="{C183D7F6-B498-43B3-948B-1728B52AA6E4}">
+                <adec:decorative xmlns:adec="http://schemas.microsoft.com/office/drawing/2017/decorative" val="1"/>
               </a:ext>
             </a:extLst>
           </p:cNvPr>
-          <p:cNvGraphicFramePr/>
+          <p:cNvSpPr>
+            <a:spLocks noGrp="1" noRot="1" noChangeAspect="1" noMove="1" noResize="1" noEditPoints="1" noAdjustHandles="1" noChangeArrowheads="1" noChangeShapeType="1" noTextEdit="1"/>
+          </p:cNvSpPr>
           <p:nvPr>
             <p:extLst>
-              <p:ext uri="{D42A27DB-BD31-4B8C-83A1-F6EECF244321}">
-                <p14:modId xmlns:p14="http://schemas.microsoft.com/office/powerpoint/2010/main" val="3078910590"/>
+              <p:ext uri="{386F3935-93C4-4BCD-93E2-E3B085C9AB24}">
+                <p16:designElem xmlns:p16="http://schemas.microsoft.com/office/powerpoint/2015/main" val="1"/>
               </p:ext>
             </p:extLst>
           </p:nvPr>
-        </p:nvGraphicFramePr>
-        <p:xfrm>
-          <a:off x="838200" y="0"/>
-          <a:ext cx="10515600" cy="6180138"/>
-        </p:xfrm>
-        <a:graphic>
-          <a:graphicData uri="http://schemas.openxmlformats.org/drawingml/2006/diagram">
-            <dgm:relIds xmlns:dgm="http://schemas.openxmlformats.org/drawingml/2006/diagram" xmlns:r="http://schemas.openxmlformats.org/officeDocument/2006/relationships" r:dm="rId3" r:lo="rId4" r:qs="rId5" r:cs="rId6"/>
-          </a:graphicData>
-        </a:graphic>
-      </p:graphicFrame>
+        </p:nvSpPr>
+        <p:spPr>
+          <a:xfrm>
+            <a:off x="0" y="0"/>
+            <a:ext cx="9756601" cy="6858000"/>
+          </a:xfrm>
+          <a:prstGeom prst="rect">
+            <a:avLst/>
+          </a:prstGeom>
+          <a:gradFill>
+            <a:gsLst>
+              <a:gs pos="58000">
+                <a:schemeClr val="bg1"/>
+              </a:gs>
+              <a:gs pos="35000">
+                <a:schemeClr val="bg1">
+                  <a:alpha val="79000"/>
+                </a:schemeClr>
+              </a:gs>
+              <a:gs pos="19000">
+                <a:schemeClr val="bg1">
+                  <a:alpha val="38000"/>
+                </a:schemeClr>
+              </a:gs>
+              <a:gs pos="0">
+                <a:schemeClr val="bg1">
+                  <a:alpha val="0"/>
+                </a:schemeClr>
+              </a:gs>
+              <a:gs pos="100000">
+                <a:schemeClr val="bg1"/>
+              </a:gs>
+            </a:gsLst>
+            <a:lin ang="10800000" scaled="0"/>
+          </a:gradFill>
+          <a:ln>
+            <a:noFill/>
+          </a:ln>
+        </p:spPr>
+        <p:style>
+          <a:lnRef idx="2">
+            <a:schemeClr val="accent1">
+              <a:shade val="50000"/>
+            </a:schemeClr>
+          </a:lnRef>
+          <a:fillRef idx="1">
+            <a:schemeClr val="accent1"/>
+          </a:fillRef>
+          <a:effectRef idx="0">
+            <a:schemeClr val="accent1"/>
+          </a:effectRef>
+          <a:fontRef idx="minor">
+            <a:schemeClr val="lt1"/>
+          </a:fontRef>
+        </p:style>
+        <p:txBody>
+          <a:bodyPr rtlCol="0" anchor="ctr"/>
+          <a:lstStyle/>
+          <a:p>
+            <a:pPr algn="ctr"/>
+            <a:endParaRPr lang="en-US" dirty="0"/>
+          </a:p>
+        </p:txBody>
+      </p:sp>
+      <p:sp>
+        <p:nvSpPr>
+          <p:cNvPr id="12" name="Rectangle 11">
+            <a:extLst>
+              <a:ext uri="{FF2B5EF4-FFF2-40B4-BE49-F238E27FC236}">
+                <a16:creationId xmlns:a16="http://schemas.microsoft.com/office/drawing/2014/main" id="{AF2F604E-43BE-4DC3-B983-E071523364F8}"/>
+              </a:ext>
+              <a:ext uri="{C183D7F6-B498-43B3-948B-1728B52AA6E4}">
+                <adec:decorative xmlns:adec="http://schemas.microsoft.com/office/drawing/2017/decorative" val="1"/>
+              </a:ext>
+            </a:extLst>
+          </p:cNvPr>
+          <p:cNvSpPr>
+            <a:spLocks noGrp="1" noRot="1" noChangeAspect="1" noMove="1" noResize="1" noEditPoints="1" noAdjustHandles="1" noChangeArrowheads="1" noChangeShapeType="1" noTextEdit="1"/>
+          </p:cNvSpPr>
+          <p:nvPr>
+            <p:extLst>
+              <p:ext uri="{386F3935-93C4-4BCD-93E2-E3B085C9AB24}">
+                <p16:designElem xmlns:p16="http://schemas.microsoft.com/office/powerpoint/2015/main" val="1"/>
+              </p:ext>
+            </p:extLst>
+          </p:nvPr>
+        </p:nvSpPr>
+        <p:spPr>
+          <a:xfrm rot="5400000">
+            <a:off x="759921" y="346791"/>
+            <a:ext cx="146304" cy="704088"/>
+          </a:xfrm>
+          <a:prstGeom prst="rect">
+            <a:avLst/>
+          </a:prstGeom>
+          <a:solidFill>
+            <a:schemeClr val="accent2"/>
+          </a:solidFill>
+          <a:ln>
+            <a:noFill/>
+          </a:ln>
+        </p:spPr>
+        <p:style>
+          <a:lnRef idx="2">
+            <a:schemeClr val="accent1">
+              <a:shade val="50000"/>
+            </a:schemeClr>
+          </a:lnRef>
+          <a:fillRef idx="1">
+            <a:schemeClr val="accent1"/>
+          </a:fillRef>
+          <a:effectRef idx="0">
+            <a:schemeClr val="accent1"/>
+          </a:effectRef>
+          <a:fontRef idx="minor">
+            <a:schemeClr val="lt1"/>
+          </a:fontRef>
+        </p:style>
+        <p:txBody>
+          <a:bodyPr rtlCol="0" anchor="ctr"/>
+          <a:lstStyle/>
+          <a:p>
+            <a:pPr algn="ctr"/>
+            <a:endParaRPr lang="en-US">
+              <a:solidFill>
+                <a:prstClr val="white"/>
+              </a:solidFill>
+              <a:latin typeface="Calibri" panose="020F0502020204030204"/>
+            </a:endParaRPr>
+          </a:p>
+        </p:txBody>
+      </p:sp>
+      <p:sp>
+        <p:nvSpPr>
+          <p:cNvPr id="14" name="Rectangle 13">
+            <a:extLst>
+              <a:ext uri="{FF2B5EF4-FFF2-40B4-BE49-F238E27FC236}">
+                <a16:creationId xmlns:a16="http://schemas.microsoft.com/office/drawing/2014/main" id="{08C9B587-E65E-4B52-B37C-ABEBB6E87928}"/>
+              </a:ext>
+              <a:ext uri="{C183D7F6-B498-43B3-948B-1728B52AA6E4}">
+                <adec:decorative xmlns:adec="http://schemas.microsoft.com/office/drawing/2017/decorative" val="1"/>
+              </a:ext>
+            </a:extLst>
+          </p:cNvPr>
+          <p:cNvSpPr>
+            <a:spLocks noGrp="1" noRot="1" noChangeAspect="1" noMove="1" noResize="1" noEditPoints="1" noAdjustHandles="1" noChangeArrowheads="1" noChangeShapeType="1" noTextEdit="1"/>
+          </p:cNvSpPr>
+          <p:nvPr>
+            <p:extLst>
+              <p:ext uri="{386F3935-93C4-4BCD-93E2-E3B085C9AB24}">
+                <p16:designElem xmlns:p16="http://schemas.microsoft.com/office/powerpoint/2015/main" val="1"/>
+              </p:ext>
+            </p:extLst>
+          </p:nvPr>
+        </p:nvSpPr>
+        <p:spPr>
+          <a:xfrm>
+            <a:off x="481029" y="4546920"/>
+            <a:ext cx="3977640" cy="18288"/>
+          </a:xfrm>
+          <a:prstGeom prst="rect">
+            <a:avLst/>
+          </a:prstGeom>
+          <a:solidFill>
+            <a:srgbClr val="D5D5D5"/>
+          </a:solidFill>
+          <a:ln w="3175">
+            <a:noFill/>
+          </a:ln>
+          <a:effectLst/>
+        </p:spPr>
+        <p:style>
+          <a:lnRef idx="2">
+            <a:schemeClr val="accent1">
+              <a:shade val="50000"/>
+            </a:schemeClr>
+          </a:lnRef>
+          <a:fillRef idx="1">
+            <a:schemeClr val="accent1"/>
+          </a:fillRef>
+          <a:effectRef idx="0">
+            <a:schemeClr val="accent1"/>
+          </a:effectRef>
+          <a:fontRef idx="minor">
+            <a:schemeClr val="lt1"/>
+          </a:fontRef>
+        </p:style>
+        <p:txBody>
+          <a:bodyPr rtlCol="0" anchor="ctr"/>
+          <a:lstStyle/>
+          <a:p>
+            <a:pPr marL="0" marR="0" lvl="0" indent="0" algn="ctr" defTabSz="914400" rtl="0" eaLnBrk="1" fontAlgn="auto" latinLnBrk="0" hangingPunct="1">
+              <a:lnSpc>
+                <a:spcPct val="100000"/>
+              </a:lnSpc>
+              <a:spcBef>
+                <a:spcPts val="0"/>
+              </a:spcBef>
+              <a:spcAft>
+                <a:spcPts val="0"/>
+              </a:spcAft>
+              <a:buClrTx/>
+              <a:buSzTx/>
+              <a:buFontTx/>
+              <a:buNone/>
+              <a:tabLst/>
+              <a:defRPr/>
+            </a:pPr>
+            <a:endParaRPr kumimoji="0" lang="en-US" sz="1800" b="0" i="0" u="none" strike="noStrike" kern="1200" cap="none" spc="0" normalizeH="0" baseline="0" noProof="0">
+              <a:ln>
+                <a:noFill/>
+              </a:ln>
+              <a:solidFill>
+                <a:prstClr val="white"/>
+              </a:solidFill>
+              <a:effectLst/>
+              <a:uLnTx/>
+              <a:uFillTx/>
+              <a:latin typeface="Calibri" panose="020F0502020204030204"/>
+              <a:ea typeface="+mn-ea"/>
+              <a:cs typeface="+mn-cs"/>
+            </a:endParaRPr>
+          </a:p>
+        </p:txBody>
+      </p:sp>
+      <p:sp>
+        <p:nvSpPr>
+          <p:cNvPr id="4" name="TextBox 3">
+            <a:extLst>
+              <a:ext uri="{FF2B5EF4-FFF2-40B4-BE49-F238E27FC236}">
+                <a16:creationId xmlns:a16="http://schemas.microsoft.com/office/drawing/2014/main" id="{20667186-DDC9-FD25-7894-A10611F1C7BE}"/>
+              </a:ext>
+            </a:extLst>
+          </p:cNvPr>
+          <p:cNvSpPr txBox="1"/>
+          <p:nvPr/>
+        </p:nvSpPr>
+        <p:spPr>
+          <a:xfrm>
+            <a:off x="152400" y="152400"/>
+            <a:ext cx="4648200" cy="4262705"/>
+          </a:xfrm>
+          <a:prstGeom prst="rect">
+            <a:avLst/>
+          </a:prstGeom>
+          <a:solidFill>
+            <a:schemeClr val="bg1"/>
+          </a:solidFill>
+        </p:spPr>
+        <p:txBody>
+          <a:bodyPr wrap="square" rtlCol="0">
+            <a:spAutoFit/>
+          </a:bodyPr>
+          <a:lstStyle/>
+          <a:p>
+            <a:pPr>
+              <a:spcBef>
+                <a:spcPts val="600"/>
+              </a:spcBef>
+              <a:spcAft>
+                <a:spcPts val="1200"/>
+              </a:spcAft>
+            </a:pPr>
+            <a:r>
+              <a:rPr lang="en-US" sz="1800" b="1" dirty="0"/>
+              <a:t>Notes o</a:t>
+            </a:r>
+            <a:r>
+              <a:rPr lang="en-US" b="1" dirty="0"/>
+              <a:t>n Dataset:</a:t>
+            </a:r>
+          </a:p>
+          <a:p>
+            <a:pPr>
+              <a:spcBef>
+                <a:spcPts val="600"/>
+              </a:spcBef>
+              <a:spcAft>
+                <a:spcPts val="1200"/>
+              </a:spcAft>
+            </a:pPr>
+            <a:r>
+              <a:rPr lang="en-US" sz="1800" dirty="0"/>
+              <a:t>We have chosen to </a:t>
+            </a:r>
+            <a:r>
+              <a:rPr lang="en-US" sz="1800" dirty="0" err="1"/>
+              <a:t>analyse</a:t>
+            </a:r>
+            <a:r>
+              <a:rPr lang="en-US" sz="1800" dirty="0"/>
+              <a:t> data to 2019 for two key reasons:</a:t>
+            </a:r>
+          </a:p>
+          <a:p>
+            <a:pPr marL="342900" indent="-342900">
+              <a:spcBef>
+                <a:spcPts val="1200"/>
+              </a:spcBef>
+              <a:spcAft>
+                <a:spcPts val="1200"/>
+              </a:spcAft>
+              <a:buAutoNum type="arabicPeriod"/>
+            </a:pPr>
+            <a:r>
+              <a:rPr lang="en-US" dirty="0"/>
+              <a:t>Including 2020 data would have reduced the number of countries that met our study’s criteria (as more countries would have null entries for certain fields);</a:t>
+            </a:r>
+          </a:p>
+          <a:p>
+            <a:pPr marL="342900" indent="-342900">
+              <a:spcBef>
+                <a:spcPts val="1200"/>
+              </a:spcBef>
+              <a:spcAft>
+                <a:spcPts val="1200"/>
+              </a:spcAft>
+              <a:buAutoNum type="arabicPeriod"/>
+            </a:pPr>
+            <a:r>
+              <a:rPr lang="en-US" dirty="0"/>
+              <a:t> The impact of covid on both GDP and net-migration was dramatic. By excluding 2020 data we’re likely to get a more reliable approximation of population growth’s effect on GDP growth.</a:t>
+            </a:r>
+          </a:p>
+        </p:txBody>
+      </p:sp>
     </p:spTree>
     <p:extLst>
       <p:ext uri="{BB962C8B-B14F-4D97-AF65-F5344CB8AC3E}">
@@ -34020,7 +30955,7 @@
     </p:extLst>
   </p:cSld>
   <p:clrMapOvr>
-    <a:overrideClrMapping bg1="dk1" tx1="lt1" bg2="dk2" tx2="lt2" accent1="accent1" accent2="accent2" accent3="accent3" accent4="accent4" accent5="accent5" accent6="accent6" hlink="hlink" folHlink="folHlink"/>
+    <a:masterClrMapping/>
   </p:clrMapOvr>
 </p:sld>
 </file>
@@ -39985,6 +36920,23 @@
 </file>
 
 <file path=customXml/item1.xml><?xml version="1.0" encoding="utf-8"?>
+<p:properties xmlns:p="http://schemas.microsoft.com/office/2006/metadata/properties" xmlns:xsi="http://www.w3.org/2001/XMLSchema-instance" xmlns:pc="http://schemas.microsoft.com/office/infopath/2007/PartnerControls">
+  <documentManagement>
+    <MediaServiceKeyPoints xmlns="71af3243-3dd4-4a8d-8c0d-dd76da1f02a5" xsi:nil="true"/>
+  </documentManagement>
+</p:properties>
+</file>
+
+<file path=customXml/item2.xml><?xml version="1.0" encoding="utf-8"?>
+<?mso-contentType ?>
+<FormTemplates xmlns="http://schemas.microsoft.com/sharepoint/v3/contenttype/forms">
+  <Display>DocumentLibraryForm</Display>
+  <Edit>DocumentLibraryForm</Edit>
+  <New>DocumentLibraryForm</New>
+</FormTemplates>
+</file>
+
+<file path=customXml/item3.xml><?xml version="1.0" encoding="utf-8"?>
 <ct:contentTypeSchema xmlns:ct="http://schemas.microsoft.com/office/2006/metadata/contentType" xmlns:ma="http://schemas.microsoft.com/office/2006/metadata/properties/metaAttributes" ct:_="" ma:_="" ma:contentTypeName="Document" ma:contentTypeID="0x01010079F111ED35F8CC479449609E8A0923A6" ma:contentTypeVersion="11" ma:contentTypeDescription="Create a new document." ma:contentTypeScope="" ma:versionID="96291512c1ee715ab617f4c07df79fc1">
   <xsd:schema xmlns:xsd="http://www.w3.org/2001/XMLSchema" xmlns:xs="http://www.w3.org/2001/XMLSchema" xmlns:p="http://schemas.microsoft.com/office/2006/metadata/properties" xmlns:ns2="71af3243-3dd4-4a8d-8c0d-dd76da1f02a5" xmlns:ns3="16c05727-aa75-4e4a-9b5f-8a80a1165891" targetNamespace="http://schemas.microsoft.com/office/2006/metadata/properties" ma:root="true" ma:fieldsID="8256c27c40ca5c40ce1cf6c44f0205df" ns2:_="" ns3:_="">
     <xsd:import namespace="71af3243-3dd4-4a8d-8c0d-dd76da1f02a5"/>
@@ -40195,24 +37147,25 @@
 </ct:contentTypeSchema>
 </file>
 
-<file path=customXml/item2.xml><?xml version="1.0" encoding="utf-8"?>
-<p:properties xmlns:p="http://schemas.microsoft.com/office/2006/metadata/properties" xmlns:xsi="http://www.w3.org/2001/XMLSchema-instance" xmlns:pc="http://schemas.microsoft.com/office/infopath/2007/PartnerControls">
-  <documentManagement>
-    <MediaServiceKeyPoints xmlns="71af3243-3dd4-4a8d-8c0d-dd76da1f02a5" xsi:nil="true"/>
-  </documentManagement>
-</p:properties>
+<file path=customXml/itemProps1.xml><?xml version="1.0" encoding="utf-8"?>
+<ds:datastoreItem xmlns:ds="http://schemas.openxmlformats.org/officeDocument/2006/customXml" ds:itemID="{765DCA2E-A3A3-4379-AF49-80069EEF140F}">
+  <ds:schemaRefs>
+    <ds:schemaRef ds:uri="http://schemas.microsoft.com/office/2006/metadata/properties"/>
+    <ds:schemaRef ds:uri="http://schemas.microsoft.com/office/infopath/2007/PartnerControls"/>
+    <ds:schemaRef ds:uri="71af3243-3dd4-4a8d-8c0d-dd76da1f02a5"/>
+  </ds:schemaRefs>
+</ds:datastoreItem>
 </file>
 
-<file path=customXml/item3.xml><?xml version="1.0" encoding="utf-8"?>
-<?mso-contentType ?>
-<FormTemplates xmlns="http://schemas.microsoft.com/sharepoint/v3/contenttype/forms">
-  <Display>DocumentLibraryForm</Display>
-  <Edit>DocumentLibraryForm</Edit>
-  <New>DocumentLibraryForm</New>
-</FormTemplates>
+<file path=customXml/itemProps2.xml><?xml version="1.0" encoding="utf-8"?>
+<ds:datastoreItem xmlns:ds="http://schemas.openxmlformats.org/officeDocument/2006/customXml" ds:itemID="{1050AFE8-A560-4DCF-9BA0-FFF107A3C767}">
+  <ds:schemaRefs>
+    <ds:schemaRef ds:uri="http://schemas.microsoft.com/sharepoint/v3/contenttype/forms"/>
+  </ds:schemaRefs>
+</ds:datastoreItem>
 </file>
 
-<file path=customXml/itemProps1.xml><?xml version="1.0" encoding="utf-8"?>
+<file path=customXml/itemProps3.xml><?xml version="1.0" encoding="utf-8"?>
 <ds:datastoreItem xmlns:ds="http://schemas.openxmlformats.org/officeDocument/2006/customXml" ds:itemID="{87837719-2FF4-44D4-BAC3-0A7A8270EE0F}">
   <ds:schemaRefs>
     <ds:schemaRef ds:uri="http://schemas.microsoft.com/office/2006/metadata/contentType"/>
@@ -40229,22 +37182,4 @@
     <ds:schemaRef ds:uri="http://schemas.microsoft.com/internal/obd"/>
   </ds:schemaRefs>
 </ds:datastoreItem>
-</file>
-
-<file path=customXml/itemProps2.xml><?xml version="1.0" encoding="utf-8"?>
-<ds:datastoreItem xmlns:ds="http://schemas.openxmlformats.org/officeDocument/2006/customXml" ds:itemID="{765DCA2E-A3A3-4379-AF49-80069EEF140F}">
-  <ds:schemaRefs>
-    <ds:schemaRef ds:uri="http://schemas.microsoft.com/office/2006/metadata/properties"/>
-    <ds:schemaRef ds:uri="http://schemas.microsoft.com/office/infopath/2007/PartnerControls"/>
-    <ds:schemaRef ds:uri="71af3243-3dd4-4a8d-8c0d-dd76da1f02a5"/>
-  </ds:schemaRefs>
-</ds:datastoreItem>
-</file>
-
-<file path=customXml/itemProps3.xml><?xml version="1.0" encoding="utf-8"?>
-<ds:datastoreItem xmlns:ds="http://schemas.openxmlformats.org/officeDocument/2006/customXml" ds:itemID="{1050AFE8-A560-4DCF-9BA0-FFF107A3C767}">
-  <ds:schemaRefs>
-    <ds:schemaRef ds:uri="http://schemas.microsoft.com/sharepoint/v3/contenttype/forms"/>
-  </ds:schemaRefs>
-</ds:datastoreItem>
 </file>
</xml_diff>